<commit_message>
made the changes to the notebook and ppt
</commit_message>
<xml_diff>
--- a/Final_Presentation.pptx
+++ b/Final_Presentation.pptx
@@ -5,7 +5,7 @@
     <p:sldMasterId id="2147483648" r:id="rId1"/>
   </p:sldMasterIdLst>
   <p:notesMasterIdLst>
-    <p:notesMasterId r:id="rId15"/>
+    <p:notesMasterId r:id="rId16"/>
   </p:notesMasterIdLst>
   <p:sldIdLst>
     <p:sldId id="256" r:id="rId2"/>
@@ -14,13 +14,14 @@
     <p:sldId id="257" r:id="rId5"/>
     <p:sldId id="261" r:id="rId6"/>
     <p:sldId id="264" r:id="rId7"/>
-    <p:sldId id="262" r:id="rId8"/>
-    <p:sldId id="263" r:id="rId9"/>
-    <p:sldId id="265" r:id="rId10"/>
-    <p:sldId id="266" r:id="rId11"/>
-    <p:sldId id="267" r:id="rId12"/>
-    <p:sldId id="269" r:id="rId13"/>
-    <p:sldId id="270" r:id="rId14"/>
+    <p:sldId id="271" r:id="rId8"/>
+    <p:sldId id="262" r:id="rId9"/>
+    <p:sldId id="263" r:id="rId10"/>
+    <p:sldId id="265" r:id="rId11"/>
+    <p:sldId id="266" r:id="rId12"/>
+    <p:sldId id="267" r:id="rId13"/>
+    <p:sldId id="269" r:id="rId14"/>
+    <p:sldId id="270" r:id="rId15"/>
   </p:sldIdLst>
   <p:sldSz cx="12192000" cy="6858000"/>
   <p:notesSz cx="6858000" cy="9144000"/>
@@ -209,7 +210,7 @@
           <a:p>
             <a:fld id="{967483A9-E084-4649-A19B-B92CB0DE91A3}" type="datetimeFigureOut">
               <a:rPr lang="en-US" smtClean="0"/>
-              <a:t>6/21/20</a:t>
+              <a:t>6/21/2020</a:t>
             </a:fld>
             <a:endParaRPr lang="en-US"/>
           </a:p>
@@ -743,7 +744,7 @@
           <a:p>
             <a:fld id="{5B0439F7-BA01-A541-95AE-C6E45E2F4003}" type="slidenum">
               <a:rPr lang="en-US" smtClean="0"/>
-              <a:t>7</a:t>
+              <a:t>8</a:t>
             </a:fld>
             <a:endParaRPr lang="en-US"/>
           </a:p>
@@ -830,7 +831,7 @@
           <a:p>
             <a:fld id="{5B0439F7-BA01-A541-95AE-C6E45E2F4003}" type="slidenum">
               <a:rPr lang="en-US" smtClean="0"/>
-              <a:t>8</a:t>
+              <a:t>9</a:t>
             </a:fld>
             <a:endParaRPr lang="en-US"/>
           </a:p>
@@ -917,7 +918,7 @@
           <a:p>
             <a:fld id="{5B0439F7-BA01-A541-95AE-C6E45E2F4003}" type="slidenum">
               <a:rPr lang="en-US" smtClean="0"/>
-              <a:t>10</a:t>
+              <a:t>11</a:t>
             </a:fld>
             <a:endParaRPr lang="en-US"/>
           </a:p>
@@ -1001,7 +1002,7 @@
           <a:p>
             <a:fld id="{5B0439F7-BA01-A541-95AE-C6E45E2F4003}" type="slidenum">
               <a:rPr lang="en-US" smtClean="0"/>
-              <a:t>11</a:t>
+              <a:t>12</a:t>
             </a:fld>
             <a:endParaRPr lang="en-US"/>
           </a:p>
@@ -1110,7 +1111,7 @@
           <a:p>
             <a:fld id="{5B0439F7-BA01-A541-95AE-C6E45E2F4003}" type="slidenum">
               <a:rPr lang="en-US" smtClean="0"/>
-              <a:t>12</a:t>
+              <a:t>13</a:t>
             </a:fld>
             <a:endParaRPr lang="en-US"/>
           </a:p>
@@ -1276,7 +1277,7 @@
           <a:p>
             <a:fld id="{C1CC7F00-77D2-4F43-9191-B15704280A39}" type="datetimeFigureOut">
               <a:rPr lang="en-US" smtClean="0"/>
-              <a:t>6/21/20</a:t>
+              <a:t>6/21/2020</a:t>
             </a:fld>
             <a:endParaRPr lang="en-US"/>
           </a:p>
@@ -1474,7 +1475,7 @@
           <a:p>
             <a:fld id="{C1CC7F00-77D2-4F43-9191-B15704280A39}" type="datetimeFigureOut">
               <a:rPr lang="en-US" smtClean="0"/>
-              <a:t>6/21/20</a:t>
+              <a:t>6/21/2020</a:t>
             </a:fld>
             <a:endParaRPr lang="en-US"/>
           </a:p>
@@ -1682,7 +1683,7 @@
           <a:p>
             <a:fld id="{C1CC7F00-77D2-4F43-9191-B15704280A39}" type="datetimeFigureOut">
               <a:rPr lang="en-US" smtClean="0"/>
-              <a:t>6/21/20</a:t>
+              <a:t>6/21/2020</a:t>
             </a:fld>
             <a:endParaRPr lang="en-US"/>
           </a:p>
@@ -1880,7 +1881,7 @@
           <a:p>
             <a:fld id="{C1CC7F00-77D2-4F43-9191-B15704280A39}" type="datetimeFigureOut">
               <a:rPr lang="en-US" smtClean="0"/>
-              <a:t>6/21/20</a:t>
+              <a:t>6/21/2020</a:t>
             </a:fld>
             <a:endParaRPr lang="en-US"/>
           </a:p>
@@ -2155,7 +2156,7 @@
           <a:p>
             <a:fld id="{C1CC7F00-77D2-4F43-9191-B15704280A39}" type="datetimeFigureOut">
               <a:rPr lang="en-US" smtClean="0"/>
-              <a:t>6/21/20</a:t>
+              <a:t>6/21/2020</a:t>
             </a:fld>
             <a:endParaRPr lang="en-US"/>
           </a:p>
@@ -2420,7 +2421,7 @@
           <a:p>
             <a:fld id="{C1CC7F00-77D2-4F43-9191-B15704280A39}" type="datetimeFigureOut">
               <a:rPr lang="en-US" smtClean="0"/>
-              <a:t>6/21/20</a:t>
+              <a:t>6/21/2020</a:t>
             </a:fld>
             <a:endParaRPr lang="en-US"/>
           </a:p>
@@ -2832,7 +2833,7 @@
           <a:p>
             <a:fld id="{C1CC7F00-77D2-4F43-9191-B15704280A39}" type="datetimeFigureOut">
               <a:rPr lang="en-US" smtClean="0"/>
-              <a:t>6/21/20</a:t>
+              <a:t>6/21/2020</a:t>
             </a:fld>
             <a:endParaRPr lang="en-US"/>
           </a:p>
@@ -2973,7 +2974,7 @@
           <a:p>
             <a:fld id="{C1CC7F00-77D2-4F43-9191-B15704280A39}" type="datetimeFigureOut">
               <a:rPr lang="en-US" smtClean="0"/>
-              <a:t>6/21/20</a:t>
+              <a:t>6/21/2020</a:t>
             </a:fld>
             <a:endParaRPr lang="en-US"/>
           </a:p>
@@ -3086,7 +3087,7 @@
           <a:p>
             <a:fld id="{C1CC7F00-77D2-4F43-9191-B15704280A39}" type="datetimeFigureOut">
               <a:rPr lang="en-US" smtClean="0"/>
-              <a:t>6/21/20</a:t>
+              <a:t>6/21/2020</a:t>
             </a:fld>
             <a:endParaRPr lang="en-US"/>
           </a:p>
@@ -3397,7 +3398,7 @@
           <a:p>
             <a:fld id="{C1CC7F00-77D2-4F43-9191-B15704280A39}" type="datetimeFigureOut">
               <a:rPr lang="en-US" smtClean="0"/>
-              <a:t>6/21/20</a:t>
+              <a:t>6/21/2020</a:t>
             </a:fld>
             <a:endParaRPr lang="en-US"/>
           </a:p>
@@ -3685,7 +3686,7 @@
           <a:p>
             <a:fld id="{C1CC7F00-77D2-4F43-9191-B15704280A39}" type="datetimeFigureOut">
               <a:rPr lang="en-US" smtClean="0"/>
-              <a:t>6/21/20</a:t>
+              <a:t>6/21/2020</a:t>
             </a:fld>
             <a:endParaRPr lang="en-US"/>
           </a:p>
@@ -3926,7 +3927,7 @@
           <a:p>
             <a:fld id="{C1CC7F00-77D2-4F43-9191-B15704280A39}" type="datetimeFigureOut">
               <a:rPr lang="en-US" smtClean="0"/>
-              <a:t>6/21/20</a:t>
+              <a:t>6/21/2020</a:t>
             </a:fld>
             <a:endParaRPr lang="en-US"/>
           </a:p>
@@ -4437,6 +4438,1498 @@
           <p:cNvPr id="2" name="Title 1">
             <a:extLst>
               <a:ext uri="{FF2B5EF4-FFF2-40B4-BE49-F238E27FC236}">
+                <a16:creationId xmlns:a16="http://schemas.microsoft.com/office/drawing/2014/main" id="{74E2BB06-5706-8E45-9B30-F37A3E1B6A12}"/>
+              </a:ext>
+            </a:extLst>
+          </p:cNvPr>
+          <p:cNvSpPr>
+            <a:spLocks noGrp="1"/>
+          </p:cNvSpPr>
+          <p:nvPr>
+            <p:ph type="title"/>
+          </p:nvPr>
+        </p:nvSpPr>
+        <p:spPr>
+          <a:xfrm>
+            <a:off x="838200" y="365126"/>
+            <a:ext cx="10515600" cy="1001338"/>
+          </a:xfrm>
+        </p:spPr>
+        <p:txBody>
+          <a:bodyPr/>
+          <a:lstStyle/>
+          <a:p>
+            <a:r>
+              <a:rPr lang="en-US" dirty="0">
+                <a:latin typeface="Times New Roman" panose="02020603050405020304" pitchFamily="18" charset="0"/>
+                <a:cs typeface="Times New Roman" panose="02020603050405020304" pitchFamily="18" charset="0"/>
+              </a:rPr>
+              <a:t>Correlation Matrix of All Assets </a:t>
+            </a:r>
+          </a:p>
+        </p:txBody>
+      </p:sp>
+      <p:sp>
+        <p:nvSpPr>
+          <p:cNvPr id="3" name="Content Placeholder 2">
+            <a:extLst>
+              <a:ext uri="{FF2B5EF4-FFF2-40B4-BE49-F238E27FC236}">
+                <a16:creationId xmlns:a16="http://schemas.microsoft.com/office/drawing/2014/main" id="{971D751F-79D8-1E49-B651-29F593965A38}"/>
+              </a:ext>
+            </a:extLst>
+          </p:cNvPr>
+          <p:cNvSpPr>
+            <a:spLocks noGrp="1"/>
+          </p:cNvSpPr>
+          <p:nvPr>
+            <p:ph idx="1"/>
+          </p:nvPr>
+        </p:nvSpPr>
+        <p:spPr>
+          <a:xfrm>
+            <a:off x="507099" y="5777836"/>
+            <a:ext cx="10515600" cy="1059397"/>
+          </a:xfrm>
+        </p:spPr>
+        <p:txBody>
+          <a:bodyPr>
+            <a:normAutofit/>
+          </a:bodyPr>
+          <a:lstStyle/>
+          <a:p>
+            <a:endParaRPr lang="en-US" sz="1600" dirty="0"/>
+          </a:p>
+          <a:p>
+            <a:r>
+              <a:rPr lang="en-US" sz="1600" dirty="0"/>
+              <a:t>A measure of linear relationship between 2 assets…what is the impact of a change on one asset on the other asset?</a:t>
+            </a:r>
+          </a:p>
+          <a:p>
+            <a:r>
+              <a:rPr lang="en-US" sz="1600" dirty="0"/>
+              <a:t>Notice the level of correlation among assets within the same industry</a:t>
+            </a:r>
+          </a:p>
+        </p:txBody>
+      </p:sp>
+      <p:sp>
+        <p:nvSpPr>
+          <p:cNvPr id="6" name="TextBox 5">
+            <a:extLst>
+              <a:ext uri="{FF2B5EF4-FFF2-40B4-BE49-F238E27FC236}">
+                <a16:creationId xmlns:a16="http://schemas.microsoft.com/office/drawing/2014/main" id="{FD535C47-BC3B-C74F-88D5-E821F9B8F379}"/>
+              </a:ext>
+            </a:extLst>
+          </p:cNvPr>
+          <p:cNvSpPr txBox="1"/>
+          <p:nvPr/>
+        </p:nvSpPr>
+        <p:spPr>
+          <a:xfrm>
+            <a:off x="484095" y="2889455"/>
+            <a:ext cx="2892873" cy="2031325"/>
+          </a:xfrm>
+          <a:prstGeom prst="rect">
+            <a:avLst/>
+          </a:prstGeom>
+          <a:solidFill>
+            <a:srgbClr val="FFFF00"/>
+          </a:solidFill>
+        </p:spPr>
+        <p:txBody>
+          <a:bodyPr wrap="square" rtlCol="0">
+            <a:spAutoFit/>
+          </a:bodyPr>
+          <a:lstStyle/>
+          <a:p>
+            <a:r>
+              <a:rPr lang="en-US" dirty="0"/>
+              <a:t>Highlight the correlating assets with better marking </a:t>
+            </a:r>
+            <a:r>
+              <a:rPr lang="en-US" dirty="0">
+                <a:sym typeface="Wingdings" pitchFamily="2" charset="2"/>
+              </a:rPr>
+              <a:t>.</a:t>
+            </a:r>
+            <a:br>
+              <a:rPr lang="en-US" dirty="0">
+                <a:sym typeface="Wingdings" pitchFamily="2" charset="2"/>
+              </a:rPr>
+            </a:br>
+            <a:r>
+              <a:rPr lang="en-US" dirty="0">
+                <a:sym typeface="Wingdings" pitchFamily="2" charset="2"/>
+              </a:rPr>
+              <a:t>Re-arrange the assets to have assets from the same industries in pairs.</a:t>
+            </a:r>
+          </a:p>
+          <a:p>
+            <a:endParaRPr lang="en-US" dirty="0"/>
+          </a:p>
+        </p:txBody>
+      </p:sp>
+      <p:pic>
+        <p:nvPicPr>
+          <p:cNvPr id="9" name="Picture 8">
+            <a:extLst>
+              <a:ext uri="{FF2B5EF4-FFF2-40B4-BE49-F238E27FC236}">
+                <a16:creationId xmlns:a16="http://schemas.microsoft.com/office/drawing/2014/main" id="{12BCD5B3-0E5C-E24D-8AD3-9DD67A741BD0}"/>
+              </a:ext>
+            </a:extLst>
+          </p:cNvPr>
+          <p:cNvPicPr>
+            <a:picLocks noChangeAspect="1"/>
+          </p:cNvPicPr>
+          <p:nvPr/>
+        </p:nvPicPr>
+        <p:blipFill>
+          <a:blip r:embed="rId2"/>
+          <a:stretch>
+            <a:fillRect/>
+          </a:stretch>
+        </p:blipFill>
+        <p:spPr>
+          <a:xfrm>
+            <a:off x="484095" y="1427007"/>
+            <a:ext cx="2892873" cy="1495025"/>
+          </a:xfrm>
+          <a:prstGeom prst="rect">
+            <a:avLst/>
+          </a:prstGeom>
+        </p:spPr>
+      </p:pic>
+      <p:pic>
+        <p:nvPicPr>
+          <p:cNvPr id="8" name="Picture 7">
+            <a:extLst>
+              <a:ext uri="{FF2B5EF4-FFF2-40B4-BE49-F238E27FC236}">
+                <a16:creationId xmlns:a16="http://schemas.microsoft.com/office/drawing/2014/main" id="{07904EA0-FA62-4DBC-9C46-4F736B4901BB}"/>
+              </a:ext>
+            </a:extLst>
+          </p:cNvPr>
+          <p:cNvPicPr>
+            <a:picLocks noChangeAspect="1"/>
+          </p:cNvPicPr>
+          <p:nvPr/>
+        </p:nvPicPr>
+        <p:blipFill>
+          <a:blip r:embed="rId3">
+            <a:extLst>
+              <a:ext uri="{28A0092B-C50C-407E-A947-70E740481C1C}">
+                <a14:useLocalDpi xmlns:a14="http://schemas.microsoft.com/office/drawing/2010/main" val="0"/>
+              </a:ext>
+            </a:extLst>
+          </a:blip>
+          <a:stretch>
+            <a:fillRect/>
+          </a:stretch>
+        </p:blipFill>
+        <p:spPr>
+          <a:xfrm>
+            <a:off x="3382242" y="1427008"/>
+            <a:ext cx="8083568" cy="3905650"/>
+          </a:xfrm>
+          <a:prstGeom prst="rect">
+            <a:avLst/>
+          </a:prstGeom>
+        </p:spPr>
+      </p:pic>
+      <p:sp>
+        <p:nvSpPr>
+          <p:cNvPr id="11" name="Oval 10">
+            <a:extLst>
+              <a:ext uri="{FF2B5EF4-FFF2-40B4-BE49-F238E27FC236}">
+                <a16:creationId xmlns:a16="http://schemas.microsoft.com/office/drawing/2014/main" id="{AD4A2842-8196-41FA-B1B6-F316FD196B0E}"/>
+              </a:ext>
+            </a:extLst>
+          </p:cNvPr>
+          <p:cNvSpPr/>
+          <p:nvPr/>
+        </p:nvSpPr>
+        <p:spPr>
+          <a:xfrm rot="20195107">
+            <a:off x="4077478" y="1767623"/>
+            <a:ext cx="738231" cy="257077"/>
+          </a:xfrm>
+          <a:prstGeom prst="ellipse">
+            <a:avLst/>
+          </a:prstGeom>
+          <a:noFill/>
+          <a:ln w="28575">
+            <a:solidFill>
+              <a:srgbClr val="00B050"/>
+            </a:solidFill>
+          </a:ln>
+        </p:spPr>
+        <p:style>
+          <a:lnRef idx="2">
+            <a:schemeClr val="accent1">
+              <a:shade val="50000"/>
+            </a:schemeClr>
+          </a:lnRef>
+          <a:fillRef idx="1">
+            <a:schemeClr val="accent1"/>
+          </a:fillRef>
+          <a:effectRef idx="0">
+            <a:schemeClr val="accent1"/>
+          </a:effectRef>
+          <a:fontRef idx="minor">
+            <a:schemeClr val="lt1"/>
+          </a:fontRef>
+        </p:style>
+        <p:txBody>
+          <a:bodyPr rtlCol="0" anchor="ctr"/>
+          <a:lstStyle/>
+          <a:p>
+            <a:pPr algn="ctr"/>
+            <a:endParaRPr lang="en-US"/>
+          </a:p>
+        </p:txBody>
+      </p:sp>
+      <p:sp>
+        <p:nvSpPr>
+          <p:cNvPr id="13" name="Oval 12">
+            <a:extLst>
+              <a:ext uri="{FF2B5EF4-FFF2-40B4-BE49-F238E27FC236}">
+                <a16:creationId xmlns:a16="http://schemas.microsoft.com/office/drawing/2014/main" id="{B50A1EE1-7E98-409D-BB46-B3FBC36181E5}"/>
+              </a:ext>
+            </a:extLst>
+          </p:cNvPr>
+          <p:cNvSpPr/>
+          <p:nvPr/>
+        </p:nvSpPr>
+        <p:spPr>
+          <a:xfrm rot="20195107">
+            <a:off x="4731198" y="2092802"/>
+            <a:ext cx="738231" cy="257077"/>
+          </a:xfrm>
+          <a:prstGeom prst="ellipse">
+            <a:avLst/>
+          </a:prstGeom>
+          <a:noFill/>
+          <a:ln w="28575">
+            <a:solidFill>
+              <a:srgbClr val="00B050"/>
+            </a:solidFill>
+          </a:ln>
+        </p:spPr>
+        <p:style>
+          <a:lnRef idx="2">
+            <a:schemeClr val="accent1">
+              <a:shade val="50000"/>
+            </a:schemeClr>
+          </a:lnRef>
+          <a:fillRef idx="1">
+            <a:schemeClr val="accent1"/>
+          </a:fillRef>
+          <a:effectRef idx="0">
+            <a:schemeClr val="accent1"/>
+          </a:effectRef>
+          <a:fontRef idx="minor">
+            <a:schemeClr val="lt1"/>
+          </a:fontRef>
+        </p:style>
+        <p:txBody>
+          <a:bodyPr rtlCol="0" anchor="ctr"/>
+          <a:lstStyle/>
+          <a:p>
+            <a:pPr algn="ctr"/>
+            <a:endParaRPr lang="en-US"/>
+          </a:p>
+        </p:txBody>
+      </p:sp>
+      <p:sp>
+        <p:nvSpPr>
+          <p:cNvPr id="14" name="Oval 13">
+            <a:extLst>
+              <a:ext uri="{FF2B5EF4-FFF2-40B4-BE49-F238E27FC236}">
+                <a16:creationId xmlns:a16="http://schemas.microsoft.com/office/drawing/2014/main" id="{5687C895-A22E-4080-848C-A7A3503BE9CE}"/>
+              </a:ext>
+            </a:extLst>
+          </p:cNvPr>
+          <p:cNvSpPr/>
+          <p:nvPr/>
+        </p:nvSpPr>
+        <p:spPr>
+          <a:xfrm rot="20195107">
+            <a:off x="5365967" y="2417982"/>
+            <a:ext cx="738231" cy="257077"/>
+          </a:xfrm>
+          <a:prstGeom prst="ellipse">
+            <a:avLst/>
+          </a:prstGeom>
+          <a:noFill/>
+          <a:ln w="28575">
+            <a:solidFill>
+              <a:srgbClr val="00B050"/>
+            </a:solidFill>
+          </a:ln>
+        </p:spPr>
+        <p:style>
+          <a:lnRef idx="2">
+            <a:schemeClr val="accent1">
+              <a:shade val="50000"/>
+            </a:schemeClr>
+          </a:lnRef>
+          <a:fillRef idx="1">
+            <a:schemeClr val="accent1"/>
+          </a:fillRef>
+          <a:effectRef idx="0">
+            <a:schemeClr val="accent1"/>
+          </a:effectRef>
+          <a:fontRef idx="minor">
+            <a:schemeClr val="lt1"/>
+          </a:fontRef>
+        </p:style>
+        <p:txBody>
+          <a:bodyPr rtlCol="0" anchor="ctr"/>
+          <a:lstStyle/>
+          <a:p>
+            <a:pPr algn="ctr"/>
+            <a:endParaRPr lang="en-US"/>
+          </a:p>
+        </p:txBody>
+      </p:sp>
+      <p:sp>
+        <p:nvSpPr>
+          <p:cNvPr id="15" name="Oval 14">
+            <a:extLst>
+              <a:ext uri="{FF2B5EF4-FFF2-40B4-BE49-F238E27FC236}">
+                <a16:creationId xmlns:a16="http://schemas.microsoft.com/office/drawing/2014/main" id="{527FEE74-88DA-43D9-BDEA-438EBD5D2C9B}"/>
+              </a:ext>
+            </a:extLst>
+          </p:cNvPr>
+          <p:cNvSpPr/>
+          <p:nvPr/>
+        </p:nvSpPr>
+        <p:spPr>
+          <a:xfrm rot="20195107">
+            <a:off x="6014718" y="2768327"/>
+            <a:ext cx="738231" cy="257077"/>
+          </a:xfrm>
+          <a:prstGeom prst="ellipse">
+            <a:avLst/>
+          </a:prstGeom>
+          <a:noFill/>
+          <a:ln w="28575">
+            <a:solidFill>
+              <a:srgbClr val="00B050"/>
+            </a:solidFill>
+          </a:ln>
+        </p:spPr>
+        <p:style>
+          <a:lnRef idx="2">
+            <a:schemeClr val="accent1">
+              <a:shade val="50000"/>
+            </a:schemeClr>
+          </a:lnRef>
+          <a:fillRef idx="1">
+            <a:schemeClr val="accent1"/>
+          </a:fillRef>
+          <a:effectRef idx="0">
+            <a:schemeClr val="accent1"/>
+          </a:effectRef>
+          <a:fontRef idx="minor">
+            <a:schemeClr val="lt1"/>
+          </a:fontRef>
+        </p:style>
+        <p:txBody>
+          <a:bodyPr rtlCol="0" anchor="ctr"/>
+          <a:lstStyle/>
+          <a:p>
+            <a:pPr algn="ctr"/>
+            <a:endParaRPr lang="en-US"/>
+          </a:p>
+        </p:txBody>
+      </p:sp>
+      <p:sp>
+        <p:nvSpPr>
+          <p:cNvPr id="23" name="Oval 22">
+            <a:extLst>
+              <a:ext uri="{FF2B5EF4-FFF2-40B4-BE49-F238E27FC236}">
+                <a16:creationId xmlns:a16="http://schemas.microsoft.com/office/drawing/2014/main" id="{01151F52-4DC6-454F-BA69-B61D4752A041}"/>
+              </a:ext>
+            </a:extLst>
+          </p:cNvPr>
+          <p:cNvSpPr/>
+          <p:nvPr/>
+        </p:nvSpPr>
+        <p:spPr>
+          <a:xfrm rot="20195107">
+            <a:off x="6643540" y="3110892"/>
+            <a:ext cx="738231" cy="257077"/>
+          </a:xfrm>
+          <a:prstGeom prst="ellipse">
+            <a:avLst/>
+          </a:prstGeom>
+          <a:noFill/>
+          <a:ln w="28575">
+            <a:solidFill>
+              <a:srgbClr val="00B050"/>
+            </a:solidFill>
+          </a:ln>
+        </p:spPr>
+        <p:style>
+          <a:lnRef idx="2">
+            <a:schemeClr val="accent1">
+              <a:shade val="50000"/>
+            </a:schemeClr>
+          </a:lnRef>
+          <a:fillRef idx="1">
+            <a:schemeClr val="accent1"/>
+          </a:fillRef>
+          <a:effectRef idx="0">
+            <a:schemeClr val="accent1"/>
+          </a:effectRef>
+          <a:fontRef idx="minor">
+            <a:schemeClr val="lt1"/>
+          </a:fontRef>
+        </p:style>
+        <p:txBody>
+          <a:bodyPr rtlCol="0" anchor="ctr"/>
+          <a:lstStyle/>
+          <a:p>
+            <a:pPr algn="ctr"/>
+            <a:endParaRPr lang="en-US"/>
+          </a:p>
+        </p:txBody>
+      </p:sp>
+      <p:sp>
+        <p:nvSpPr>
+          <p:cNvPr id="24" name="Oval 23">
+            <a:extLst>
+              <a:ext uri="{FF2B5EF4-FFF2-40B4-BE49-F238E27FC236}">
+                <a16:creationId xmlns:a16="http://schemas.microsoft.com/office/drawing/2014/main" id="{C7D086EC-C14B-4B46-9871-0C5AC8D1D8C5}"/>
+              </a:ext>
+            </a:extLst>
+          </p:cNvPr>
+          <p:cNvSpPr/>
+          <p:nvPr/>
+        </p:nvSpPr>
+        <p:spPr>
+          <a:xfrm rot="20195107">
+            <a:off x="7282502" y="3445069"/>
+            <a:ext cx="738231" cy="257077"/>
+          </a:xfrm>
+          <a:prstGeom prst="ellipse">
+            <a:avLst/>
+          </a:prstGeom>
+          <a:noFill/>
+          <a:ln w="28575">
+            <a:solidFill>
+              <a:srgbClr val="00B050"/>
+            </a:solidFill>
+          </a:ln>
+        </p:spPr>
+        <p:style>
+          <a:lnRef idx="2">
+            <a:schemeClr val="accent1">
+              <a:shade val="50000"/>
+            </a:schemeClr>
+          </a:lnRef>
+          <a:fillRef idx="1">
+            <a:schemeClr val="accent1"/>
+          </a:fillRef>
+          <a:effectRef idx="0">
+            <a:schemeClr val="accent1"/>
+          </a:effectRef>
+          <a:fontRef idx="minor">
+            <a:schemeClr val="lt1"/>
+          </a:fontRef>
+        </p:style>
+        <p:txBody>
+          <a:bodyPr rtlCol="0" anchor="ctr"/>
+          <a:lstStyle/>
+          <a:p>
+            <a:pPr algn="ctr"/>
+            <a:endParaRPr lang="en-US"/>
+          </a:p>
+        </p:txBody>
+      </p:sp>
+      <p:sp>
+        <p:nvSpPr>
+          <p:cNvPr id="25" name="Oval 24">
+            <a:extLst>
+              <a:ext uri="{FF2B5EF4-FFF2-40B4-BE49-F238E27FC236}">
+                <a16:creationId xmlns:a16="http://schemas.microsoft.com/office/drawing/2014/main" id="{C7798F41-0D3B-4AE6-AE9B-137CEB07158D}"/>
+              </a:ext>
+            </a:extLst>
+          </p:cNvPr>
+          <p:cNvSpPr/>
+          <p:nvPr/>
+        </p:nvSpPr>
+        <p:spPr>
+          <a:xfrm rot="20195107">
+            <a:off x="7911322" y="3789166"/>
+            <a:ext cx="738231" cy="257077"/>
+          </a:xfrm>
+          <a:prstGeom prst="ellipse">
+            <a:avLst/>
+          </a:prstGeom>
+          <a:noFill/>
+          <a:ln w="28575">
+            <a:solidFill>
+              <a:srgbClr val="00B050"/>
+            </a:solidFill>
+          </a:ln>
+        </p:spPr>
+        <p:style>
+          <a:lnRef idx="2">
+            <a:schemeClr val="accent1">
+              <a:shade val="50000"/>
+            </a:schemeClr>
+          </a:lnRef>
+          <a:fillRef idx="1">
+            <a:schemeClr val="accent1"/>
+          </a:fillRef>
+          <a:effectRef idx="0">
+            <a:schemeClr val="accent1"/>
+          </a:effectRef>
+          <a:fontRef idx="minor">
+            <a:schemeClr val="lt1"/>
+          </a:fontRef>
+        </p:style>
+        <p:txBody>
+          <a:bodyPr rtlCol="0" anchor="ctr"/>
+          <a:lstStyle/>
+          <a:p>
+            <a:pPr algn="ctr"/>
+            <a:endParaRPr lang="en-US"/>
+          </a:p>
+        </p:txBody>
+      </p:sp>
+      <p:sp>
+        <p:nvSpPr>
+          <p:cNvPr id="26" name="Oval 25">
+            <a:extLst>
+              <a:ext uri="{FF2B5EF4-FFF2-40B4-BE49-F238E27FC236}">
+                <a16:creationId xmlns:a16="http://schemas.microsoft.com/office/drawing/2014/main" id="{702BDBB4-7F68-4CDB-9E63-3126797D54E8}"/>
+              </a:ext>
+            </a:extLst>
+          </p:cNvPr>
+          <p:cNvSpPr/>
+          <p:nvPr/>
+        </p:nvSpPr>
+        <p:spPr>
+          <a:xfrm rot="20195107">
+            <a:off x="8567061" y="4124875"/>
+            <a:ext cx="738231" cy="257077"/>
+          </a:xfrm>
+          <a:prstGeom prst="ellipse">
+            <a:avLst/>
+          </a:prstGeom>
+          <a:noFill/>
+          <a:ln w="28575">
+            <a:solidFill>
+              <a:srgbClr val="00B050"/>
+            </a:solidFill>
+          </a:ln>
+        </p:spPr>
+        <p:style>
+          <a:lnRef idx="2">
+            <a:schemeClr val="accent1">
+              <a:shade val="50000"/>
+            </a:schemeClr>
+          </a:lnRef>
+          <a:fillRef idx="1">
+            <a:schemeClr val="accent1"/>
+          </a:fillRef>
+          <a:effectRef idx="0">
+            <a:schemeClr val="accent1"/>
+          </a:effectRef>
+          <a:fontRef idx="minor">
+            <a:schemeClr val="lt1"/>
+          </a:fontRef>
+        </p:style>
+        <p:txBody>
+          <a:bodyPr rtlCol="0" anchor="ctr"/>
+          <a:lstStyle/>
+          <a:p>
+            <a:pPr algn="ctr"/>
+            <a:endParaRPr lang="en-US"/>
+          </a:p>
+        </p:txBody>
+      </p:sp>
+      <p:sp>
+        <p:nvSpPr>
+          <p:cNvPr id="27" name="Oval 26">
+            <a:extLst>
+              <a:ext uri="{FF2B5EF4-FFF2-40B4-BE49-F238E27FC236}">
+                <a16:creationId xmlns:a16="http://schemas.microsoft.com/office/drawing/2014/main" id="{3A7717C1-48DF-4E6C-AD3E-87406709B893}"/>
+              </a:ext>
+            </a:extLst>
+          </p:cNvPr>
+          <p:cNvSpPr/>
+          <p:nvPr/>
+        </p:nvSpPr>
+        <p:spPr>
+          <a:xfrm rot="20195107">
+            <a:off x="9201041" y="4468639"/>
+            <a:ext cx="738231" cy="257077"/>
+          </a:xfrm>
+          <a:prstGeom prst="ellipse">
+            <a:avLst/>
+          </a:prstGeom>
+          <a:noFill/>
+          <a:ln w="28575">
+            <a:solidFill>
+              <a:srgbClr val="00B050"/>
+            </a:solidFill>
+          </a:ln>
+        </p:spPr>
+        <p:style>
+          <a:lnRef idx="2">
+            <a:schemeClr val="accent1">
+              <a:shade val="50000"/>
+            </a:schemeClr>
+          </a:lnRef>
+          <a:fillRef idx="1">
+            <a:schemeClr val="accent1"/>
+          </a:fillRef>
+          <a:effectRef idx="0">
+            <a:schemeClr val="accent1"/>
+          </a:effectRef>
+          <a:fontRef idx="minor">
+            <a:schemeClr val="lt1"/>
+          </a:fontRef>
+        </p:style>
+        <p:txBody>
+          <a:bodyPr rtlCol="0" anchor="ctr"/>
+          <a:lstStyle/>
+          <a:p>
+            <a:pPr algn="ctr"/>
+            <a:endParaRPr lang="en-US"/>
+          </a:p>
+        </p:txBody>
+      </p:sp>
+      <p:sp>
+        <p:nvSpPr>
+          <p:cNvPr id="28" name="Oval 27">
+            <a:extLst>
+              <a:ext uri="{FF2B5EF4-FFF2-40B4-BE49-F238E27FC236}">
+                <a16:creationId xmlns:a16="http://schemas.microsoft.com/office/drawing/2014/main" id="{9F07A1BF-0FE8-45B0-A47D-52224B0A0D72}"/>
+              </a:ext>
+            </a:extLst>
+          </p:cNvPr>
+          <p:cNvSpPr/>
+          <p:nvPr/>
+        </p:nvSpPr>
+        <p:spPr>
+          <a:xfrm rot="20195107">
+            <a:off x="9838250" y="4812404"/>
+            <a:ext cx="738231" cy="257077"/>
+          </a:xfrm>
+          <a:prstGeom prst="ellipse">
+            <a:avLst/>
+          </a:prstGeom>
+          <a:noFill/>
+          <a:ln w="28575">
+            <a:solidFill>
+              <a:srgbClr val="00B050"/>
+            </a:solidFill>
+          </a:ln>
+        </p:spPr>
+        <p:style>
+          <a:lnRef idx="2">
+            <a:schemeClr val="accent1">
+              <a:shade val="50000"/>
+            </a:schemeClr>
+          </a:lnRef>
+          <a:fillRef idx="1">
+            <a:schemeClr val="accent1"/>
+          </a:fillRef>
+          <a:effectRef idx="0">
+            <a:schemeClr val="accent1"/>
+          </a:effectRef>
+          <a:fontRef idx="minor">
+            <a:schemeClr val="lt1"/>
+          </a:fontRef>
+        </p:style>
+        <p:txBody>
+          <a:bodyPr rtlCol="0" anchor="ctr"/>
+          <a:lstStyle/>
+          <a:p>
+            <a:pPr algn="ctr"/>
+            <a:endParaRPr lang="en-US"/>
+          </a:p>
+        </p:txBody>
+      </p:sp>
+      <p:sp>
+        <p:nvSpPr>
+          <p:cNvPr id="29" name="Oval 28">
+            <a:extLst>
+              <a:ext uri="{FF2B5EF4-FFF2-40B4-BE49-F238E27FC236}">
+                <a16:creationId xmlns:a16="http://schemas.microsoft.com/office/drawing/2014/main" id="{1C88600C-A171-4424-B32E-0D14F2CDC366}"/>
+              </a:ext>
+            </a:extLst>
+          </p:cNvPr>
+          <p:cNvSpPr/>
+          <p:nvPr/>
+        </p:nvSpPr>
+        <p:spPr>
+          <a:xfrm rot="20195107">
+            <a:off x="8940583" y="2657288"/>
+            <a:ext cx="312922" cy="307733"/>
+          </a:xfrm>
+          <a:prstGeom prst="ellipse">
+            <a:avLst/>
+          </a:prstGeom>
+          <a:noFill/>
+          <a:ln w="28575">
+            <a:solidFill>
+              <a:srgbClr val="FFFF00"/>
+            </a:solidFill>
+          </a:ln>
+        </p:spPr>
+        <p:style>
+          <a:lnRef idx="2">
+            <a:schemeClr val="accent1">
+              <a:shade val="50000"/>
+            </a:schemeClr>
+          </a:lnRef>
+          <a:fillRef idx="1">
+            <a:schemeClr val="accent1"/>
+          </a:fillRef>
+          <a:effectRef idx="0">
+            <a:schemeClr val="accent1"/>
+          </a:effectRef>
+          <a:fontRef idx="minor">
+            <a:schemeClr val="lt1"/>
+          </a:fontRef>
+        </p:style>
+        <p:txBody>
+          <a:bodyPr rtlCol="0" anchor="ctr"/>
+          <a:lstStyle/>
+          <a:p>
+            <a:pPr algn="ctr"/>
+            <a:endParaRPr lang="en-US"/>
+          </a:p>
+        </p:txBody>
+      </p:sp>
+      <p:sp>
+        <p:nvSpPr>
+          <p:cNvPr id="30" name="Oval 29">
+            <a:extLst>
+              <a:ext uri="{FF2B5EF4-FFF2-40B4-BE49-F238E27FC236}">
+                <a16:creationId xmlns:a16="http://schemas.microsoft.com/office/drawing/2014/main" id="{1A186E8B-876F-485F-BF64-B8ECAE7D9C70}"/>
+              </a:ext>
+            </a:extLst>
+          </p:cNvPr>
+          <p:cNvSpPr/>
+          <p:nvPr/>
+        </p:nvSpPr>
+        <p:spPr>
+          <a:xfrm rot="20195107">
+            <a:off x="7974151" y="2829316"/>
+            <a:ext cx="312922" cy="307733"/>
+          </a:xfrm>
+          <a:prstGeom prst="ellipse">
+            <a:avLst/>
+          </a:prstGeom>
+          <a:noFill/>
+          <a:ln w="28575">
+            <a:solidFill>
+              <a:srgbClr val="FFFF00"/>
+            </a:solidFill>
+          </a:ln>
+        </p:spPr>
+        <p:style>
+          <a:lnRef idx="2">
+            <a:schemeClr val="accent1">
+              <a:shade val="50000"/>
+            </a:schemeClr>
+          </a:lnRef>
+          <a:fillRef idx="1">
+            <a:schemeClr val="accent1"/>
+          </a:fillRef>
+          <a:effectRef idx="0">
+            <a:schemeClr val="accent1"/>
+          </a:effectRef>
+          <a:fontRef idx="minor">
+            <a:schemeClr val="lt1"/>
+          </a:fontRef>
+        </p:style>
+        <p:txBody>
+          <a:bodyPr rtlCol="0" anchor="ctr"/>
+          <a:lstStyle/>
+          <a:p>
+            <a:pPr algn="ctr"/>
+            <a:endParaRPr lang="en-US"/>
+          </a:p>
+        </p:txBody>
+      </p:sp>
+      <p:sp>
+        <p:nvSpPr>
+          <p:cNvPr id="31" name="Oval 30">
+            <a:extLst>
+              <a:ext uri="{FF2B5EF4-FFF2-40B4-BE49-F238E27FC236}">
+                <a16:creationId xmlns:a16="http://schemas.microsoft.com/office/drawing/2014/main" id="{2A431DF4-0388-4DD8-9E87-630E438DF370}"/>
+              </a:ext>
+            </a:extLst>
+          </p:cNvPr>
+          <p:cNvSpPr/>
+          <p:nvPr/>
+        </p:nvSpPr>
+        <p:spPr>
+          <a:xfrm rot="20195107">
+            <a:off x="10219205" y="2493255"/>
+            <a:ext cx="312922" cy="307733"/>
+          </a:xfrm>
+          <a:prstGeom prst="ellipse">
+            <a:avLst/>
+          </a:prstGeom>
+          <a:noFill/>
+          <a:ln w="28575">
+            <a:solidFill>
+              <a:srgbClr val="FFFF00"/>
+            </a:solidFill>
+          </a:ln>
+        </p:spPr>
+        <p:style>
+          <a:lnRef idx="2">
+            <a:schemeClr val="accent1">
+              <a:shade val="50000"/>
+            </a:schemeClr>
+          </a:lnRef>
+          <a:fillRef idx="1">
+            <a:schemeClr val="accent1"/>
+          </a:fillRef>
+          <a:effectRef idx="0">
+            <a:schemeClr val="accent1"/>
+          </a:effectRef>
+          <a:fontRef idx="minor">
+            <a:schemeClr val="lt1"/>
+          </a:fontRef>
+        </p:style>
+        <p:txBody>
+          <a:bodyPr rtlCol="0" anchor="ctr"/>
+          <a:lstStyle/>
+          <a:p>
+            <a:pPr algn="ctr"/>
+            <a:endParaRPr lang="en-US"/>
+          </a:p>
+        </p:txBody>
+      </p:sp>
+      <p:sp>
+        <p:nvSpPr>
+          <p:cNvPr id="32" name="Oval 31">
+            <a:extLst>
+              <a:ext uri="{FF2B5EF4-FFF2-40B4-BE49-F238E27FC236}">
+                <a16:creationId xmlns:a16="http://schemas.microsoft.com/office/drawing/2014/main" id="{560534C7-5A5E-48E2-B437-24C63B626F95}"/>
+              </a:ext>
+            </a:extLst>
+          </p:cNvPr>
+          <p:cNvSpPr/>
+          <p:nvPr/>
+        </p:nvSpPr>
+        <p:spPr>
+          <a:xfrm rot="20195107">
+            <a:off x="7343977" y="2657288"/>
+            <a:ext cx="312922" cy="307733"/>
+          </a:xfrm>
+          <a:prstGeom prst="ellipse">
+            <a:avLst/>
+          </a:prstGeom>
+          <a:noFill/>
+          <a:ln w="28575">
+            <a:solidFill>
+              <a:srgbClr val="FFFF00"/>
+            </a:solidFill>
+          </a:ln>
+        </p:spPr>
+        <p:style>
+          <a:lnRef idx="2">
+            <a:schemeClr val="accent1">
+              <a:shade val="50000"/>
+            </a:schemeClr>
+          </a:lnRef>
+          <a:fillRef idx="1">
+            <a:schemeClr val="accent1"/>
+          </a:fillRef>
+          <a:effectRef idx="0">
+            <a:schemeClr val="accent1"/>
+          </a:effectRef>
+          <a:fontRef idx="minor">
+            <a:schemeClr val="lt1"/>
+          </a:fontRef>
+        </p:style>
+        <p:txBody>
+          <a:bodyPr rtlCol="0" anchor="ctr"/>
+          <a:lstStyle/>
+          <a:p>
+            <a:pPr algn="ctr"/>
+            <a:endParaRPr lang="en-US"/>
+          </a:p>
+        </p:txBody>
+      </p:sp>
+      <p:sp>
+        <p:nvSpPr>
+          <p:cNvPr id="33" name="Oval 32">
+            <a:extLst>
+              <a:ext uri="{FF2B5EF4-FFF2-40B4-BE49-F238E27FC236}">
+                <a16:creationId xmlns:a16="http://schemas.microsoft.com/office/drawing/2014/main" id="{E0E594DE-E601-4BD3-842B-9CF23A6D1F90}"/>
+              </a:ext>
+            </a:extLst>
+          </p:cNvPr>
+          <p:cNvSpPr/>
+          <p:nvPr/>
+        </p:nvSpPr>
+        <p:spPr>
+          <a:xfrm rot="20195107">
+            <a:off x="6059072" y="3168270"/>
+            <a:ext cx="312922" cy="307733"/>
+          </a:xfrm>
+          <a:prstGeom prst="ellipse">
+            <a:avLst/>
+          </a:prstGeom>
+          <a:noFill/>
+          <a:ln w="28575">
+            <a:solidFill>
+              <a:srgbClr val="FFFF00"/>
+            </a:solidFill>
+          </a:ln>
+        </p:spPr>
+        <p:style>
+          <a:lnRef idx="2">
+            <a:schemeClr val="accent1">
+              <a:shade val="50000"/>
+            </a:schemeClr>
+          </a:lnRef>
+          <a:fillRef idx="1">
+            <a:schemeClr val="accent1"/>
+          </a:fillRef>
+          <a:effectRef idx="0">
+            <a:schemeClr val="accent1"/>
+          </a:effectRef>
+          <a:fontRef idx="minor">
+            <a:schemeClr val="lt1"/>
+          </a:fontRef>
+        </p:style>
+        <p:txBody>
+          <a:bodyPr rtlCol="0" anchor="ctr"/>
+          <a:lstStyle/>
+          <a:p>
+            <a:pPr algn="ctr"/>
+            <a:endParaRPr lang="en-US"/>
+          </a:p>
+        </p:txBody>
+      </p:sp>
+      <p:sp>
+        <p:nvSpPr>
+          <p:cNvPr id="35" name="Oval 34">
+            <a:extLst>
+              <a:ext uri="{FF2B5EF4-FFF2-40B4-BE49-F238E27FC236}">
+                <a16:creationId xmlns:a16="http://schemas.microsoft.com/office/drawing/2014/main" id="{00907E2E-AB57-4358-A821-94840F2C96E5}"/>
+              </a:ext>
+            </a:extLst>
+          </p:cNvPr>
+          <p:cNvSpPr/>
+          <p:nvPr/>
+        </p:nvSpPr>
+        <p:spPr>
+          <a:xfrm rot="20195107">
+            <a:off x="8594574" y="3347784"/>
+            <a:ext cx="312922" cy="307733"/>
+          </a:xfrm>
+          <a:prstGeom prst="ellipse">
+            <a:avLst/>
+          </a:prstGeom>
+          <a:noFill/>
+          <a:ln w="28575">
+            <a:solidFill>
+              <a:srgbClr val="FFFF00"/>
+            </a:solidFill>
+          </a:ln>
+        </p:spPr>
+        <p:style>
+          <a:lnRef idx="2">
+            <a:schemeClr val="accent1">
+              <a:shade val="50000"/>
+            </a:schemeClr>
+          </a:lnRef>
+          <a:fillRef idx="1">
+            <a:schemeClr val="accent1"/>
+          </a:fillRef>
+          <a:effectRef idx="0">
+            <a:schemeClr val="accent1"/>
+          </a:effectRef>
+          <a:fontRef idx="minor">
+            <a:schemeClr val="lt1"/>
+          </a:fontRef>
+        </p:style>
+        <p:txBody>
+          <a:bodyPr rtlCol="0" anchor="ctr"/>
+          <a:lstStyle/>
+          <a:p>
+            <a:pPr algn="ctr"/>
+            <a:endParaRPr lang="en-US"/>
+          </a:p>
+        </p:txBody>
+      </p:sp>
+      <p:sp>
+        <p:nvSpPr>
+          <p:cNvPr id="37" name="Rectangle 36">
+            <a:extLst>
+              <a:ext uri="{FF2B5EF4-FFF2-40B4-BE49-F238E27FC236}">
+                <a16:creationId xmlns:a16="http://schemas.microsoft.com/office/drawing/2014/main" id="{CCF0ACCB-FBBA-4AAB-BEAC-C60EEF4FB704}"/>
+              </a:ext>
+            </a:extLst>
+          </p:cNvPr>
+          <p:cNvSpPr/>
+          <p:nvPr/>
+        </p:nvSpPr>
+        <p:spPr>
+          <a:xfrm>
+            <a:off x="3802120" y="5351405"/>
+            <a:ext cx="5153637" cy="793837"/>
+          </a:xfrm>
+          <a:prstGeom prst="rect">
+            <a:avLst/>
+          </a:prstGeom>
+          <a:solidFill>
+            <a:schemeClr val="bg1">
+              <a:lumMod val="75000"/>
+            </a:schemeClr>
+          </a:solidFill>
+          <a:ln>
+            <a:noFill/>
+          </a:ln>
+        </p:spPr>
+        <p:style>
+          <a:lnRef idx="2">
+            <a:schemeClr val="accent1">
+              <a:shade val="50000"/>
+            </a:schemeClr>
+          </a:lnRef>
+          <a:fillRef idx="1">
+            <a:schemeClr val="accent1"/>
+          </a:fillRef>
+          <a:effectRef idx="0">
+            <a:schemeClr val="accent1"/>
+          </a:effectRef>
+          <a:fontRef idx="minor">
+            <a:schemeClr val="lt1"/>
+          </a:fontRef>
+        </p:style>
+        <p:txBody>
+          <a:bodyPr rtlCol="0" anchor="ctr"/>
+          <a:lstStyle/>
+          <a:p>
+            <a:pPr algn="ctr"/>
+            <a:endParaRPr lang="en-US" dirty="0"/>
+          </a:p>
+        </p:txBody>
+      </p:sp>
+      <p:sp>
+        <p:nvSpPr>
+          <p:cNvPr id="38" name="Oval 37">
+            <a:extLst>
+              <a:ext uri="{FF2B5EF4-FFF2-40B4-BE49-F238E27FC236}">
+                <a16:creationId xmlns:a16="http://schemas.microsoft.com/office/drawing/2014/main" id="{80A92D7D-2235-4700-BE9E-8BBDE5568FF0}"/>
+              </a:ext>
+            </a:extLst>
+          </p:cNvPr>
+          <p:cNvSpPr/>
+          <p:nvPr/>
+        </p:nvSpPr>
+        <p:spPr>
+          <a:xfrm rot="20195107">
+            <a:off x="3912986" y="5435740"/>
+            <a:ext cx="312922" cy="307733"/>
+          </a:xfrm>
+          <a:prstGeom prst="ellipse">
+            <a:avLst/>
+          </a:prstGeom>
+          <a:noFill/>
+          <a:ln w="28575">
+            <a:solidFill>
+              <a:srgbClr val="FFFF00"/>
+            </a:solidFill>
+          </a:ln>
+        </p:spPr>
+        <p:style>
+          <a:lnRef idx="2">
+            <a:schemeClr val="accent1">
+              <a:shade val="50000"/>
+            </a:schemeClr>
+          </a:lnRef>
+          <a:fillRef idx="1">
+            <a:schemeClr val="accent1"/>
+          </a:fillRef>
+          <a:effectRef idx="0">
+            <a:schemeClr val="accent1"/>
+          </a:effectRef>
+          <a:fontRef idx="minor">
+            <a:schemeClr val="lt1"/>
+          </a:fontRef>
+        </p:style>
+        <p:txBody>
+          <a:bodyPr rtlCol="0" anchor="ctr"/>
+          <a:lstStyle/>
+          <a:p>
+            <a:pPr algn="ctr"/>
+            <a:endParaRPr lang="en-US"/>
+          </a:p>
+        </p:txBody>
+      </p:sp>
+      <p:sp>
+        <p:nvSpPr>
+          <p:cNvPr id="39" name="Oval 38">
+            <a:extLst>
+              <a:ext uri="{FF2B5EF4-FFF2-40B4-BE49-F238E27FC236}">
+                <a16:creationId xmlns:a16="http://schemas.microsoft.com/office/drawing/2014/main" id="{2FC3F874-28B7-402F-945C-08AFA410CB34}"/>
+              </a:ext>
+            </a:extLst>
+          </p:cNvPr>
+          <p:cNvSpPr/>
+          <p:nvPr/>
+        </p:nvSpPr>
+        <p:spPr>
+          <a:xfrm>
+            <a:off x="3864725" y="5842462"/>
+            <a:ext cx="576105" cy="244817"/>
+          </a:xfrm>
+          <a:prstGeom prst="ellipse">
+            <a:avLst/>
+          </a:prstGeom>
+          <a:noFill/>
+          <a:ln w="28575">
+            <a:solidFill>
+              <a:srgbClr val="00B050"/>
+            </a:solidFill>
+          </a:ln>
+        </p:spPr>
+        <p:style>
+          <a:lnRef idx="2">
+            <a:schemeClr val="accent1">
+              <a:shade val="50000"/>
+            </a:schemeClr>
+          </a:lnRef>
+          <a:fillRef idx="1">
+            <a:schemeClr val="accent1"/>
+          </a:fillRef>
+          <a:effectRef idx="0">
+            <a:schemeClr val="accent1"/>
+          </a:effectRef>
+          <a:fontRef idx="minor">
+            <a:schemeClr val="lt1"/>
+          </a:fontRef>
+        </p:style>
+        <p:txBody>
+          <a:bodyPr rtlCol="0" anchor="ctr"/>
+          <a:lstStyle/>
+          <a:p>
+            <a:pPr algn="ctr"/>
+            <a:endParaRPr lang="en-US"/>
+          </a:p>
+        </p:txBody>
+      </p:sp>
+      <p:sp>
+        <p:nvSpPr>
+          <p:cNvPr id="40" name="TextBox 39">
+            <a:extLst>
+              <a:ext uri="{FF2B5EF4-FFF2-40B4-BE49-F238E27FC236}">
+                <a16:creationId xmlns:a16="http://schemas.microsoft.com/office/drawing/2014/main" id="{4358DBCD-F3DD-45FB-9777-BEBB0F277420}"/>
+              </a:ext>
+            </a:extLst>
+          </p:cNvPr>
+          <p:cNvSpPr txBox="1"/>
+          <p:nvPr/>
+        </p:nvSpPr>
+        <p:spPr>
+          <a:xfrm>
+            <a:off x="4218670" y="5437505"/>
+            <a:ext cx="4747060" cy="461665"/>
+          </a:xfrm>
+          <a:prstGeom prst="rect">
+            <a:avLst/>
+          </a:prstGeom>
+          <a:noFill/>
+        </p:spPr>
+        <p:txBody>
+          <a:bodyPr wrap="square" rtlCol="0">
+            <a:spAutoFit/>
+          </a:bodyPr>
+          <a:lstStyle/>
+          <a:p>
+            <a:r>
+              <a:rPr lang="en-US" sz="1200" dirty="0">
+                <a:latin typeface="Times New Roman" panose="02020603050405020304" pitchFamily="18" charset="0"/>
+                <a:cs typeface="Times New Roman" panose="02020603050405020304" pitchFamily="18" charset="0"/>
+              </a:rPr>
+              <a:t>- Displays a higher correlation in the table with other assets compared to the assets it’s own category excluding SP500</a:t>
+            </a:r>
+          </a:p>
+        </p:txBody>
+      </p:sp>
+      <p:sp>
+        <p:nvSpPr>
+          <p:cNvPr id="42" name="TextBox 41">
+            <a:extLst>
+              <a:ext uri="{FF2B5EF4-FFF2-40B4-BE49-F238E27FC236}">
+                <a16:creationId xmlns:a16="http://schemas.microsoft.com/office/drawing/2014/main" id="{331174E2-3417-4575-A0F0-E38FF181B388}"/>
+              </a:ext>
+            </a:extLst>
+          </p:cNvPr>
+          <p:cNvSpPr txBox="1"/>
+          <p:nvPr/>
+        </p:nvSpPr>
+        <p:spPr>
+          <a:xfrm>
+            <a:off x="4410024" y="5846770"/>
+            <a:ext cx="3241593" cy="276999"/>
+          </a:xfrm>
+          <a:prstGeom prst="rect">
+            <a:avLst/>
+          </a:prstGeom>
+          <a:noFill/>
+        </p:spPr>
+        <p:txBody>
+          <a:bodyPr wrap="none" rtlCol="0">
+            <a:spAutoFit/>
+          </a:bodyPr>
+          <a:lstStyle/>
+          <a:p>
+            <a:r>
+              <a:rPr lang="en-US" sz="1200" dirty="0">
+                <a:latin typeface="Times New Roman" panose="02020603050405020304" pitchFamily="18" charset="0"/>
+                <a:cs typeface="Times New Roman" panose="02020603050405020304" pitchFamily="18" charset="0"/>
+              </a:rPr>
+              <a:t>- Correlation between assets in the same category</a:t>
+            </a:r>
+          </a:p>
+        </p:txBody>
+      </p:sp>
+      <p:sp>
+        <p:nvSpPr>
+          <p:cNvPr id="43" name="Oval 42">
+            <a:extLst>
+              <a:ext uri="{FF2B5EF4-FFF2-40B4-BE49-F238E27FC236}">
+                <a16:creationId xmlns:a16="http://schemas.microsoft.com/office/drawing/2014/main" id="{C8D75EC6-9032-408A-A1D2-D1E419A4F732}"/>
+              </a:ext>
+            </a:extLst>
+          </p:cNvPr>
+          <p:cNvSpPr/>
+          <p:nvPr/>
+        </p:nvSpPr>
+        <p:spPr>
+          <a:xfrm rot="20195107">
+            <a:off x="9245472" y="3171781"/>
+            <a:ext cx="312922" cy="307733"/>
+          </a:xfrm>
+          <a:prstGeom prst="ellipse">
+            <a:avLst/>
+          </a:prstGeom>
+          <a:noFill/>
+          <a:ln w="28575">
+            <a:solidFill>
+              <a:srgbClr val="FFFF00"/>
+            </a:solidFill>
+          </a:ln>
+        </p:spPr>
+        <p:style>
+          <a:lnRef idx="2">
+            <a:schemeClr val="accent1">
+              <a:shade val="50000"/>
+            </a:schemeClr>
+          </a:lnRef>
+          <a:fillRef idx="1">
+            <a:schemeClr val="accent1"/>
+          </a:fillRef>
+          <a:effectRef idx="0">
+            <a:schemeClr val="accent1"/>
+          </a:effectRef>
+          <a:fontRef idx="minor">
+            <a:schemeClr val="lt1"/>
+          </a:fontRef>
+        </p:style>
+        <p:txBody>
+          <a:bodyPr rtlCol="0" anchor="ctr"/>
+          <a:lstStyle/>
+          <a:p>
+            <a:pPr algn="ctr"/>
+            <a:endParaRPr lang="en-US"/>
+          </a:p>
+        </p:txBody>
+      </p:sp>
+      <p:sp>
+        <p:nvSpPr>
+          <p:cNvPr id="44" name="Oval 43">
+            <a:extLst>
+              <a:ext uri="{FF2B5EF4-FFF2-40B4-BE49-F238E27FC236}">
+                <a16:creationId xmlns:a16="http://schemas.microsoft.com/office/drawing/2014/main" id="{83738F99-2D5A-45C7-9BCE-7737A04F344F}"/>
+              </a:ext>
+            </a:extLst>
+          </p:cNvPr>
+          <p:cNvSpPr/>
+          <p:nvPr/>
+        </p:nvSpPr>
+        <p:spPr>
+          <a:xfrm rot="20195107">
+            <a:off x="7011150" y="2649647"/>
+            <a:ext cx="312922" cy="307733"/>
+          </a:xfrm>
+          <a:prstGeom prst="ellipse">
+            <a:avLst/>
+          </a:prstGeom>
+          <a:noFill/>
+          <a:ln w="28575">
+            <a:solidFill>
+              <a:srgbClr val="FFFF00"/>
+            </a:solidFill>
+          </a:ln>
+        </p:spPr>
+        <p:style>
+          <a:lnRef idx="2">
+            <a:schemeClr val="accent1">
+              <a:shade val="50000"/>
+            </a:schemeClr>
+          </a:lnRef>
+          <a:fillRef idx="1">
+            <a:schemeClr val="accent1"/>
+          </a:fillRef>
+          <a:effectRef idx="0">
+            <a:schemeClr val="accent1"/>
+          </a:effectRef>
+          <a:fontRef idx="minor">
+            <a:schemeClr val="lt1"/>
+          </a:fontRef>
+        </p:style>
+        <p:txBody>
+          <a:bodyPr rtlCol="0" anchor="ctr"/>
+          <a:lstStyle/>
+          <a:p>
+            <a:pPr algn="ctr"/>
+            <a:endParaRPr lang="en-US"/>
+          </a:p>
+        </p:txBody>
+      </p:sp>
+      <p:sp>
+        <p:nvSpPr>
+          <p:cNvPr id="45" name="Oval 44">
+            <a:extLst>
+              <a:ext uri="{FF2B5EF4-FFF2-40B4-BE49-F238E27FC236}">
+                <a16:creationId xmlns:a16="http://schemas.microsoft.com/office/drawing/2014/main" id="{E6E59B8C-53DF-4E45-AE18-41D0112A19A0}"/>
+              </a:ext>
+            </a:extLst>
+          </p:cNvPr>
+          <p:cNvSpPr/>
+          <p:nvPr/>
+        </p:nvSpPr>
+        <p:spPr>
+          <a:xfrm rot="20195107">
+            <a:off x="9886377" y="2319167"/>
+            <a:ext cx="312922" cy="307733"/>
+          </a:xfrm>
+          <a:prstGeom prst="ellipse">
+            <a:avLst/>
+          </a:prstGeom>
+          <a:noFill/>
+          <a:ln w="28575">
+            <a:solidFill>
+              <a:srgbClr val="FFFF00"/>
+            </a:solidFill>
+          </a:ln>
+        </p:spPr>
+        <p:style>
+          <a:lnRef idx="2">
+            <a:schemeClr val="accent1">
+              <a:shade val="50000"/>
+            </a:schemeClr>
+          </a:lnRef>
+          <a:fillRef idx="1">
+            <a:schemeClr val="accent1"/>
+          </a:fillRef>
+          <a:effectRef idx="0">
+            <a:schemeClr val="accent1"/>
+          </a:effectRef>
+          <a:fontRef idx="minor">
+            <a:schemeClr val="lt1"/>
+          </a:fontRef>
+        </p:style>
+        <p:txBody>
+          <a:bodyPr rtlCol="0" anchor="ctr"/>
+          <a:lstStyle/>
+          <a:p>
+            <a:pPr algn="ctr"/>
+            <a:endParaRPr lang="en-US"/>
+          </a:p>
+        </p:txBody>
+      </p:sp>
+      <p:sp>
+        <p:nvSpPr>
+          <p:cNvPr id="46" name="TextBox 45">
+            <a:extLst>
+              <a:ext uri="{FF2B5EF4-FFF2-40B4-BE49-F238E27FC236}">
+                <a16:creationId xmlns:a16="http://schemas.microsoft.com/office/drawing/2014/main" id="{EE40F7ED-E242-43BF-9C72-175F26C15D8B}"/>
+              </a:ext>
+            </a:extLst>
+          </p:cNvPr>
+          <p:cNvSpPr txBox="1"/>
+          <p:nvPr/>
+        </p:nvSpPr>
+        <p:spPr>
+          <a:xfrm>
+            <a:off x="478136" y="4753979"/>
+            <a:ext cx="2907222" cy="1200329"/>
+          </a:xfrm>
+          <a:prstGeom prst="rect">
+            <a:avLst/>
+          </a:prstGeom>
+          <a:solidFill>
+            <a:srgbClr val="92D050"/>
+          </a:solidFill>
+        </p:spPr>
+        <p:txBody>
+          <a:bodyPr wrap="square" rtlCol="0">
+            <a:spAutoFit/>
+          </a:bodyPr>
+          <a:lstStyle/>
+          <a:p>
+            <a:r>
+              <a:rPr lang="en-US" dirty="0"/>
+              <a:t>Added highlights and went through to find higher correlation in the general matrix</a:t>
+            </a:r>
+          </a:p>
+        </p:txBody>
+      </p:sp>
+    </p:spTree>
+    <p:extLst>
+      <p:ext uri="{BB962C8B-B14F-4D97-AF65-F5344CB8AC3E}">
+        <p14:creationId xmlns:p14="http://schemas.microsoft.com/office/powerpoint/2010/main" val="3445903379"/>
+      </p:ext>
+    </p:extLst>
+  </p:cSld>
+  <p:clrMapOvr>
+    <a:masterClrMapping/>
+  </p:clrMapOvr>
+</p:sld>
+</file>
+
+<file path=ppt/slides/slide11.xml><?xml version="1.0" encoding="utf-8"?>
+<p:sld xmlns:a="http://schemas.openxmlformats.org/drawingml/2006/main" xmlns:r="http://schemas.openxmlformats.org/officeDocument/2006/relationships" xmlns:p="http://schemas.openxmlformats.org/presentationml/2006/main">
+  <p:cSld>
+    <p:spTree>
+      <p:nvGrpSpPr>
+        <p:cNvPr id="1" name=""/>
+        <p:cNvGrpSpPr/>
+        <p:nvPr/>
+      </p:nvGrpSpPr>
+      <p:grpSpPr>
+        <a:xfrm>
+          <a:off x="0" y="0"/>
+          <a:ext cx="0" cy="0"/>
+          <a:chOff x="0" y="0"/>
+          <a:chExt cx="0" cy="0"/>
+        </a:xfrm>
+      </p:grpSpPr>
+      <p:sp>
+        <p:nvSpPr>
+          <p:cNvPr id="2" name="Title 1">
+            <a:extLst>
+              <a:ext uri="{FF2B5EF4-FFF2-40B4-BE49-F238E27FC236}">
                 <a16:creationId xmlns:a16="http://schemas.microsoft.com/office/drawing/2014/main" id="{3403E013-A6ED-9C47-99A7-8731D6B609C0}"/>
               </a:ext>
             </a:extLst>
@@ -4461,7 +5954,10 @@
           <a:lstStyle/>
           <a:p>
             <a:r>
-              <a:rPr lang="en-US" sz="2400" b="1" dirty="0"/>
+              <a:rPr lang="en-US" sz="2000" dirty="0">
+                <a:latin typeface="Times New Roman" panose="02020603050405020304" pitchFamily="18" charset="0"/>
+                <a:cs typeface="Times New Roman" panose="02020603050405020304" pitchFamily="18" charset="0"/>
+              </a:rPr>
               <a:t>Predict the future Price of 2 assets with relative high and low STD – CVX and NFLX</a:t>
             </a:r>
           </a:p>
@@ -4561,45 +6057,10 @@
       </p:sp>
       <p:pic>
         <p:nvPicPr>
-          <p:cNvPr id="6" name="Picture 5" descr="A close up of a map&#10;&#10;Description automatically generated">
+          <p:cNvPr id="10" name="Picture 9">
             <a:extLst>
               <a:ext uri="{FF2B5EF4-FFF2-40B4-BE49-F238E27FC236}">
-                <a16:creationId xmlns:a16="http://schemas.microsoft.com/office/drawing/2014/main" id="{87EE5912-CCA3-4243-B245-2A3F3C391568}"/>
-              </a:ext>
-            </a:extLst>
-          </p:cNvPr>
-          <p:cNvPicPr>
-            <a:picLocks noChangeAspect="1"/>
-          </p:cNvPicPr>
-          <p:nvPr/>
-        </p:nvPicPr>
-        <p:blipFill rotWithShape="1">
-          <a:blip r:embed="rId3">
-            <a:extLst>
-              <a:ext uri="{28A0092B-C50C-407E-A947-70E740481C1C}">
-                <a14:useLocalDpi xmlns:a14="http://schemas.microsoft.com/office/drawing/2010/main" val="0"/>
-              </a:ext>
-            </a:extLst>
-          </a:blip>
-          <a:srcRect l="8260" t="7068" r="9240" b="5135"/>
-          <a:stretch/>
-        </p:blipFill>
-        <p:spPr>
-          <a:xfrm>
-            <a:off x="300941" y="581953"/>
-            <a:ext cx="7873835" cy="3665956"/>
-          </a:xfrm>
-          <a:prstGeom prst="rect">
-            <a:avLst/>
-          </a:prstGeom>
-        </p:spPr>
-      </p:pic>
-      <p:pic>
-        <p:nvPicPr>
-          <p:cNvPr id="7" name="Picture 6">
-            <a:extLst>
-              <a:ext uri="{FF2B5EF4-FFF2-40B4-BE49-F238E27FC236}">
-                <a16:creationId xmlns:a16="http://schemas.microsoft.com/office/drawing/2014/main" id="{FB456CBB-950A-5847-9A99-288FEDA34B94}"/>
+                <a16:creationId xmlns:a16="http://schemas.microsoft.com/office/drawing/2014/main" id="{C15A032C-218D-4C7A-A6E2-DC7BDB07A649}"/>
               </a:ext>
             </a:extLst>
           </p:cNvPr>
@@ -4609,21 +6070,64 @@
           <p:nvPr/>
         </p:nvPicPr>
         <p:blipFill>
-          <a:blip r:embed="rId4"/>
+          <a:blip r:embed="rId3">
+            <a:extLst>
+              <a:ext uri="{28A0092B-C50C-407E-A947-70E740481C1C}">
+                <a14:useLocalDpi xmlns:a14="http://schemas.microsoft.com/office/drawing/2010/main" val="0"/>
+              </a:ext>
+            </a:extLst>
+          </a:blip>
           <a:stretch>
             <a:fillRect/>
           </a:stretch>
         </p:blipFill>
         <p:spPr>
           <a:xfrm>
-            <a:off x="2905245" y="2903132"/>
-            <a:ext cx="9136284" cy="1441140"/>
+            <a:off x="939567" y="487023"/>
+            <a:ext cx="7021585" cy="4177256"/>
           </a:xfrm>
           <a:prstGeom prst="rect">
             <a:avLst/>
           </a:prstGeom>
         </p:spPr>
       </p:pic>
+      <p:sp>
+        <p:nvSpPr>
+          <p:cNvPr id="11" name="TextBox 10">
+            <a:extLst>
+              <a:ext uri="{FF2B5EF4-FFF2-40B4-BE49-F238E27FC236}">
+                <a16:creationId xmlns:a16="http://schemas.microsoft.com/office/drawing/2014/main" id="{88245CC6-E68E-4C11-88F2-DD852286A96E}"/>
+              </a:ext>
+            </a:extLst>
+          </p:cNvPr>
+          <p:cNvSpPr txBox="1"/>
+          <p:nvPr/>
+        </p:nvSpPr>
+        <p:spPr>
+          <a:xfrm>
+            <a:off x="8263119" y="1577106"/>
+            <a:ext cx="2907222" cy="369332"/>
+          </a:xfrm>
+          <a:prstGeom prst="rect">
+            <a:avLst/>
+          </a:prstGeom>
+          <a:solidFill>
+            <a:srgbClr val="92D050"/>
+          </a:solidFill>
+        </p:spPr>
+        <p:txBody>
+          <a:bodyPr wrap="square" rtlCol="0">
+            <a:spAutoFit/>
+          </a:bodyPr>
+          <a:lstStyle/>
+          <a:p>
+            <a:r>
+              <a:rPr lang="en-US" dirty="0"/>
+              <a:t>Updated the Image</a:t>
+            </a:r>
+          </a:p>
+        </p:txBody>
+      </p:sp>
     </p:spTree>
     <p:extLst>
       <p:ext uri="{BB962C8B-B14F-4D97-AF65-F5344CB8AC3E}">
@@ -4637,7 +6141,7 @@
 </p:sld>
 </file>
 
-<file path=ppt/slides/slide11.xml><?xml version="1.0" encoding="utf-8"?>
+<file path=ppt/slides/slide12.xml><?xml version="1.0" encoding="utf-8"?>
 <p:sld xmlns:a="http://schemas.openxmlformats.org/drawingml/2006/main" xmlns:r="http://schemas.openxmlformats.org/officeDocument/2006/relationships" xmlns:p="http://schemas.openxmlformats.org/presentationml/2006/main">
   <p:cSld>
     <p:spTree>
@@ -4683,10 +6187,12 @@
           <a:lstStyle/>
           <a:p>
             <a:r>
-              <a:rPr lang="en-US" sz="2400" b="1" dirty="0"/>
+              <a:rPr lang="en-US" sz="2400" dirty="0">
+                <a:latin typeface="Times New Roman" panose="02020603050405020304" pitchFamily="18" charset="0"/>
+                <a:cs typeface="Times New Roman" panose="02020603050405020304" pitchFamily="18" charset="0"/>
+              </a:rPr>
               <a:t>Predict the future Price of 2 assets with relative high and low STD – CVX and NFLX</a:t>
             </a:r>
-            <a:endParaRPr lang="en-US" sz="2400" dirty="0"/>
           </a:p>
         </p:txBody>
       </p:sp>
@@ -4708,7 +6214,7 @@
         </p:nvSpPr>
         <p:spPr>
           <a:xfrm>
-            <a:off x="838200" y="4490977"/>
+            <a:off x="578141" y="4865611"/>
             <a:ext cx="10515600" cy="1685986"/>
           </a:xfrm>
         </p:spPr>
@@ -4799,7 +6305,7 @@
         </p:nvSpPr>
         <p:spPr>
           <a:xfrm>
-            <a:off x="3676851" y="5853797"/>
+            <a:off x="900095" y="6046743"/>
             <a:ext cx="6049413" cy="646331"/>
           </a:xfrm>
           <a:prstGeom prst="rect">
@@ -4830,45 +6336,10 @@
       </p:sp>
       <p:pic>
         <p:nvPicPr>
-          <p:cNvPr id="4" name="Picture 3" descr="A close up of a map&#10;&#10;Description automatically generated">
+          <p:cNvPr id="5" name="Picture 4">
             <a:extLst>
               <a:ext uri="{FF2B5EF4-FFF2-40B4-BE49-F238E27FC236}">
-                <a16:creationId xmlns:a16="http://schemas.microsoft.com/office/drawing/2014/main" id="{0E847B03-BC4E-1F43-AD46-B280F05B4C9A}"/>
-              </a:ext>
-            </a:extLst>
-          </p:cNvPr>
-          <p:cNvPicPr>
-            <a:picLocks noChangeAspect="1"/>
-          </p:cNvPicPr>
-          <p:nvPr/>
-        </p:nvPicPr>
-        <p:blipFill rotWithShape="1">
-          <a:blip r:embed="rId3">
-            <a:extLst>
-              <a:ext uri="{28A0092B-C50C-407E-A947-70E740481C1C}">
-                <a14:useLocalDpi xmlns:a14="http://schemas.microsoft.com/office/drawing/2010/main" val="0"/>
-              </a:ext>
-            </a:extLst>
-          </a:blip>
-          <a:srcRect l="8544" t="7847" r="8766" b="4541"/>
-          <a:stretch/>
-        </p:blipFill>
-        <p:spPr>
-          <a:xfrm>
-            <a:off x="347242" y="860741"/>
-            <a:ext cx="6991108" cy="3240643"/>
-          </a:xfrm>
-          <a:prstGeom prst="rect">
-            <a:avLst/>
-          </a:prstGeom>
-        </p:spPr>
-      </p:pic>
-      <p:pic>
-        <p:nvPicPr>
-          <p:cNvPr id="11" name="Picture 10">
-            <a:extLst>
-              <a:ext uri="{FF2B5EF4-FFF2-40B4-BE49-F238E27FC236}">
-                <a16:creationId xmlns:a16="http://schemas.microsoft.com/office/drawing/2014/main" id="{FA505080-1296-4040-A9E5-2CC937C83B0B}"/>
+                <a16:creationId xmlns:a16="http://schemas.microsoft.com/office/drawing/2014/main" id="{D7070D42-3DB5-4678-87AA-C7D6135EA827}"/>
               </a:ext>
             </a:extLst>
           </p:cNvPr>
@@ -4878,21 +6349,64 @@
           <p:nvPr/>
         </p:nvPicPr>
         <p:blipFill>
-          <a:blip r:embed="rId4"/>
+          <a:blip r:embed="rId3">
+            <a:extLst>
+              <a:ext uri="{28A0092B-C50C-407E-A947-70E740481C1C}">
+                <a14:useLocalDpi xmlns:a14="http://schemas.microsoft.com/office/drawing/2010/main" val="0"/>
+              </a:ext>
+            </a:extLst>
+          </a:blip>
           <a:stretch>
             <a:fillRect/>
           </a:stretch>
         </p:blipFill>
         <p:spPr>
           <a:xfrm>
-            <a:off x="5122921" y="2810682"/>
-            <a:ext cx="6721837" cy="1236636"/>
+            <a:off x="896923" y="639571"/>
+            <a:ext cx="7074218" cy="4167317"/>
           </a:xfrm>
           <a:prstGeom prst="rect">
             <a:avLst/>
           </a:prstGeom>
         </p:spPr>
       </p:pic>
+      <p:sp>
+        <p:nvSpPr>
+          <p:cNvPr id="10" name="TextBox 9">
+            <a:extLst>
+              <a:ext uri="{FF2B5EF4-FFF2-40B4-BE49-F238E27FC236}">
+                <a16:creationId xmlns:a16="http://schemas.microsoft.com/office/drawing/2014/main" id="{5EFE7C37-2CA8-4A03-8CE5-FDF744E2363F}"/>
+              </a:ext>
+            </a:extLst>
+          </p:cNvPr>
+          <p:cNvSpPr txBox="1"/>
+          <p:nvPr/>
+        </p:nvSpPr>
+        <p:spPr>
+          <a:xfrm>
+            <a:off x="7971141" y="830486"/>
+            <a:ext cx="2907222" cy="923330"/>
+          </a:xfrm>
+          <a:prstGeom prst="rect">
+            <a:avLst/>
+          </a:prstGeom>
+          <a:solidFill>
+            <a:srgbClr val="92D050"/>
+          </a:solidFill>
+        </p:spPr>
+        <p:txBody>
+          <a:bodyPr wrap="square" rtlCol="0">
+            <a:spAutoFit/>
+          </a:bodyPr>
+          <a:lstStyle/>
+          <a:p>
+            <a:r>
+              <a:rPr lang="en-US" dirty="0"/>
+              <a:t>Updated the Image. Not sure about the text below. Same with the slide above</a:t>
+            </a:r>
+          </a:p>
+        </p:txBody>
+      </p:sp>
     </p:spTree>
     <p:extLst>
       <p:ext uri="{BB962C8B-B14F-4D97-AF65-F5344CB8AC3E}">
@@ -4906,7 +6420,7 @@
 </p:sld>
 </file>
 
-<file path=ppt/slides/slide12.xml><?xml version="1.0" encoding="utf-8"?>
+<file path=ppt/slides/slide13.xml><?xml version="1.0" encoding="utf-8"?>
 <p:sld xmlns:a="http://schemas.openxmlformats.org/drawingml/2006/main" xmlns:r="http://schemas.openxmlformats.org/officeDocument/2006/relationships" xmlns:p="http://schemas.openxmlformats.org/presentationml/2006/main">
   <p:cSld>
     <p:spTree>
@@ -5080,7 +6594,7 @@
 </p:sld>
 </file>
 
-<file path=ppt/slides/slide13.xml><?xml version="1.0" encoding="utf-8"?>
+<file path=ppt/slides/slide14.xml><?xml version="1.0" encoding="utf-8"?>
 <p:sld xmlns:a="http://schemas.openxmlformats.org/drawingml/2006/main" xmlns:r="http://schemas.openxmlformats.org/officeDocument/2006/relationships" xmlns:p="http://schemas.openxmlformats.org/presentationml/2006/main">
   <p:cSld>
     <p:spTree>
@@ -6385,10 +7899,10 @@
       </p:pic>
       <p:pic>
         <p:nvPicPr>
-          <p:cNvPr id="5" name="Content Placeholder 3">
+          <p:cNvPr id="6" name="Picture 5">
             <a:extLst>
               <a:ext uri="{FF2B5EF4-FFF2-40B4-BE49-F238E27FC236}">
-                <a16:creationId xmlns:a16="http://schemas.microsoft.com/office/drawing/2014/main" id="{4B1876BD-6FAC-284B-9E14-89225FB8A002}"/>
+                <a16:creationId xmlns:a16="http://schemas.microsoft.com/office/drawing/2014/main" id="{807387BC-6EA8-48B7-8C58-8C54EE6D761A}"/>
               </a:ext>
             </a:extLst>
           </p:cNvPr>
@@ -6398,15 +7912,21 @@
           <p:nvPr/>
         </p:nvPicPr>
         <p:blipFill>
-          <a:blip r:embed="rId3"/>
+          <a:blip r:embed="rId3">
+            <a:extLst>
+              <a:ext uri="{28A0092B-C50C-407E-A947-70E740481C1C}">
+                <a14:useLocalDpi xmlns:a14="http://schemas.microsoft.com/office/drawing/2010/main" val="0"/>
+              </a:ext>
+            </a:extLst>
+          </a:blip>
           <a:stretch>
             <a:fillRect/>
           </a:stretch>
         </p:blipFill>
         <p:spPr>
           <a:xfrm>
-            <a:off x="5078717" y="1690688"/>
-            <a:ext cx="6823382" cy="4351338"/>
+            <a:off x="5167618" y="1690688"/>
+            <a:ext cx="6669249" cy="4770276"/>
           </a:xfrm>
           <a:prstGeom prst="rect">
             <a:avLst/>
@@ -6465,7 +7985,10 @@
           <a:lstStyle/>
           <a:p>
             <a:r>
-              <a:rPr lang="en-US" dirty="0"/>
+              <a:rPr lang="en-US" dirty="0">
+                <a:latin typeface="Times New Roman" panose="02020603050405020304" pitchFamily="18" charset="0"/>
+                <a:cs typeface="Times New Roman" panose="02020603050405020304" pitchFamily="18" charset="0"/>
+              </a:rPr>
               <a:t>Plot of monthly returns of all assets </a:t>
             </a:r>
           </a:p>
@@ -6548,8 +8071,8 @@
         </p:nvSpPr>
         <p:spPr>
           <a:xfrm>
-            <a:off x="8234471" y="6858000"/>
-            <a:ext cx="3782511" cy="2308324"/>
+            <a:off x="321578" y="97605"/>
+            <a:ext cx="6418277" cy="646331"/>
           </a:xfrm>
           <a:prstGeom prst="rect">
             <a:avLst/>
@@ -6565,7 +8088,7 @@
           <a:lstStyle/>
           <a:p>
             <a:r>
-              <a:rPr lang="en-US" dirty="0">
+              <a:rPr lang="en-US" sz="1200" dirty="0">
                 <a:ln w="0"/>
                 <a:effectLst>
                   <a:outerShdw blurRad="38100" dist="19050" dir="2700000" algn="tl" rotWithShape="0">
@@ -6578,7 +8101,7 @@
               <a:t>Cannot really use this view, as too much noise.</a:t>
             </a:r>
             <a:br>
-              <a:rPr lang="en-US" dirty="0">
+              <a:rPr lang="en-US" sz="1200" dirty="0">
                 <a:ln w="0"/>
                 <a:effectLst>
                   <a:outerShdw blurRad="38100" dist="19050" dir="2700000" algn="tl" rotWithShape="0">
@@ -6590,7 +8113,7 @@
               </a:rPr>
             </a:br>
             <a:r>
-              <a:rPr lang="en-US" dirty="0">
+              <a:rPr lang="en-US" sz="1200" dirty="0">
                 <a:ln w="0"/>
                 <a:effectLst>
                   <a:outerShdw blurRad="38100" dist="19050" dir="2700000" algn="tl" rotWithShape="0">
@@ -6604,20 +8127,8 @@
             </a:r>
           </a:p>
           <a:p>
-            <a:endParaRPr lang="en-US" dirty="0">
-              <a:ln w="0"/>
-              <a:effectLst>
-                <a:outerShdw blurRad="38100" dist="19050" dir="2700000" algn="tl" rotWithShape="0">
-                  <a:schemeClr val="dk1">
-                    <a:alpha val="40000"/>
-                  </a:schemeClr>
-                </a:outerShdw>
-              </a:effectLst>
-            </a:endParaRPr>
-          </a:p>
-          <a:p>
             <a:r>
-              <a:rPr lang="en-US" dirty="0">
+              <a:rPr lang="en-US" sz="1200" dirty="0">
                 <a:ln w="0"/>
                 <a:effectLst>
                   <a:outerShdw blurRad="38100" dist="19050" dir="2700000" algn="tl" rotWithShape="0">
@@ -6630,7 +8141,7 @@
               <a:t>Note: change the </a:t>
             </a:r>
             <a:r>
-              <a:rPr lang="en-US" dirty="0" err="1">
+              <a:rPr lang="en-US" sz="1200" dirty="0" err="1">
                 <a:ln w="0"/>
                 <a:effectLst>
                   <a:outerShdw blurRad="38100" dist="19050" dir="2700000" algn="tl" rotWithShape="0">
@@ -6643,7 +8154,7 @@
               <a:t>x_axis</a:t>
             </a:r>
             <a:r>
-              <a:rPr lang="en-US" dirty="0">
+              <a:rPr lang="en-US" sz="1200" dirty="0">
                 <a:ln w="0"/>
                 <a:effectLst>
                   <a:outerShdw blurRad="38100" dist="19050" dir="2700000" algn="tl" rotWithShape="0">
@@ -6655,18 +8166,6 @@
               </a:rPr>
               <a:t> to convert to  mm-YYYY. (in 2012, Netflix …)</a:t>
             </a:r>
-            <a:br>
-              <a:rPr lang="en-US" dirty="0">
-                <a:ln w="0"/>
-                <a:effectLst>
-                  <a:outerShdw blurRad="38100" dist="19050" dir="2700000" algn="tl" rotWithShape="0">
-                    <a:schemeClr val="dk1">
-                      <a:alpha val="40000"/>
-                    </a:schemeClr>
-                  </a:outerShdw>
-                </a:effectLst>
-              </a:rPr>
-            </a:br>
             <a:endParaRPr lang="en-US" dirty="0">
               <a:ln w="0"/>
               <a:effectLst>
@@ -6715,6 +8214,43 @@
           </a:prstGeom>
         </p:spPr>
       </p:pic>
+      <p:sp>
+        <p:nvSpPr>
+          <p:cNvPr id="7" name="TextBox 6">
+            <a:extLst>
+              <a:ext uri="{FF2B5EF4-FFF2-40B4-BE49-F238E27FC236}">
+                <a16:creationId xmlns:a16="http://schemas.microsoft.com/office/drawing/2014/main" id="{10D1AEA3-AB3C-43EB-A3BC-E5E46B7CE695}"/>
+              </a:ext>
+            </a:extLst>
+          </p:cNvPr>
+          <p:cNvSpPr txBox="1"/>
+          <p:nvPr/>
+        </p:nvSpPr>
+        <p:spPr>
+          <a:xfrm>
+            <a:off x="6006518" y="97605"/>
+            <a:ext cx="5922627" cy="646331"/>
+          </a:xfrm>
+          <a:prstGeom prst="rect">
+            <a:avLst/>
+          </a:prstGeom>
+          <a:solidFill>
+            <a:srgbClr val="92D050"/>
+          </a:solidFill>
+        </p:spPr>
+        <p:txBody>
+          <a:bodyPr wrap="square" rtlCol="0">
+            <a:spAutoFit/>
+          </a:bodyPr>
+          <a:lstStyle/>
+          <a:p>
+            <a:r>
+              <a:rPr lang="en-US" dirty="0"/>
+              <a:t>No change I believe we should keep This because it shows the large difference between Netflix and the Others</a:t>
+            </a:r>
+          </a:p>
+        </p:txBody>
+      </p:sp>
     </p:spTree>
     <p:extLst>
       <p:ext uri="{BB962C8B-B14F-4D97-AF65-F5344CB8AC3E}">
@@ -6857,14 +8393,14 @@
         </p:nvSpPr>
         <p:spPr>
           <a:xfrm>
-            <a:off x="2330059" y="6029077"/>
+            <a:off x="838200" y="6039937"/>
             <a:ext cx="9146086" cy="646331"/>
           </a:xfrm>
           <a:prstGeom prst="rect">
             <a:avLst/>
           </a:prstGeom>
           <a:solidFill>
-            <a:srgbClr val="FFFF00"/>
+            <a:srgbClr val="92D050"/>
           </a:solidFill>
         </p:spPr>
         <p:txBody>
@@ -6913,8 +8449,8 @@
         </p:blipFill>
         <p:spPr>
           <a:xfrm>
-            <a:off x="12808" y="1470409"/>
-            <a:ext cx="8337178" cy="3198567"/>
+            <a:off x="12808" y="1915272"/>
+            <a:ext cx="6083192" cy="2500782"/>
           </a:xfrm>
           <a:prstGeom prst="rect">
             <a:avLst/>
@@ -6948,8 +8484,8 @@
         </p:blipFill>
         <p:spPr>
           <a:xfrm>
-            <a:off x="8567696" y="1915272"/>
-            <a:ext cx="3042879" cy="2308839"/>
+            <a:off x="6470244" y="1386662"/>
+            <a:ext cx="4689183" cy="3558002"/>
           </a:xfrm>
           <a:prstGeom prst="rect">
             <a:avLst/>
@@ -6970,6 +8506,246 @@
 </file>
 
 <file path=ppt/slides/slide7.xml><?xml version="1.0" encoding="utf-8"?>
+<p:sld xmlns:a="http://schemas.openxmlformats.org/drawingml/2006/main" xmlns:r="http://schemas.openxmlformats.org/officeDocument/2006/relationships" xmlns:p="http://schemas.openxmlformats.org/presentationml/2006/main">
+  <p:cSld>
+    <p:spTree>
+      <p:nvGrpSpPr>
+        <p:cNvPr id="1" name=""/>
+        <p:cNvGrpSpPr/>
+        <p:nvPr/>
+      </p:nvGrpSpPr>
+      <p:grpSpPr>
+        <a:xfrm>
+          <a:off x="0" y="0"/>
+          <a:ext cx="0" cy="0"/>
+          <a:chOff x="0" y="0"/>
+          <a:chExt cx="0" cy="0"/>
+        </a:xfrm>
+      </p:grpSpPr>
+      <p:sp>
+        <p:nvSpPr>
+          <p:cNvPr id="2" name="Title 1">
+            <a:extLst>
+              <a:ext uri="{FF2B5EF4-FFF2-40B4-BE49-F238E27FC236}">
+                <a16:creationId xmlns:a16="http://schemas.microsoft.com/office/drawing/2014/main" id="{068B362E-1447-4D39-A4EB-054D49E839C2}"/>
+              </a:ext>
+            </a:extLst>
+          </p:cNvPr>
+          <p:cNvSpPr>
+            <a:spLocks noGrp="1"/>
+          </p:cNvSpPr>
+          <p:nvPr>
+            <p:ph type="title"/>
+          </p:nvPr>
+        </p:nvSpPr>
+        <p:spPr/>
+        <p:txBody>
+          <a:bodyPr/>
+          <a:lstStyle/>
+          <a:p>
+            <a:r>
+              <a:rPr lang="en-US" dirty="0">
+                <a:latin typeface="Times New Roman" panose="02020603050405020304" pitchFamily="18" charset="0"/>
+                <a:cs typeface="Times New Roman" panose="02020603050405020304" pitchFamily="18" charset="0"/>
+              </a:rPr>
+              <a:t>Plot of Cumulative Returns of all Assets</a:t>
+            </a:r>
+          </a:p>
+        </p:txBody>
+      </p:sp>
+      <p:pic>
+        <p:nvPicPr>
+          <p:cNvPr id="5" name="Content Placeholder 4">
+            <a:extLst>
+              <a:ext uri="{FF2B5EF4-FFF2-40B4-BE49-F238E27FC236}">
+                <a16:creationId xmlns:a16="http://schemas.microsoft.com/office/drawing/2014/main" id="{91E1C9AA-21D9-41E1-BEB0-8FA04E545195}"/>
+              </a:ext>
+            </a:extLst>
+          </p:cNvPr>
+          <p:cNvPicPr>
+            <a:picLocks noGrp="1" noChangeAspect="1"/>
+          </p:cNvPicPr>
+          <p:nvPr>
+            <p:ph idx="1"/>
+          </p:nvPr>
+        </p:nvPicPr>
+        <p:blipFill>
+          <a:blip r:embed="rId2">
+            <a:extLst>
+              <a:ext uri="{28A0092B-C50C-407E-A947-70E740481C1C}">
+                <a14:useLocalDpi xmlns:a14="http://schemas.microsoft.com/office/drawing/2010/main" val="0"/>
+              </a:ext>
+            </a:extLst>
+          </a:blip>
+          <a:stretch>
+            <a:fillRect/>
+          </a:stretch>
+        </p:blipFill>
+        <p:spPr>
+          <a:xfrm>
+            <a:off x="838200" y="2138425"/>
+            <a:ext cx="5797491" cy="2970120"/>
+          </a:xfrm>
+        </p:spPr>
+      </p:pic>
+      <p:pic>
+        <p:nvPicPr>
+          <p:cNvPr id="7" name="Picture 6">
+            <a:extLst>
+              <a:ext uri="{FF2B5EF4-FFF2-40B4-BE49-F238E27FC236}">
+                <a16:creationId xmlns:a16="http://schemas.microsoft.com/office/drawing/2014/main" id="{0F25FF4A-3A98-4E7E-977C-4F97970F7B12}"/>
+              </a:ext>
+            </a:extLst>
+          </p:cNvPr>
+          <p:cNvPicPr>
+            <a:picLocks noChangeAspect="1"/>
+          </p:cNvPicPr>
+          <p:nvPr/>
+        </p:nvPicPr>
+        <p:blipFill>
+          <a:blip r:embed="rId3">
+            <a:extLst>
+              <a:ext uri="{28A0092B-C50C-407E-A947-70E740481C1C}">
+                <a14:useLocalDpi xmlns:a14="http://schemas.microsoft.com/office/drawing/2010/main" val="0"/>
+              </a:ext>
+            </a:extLst>
+          </a:blip>
+          <a:stretch>
+            <a:fillRect/>
+          </a:stretch>
+        </p:blipFill>
+        <p:spPr>
+          <a:xfrm>
+            <a:off x="6221835" y="2149308"/>
+            <a:ext cx="5973008" cy="2613191"/>
+          </a:xfrm>
+          <a:prstGeom prst="rect">
+            <a:avLst/>
+          </a:prstGeom>
+        </p:spPr>
+      </p:pic>
+      <p:sp>
+        <p:nvSpPr>
+          <p:cNvPr id="9" name="TextBox 8">
+            <a:extLst>
+              <a:ext uri="{FF2B5EF4-FFF2-40B4-BE49-F238E27FC236}">
+                <a16:creationId xmlns:a16="http://schemas.microsoft.com/office/drawing/2014/main" id="{66CC7D55-3D58-44A3-BA3F-9D358C20AE86}"/>
+              </a:ext>
+            </a:extLst>
+          </p:cNvPr>
+          <p:cNvSpPr txBox="1"/>
+          <p:nvPr/>
+        </p:nvSpPr>
+        <p:spPr>
+          <a:xfrm>
+            <a:off x="838200" y="5567166"/>
+            <a:ext cx="7965322" cy="738664"/>
+          </a:xfrm>
+          <a:prstGeom prst="rect">
+            <a:avLst/>
+          </a:prstGeom>
+          <a:noFill/>
+        </p:spPr>
+        <p:txBody>
+          <a:bodyPr wrap="none" rtlCol="0">
+            <a:spAutoFit/>
+          </a:bodyPr>
+          <a:lstStyle/>
+          <a:p>
+            <a:pPr marL="285750" indent="-285750">
+              <a:buFont typeface="Arial" panose="020B0604020202020204" pitchFamily="34" charset="0"/>
+              <a:buChar char="•"/>
+            </a:pPr>
+            <a:r>
+              <a:rPr lang="en-US" sz="1400" dirty="0">
+                <a:latin typeface="Times New Roman" panose="02020603050405020304" pitchFamily="18" charset="0"/>
+                <a:cs typeface="Times New Roman" panose="02020603050405020304" pitchFamily="18" charset="0"/>
+              </a:rPr>
+              <a:t>As shown on the line plot Netflix has the highest Cumulative returns out of all the Assets</a:t>
+            </a:r>
+          </a:p>
+          <a:p>
+            <a:pPr marL="285750" indent="-285750">
+              <a:buFont typeface="Arial" panose="020B0604020202020204" pitchFamily="34" charset="0"/>
+              <a:buChar char="•"/>
+            </a:pPr>
+            <a:r>
+              <a:rPr lang="en-US" sz="1400" dirty="0">
+                <a:latin typeface="Times New Roman" panose="02020603050405020304" pitchFamily="18" charset="0"/>
+                <a:cs typeface="Times New Roman" panose="02020603050405020304" pitchFamily="18" charset="0"/>
+              </a:rPr>
+              <a:t>Due to an extreme amount of noise on the rest of the assets a Bar chart was made</a:t>
+            </a:r>
+          </a:p>
+          <a:p>
+            <a:pPr marL="285750" indent="-285750">
+              <a:buFont typeface="Arial" panose="020B0604020202020204" pitchFamily="34" charset="0"/>
+              <a:buChar char="•"/>
+            </a:pPr>
+            <a:r>
+              <a:rPr lang="en-US" sz="1400" dirty="0">
+                <a:latin typeface="Times New Roman" panose="02020603050405020304" pitchFamily="18" charset="0"/>
+                <a:cs typeface="Times New Roman" panose="02020603050405020304" pitchFamily="18" charset="0"/>
+              </a:rPr>
+              <a:t>Bar chart shows clearer difference in the Cumulative Returns of Netflix compared to all the other Assets</a:t>
+            </a:r>
+          </a:p>
+        </p:txBody>
+      </p:sp>
+      <p:sp>
+        <p:nvSpPr>
+          <p:cNvPr id="10" name="TextBox 9">
+            <a:extLst>
+              <a:ext uri="{FF2B5EF4-FFF2-40B4-BE49-F238E27FC236}">
+                <a16:creationId xmlns:a16="http://schemas.microsoft.com/office/drawing/2014/main" id="{4C461756-0463-42F6-8727-21D0801555CD}"/>
+              </a:ext>
+            </a:extLst>
+          </p:cNvPr>
+          <p:cNvSpPr txBox="1"/>
+          <p:nvPr/>
+        </p:nvSpPr>
+        <p:spPr>
+          <a:xfrm>
+            <a:off x="961955" y="6328306"/>
+            <a:ext cx="8246384" cy="461665"/>
+          </a:xfrm>
+          <a:prstGeom prst="rect">
+            <a:avLst/>
+          </a:prstGeom>
+          <a:solidFill>
+            <a:srgbClr val="92D050"/>
+          </a:solidFill>
+        </p:spPr>
+        <p:txBody>
+          <a:bodyPr wrap="square" rtlCol="0">
+            <a:spAutoFit/>
+          </a:bodyPr>
+          <a:lstStyle/>
+          <a:p>
+            <a:r>
+              <a:rPr lang="en-US" sz="1200" dirty="0">
+                <a:latin typeface="Times New Roman" panose="02020603050405020304" pitchFamily="18" charset="0"/>
+                <a:cs typeface="Times New Roman" panose="02020603050405020304" pitchFamily="18" charset="0"/>
+              </a:rPr>
+              <a:t>A slide for the cumulative returns. I put this cause it showed the greatest display with the most graph  images for comparison in the notebook and project in whole for all 20 assets.</a:t>
+            </a:r>
+          </a:p>
+        </p:txBody>
+      </p:sp>
+    </p:spTree>
+    <p:extLst>
+      <p:ext uri="{BB962C8B-B14F-4D97-AF65-F5344CB8AC3E}">
+        <p14:creationId xmlns:p14="http://schemas.microsoft.com/office/powerpoint/2010/main" val="4115902491"/>
+      </p:ext>
+    </p:extLst>
+  </p:cSld>
+  <p:clrMapOvr>
+    <a:masterClrMapping/>
+  </p:clrMapOvr>
+</p:sld>
+</file>
+
+<file path=ppt/slides/slide8.xml><?xml version="1.0" encoding="utf-8"?>
 <p:sld xmlns:a="http://schemas.openxmlformats.org/drawingml/2006/main" xmlns:r="http://schemas.openxmlformats.org/officeDocument/2006/relationships" xmlns:p="http://schemas.openxmlformats.org/presentationml/2006/main">
   <p:cSld>
     <p:spTree>
@@ -7082,7 +8858,7 @@
         </p:nvSpPr>
         <p:spPr>
           <a:xfrm>
-            <a:off x="9185616" y="-538231"/>
+            <a:off x="981197" y="3435292"/>
             <a:ext cx="2901369" cy="1200329"/>
           </a:xfrm>
           <a:prstGeom prst="rect">
@@ -17467,6 +19243,43 @@
           </a:graphicData>
         </a:graphic>
       </p:graphicFrame>
+      <p:sp>
+        <p:nvSpPr>
+          <p:cNvPr id="9" name="TextBox 8">
+            <a:extLst>
+              <a:ext uri="{FF2B5EF4-FFF2-40B4-BE49-F238E27FC236}">
+                <a16:creationId xmlns:a16="http://schemas.microsoft.com/office/drawing/2014/main" id="{E256C769-8F37-4E45-ACBC-2B1FE9AF4E20}"/>
+              </a:ext>
+            </a:extLst>
+          </p:cNvPr>
+          <p:cNvSpPr txBox="1"/>
+          <p:nvPr/>
+        </p:nvSpPr>
+        <p:spPr>
+          <a:xfrm>
+            <a:off x="3949598" y="3816225"/>
+            <a:ext cx="2064924" cy="830997"/>
+          </a:xfrm>
+          <a:prstGeom prst="rect">
+            <a:avLst/>
+          </a:prstGeom>
+          <a:solidFill>
+            <a:srgbClr val="92D050"/>
+          </a:solidFill>
+        </p:spPr>
+        <p:txBody>
+          <a:bodyPr wrap="square" rtlCol="0">
+            <a:spAutoFit/>
+          </a:bodyPr>
+          <a:lstStyle/>
+          <a:p>
+            <a:r>
+              <a:rPr lang="en-US" sz="1200" dirty="0"/>
+              <a:t>No change in this slide cause if we keep the slide I made, it adds a more depth explanation on the images</a:t>
+            </a:r>
+          </a:p>
+        </p:txBody>
+      </p:sp>
     </p:spTree>
     <p:extLst>
       <p:ext uri="{BB962C8B-B14F-4D97-AF65-F5344CB8AC3E}">
@@ -17480,7 +19293,7 @@
 </p:sld>
 </file>
 
-<file path=ppt/slides/slide8.xml><?xml version="1.0" encoding="utf-8"?>
+<file path=ppt/slides/slide9.xml><?xml version="1.0" encoding="utf-8"?>
 <p:sld xmlns:a="http://schemas.openxmlformats.org/drawingml/2006/main" xmlns:r="http://schemas.openxmlformats.org/officeDocument/2006/relationships" xmlns:p="http://schemas.openxmlformats.org/presentationml/2006/main">
   <p:cSld>
     <p:spTree>
@@ -17665,8 +19478,8 @@
         </p:nvSpPr>
         <p:spPr>
           <a:xfrm>
-            <a:off x="7613596" y="1241174"/>
-            <a:ext cx="4435283" cy="1477328"/>
+            <a:off x="9200271" y="1702838"/>
+            <a:ext cx="3055842" cy="2031325"/>
           </a:xfrm>
           <a:prstGeom prst="rect">
             <a:avLst/>
@@ -17706,119 +19519,12 @@
           </a:p>
         </p:txBody>
       </p:sp>
-    </p:spTree>
-    <p:extLst>
-      <p:ext uri="{BB962C8B-B14F-4D97-AF65-F5344CB8AC3E}">
-        <p14:creationId xmlns:p14="http://schemas.microsoft.com/office/powerpoint/2010/main" val="1517065765"/>
-      </p:ext>
-    </p:extLst>
-  </p:cSld>
-  <p:clrMapOvr>
-    <a:masterClrMapping/>
-  </p:clrMapOvr>
-</p:sld>
-</file>
-
-<file path=ppt/slides/slide9.xml><?xml version="1.0" encoding="utf-8"?>
-<p:sld xmlns:a="http://schemas.openxmlformats.org/drawingml/2006/main" xmlns:r="http://schemas.openxmlformats.org/officeDocument/2006/relationships" xmlns:p="http://schemas.openxmlformats.org/presentationml/2006/main">
-  <p:cSld>
-    <p:spTree>
-      <p:nvGrpSpPr>
-        <p:cNvPr id="1" name=""/>
-        <p:cNvGrpSpPr/>
-        <p:nvPr/>
-      </p:nvGrpSpPr>
-      <p:grpSpPr>
-        <a:xfrm>
-          <a:off x="0" y="0"/>
-          <a:ext cx="0" cy="0"/>
-          <a:chOff x="0" y="0"/>
-          <a:chExt cx="0" cy="0"/>
-        </a:xfrm>
-      </p:grpSpPr>
-      <p:sp>
-        <p:nvSpPr>
-          <p:cNvPr id="2" name="Title 1">
-            <a:extLst>
-              <a:ext uri="{FF2B5EF4-FFF2-40B4-BE49-F238E27FC236}">
-                <a16:creationId xmlns:a16="http://schemas.microsoft.com/office/drawing/2014/main" id="{74E2BB06-5706-8E45-9B30-F37A3E1B6A12}"/>
-              </a:ext>
-            </a:extLst>
-          </p:cNvPr>
-          <p:cNvSpPr>
-            <a:spLocks noGrp="1"/>
-          </p:cNvSpPr>
-          <p:nvPr>
-            <p:ph type="title"/>
-          </p:nvPr>
-        </p:nvSpPr>
-        <p:spPr>
-          <a:xfrm>
-            <a:off x="838200" y="365126"/>
-            <a:ext cx="10515600" cy="1001338"/>
-          </a:xfrm>
-        </p:spPr>
-        <p:txBody>
-          <a:bodyPr/>
-          <a:lstStyle/>
-          <a:p>
-            <a:r>
-              <a:rPr lang="en-US" dirty="0"/>
-              <a:t>Correlation Matrix of All Assets </a:t>
-            </a:r>
-          </a:p>
-        </p:txBody>
-      </p:sp>
-      <p:sp>
-        <p:nvSpPr>
-          <p:cNvPr id="3" name="Content Placeholder 2">
-            <a:extLst>
-              <a:ext uri="{FF2B5EF4-FFF2-40B4-BE49-F238E27FC236}">
-                <a16:creationId xmlns:a16="http://schemas.microsoft.com/office/drawing/2014/main" id="{971D751F-79D8-1E49-B651-29F593965A38}"/>
-              </a:ext>
-            </a:extLst>
-          </p:cNvPr>
-          <p:cNvSpPr>
-            <a:spLocks noGrp="1"/>
-          </p:cNvSpPr>
-          <p:nvPr>
-            <p:ph idx="1"/>
-          </p:nvPr>
-        </p:nvSpPr>
-        <p:spPr>
-          <a:xfrm>
-            <a:off x="584627" y="5332658"/>
-            <a:ext cx="10515600" cy="1059397"/>
-          </a:xfrm>
-        </p:spPr>
-        <p:txBody>
-          <a:bodyPr>
-            <a:normAutofit/>
-          </a:bodyPr>
-          <a:lstStyle/>
-          <a:p>
-            <a:endParaRPr lang="en-US" sz="1600" dirty="0"/>
-          </a:p>
-          <a:p>
-            <a:r>
-              <a:rPr lang="en-US" sz="1600" dirty="0"/>
-              <a:t>A measure of linear relationship between 2 assets…what is the impact of a change on one asset on the other asset?</a:t>
-            </a:r>
-          </a:p>
-          <a:p>
-            <a:r>
-              <a:rPr lang="en-US" sz="1600" dirty="0"/>
-              <a:t>Notice the level of correlation among assets within the same industry</a:t>
-            </a:r>
-          </a:p>
-        </p:txBody>
-      </p:sp>
       <p:sp>
         <p:nvSpPr>
           <p:cNvPr id="6" name="TextBox 5">
             <a:extLst>
               <a:ext uri="{FF2B5EF4-FFF2-40B4-BE49-F238E27FC236}">
-                <a16:creationId xmlns:a16="http://schemas.microsoft.com/office/drawing/2014/main" id="{FD535C47-BC3B-C74F-88D5-E821F9B8F379}"/>
+                <a16:creationId xmlns:a16="http://schemas.microsoft.com/office/drawing/2014/main" id="{A98B9F06-0FA1-4DDE-8C17-16F6280C0148}"/>
               </a:ext>
             </a:extLst>
           </p:cNvPr>
@@ -17827,14 +19533,14 @@
         </p:nvSpPr>
         <p:spPr>
           <a:xfrm>
-            <a:off x="484095" y="3250182"/>
-            <a:ext cx="2709459" cy="2031325"/>
+            <a:off x="9200271" y="3786770"/>
+            <a:ext cx="1175141" cy="373845"/>
           </a:xfrm>
           <a:prstGeom prst="rect">
             <a:avLst/>
           </a:prstGeom>
           <a:solidFill>
-            <a:srgbClr val="FFFF00"/>
+            <a:srgbClr val="92D050"/>
           </a:solidFill>
         </p:spPr>
         <p:txBody>
@@ -17845,100 +19551,15 @@
           <a:p>
             <a:r>
               <a:rPr lang="en-US" dirty="0"/>
-              <a:t>Highlight the correlating assets with better marking </a:t>
+              <a:t>No change</a:t>
             </a:r>
-            <a:r>
-              <a:rPr lang="en-US" dirty="0">
-                <a:sym typeface="Wingdings" pitchFamily="2" charset="2"/>
-              </a:rPr>
-              <a:t>.</a:t>
-            </a:r>
-            <a:br>
-              <a:rPr lang="en-US" dirty="0">
-                <a:sym typeface="Wingdings" pitchFamily="2" charset="2"/>
-              </a:rPr>
-            </a:br>
-            <a:r>
-              <a:rPr lang="en-US" dirty="0">
-                <a:sym typeface="Wingdings" pitchFamily="2" charset="2"/>
-              </a:rPr>
-              <a:t>Re-arrange the assets to have assets from the same industries in pairs.</a:t>
-            </a:r>
-          </a:p>
-          <a:p>
-            <a:endParaRPr lang="en-US" dirty="0"/>
           </a:p>
         </p:txBody>
       </p:sp>
-      <p:pic>
-        <p:nvPicPr>
-          <p:cNvPr id="9" name="Picture 8">
-            <a:extLst>
-              <a:ext uri="{FF2B5EF4-FFF2-40B4-BE49-F238E27FC236}">
-                <a16:creationId xmlns:a16="http://schemas.microsoft.com/office/drawing/2014/main" id="{12BCD5B3-0E5C-E24D-8AD3-9DD67A741BD0}"/>
-              </a:ext>
-            </a:extLst>
-          </p:cNvPr>
-          <p:cNvPicPr>
-            <a:picLocks noChangeAspect="1"/>
-          </p:cNvPicPr>
-          <p:nvPr/>
-        </p:nvPicPr>
-        <p:blipFill>
-          <a:blip r:embed="rId2"/>
-          <a:stretch>
-            <a:fillRect/>
-          </a:stretch>
-        </p:blipFill>
-        <p:spPr>
-          <a:xfrm>
-            <a:off x="484095" y="1427007"/>
-            <a:ext cx="2892873" cy="1495025"/>
-          </a:xfrm>
-          <a:prstGeom prst="rect">
-            <a:avLst/>
-          </a:prstGeom>
-        </p:spPr>
-      </p:pic>
-      <p:pic>
-        <p:nvPicPr>
-          <p:cNvPr id="12" name="Picture 11">
-            <a:extLst>
-              <a:ext uri="{FF2B5EF4-FFF2-40B4-BE49-F238E27FC236}">
-                <a16:creationId xmlns:a16="http://schemas.microsoft.com/office/drawing/2014/main" id="{503F19CE-E435-7848-AC96-33F7E130AAD3}"/>
-              </a:ext>
-            </a:extLst>
-          </p:cNvPr>
-          <p:cNvPicPr>
-            <a:picLocks noChangeAspect="1"/>
-          </p:cNvPicPr>
-          <p:nvPr/>
-        </p:nvPicPr>
-        <p:blipFill rotWithShape="1">
-          <a:blip r:embed="rId3">
-            <a:extLst>
-              <a:ext uri="{28A0092B-C50C-407E-A947-70E740481C1C}">
-                <a14:useLocalDpi xmlns:a14="http://schemas.microsoft.com/office/drawing/2010/main" val="0"/>
-              </a:ext>
-            </a:extLst>
-          </a:blip>
-          <a:srcRect l="8383" t="9340" r="16413" b="6242"/>
-          <a:stretch/>
-        </p:blipFill>
-        <p:spPr>
-          <a:xfrm>
-            <a:off x="3477500" y="1312864"/>
-            <a:ext cx="8294375" cy="4073395"/>
-          </a:xfrm>
-          <a:prstGeom prst="rect">
-            <a:avLst/>
-          </a:prstGeom>
-        </p:spPr>
-      </p:pic>
     </p:spTree>
     <p:extLst>
       <p:ext uri="{BB962C8B-B14F-4D97-AF65-F5344CB8AC3E}">
-        <p14:creationId xmlns:p14="http://schemas.microsoft.com/office/powerpoint/2010/main" val="3445903379"/>
+        <p14:creationId xmlns:p14="http://schemas.microsoft.com/office/powerpoint/2010/main" val="1517065765"/>
       </p:ext>
     </p:extLst>
   </p:cSld>

</xml_diff>

<commit_message>
Worked on Final_Presentation.pptx, added new images
</commit_message>
<xml_diff>
--- a/Final_Presentation.pptx
+++ b/Final_Presentation.pptx
@@ -2,7 +2,7 @@
 <file path=ppt/presentation.xml><?xml version="1.0" encoding="utf-8"?>
 <p:presentation xmlns:a="http://schemas.openxmlformats.org/drawingml/2006/main" xmlns:r="http://schemas.openxmlformats.org/officeDocument/2006/relationships" xmlns:p="http://schemas.openxmlformats.org/presentationml/2006/main" saveSubsetFonts="1">
   <p:sldMasterIdLst>
-    <p:sldMasterId id="2147483648" r:id="rId1"/>
+    <p:sldMasterId id="2147483823" r:id="rId1"/>
   </p:sldMasterIdLst>
   <p:notesMasterIdLst>
     <p:notesMasterId r:id="rId16"/>
@@ -19,7 +19,7 @@
     <p:sldId id="263" r:id="rId10"/>
     <p:sldId id="265" r:id="rId11"/>
     <p:sldId id="266" r:id="rId12"/>
-    <p:sldId id="267" r:id="rId13"/>
+    <p:sldId id="272" r:id="rId13"/>
     <p:sldId id="269" r:id="rId14"/>
     <p:sldId id="270" r:id="rId15"/>
   </p:sldIdLst>
@@ -210,7 +210,7 @@
           <a:p>
             <a:fld id="{967483A9-E084-4649-A19B-B92CB0DE91A3}" type="datetimeFigureOut">
               <a:rPr lang="en-US" smtClean="0"/>
-              <a:t>6/21/2020</a:t>
+              <a:t>6/22/2020</a:t>
             </a:fld>
             <a:endParaRPr lang="en-US"/>
           </a:p>
@@ -535,6 +535,142 @@
           <a:p>
             <a:endParaRPr lang="en-US" dirty="0"/>
           </a:p>
+          <a:p>
+            <a:r>
+              <a:rPr lang="en-US" dirty="0"/>
+              <a:t>Irina Notes:     </a:t>
+            </a:r>
+            <a:r>
+              <a:rPr lang="en-US" sz="1200" dirty="0">
+                <a:ln w="0"/>
+                <a:effectLst>
+                  <a:outerShdw blurRad="38100" dist="19050" dir="2700000" algn="tl" rotWithShape="0">
+                    <a:schemeClr val="dk1">
+                      <a:alpha val="40000"/>
+                    </a:schemeClr>
+                  </a:outerShdw>
+                </a:effectLst>
+              </a:rPr>
+              <a:t>Cannot really use this view, as too much noise.</a:t>
+            </a:r>
+            <a:br>
+              <a:rPr lang="en-US" sz="1200" dirty="0">
+                <a:ln w="0"/>
+                <a:effectLst>
+                  <a:outerShdw blurRad="38100" dist="19050" dir="2700000" algn="tl" rotWithShape="0">
+                    <a:schemeClr val="dk1">
+                      <a:alpha val="40000"/>
+                    </a:schemeClr>
+                  </a:outerShdw>
+                </a:effectLst>
+              </a:rPr>
+            </a:br>
+            <a:r>
+              <a:rPr lang="en-US" sz="1200" dirty="0">
+                <a:ln w="0"/>
+                <a:effectLst>
+                  <a:outerShdw blurRad="38100" dist="19050" dir="2700000" algn="tl" rotWithShape="0">
+                    <a:schemeClr val="dk1">
+                      <a:alpha val="40000"/>
+                    </a:schemeClr>
+                  </a:outerShdw>
+                </a:effectLst>
+              </a:rPr>
+              <a:t>	Note: might need to take out the SP500.</a:t>
+            </a:r>
+          </a:p>
+          <a:p>
+            <a:r>
+              <a:rPr lang="en-US" sz="1200" dirty="0">
+                <a:ln w="0"/>
+                <a:effectLst>
+                  <a:outerShdw blurRad="38100" dist="19050" dir="2700000" algn="tl" rotWithShape="0">
+                    <a:schemeClr val="dk1">
+                      <a:alpha val="40000"/>
+                    </a:schemeClr>
+                  </a:outerShdw>
+                </a:effectLst>
+              </a:rPr>
+              <a:t>	Note: change the </a:t>
+            </a:r>
+            <a:r>
+              <a:rPr lang="en-US" sz="1200" dirty="0" err="1">
+                <a:ln w="0"/>
+                <a:effectLst>
+                  <a:outerShdw blurRad="38100" dist="19050" dir="2700000" algn="tl" rotWithShape="0">
+                    <a:schemeClr val="dk1">
+                      <a:alpha val="40000"/>
+                    </a:schemeClr>
+                  </a:outerShdw>
+                </a:effectLst>
+              </a:rPr>
+              <a:t>x_axis</a:t>
+            </a:r>
+            <a:r>
+              <a:rPr lang="en-US" sz="1200" dirty="0">
+                <a:ln w="0"/>
+                <a:effectLst>
+                  <a:outerShdw blurRad="38100" dist="19050" dir="2700000" algn="tl" rotWithShape="0">
+                    <a:schemeClr val="dk1">
+                      <a:alpha val="40000"/>
+                    </a:schemeClr>
+                  </a:outerShdw>
+                </a:effectLst>
+              </a:rPr>
+              <a:t> to convert to  mm-YYYY. (in 2012, Netflix …)</a:t>
+            </a:r>
+          </a:p>
+          <a:p>
+            <a:pPr marL="0" marR="0" lvl="0" indent="0" algn="l" defTabSz="914400" rtl="0" eaLnBrk="1" fontAlgn="auto" latinLnBrk="0" hangingPunct="1">
+              <a:lnSpc>
+                <a:spcPct val="100000"/>
+              </a:lnSpc>
+              <a:spcBef>
+                <a:spcPts val="0"/>
+              </a:spcBef>
+              <a:spcAft>
+                <a:spcPts val="0"/>
+              </a:spcAft>
+              <a:buClrTx/>
+              <a:buSzTx/>
+              <a:buFontTx/>
+              <a:buNone/>
+              <a:tabLst/>
+              <a:defRPr/>
+            </a:pPr>
+            <a:r>
+              <a:rPr lang="en-US" sz="1200" dirty="0">
+                <a:ln w="0"/>
+                <a:effectLst>
+                  <a:outerShdw blurRad="38100" dist="19050" dir="2700000" algn="tl" rotWithShape="0">
+                    <a:schemeClr val="dk1">
+                      <a:alpha val="40000"/>
+                    </a:schemeClr>
+                  </a:outerShdw>
+                </a:effectLst>
+              </a:rPr>
+              <a:t>Lucas Notes:   </a:t>
+            </a:r>
+            <a:r>
+              <a:rPr lang="en-US" dirty="0"/>
+              <a:t>No change I believe we should keep This because it shows the large difference between Netflix and the Others</a:t>
+            </a:r>
+          </a:p>
+          <a:p>
+            <a:endParaRPr lang="en-US" dirty="0">
+              <a:ln w="0"/>
+              <a:effectLst>
+                <a:outerShdw blurRad="38100" dist="19050" dir="2700000" algn="tl" rotWithShape="0">
+                  <a:schemeClr val="dk1">
+                    <a:alpha val="40000"/>
+                  </a:schemeClr>
+                </a:outerShdw>
+              </a:effectLst>
+            </a:endParaRPr>
+          </a:p>
+          <a:p>
+            <a:endParaRPr lang="en-US" dirty="0"/>
+          </a:p>
         </p:txBody>
       </p:sp>
       <p:sp>
@@ -622,6 +758,24 @@
               <a:t>This is a continuation of the previous slide. Now, when we look closer at two companies within the same industry, we can observe this behavior from the presented histogram plot.</a:t>
             </a:r>
           </a:p>
+          <a:p>
+            <a:endParaRPr lang="en-US" sz="2000" dirty="0"/>
+          </a:p>
+          <a:p>
+            <a:r>
+              <a:rPr lang="en-US" sz="2000" dirty="0"/>
+              <a:t>Lucas Notes:   The intention is to use a different representation to avoid noisy data as in the previous graph. </a:t>
+            </a:r>
+          </a:p>
+          <a:p>
+            <a:r>
+              <a:rPr lang="en-US" sz="2000" dirty="0"/>
+              <a:t>	Import updated graphs.</a:t>
+            </a:r>
+          </a:p>
+          <a:p>
+            <a:endParaRPr lang="en-US" sz="2000" dirty="0"/>
+          </a:p>
         </p:txBody>
       </p:sp>
       <p:sp>
@@ -704,26 +858,43 @@
           <a:bodyPr/>
           <a:lstStyle/>
           <a:p>
-            <a:br>
-              <a:rPr lang="en-US" dirty="0"/>
-            </a:br>
+            <a:endParaRPr lang="en-US" dirty="0"/>
+          </a:p>
+          <a:p>
+            <a:endParaRPr lang="en-US" dirty="0"/>
+          </a:p>
+          <a:p>
+            <a:pPr marL="0" marR="0" lvl="0" indent="0" algn="l" defTabSz="914400" rtl="0" eaLnBrk="1" fontAlgn="auto" latinLnBrk="0" hangingPunct="1">
+              <a:lnSpc>
+                <a:spcPct val="100000"/>
+              </a:lnSpc>
+              <a:spcBef>
+                <a:spcPts val="0"/>
+              </a:spcBef>
+              <a:spcAft>
+                <a:spcPts val="0"/>
+              </a:spcAft>
+              <a:buClrTx/>
+              <a:buSzTx/>
+              <a:buFontTx/>
+              <a:buNone/>
+              <a:tabLst/>
+              <a:defRPr/>
+            </a:pPr>
             <a:r>
               <a:rPr lang="en-US" dirty="0"/>
-              <a:t>Note: focus on accumulative returns. Where investors make or lose money. </a:t>
+              <a:t>Lucas Notes: </a:t>
             </a:r>
-            <a:br>
-              <a:rPr lang="en-US" dirty="0"/>
-            </a:br>
             <a:r>
-              <a:rPr lang="en-US" dirty="0"/>
-              <a:t>Long-term investors see 1.5 – 3.0 times the return over 10 years period.</a:t>
+              <a:rPr lang="en-US" sz="1200" dirty="0">
+                <a:latin typeface="Times New Roman" panose="02020603050405020304" pitchFamily="18" charset="0"/>
+                <a:cs typeface="Times New Roman" panose="02020603050405020304" pitchFamily="18" charset="0"/>
+              </a:rPr>
+              <a:t>A slide for the cumulative returns. I put this cause it showed the greatest display with the most graph  images for comparison in the notebook and project in whole for all 20 assets.</a:t>
             </a:r>
           </a:p>
           <a:p>
-            <a:r>
-              <a:rPr lang="en-US" dirty="0"/>
-              <a:t>Speculators capture gains on the volatility of short-term market movements. </a:t>
-            </a:r>
+            <a:endParaRPr lang="en-US" dirty="0"/>
           </a:p>
         </p:txBody>
       </p:sp>
@@ -742,9 +913,9 @@
           <a:bodyPr/>
           <a:lstStyle/>
           <a:p>
-            <a:fld id="{5B0439F7-BA01-A541-95AE-C6E45E2F4003}" type="slidenum">
+            <a:fld id="{3C464D38-78EB-6A4F-BCA2-1B202E646C54}" type="slidenum">
               <a:rPr lang="en-US" smtClean="0"/>
-              <a:t>8</a:t>
+              <a:t>7</a:t>
             </a:fld>
             <a:endParaRPr lang="en-US"/>
           </a:p>
@@ -753,7 +924,7 @@
     </p:spTree>
     <p:extLst>
       <p:ext uri="{BB962C8B-B14F-4D97-AF65-F5344CB8AC3E}">
-        <p14:creationId xmlns:p14="http://schemas.microsoft.com/office/powerpoint/2010/main" val="2168716566"/>
+        <p14:creationId xmlns:p14="http://schemas.microsoft.com/office/powerpoint/2010/main" val="4110492165"/>
       </p:ext>
     </p:extLst>
   </p:cSld>
@@ -807,10 +978,134 @@
           <a:bodyPr/>
           <a:lstStyle/>
           <a:p>
+            <a:br>
+              <a:rPr lang="en-US" dirty="0"/>
+            </a:br>
             <a:r>
               <a:rPr lang="en-US" dirty="0"/>
-              <a:t>This chart </a:t>
+              <a:t>Note: focus on accumulative returns. Where investors make or lose money. </a:t>
             </a:r>
+            <a:br>
+              <a:rPr lang="en-US" dirty="0"/>
+            </a:br>
+            <a:r>
+              <a:rPr lang="en-US" dirty="0"/>
+              <a:t>Long-term investors see 1.5 – 3.0 times the return over 10 years period.</a:t>
+            </a:r>
+          </a:p>
+          <a:p>
+            <a:r>
+              <a:rPr lang="en-US" dirty="0"/>
+              <a:t>Speculators capture gains on the volatility of short-term market movements. </a:t>
+            </a:r>
+          </a:p>
+          <a:p>
+            <a:endParaRPr lang="en-US" dirty="0"/>
+          </a:p>
+          <a:p>
+            <a:r>
+              <a:rPr lang="en-US" dirty="0"/>
+              <a:t>Irina Notes:     </a:t>
+            </a:r>
+            <a:r>
+              <a:rPr lang="en-US" sz="1200" dirty="0"/>
+              <a:t>Add all assets.</a:t>
+            </a:r>
+          </a:p>
+          <a:p>
+            <a:r>
+              <a:rPr lang="en-US" sz="1200" dirty="0"/>
+              <a:t>	Import separate legend from previous graph.</a:t>
+            </a:r>
+          </a:p>
+          <a:p>
+            <a:r>
+              <a:rPr lang="en-US" sz="1200" dirty="0"/>
+              <a:t>	Note: </a:t>
+            </a:r>
+            <a:r>
+              <a:rPr lang="en-US" sz="1200" dirty="0" err="1"/>
+              <a:t>y_axis</a:t>
+            </a:r>
+            <a:r>
+              <a:rPr lang="en-US" sz="1200" dirty="0"/>
+              <a:t> renamed to Returns (no %)</a:t>
+            </a:r>
+          </a:p>
+          <a:p>
+            <a:pPr marL="0" marR="0" lvl="0" indent="0" algn="l" defTabSz="914400" rtl="0" eaLnBrk="1" fontAlgn="auto" latinLnBrk="0" hangingPunct="1">
+              <a:lnSpc>
+                <a:spcPct val="100000"/>
+              </a:lnSpc>
+              <a:spcBef>
+                <a:spcPts val="0"/>
+              </a:spcBef>
+              <a:spcAft>
+                <a:spcPts val="0"/>
+              </a:spcAft>
+              <a:buClrTx/>
+              <a:buSzTx/>
+              <a:buFontTx/>
+              <a:buNone/>
+              <a:tabLst/>
+              <a:defRPr/>
+            </a:pPr>
+            <a:r>
+              <a:rPr lang="en-US" sz="1200" dirty="0"/>
+              <a:t>Lucas Notes:    No change in this slide cause if we keep the slide I made, </a:t>
+            </a:r>
+          </a:p>
+          <a:p>
+            <a:pPr marL="0" marR="0" lvl="0" indent="0" algn="l" defTabSz="914400" rtl="0" eaLnBrk="1" fontAlgn="auto" latinLnBrk="0" hangingPunct="1">
+              <a:lnSpc>
+                <a:spcPct val="100000"/>
+              </a:lnSpc>
+              <a:spcBef>
+                <a:spcPts val="0"/>
+              </a:spcBef>
+              <a:spcAft>
+                <a:spcPts val="0"/>
+              </a:spcAft>
+              <a:buClrTx/>
+              <a:buSzTx/>
+              <a:buFontTx/>
+              <a:buNone/>
+              <a:tabLst/>
+              <a:defRPr/>
+            </a:pPr>
+            <a:r>
+              <a:rPr lang="en-US" sz="1200" dirty="0"/>
+              <a:t>	it adds a more depth explanation on the images</a:t>
+            </a:r>
+          </a:p>
+          <a:p>
+            <a:pPr marL="0" marR="0" lvl="0" indent="0" algn="l" defTabSz="914400" rtl="0" eaLnBrk="1" fontAlgn="auto" latinLnBrk="0" hangingPunct="1">
+              <a:lnSpc>
+                <a:spcPct val="100000"/>
+              </a:lnSpc>
+              <a:spcBef>
+                <a:spcPts val="0"/>
+              </a:spcBef>
+              <a:spcAft>
+                <a:spcPts val="0"/>
+              </a:spcAft>
+              <a:buClrTx/>
+              <a:buSzTx/>
+              <a:buFontTx/>
+              <a:buNone/>
+              <a:tabLst/>
+              <a:defRPr/>
+            </a:pPr>
+            <a:r>
+              <a:rPr lang="en-US" sz="1200" dirty="0"/>
+              <a:t>Clay notes:    Do we need all the data at bottom?  Keep this or Lucas’s previous slide?</a:t>
+            </a:r>
+          </a:p>
+          <a:p>
+            <a:endParaRPr lang="en-US" sz="1200" dirty="0"/>
+          </a:p>
+          <a:p>
+            <a:endParaRPr lang="en-US" dirty="0"/>
           </a:p>
         </p:txBody>
       </p:sp>
@@ -831,7 +1126,7 @@
           <a:p>
             <a:fld id="{5B0439F7-BA01-A541-95AE-C6E45E2F4003}" type="slidenum">
               <a:rPr lang="en-US" smtClean="0"/>
-              <a:t>9</a:t>
+              <a:t>8</a:t>
             </a:fld>
             <a:endParaRPr lang="en-US"/>
           </a:p>
@@ -840,7 +1135,7 @@
     </p:spTree>
     <p:extLst>
       <p:ext uri="{BB962C8B-B14F-4D97-AF65-F5344CB8AC3E}">
-        <p14:creationId xmlns:p14="http://schemas.microsoft.com/office/powerpoint/2010/main" val="4018700139"/>
+        <p14:creationId xmlns:p14="http://schemas.microsoft.com/office/powerpoint/2010/main" val="2168716566"/>
       </p:ext>
     </p:extLst>
   </p:cSld>
@@ -896,7 +1191,34 @@
           <a:p>
             <a:r>
               <a:rPr lang="en-US" dirty="0"/>
-              <a:t>Open </a:t>
+              <a:t>This chart </a:t>
+            </a:r>
+          </a:p>
+          <a:p>
+            <a:endParaRPr lang="en-US" dirty="0"/>
+          </a:p>
+          <a:p>
+            <a:r>
+              <a:rPr lang="en-US" dirty="0"/>
+              <a:t>Irina Notes:     Only leave one plot.</a:t>
+            </a:r>
+          </a:p>
+          <a:p>
+            <a:r>
+              <a:rPr lang="en-US" dirty="0"/>
+              <a:t>	Make the graph as big as possible.</a:t>
+            </a:r>
+          </a:p>
+          <a:p>
+            <a:r>
+              <a:rPr lang="en-US" dirty="0"/>
+              <a:t>	Collect all figures in a separate folder. </a:t>
+            </a:r>
+          </a:p>
+          <a:p>
+            <a:r>
+              <a:rPr lang="en-US" dirty="0"/>
+              <a:t>Lucas Notes:   No Change</a:t>
             </a:r>
           </a:p>
         </p:txBody>
@@ -918,7 +1240,7 @@
           <a:p>
             <a:fld id="{5B0439F7-BA01-A541-95AE-C6E45E2F4003}" type="slidenum">
               <a:rPr lang="en-US" smtClean="0"/>
-              <a:t>11</a:t>
+              <a:t>9</a:t>
             </a:fld>
             <a:endParaRPr lang="en-US"/>
           </a:p>
@@ -927,7 +1249,7 @@
     </p:spTree>
     <p:extLst>
       <p:ext uri="{BB962C8B-B14F-4D97-AF65-F5344CB8AC3E}">
-        <p14:creationId xmlns:p14="http://schemas.microsoft.com/office/powerpoint/2010/main" val="3024818523"/>
+        <p14:creationId xmlns:p14="http://schemas.microsoft.com/office/powerpoint/2010/main" val="4018700139"/>
       </p:ext>
     </p:extLst>
   </p:cSld>
@@ -983,6 +1305,78 @@
           <a:p>
             <a:endParaRPr lang="en-US" dirty="0"/>
           </a:p>
+          <a:p>
+            <a:endParaRPr lang="en-US" dirty="0"/>
+          </a:p>
+          <a:p>
+            <a:pPr marL="0" marR="0" lvl="0" indent="0" algn="l" defTabSz="914400" rtl="0" eaLnBrk="1" fontAlgn="auto" latinLnBrk="0" hangingPunct="1">
+              <a:lnSpc>
+                <a:spcPct val="100000"/>
+              </a:lnSpc>
+              <a:spcBef>
+                <a:spcPts val="0"/>
+              </a:spcBef>
+              <a:spcAft>
+                <a:spcPts val="0"/>
+              </a:spcAft>
+              <a:buClrTx/>
+              <a:buSzTx/>
+              <a:buFontTx/>
+              <a:buNone/>
+              <a:tabLst/>
+              <a:defRPr/>
+            </a:pPr>
+            <a:r>
+              <a:rPr lang="en-US" dirty="0"/>
+              <a:t>Irina Notes:     Highlight the correlating assets with better marking </a:t>
+            </a:r>
+            <a:r>
+              <a:rPr lang="en-US" dirty="0">
+                <a:sym typeface="Wingdings" pitchFamily="2" charset="2"/>
+              </a:rPr>
+              <a:t>.</a:t>
+            </a:r>
+            <a:br>
+              <a:rPr lang="en-US" dirty="0">
+                <a:sym typeface="Wingdings" pitchFamily="2" charset="2"/>
+              </a:rPr>
+            </a:br>
+            <a:r>
+              <a:rPr lang="en-US" dirty="0">
+                <a:sym typeface="Wingdings" pitchFamily="2" charset="2"/>
+              </a:rPr>
+              <a:t>	Re-arrange the assets to have assets from the same industries in pairs.</a:t>
+            </a:r>
+          </a:p>
+          <a:p>
+            <a:pPr marL="0" marR="0" lvl="0" indent="0" algn="l" defTabSz="914400" rtl="0" eaLnBrk="1" fontAlgn="auto" latinLnBrk="0" hangingPunct="1">
+              <a:lnSpc>
+                <a:spcPct val="100000"/>
+              </a:lnSpc>
+              <a:spcBef>
+                <a:spcPts val="0"/>
+              </a:spcBef>
+              <a:spcAft>
+                <a:spcPts val="0"/>
+              </a:spcAft>
+              <a:buClrTx/>
+              <a:buSzTx/>
+              <a:buFontTx/>
+              <a:buNone/>
+              <a:tabLst/>
+              <a:defRPr/>
+            </a:pPr>
+            <a:r>
+              <a:rPr lang="en-US" dirty="0"/>
+              <a:t>Lucas Notes:    Added highlights and went through to find higher correlation in the general matrix</a:t>
+            </a:r>
+          </a:p>
+          <a:p>
+            <a:r>
+              <a:rPr lang="en-US" dirty="0"/>
+              <a:t>Clay Notes:     Adjusted Key on left</a:t>
+            </a:r>
+          </a:p>
         </p:txBody>
       </p:sp>
       <p:sp>
@@ -1000,9 +1394,9 @@
           <a:bodyPr/>
           <a:lstStyle/>
           <a:p>
-            <a:fld id="{5B0439F7-BA01-A541-95AE-C6E45E2F4003}" type="slidenum">
+            <a:fld id="{3C464D38-78EB-6A4F-BCA2-1B202E646C54}" type="slidenum">
               <a:rPr lang="en-US" smtClean="0"/>
-              <a:t>12</a:t>
+              <a:t>10</a:t>
             </a:fld>
             <a:endParaRPr lang="en-US"/>
           </a:p>
@@ -1011,7 +1405,7 @@
     </p:spTree>
     <p:extLst>
       <p:ext uri="{BB962C8B-B14F-4D97-AF65-F5344CB8AC3E}">
-        <p14:creationId xmlns:p14="http://schemas.microsoft.com/office/powerpoint/2010/main" val="1231067623"/>
+        <p14:creationId xmlns:p14="http://schemas.microsoft.com/office/powerpoint/2010/main" val="2053148706"/>
       </p:ext>
     </p:extLst>
   </p:cSld>
@@ -1067,6 +1461,268 @@
           <a:p>
             <a:r>
               <a:rPr lang="en-US" dirty="0"/>
+              <a:t>Open </a:t>
+            </a:r>
+          </a:p>
+          <a:p>
+            <a:endParaRPr lang="en-US" dirty="0"/>
+          </a:p>
+          <a:p>
+            <a:r>
+              <a:rPr lang="en-US" dirty="0"/>
+              <a:t>Irina Notes:     Keep the CVX but replace with an updated plot.</a:t>
+            </a:r>
+          </a:p>
+          <a:p>
+            <a:r>
+              <a:rPr lang="en-US" dirty="0"/>
+              <a:t>	Note: open to change, if more interesting companies observed.</a:t>
+            </a:r>
+          </a:p>
+          <a:p>
+            <a:pPr marL="0" marR="0" lvl="0" indent="0" algn="l" defTabSz="914400" rtl="0" eaLnBrk="1" fontAlgn="auto" latinLnBrk="0" hangingPunct="1">
+              <a:lnSpc>
+                <a:spcPct val="100000"/>
+              </a:lnSpc>
+              <a:spcBef>
+                <a:spcPts val="0"/>
+              </a:spcBef>
+              <a:spcAft>
+                <a:spcPts val="0"/>
+              </a:spcAft>
+              <a:buClrTx/>
+              <a:buSzTx/>
+              <a:buFontTx/>
+              <a:buNone/>
+              <a:tabLst/>
+              <a:defRPr/>
+            </a:pPr>
+            <a:r>
+              <a:rPr lang="en-US" dirty="0"/>
+              <a:t>Lucas Notes:   Updated the Image</a:t>
+            </a:r>
+          </a:p>
+          <a:p>
+            <a:endParaRPr lang="en-US" dirty="0"/>
+          </a:p>
+          <a:p>
+            <a:endParaRPr lang="en-US" dirty="0"/>
+          </a:p>
+        </p:txBody>
+      </p:sp>
+      <p:sp>
+        <p:nvSpPr>
+          <p:cNvPr id="4" name="Slide Number Placeholder 3"/>
+          <p:cNvSpPr>
+            <a:spLocks noGrp="1"/>
+          </p:cNvSpPr>
+          <p:nvPr>
+            <p:ph type="sldNum" sz="quarter" idx="5"/>
+          </p:nvPr>
+        </p:nvSpPr>
+        <p:spPr/>
+        <p:txBody>
+          <a:bodyPr/>
+          <a:lstStyle/>
+          <a:p>
+            <a:fld id="{5B0439F7-BA01-A541-95AE-C6E45E2F4003}" type="slidenum">
+              <a:rPr lang="en-US" smtClean="0"/>
+              <a:t>11</a:t>
+            </a:fld>
+            <a:endParaRPr lang="en-US"/>
+          </a:p>
+        </p:txBody>
+      </p:sp>
+    </p:spTree>
+    <p:extLst>
+      <p:ext uri="{BB962C8B-B14F-4D97-AF65-F5344CB8AC3E}">
+        <p14:creationId xmlns:p14="http://schemas.microsoft.com/office/powerpoint/2010/main" val="3024818523"/>
+      </p:ext>
+    </p:extLst>
+  </p:cSld>
+  <p:clrMapOvr>
+    <a:masterClrMapping/>
+  </p:clrMapOvr>
+</p:notes>
+</file>
+
+<file path=ppt/notesSlides/notesSlide8.xml><?xml version="1.0" encoding="utf-8"?>
+<p:notes xmlns:a="http://schemas.openxmlformats.org/drawingml/2006/main" xmlns:r="http://schemas.openxmlformats.org/officeDocument/2006/relationships" xmlns:p="http://schemas.openxmlformats.org/presentationml/2006/main">
+  <p:cSld>
+    <p:spTree>
+      <p:nvGrpSpPr>
+        <p:cNvPr id="1" name=""/>
+        <p:cNvGrpSpPr/>
+        <p:nvPr/>
+      </p:nvGrpSpPr>
+      <p:grpSpPr>
+        <a:xfrm>
+          <a:off x="0" y="0"/>
+          <a:ext cx="0" cy="0"/>
+          <a:chOff x="0" y="0"/>
+          <a:chExt cx="0" cy="0"/>
+        </a:xfrm>
+      </p:grpSpPr>
+      <p:sp>
+        <p:nvSpPr>
+          <p:cNvPr id="2" name="Slide Image Placeholder 1"/>
+          <p:cNvSpPr>
+            <a:spLocks noGrp="1" noRot="1" noChangeAspect="1"/>
+          </p:cNvSpPr>
+          <p:nvPr>
+            <p:ph type="sldImg"/>
+          </p:nvPr>
+        </p:nvSpPr>
+        <p:spPr/>
+      </p:sp>
+      <p:sp>
+        <p:nvSpPr>
+          <p:cNvPr id="3" name="Notes Placeholder 2"/>
+          <p:cNvSpPr>
+            <a:spLocks noGrp="1"/>
+          </p:cNvSpPr>
+          <p:nvPr>
+            <p:ph type="body" idx="1"/>
+          </p:nvPr>
+        </p:nvSpPr>
+        <p:spPr/>
+        <p:txBody>
+          <a:bodyPr/>
+          <a:lstStyle/>
+          <a:p>
+            <a:r>
+              <a:rPr lang="en-US" dirty="0"/>
+              <a:t>Open </a:t>
+            </a:r>
+          </a:p>
+          <a:p>
+            <a:endParaRPr lang="en-US" dirty="0"/>
+          </a:p>
+          <a:p>
+            <a:r>
+              <a:rPr lang="en-US" dirty="0"/>
+              <a:t>Irina Notes:     Keep the CVX but replace with an updated plot.</a:t>
+            </a:r>
+          </a:p>
+          <a:p>
+            <a:r>
+              <a:rPr lang="en-US" dirty="0"/>
+              <a:t>	Note: open to change, if more interesting companies observed.</a:t>
+            </a:r>
+          </a:p>
+          <a:p>
+            <a:pPr marL="0" marR="0" lvl="0" indent="0" algn="l" defTabSz="914400" rtl="0" eaLnBrk="1" fontAlgn="auto" latinLnBrk="0" hangingPunct="1">
+              <a:lnSpc>
+                <a:spcPct val="100000"/>
+              </a:lnSpc>
+              <a:spcBef>
+                <a:spcPts val="0"/>
+              </a:spcBef>
+              <a:spcAft>
+                <a:spcPts val="0"/>
+              </a:spcAft>
+              <a:buClrTx/>
+              <a:buSzTx/>
+              <a:buFontTx/>
+              <a:buNone/>
+              <a:tabLst/>
+              <a:defRPr/>
+            </a:pPr>
+            <a:r>
+              <a:rPr lang="en-US" dirty="0"/>
+              <a:t>Lucas Notes:   Updated the Image</a:t>
+            </a:r>
+          </a:p>
+          <a:p>
+            <a:endParaRPr lang="en-US" dirty="0"/>
+          </a:p>
+          <a:p>
+            <a:endParaRPr lang="en-US" dirty="0"/>
+          </a:p>
+        </p:txBody>
+      </p:sp>
+      <p:sp>
+        <p:nvSpPr>
+          <p:cNvPr id="4" name="Slide Number Placeholder 3"/>
+          <p:cNvSpPr>
+            <a:spLocks noGrp="1"/>
+          </p:cNvSpPr>
+          <p:nvPr>
+            <p:ph type="sldNum" sz="quarter" idx="5"/>
+          </p:nvPr>
+        </p:nvSpPr>
+        <p:spPr/>
+        <p:txBody>
+          <a:bodyPr/>
+          <a:lstStyle/>
+          <a:p>
+            <a:fld id="{5B0439F7-BA01-A541-95AE-C6E45E2F4003}" type="slidenum">
+              <a:rPr lang="en-US" smtClean="0"/>
+              <a:t>12</a:t>
+            </a:fld>
+            <a:endParaRPr lang="en-US"/>
+          </a:p>
+        </p:txBody>
+      </p:sp>
+    </p:spTree>
+    <p:extLst>
+      <p:ext uri="{BB962C8B-B14F-4D97-AF65-F5344CB8AC3E}">
+        <p14:creationId xmlns:p14="http://schemas.microsoft.com/office/powerpoint/2010/main" val="533763186"/>
+      </p:ext>
+    </p:extLst>
+  </p:cSld>
+  <p:clrMapOvr>
+    <a:masterClrMapping/>
+  </p:clrMapOvr>
+</p:notes>
+</file>
+
+<file path=ppt/notesSlides/notesSlide9.xml><?xml version="1.0" encoding="utf-8"?>
+<p:notes xmlns:a="http://schemas.openxmlformats.org/drawingml/2006/main" xmlns:r="http://schemas.openxmlformats.org/officeDocument/2006/relationships" xmlns:p="http://schemas.openxmlformats.org/presentationml/2006/main">
+  <p:cSld>
+    <p:spTree>
+      <p:nvGrpSpPr>
+        <p:cNvPr id="1" name=""/>
+        <p:cNvGrpSpPr/>
+        <p:nvPr/>
+      </p:nvGrpSpPr>
+      <p:grpSpPr>
+        <a:xfrm>
+          <a:off x="0" y="0"/>
+          <a:ext cx="0" cy="0"/>
+          <a:chOff x="0" y="0"/>
+          <a:chExt cx="0" cy="0"/>
+        </a:xfrm>
+      </p:grpSpPr>
+      <p:sp>
+        <p:nvSpPr>
+          <p:cNvPr id="2" name="Slide Image Placeholder 1"/>
+          <p:cNvSpPr>
+            <a:spLocks noGrp="1" noRot="1" noChangeAspect="1"/>
+          </p:cNvSpPr>
+          <p:nvPr>
+            <p:ph type="sldImg"/>
+          </p:nvPr>
+        </p:nvSpPr>
+        <p:spPr/>
+      </p:sp>
+      <p:sp>
+        <p:nvSpPr>
+          <p:cNvPr id="3" name="Notes Placeholder 2"/>
+          <p:cNvSpPr>
+            <a:spLocks noGrp="1"/>
+          </p:cNvSpPr>
+          <p:nvPr>
+            <p:ph type="body" idx="1"/>
+          </p:nvPr>
+        </p:nvSpPr>
+        <p:spPr/>
+        <p:txBody>
+          <a:bodyPr/>
+          <a:lstStyle/>
+          <a:p>
+            <a:r>
+              <a:rPr lang="en-US" dirty="0"/>
               <a:t>50% of your data is in the box.</a:t>
             </a:r>
           </a:p>
@@ -1087,9 +1743,26 @@
           </a:p>
           <a:p>
             <a:r>
-              <a:rPr lang="en-US" dirty="0" err="1"/>
-              <a:t>Outlierss</a:t>
+              <a:rPr lang="en-US" dirty="0"/>
+              <a:t>Outliers</a:t>
             </a:r>
+          </a:p>
+          <a:p>
+            <a:endParaRPr lang="en-US" dirty="0"/>
+          </a:p>
+          <a:p>
+            <a:r>
+              <a:rPr lang="en-US" dirty="0"/>
+              <a:t>Irina Notes:      Keep the CVX but replace with an updated plot.</a:t>
+            </a:r>
+          </a:p>
+          <a:p>
+            <a:r>
+              <a:rPr lang="en-US" dirty="0"/>
+              <a:t>	Note: open to change, if more interesting companies observed.</a:t>
+            </a:r>
+          </a:p>
+          <a:p>
             <a:endParaRPr lang="en-US" dirty="0"/>
           </a:p>
         </p:txBody>
@@ -1152,7 +1825,7 @@
           <p:cNvPr id="2" name="Title 1">
             <a:extLst>
               <a:ext uri="{FF2B5EF4-FFF2-40B4-BE49-F238E27FC236}">
-                <a16:creationId xmlns:a16="http://schemas.microsoft.com/office/drawing/2014/main" id="{FAF7C5EA-AD28-42FF-9791-A9C72F86838F}"/>
+                <a16:creationId xmlns:a16="http://schemas.microsoft.com/office/drawing/2014/main" id="{62E7BC30-DEBF-4079-8492-5FC1ED593F61}"/>
               </a:ext>
             </a:extLst>
           </p:cNvPr>
@@ -1189,7 +1862,7 @@
           <p:cNvPr id="3" name="Subtitle 2">
             <a:extLst>
               <a:ext uri="{FF2B5EF4-FFF2-40B4-BE49-F238E27FC236}">
-                <a16:creationId xmlns:a16="http://schemas.microsoft.com/office/drawing/2014/main" id="{5C20E8E6-7A09-421E-82C6-5DD7B704C81A}"/>
+                <a16:creationId xmlns:a16="http://schemas.microsoft.com/office/drawing/2014/main" id="{C992E488-B99A-47B2-94FF-A0E3C2C5C86F}"/>
               </a:ext>
             </a:extLst>
           </p:cNvPr>
@@ -1259,7 +1932,7 @@
           <p:cNvPr id="4" name="Date Placeholder 3">
             <a:extLst>
               <a:ext uri="{FF2B5EF4-FFF2-40B4-BE49-F238E27FC236}">
-                <a16:creationId xmlns:a16="http://schemas.microsoft.com/office/drawing/2014/main" id="{08EBC288-9072-410C-8D4B-44CADF623546}"/>
+                <a16:creationId xmlns:a16="http://schemas.microsoft.com/office/drawing/2014/main" id="{AC129EE8-216F-42CC-B902-567EFCB7CFF5}"/>
               </a:ext>
             </a:extLst>
           </p:cNvPr>
@@ -1277,7 +1950,7 @@
           <a:p>
             <a:fld id="{C1CC7F00-77D2-4F43-9191-B15704280A39}" type="datetimeFigureOut">
               <a:rPr lang="en-US" smtClean="0"/>
-              <a:t>6/21/2020</a:t>
+              <a:t>6/22/2020</a:t>
             </a:fld>
             <a:endParaRPr lang="en-US"/>
           </a:p>
@@ -1288,7 +1961,7 @@
           <p:cNvPr id="5" name="Footer Placeholder 4">
             <a:extLst>
               <a:ext uri="{FF2B5EF4-FFF2-40B4-BE49-F238E27FC236}">
-                <a16:creationId xmlns:a16="http://schemas.microsoft.com/office/drawing/2014/main" id="{B9742229-AB9B-45B5-B822-F0B704AC61CF}"/>
+                <a16:creationId xmlns:a16="http://schemas.microsoft.com/office/drawing/2014/main" id="{64DA6D28-2EAF-4ECD-92C4-FFC02686560D}"/>
               </a:ext>
             </a:extLst>
           </p:cNvPr>
@@ -1313,7 +1986,7 @@
           <p:cNvPr id="6" name="Slide Number Placeholder 5">
             <a:extLst>
               <a:ext uri="{FF2B5EF4-FFF2-40B4-BE49-F238E27FC236}">
-                <a16:creationId xmlns:a16="http://schemas.microsoft.com/office/drawing/2014/main" id="{C78BA798-A2F9-420F-9E75-73C84F5629AF}"/>
+                <a16:creationId xmlns:a16="http://schemas.microsoft.com/office/drawing/2014/main" id="{096A3745-755F-4248-9EFB-9440DA408476}"/>
               </a:ext>
             </a:extLst>
           </p:cNvPr>
@@ -1340,13 +2013,18 @@
     </p:spTree>
     <p:extLst>
       <p:ext uri="{BB962C8B-B14F-4D97-AF65-F5344CB8AC3E}">
-        <p14:creationId xmlns:p14="http://schemas.microsoft.com/office/powerpoint/2010/main" val="438241222"/>
+        <p14:creationId xmlns:p14="http://schemas.microsoft.com/office/powerpoint/2010/main" val="3719850846"/>
       </p:ext>
     </p:extLst>
   </p:cSld>
   <p:clrMapOvr>
     <a:masterClrMapping/>
   </p:clrMapOvr>
+  <p:extLst>
+    <p:ext uri="{DCECCB84-F9BA-43D5-87BE-67443E8EF086}">
+      <p15:sldGuideLst xmlns:p15="http://schemas.microsoft.com/office/powerpoint/2012/main"/>
+    </p:ext>
+  </p:extLst>
 </p:sldLayout>
 </file>
 
@@ -1372,7 +2050,7 @@
           <p:cNvPr id="2" name="Title 1">
             <a:extLst>
               <a:ext uri="{FF2B5EF4-FFF2-40B4-BE49-F238E27FC236}">
-                <a16:creationId xmlns:a16="http://schemas.microsoft.com/office/drawing/2014/main" id="{BDDD8BCA-6CD9-4D2C-B68F-2E9101D5E7BC}"/>
+                <a16:creationId xmlns:a16="http://schemas.microsoft.com/office/drawing/2014/main" id="{1ADBF2FF-0B53-42BF-A63E-346130C93CA0}"/>
               </a:ext>
             </a:extLst>
           </p:cNvPr>
@@ -1400,7 +2078,7 @@
           <p:cNvPr id="3" name="Vertical Text Placeholder 2">
             <a:extLst>
               <a:ext uri="{FF2B5EF4-FFF2-40B4-BE49-F238E27FC236}">
-                <a16:creationId xmlns:a16="http://schemas.microsoft.com/office/drawing/2014/main" id="{3B1CBFA2-F20C-44E6-8532-862C5DD080C5}"/>
+                <a16:creationId xmlns:a16="http://schemas.microsoft.com/office/drawing/2014/main" id="{1D81A189-ABC3-4A3E-A035-2CF12E4B1029}"/>
               </a:ext>
             </a:extLst>
           </p:cNvPr>
@@ -1457,7 +2135,7 @@
           <p:cNvPr id="4" name="Date Placeholder 3">
             <a:extLst>
               <a:ext uri="{FF2B5EF4-FFF2-40B4-BE49-F238E27FC236}">
-                <a16:creationId xmlns:a16="http://schemas.microsoft.com/office/drawing/2014/main" id="{C51FBA73-88FE-4D4C-982E-9B4D08865DC8}"/>
+                <a16:creationId xmlns:a16="http://schemas.microsoft.com/office/drawing/2014/main" id="{A8191844-C82F-48E1-96D4-A4A3F04E2F14}"/>
               </a:ext>
             </a:extLst>
           </p:cNvPr>
@@ -1475,7 +2153,7 @@
           <a:p>
             <a:fld id="{C1CC7F00-77D2-4F43-9191-B15704280A39}" type="datetimeFigureOut">
               <a:rPr lang="en-US" smtClean="0"/>
-              <a:t>6/21/2020</a:t>
+              <a:t>6/22/2020</a:t>
             </a:fld>
             <a:endParaRPr lang="en-US"/>
           </a:p>
@@ -1486,7 +2164,7 @@
           <p:cNvPr id="5" name="Footer Placeholder 4">
             <a:extLst>
               <a:ext uri="{FF2B5EF4-FFF2-40B4-BE49-F238E27FC236}">
-                <a16:creationId xmlns:a16="http://schemas.microsoft.com/office/drawing/2014/main" id="{127790B3-594A-4E65-A94C-ECDF8C9B7DA1}"/>
+                <a16:creationId xmlns:a16="http://schemas.microsoft.com/office/drawing/2014/main" id="{CAC5B94A-F970-49CB-85FD-C422A0AF6E84}"/>
               </a:ext>
             </a:extLst>
           </p:cNvPr>
@@ -1511,7 +2189,7 @@
           <p:cNvPr id="6" name="Slide Number Placeholder 5">
             <a:extLst>
               <a:ext uri="{FF2B5EF4-FFF2-40B4-BE49-F238E27FC236}">
-                <a16:creationId xmlns:a16="http://schemas.microsoft.com/office/drawing/2014/main" id="{D3EA9C4A-A2E5-4747-B66E-E113790CE0CC}"/>
+                <a16:creationId xmlns:a16="http://schemas.microsoft.com/office/drawing/2014/main" id="{DF23B85B-5B00-4886-98C8-279F62241024}"/>
               </a:ext>
             </a:extLst>
           </p:cNvPr>
@@ -1538,7 +2216,7 @@
     </p:spTree>
     <p:extLst>
       <p:ext uri="{BB962C8B-B14F-4D97-AF65-F5344CB8AC3E}">
-        <p14:creationId xmlns:p14="http://schemas.microsoft.com/office/powerpoint/2010/main" val="2670032974"/>
+        <p14:creationId xmlns:p14="http://schemas.microsoft.com/office/powerpoint/2010/main" val="786019728"/>
       </p:ext>
     </p:extLst>
   </p:cSld>
@@ -1570,7 +2248,7 @@
           <p:cNvPr id="2" name="Vertical Title 1">
             <a:extLst>
               <a:ext uri="{FF2B5EF4-FFF2-40B4-BE49-F238E27FC236}">
-                <a16:creationId xmlns:a16="http://schemas.microsoft.com/office/drawing/2014/main" id="{148FB096-4734-4F68-81C4-C5856EC5FB6D}"/>
+                <a16:creationId xmlns:a16="http://schemas.microsoft.com/office/drawing/2014/main" id="{38E9A0EF-4915-417E-B831-E7311CF6829B}"/>
               </a:ext>
             </a:extLst>
           </p:cNvPr>
@@ -1603,7 +2281,7 @@
           <p:cNvPr id="3" name="Vertical Text Placeholder 2">
             <a:extLst>
               <a:ext uri="{FF2B5EF4-FFF2-40B4-BE49-F238E27FC236}">
-                <a16:creationId xmlns:a16="http://schemas.microsoft.com/office/drawing/2014/main" id="{0F058007-0E77-4B12-A838-B13FB5D989D0}"/>
+                <a16:creationId xmlns:a16="http://schemas.microsoft.com/office/drawing/2014/main" id="{29FF659C-036E-4FFF-8B2A-39AC2A403BED}"/>
               </a:ext>
             </a:extLst>
           </p:cNvPr>
@@ -1665,7 +2343,7 @@
           <p:cNvPr id="4" name="Date Placeholder 3">
             <a:extLst>
               <a:ext uri="{FF2B5EF4-FFF2-40B4-BE49-F238E27FC236}">
-                <a16:creationId xmlns:a16="http://schemas.microsoft.com/office/drawing/2014/main" id="{53781248-D908-4D0D-897A-1DB7F2EF3713}"/>
+                <a16:creationId xmlns:a16="http://schemas.microsoft.com/office/drawing/2014/main" id="{67DBB131-2E6C-44DA-9AC9-78311585E5E5}"/>
               </a:ext>
             </a:extLst>
           </p:cNvPr>
@@ -1683,7 +2361,7 @@
           <a:p>
             <a:fld id="{C1CC7F00-77D2-4F43-9191-B15704280A39}" type="datetimeFigureOut">
               <a:rPr lang="en-US" smtClean="0"/>
-              <a:t>6/21/2020</a:t>
+              <a:t>6/22/2020</a:t>
             </a:fld>
             <a:endParaRPr lang="en-US"/>
           </a:p>
@@ -1694,7 +2372,7 @@
           <p:cNvPr id="5" name="Footer Placeholder 4">
             <a:extLst>
               <a:ext uri="{FF2B5EF4-FFF2-40B4-BE49-F238E27FC236}">
-                <a16:creationId xmlns:a16="http://schemas.microsoft.com/office/drawing/2014/main" id="{200A4400-48AE-4ABB-B6FA-2E3A82DD98B8}"/>
+                <a16:creationId xmlns:a16="http://schemas.microsoft.com/office/drawing/2014/main" id="{177315E1-9652-4C81-8673-6E52C0CD0146}"/>
               </a:ext>
             </a:extLst>
           </p:cNvPr>
@@ -1719,7 +2397,7 @@
           <p:cNvPr id="6" name="Slide Number Placeholder 5">
             <a:extLst>
               <a:ext uri="{FF2B5EF4-FFF2-40B4-BE49-F238E27FC236}">
-                <a16:creationId xmlns:a16="http://schemas.microsoft.com/office/drawing/2014/main" id="{83502678-6A78-469D-BA74-92EC30F54EC8}"/>
+                <a16:creationId xmlns:a16="http://schemas.microsoft.com/office/drawing/2014/main" id="{BBAAFD5D-14A0-40F8-A01F-28E46E8147FF}"/>
               </a:ext>
             </a:extLst>
           </p:cNvPr>
@@ -1746,7 +2424,7 @@
     </p:spTree>
     <p:extLst>
       <p:ext uri="{BB962C8B-B14F-4D97-AF65-F5344CB8AC3E}">
-        <p14:creationId xmlns:p14="http://schemas.microsoft.com/office/powerpoint/2010/main" val="3201841602"/>
+        <p14:creationId xmlns:p14="http://schemas.microsoft.com/office/powerpoint/2010/main" val="2157958388"/>
       </p:ext>
     </p:extLst>
   </p:cSld>
@@ -1778,7 +2456,7 @@
           <p:cNvPr id="2" name="Title 1">
             <a:extLst>
               <a:ext uri="{FF2B5EF4-FFF2-40B4-BE49-F238E27FC236}">
-                <a16:creationId xmlns:a16="http://schemas.microsoft.com/office/drawing/2014/main" id="{A5163F4E-7BBF-48B2-9219-B07A3CFA8895}"/>
+                <a16:creationId xmlns:a16="http://schemas.microsoft.com/office/drawing/2014/main" id="{BEAC35E0-5C68-48E7-816B-950BA8EB8BF1}"/>
               </a:ext>
             </a:extLst>
           </p:cNvPr>
@@ -1806,7 +2484,7 @@
           <p:cNvPr id="3" name="Content Placeholder 2">
             <a:extLst>
               <a:ext uri="{FF2B5EF4-FFF2-40B4-BE49-F238E27FC236}">
-                <a16:creationId xmlns:a16="http://schemas.microsoft.com/office/drawing/2014/main" id="{77FD5A60-AB3A-45FD-A408-BE7483A0D984}"/>
+                <a16:creationId xmlns:a16="http://schemas.microsoft.com/office/drawing/2014/main" id="{637CE252-B066-454A-815D-3CBB9099E559}"/>
               </a:ext>
             </a:extLst>
           </p:cNvPr>
@@ -1863,7 +2541,7 @@
           <p:cNvPr id="4" name="Date Placeholder 3">
             <a:extLst>
               <a:ext uri="{FF2B5EF4-FFF2-40B4-BE49-F238E27FC236}">
-                <a16:creationId xmlns:a16="http://schemas.microsoft.com/office/drawing/2014/main" id="{D9609C9C-C239-490F-ABB6-AEA54E879BD4}"/>
+                <a16:creationId xmlns:a16="http://schemas.microsoft.com/office/drawing/2014/main" id="{C537A038-3862-4135-BF86-BCF607F0D275}"/>
               </a:ext>
             </a:extLst>
           </p:cNvPr>
@@ -1881,7 +2559,7 @@
           <a:p>
             <a:fld id="{C1CC7F00-77D2-4F43-9191-B15704280A39}" type="datetimeFigureOut">
               <a:rPr lang="en-US" smtClean="0"/>
-              <a:t>6/21/2020</a:t>
+              <a:t>6/22/2020</a:t>
             </a:fld>
             <a:endParaRPr lang="en-US"/>
           </a:p>
@@ -1892,7 +2570,7 @@
           <p:cNvPr id="5" name="Footer Placeholder 4">
             <a:extLst>
               <a:ext uri="{FF2B5EF4-FFF2-40B4-BE49-F238E27FC236}">
-                <a16:creationId xmlns:a16="http://schemas.microsoft.com/office/drawing/2014/main" id="{18B66A03-C6A3-49E9-BC63-8814938F81FC}"/>
+                <a16:creationId xmlns:a16="http://schemas.microsoft.com/office/drawing/2014/main" id="{16289835-8E54-46A5-9142-67D54676E98B}"/>
               </a:ext>
             </a:extLst>
           </p:cNvPr>
@@ -1917,7 +2595,7 @@
           <p:cNvPr id="6" name="Slide Number Placeholder 5">
             <a:extLst>
               <a:ext uri="{FF2B5EF4-FFF2-40B4-BE49-F238E27FC236}">
-                <a16:creationId xmlns:a16="http://schemas.microsoft.com/office/drawing/2014/main" id="{B4D0E39B-9E8D-4BB6-9D88-AC1EF9DC859C}"/>
+                <a16:creationId xmlns:a16="http://schemas.microsoft.com/office/drawing/2014/main" id="{90C823E9-802B-4D4E-93A0-FCFAFC7333D2}"/>
               </a:ext>
             </a:extLst>
           </p:cNvPr>
@@ -1944,7 +2622,7 @@
     </p:spTree>
     <p:extLst>
       <p:ext uri="{BB962C8B-B14F-4D97-AF65-F5344CB8AC3E}">
-        <p14:creationId xmlns:p14="http://schemas.microsoft.com/office/powerpoint/2010/main" val="2351957028"/>
+        <p14:creationId xmlns:p14="http://schemas.microsoft.com/office/powerpoint/2010/main" val="2066833141"/>
       </p:ext>
     </p:extLst>
   </p:cSld>
@@ -1976,7 +2654,7 @@
           <p:cNvPr id="2" name="Title 1">
             <a:extLst>
               <a:ext uri="{FF2B5EF4-FFF2-40B4-BE49-F238E27FC236}">
-                <a16:creationId xmlns:a16="http://schemas.microsoft.com/office/drawing/2014/main" id="{1D413691-541E-4F20-81C4-9CC3842110B6}"/>
+                <a16:creationId xmlns:a16="http://schemas.microsoft.com/office/drawing/2014/main" id="{C76B5B7D-748C-4489-99A1-86236AB0A8B6}"/>
               </a:ext>
             </a:extLst>
           </p:cNvPr>
@@ -2013,7 +2691,7 @@
           <p:cNvPr id="3" name="Text Placeholder 2">
             <a:extLst>
               <a:ext uri="{FF2B5EF4-FFF2-40B4-BE49-F238E27FC236}">
-                <a16:creationId xmlns:a16="http://schemas.microsoft.com/office/drawing/2014/main" id="{A4D6181C-245E-4672-A03F-508996089BE5}"/>
+                <a16:creationId xmlns:a16="http://schemas.microsoft.com/office/drawing/2014/main" id="{AEC81D40-25A7-4642-B906-ED0692467C61}"/>
               </a:ext>
             </a:extLst>
           </p:cNvPr>
@@ -2138,7 +2816,7 @@
           <p:cNvPr id="4" name="Date Placeholder 3">
             <a:extLst>
               <a:ext uri="{FF2B5EF4-FFF2-40B4-BE49-F238E27FC236}">
-                <a16:creationId xmlns:a16="http://schemas.microsoft.com/office/drawing/2014/main" id="{C81E6702-E152-4D28-9BDB-634AB8774B8C}"/>
+                <a16:creationId xmlns:a16="http://schemas.microsoft.com/office/drawing/2014/main" id="{1D1201FA-6298-4E19-A4C8-760C2D499E6F}"/>
               </a:ext>
             </a:extLst>
           </p:cNvPr>
@@ -2156,7 +2834,7 @@
           <a:p>
             <a:fld id="{C1CC7F00-77D2-4F43-9191-B15704280A39}" type="datetimeFigureOut">
               <a:rPr lang="en-US" smtClean="0"/>
-              <a:t>6/21/2020</a:t>
+              <a:t>6/22/2020</a:t>
             </a:fld>
             <a:endParaRPr lang="en-US"/>
           </a:p>
@@ -2167,7 +2845,7 @@
           <p:cNvPr id="5" name="Footer Placeholder 4">
             <a:extLst>
               <a:ext uri="{FF2B5EF4-FFF2-40B4-BE49-F238E27FC236}">
-                <a16:creationId xmlns:a16="http://schemas.microsoft.com/office/drawing/2014/main" id="{845DEC99-D93D-4633-8DBA-4EC5E5E2EDD5}"/>
+                <a16:creationId xmlns:a16="http://schemas.microsoft.com/office/drawing/2014/main" id="{C26666DE-64CA-4485-AB38-AC69F5AAD2B4}"/>
               </a:ext>
             </a:extLst>
           </p:cNvPr>
@@ -2192,7 +2870,7 @@
           <p:cNvPr id="6" name="Slide Number Placeholder 5">
             <a:extLst>
               <a:ext uri="{FF2B5EF4-FFF2-40B4-BE49-F238E27FC236}">
-                <a16:creationId xmlns:a16="http://schemas.microsoft.com/office/drawing/2014/main" id="{2708A876-B329-4C66-B7C7-74DE8BE920A6}"/>
+                <a16:creationId xmlns:a16="http://schemas.microsoft.com/office/drawing/2014/main" id="{F6469C5F-9AD3-41AB-BDDE-33663AF978D8}"/>
               </a:ext>
             </a:extLst>
           </p:cNvPr>
@@ -2219,13 +2897,18 @@
     </p:spTree>
     <p:extLst>
       <p:ext uri="{BB962C8B-B14F-4D97-AF65-F5344CB8AC3E}">
-        <p14:creationId xmlns:p14="http://schemas.microsoft.com/office/powerpoint/2010/main" val="354347179"/>
+        <p14:creationId xmlns:p14="http://schemas.microsoft.com/office/powerpoint/2010/main" val="1789401485"/>
       </p:ext>
     </p:extLst>
   </p:cSld>
   <p:clrMapOvr>
     <a:masterClrMapping/>
   </p:clrMapOvr>
+  <p:extLst>
+    <p:ext uri="{DCECCB84-F9BA-43D5-87BE-67443E8EF086}">
+      <p15:sldGuideLst xmlns:p15="http://schemas.microsoft.com/office/powerpoint/2012/main"/>
+    </p:ext>
+  </p:extLst>
 </p:sldLayout>
 </file>
 
@@ -2251,7 +2934,7 @@
           <p:cNvPr id="2" name="Title 1">
             <a:extLst>
               <a:ext uri="{FF2B5EF4-FFF2-40B4-BE49-F238E27FC236}">
-                <a16:creationId xmlns:a16="http://schemas.microsoft.com/office/drawing/2014/main" id="{1196005A-4D33-4DB0-B7B8-4AEDACE23392}"/>
+                <a16:creationId xmlns:a16="http://schemas.microsoft.com/office/drawing/2014/main" id="{73138286-3953-48D1-839D-10F59A616A02}"/>
               </a:ext>
             </a:extLst>
           </p:cNvPr>
@@ -2279,7 +2962,7 @@
           <p:cNvPr id="3" name="Content Placeholder 2">
             <a:extLst>
               <a:ext uri="{FF2B5EF4-FFF2-40B4-BE49-F238E27FC236}">
-                <a16:creationId xmlns:a16="http://schemas.microsoft.com/office/drawing/2014/main" id="{B7C538DE-346A-47EF-9586-BD59F93E7453}"/>
+                <a16:creationId xmlns:a16="http://schemas.microsoft.com/office/drawing/2014/main" id="{5BB5D5E7-BC86-4703-B116-FDBBACD250AB}"/>
               </a:ext>
             </a:extLst>
           </p:cNvPr>
@@ -2341,7 +3024,7 @@
           <p:cNvPr id="4" name="Content Placeholder 3">
             <a:extLst>
               <a:ext uri="{FF2B5EF4-FFF2-40B4-BE49-F238E27FC236}">
-                <a16:creationId xmlns:a16="http://schemas.microsoft.com/office/drawing/2014/main" id="{6730051B-0DD2-4FBC-A930-BD2B31C10F01}"/>
+                <a16:creationId xmlns:a16="http://schemas.microsoft.com/office/drawing/2014/main" id="{3BB79A92-A99F-439E-906A-DE5F0700319D}"/>
               </a:ext>
             </a:extLst>
           </p:cNvPr>
@@ -2403,7 +3086,7 @@
           <p:cNvPr id="5" name="Date Placeholder 4">
             <a:extLst>
               <a:ext uri="{FF2B5EF4-FFF2-40B4-BE49-F238E27FC236}">
-                <a16:creationId xmlns:a16="http://schemas.microsoft.com/office/drawing/2014/main" id="{74188671-CA1D-4008-A1F7-822824F5F9EE}"/>
+                <a16:creationId xmlns:a16="http://schemas.microsoft.com/office/drawing/2014/main" id="{CF9680D4-8C54-4191-987D-FEA6DEA8522A}"/>
               </a:ext>
             </a:extLst>
           </p:cNvPr>
@@ -2421,7 +3104,7 @@
           <a:p>
             <a:fld id="{C1CC7F00-77D2-4F43-9191-B15704280A39}" type="datetimeFigureOut">
               <a:rPr lang="en-US" smtClean="0"/>
-              <a:t>6/21/2020</a:t>
+              <a:t>6/22/2020</a:t>
             </a:fld>
             <a:endParaRPr lang="en-US"/>
           </a:p>
@@ -2432,7 +3115,7 @@
           <p:cNvPr id="6" name="Footer Placeholder 5">
             <a:extLst>
               <a:ext uri="{FF2B5EF4-FFF2-40B4-BE49-F238E27FC236}">
-                <a16:creationId xmlns:a16="http://schemas.microsoft.com/office/drawing/2014/main" id="{483D8E49-FBCE-458A-BA41-BA502029AB37}"/>
+                <a16:creationId xmlns:a16="http://schemas.microsoft.com/office/drawing/2014/main" id="{29FA5934-6F4B-4ABA-B476-8008499FB4FE}"/>
               </a:ext>
             </a:extLst>
           </p:cNvPr>
@@ -2457,7 +3140,7 @@
           <p:cNvPr id="7" name="Slide Number Placeholder 6">
             <a:extLst>
               <a:ext uri="{FF2B5EF4-FFF2-40B4-BE49-F238E27FC236}">
-                <a16:creationId xmlns:a16="http://schemas.microsoft.com/office/drawing/2014/main" id="{48EBAE11-E56F-4398-8362-D9C7CDDC736B}"/>
+                <a16:creationId xmlns:a16="http://schemas.microsoft.com/office/drawing/2014/main" id="{23670F2A-D2ED-42E8-A1F3-05C5B4D2A032}"/>
               </a:ext>
             </a:extLst>
           </p:cNvPr>
@@ -2484,7 +3167,7 @@
     </p:spTree>
     <p:extLst>
       <p:ext uri="{BB962C8B-B14F-4D97-AF65-F5344CB8AC3E}">
-        <p14:creationId xmlns:p14="http://schemas.microsoft.com/office/powerpoint/2010/main" val="4135737059"/>
+        <p14:creationId xmlns:p14="http://schemas.microsoft.com/office/powerpoint/2010/main" val="2400867767"/>
       </p:ext>
     </p:extLst>
   </p:cSld>
@@ -2516,7 +3199,7 @@
           <p:cNvPr id="2" name="Title 1">
             <a:extLst>
               <a:ext uri="{FF2B5EF4-FFF2-40B4-BE49-F238E27FC236}">
-                <a16:creationId xmlns:a16="http://schemas.microsoft.com/office/drawing/2014/main" id="{F3EAA854-B6F5-4F12-8C43-3560E9E6654C}"/>
+                <a16:creationId xmlns:a16="http://schemas.microsoft.com/office/drawing/2014/main" id="{5B544ABC-AABE-4E9C-B818-BC8FA8ACAB2A}"/>
               </a:ext>
             </a:extLst>
           </p:cNvPr>
@@ -2549,7 +3232,7 @@
           <p:cNvPr id="3" name="Text Placeholder 2">
             <a:extLst>
               <a:ext uri="{FF2B5EF4-FFF2-40B4-BE49-F238E27FC236}">
-                <a16:creationId xmlns:a16="http://schemas.microsoft.com/office/drawing/2014/main" id="{2A70DC15-A565-44E0-9945-44CDF3E971F8}"/>
+                <a16:creationId xmlns:a16="http://schemas.microsoft.com/office/drawing/2014/main" id="{3AC40939-1AEE-4564-B8D6-74771B034B55}"/>
               </a:ext>
             </a:extLst>
           </p:cNvPr>
@@ -2620,7 +3303,7 @@
           <p:cNvPr id="4" name="Content Placeholder 3">
             <a:extLst>
               <a:ext uri="{FF2B5EF4-FFF2-40B4-BE49-F238E27FC236}">
-                <a16:creationId xmlns:a16="http://schemas.microsoft.com/office/drawing/2014/main" id="{A39471C0-BBD0-423B-BFAD-248AB251049F}"/>
+                <a16:creationId xmlns:a16="http://schemas.microsoft.com/office/drawing/2014/main" id="{F4368302-F3A4-445F-9A34-2D01A1F36A34}"/>
               </a:ext>
             </a:extLst>
           </p:cNvPr>
@@ -2682,7 +3365,7 @@
           <p:cNvPr id="5" name="Text Placeholder 4">
             <a:extLst>
               <a:ext uri="{FF2B5EF4-FFF2-40B4-BE49-F238E27FC236}">
-                <a16:creationId xmlns:a16="http://schemas.microsoft.com/office/drawing/2014/main" id="{FC614BA4-0F15-4552-8B96-8BC6A42E7198}"/>
+                <a16:creationId xmlns:a16="http://schemas.microsoft.com/office/drawing/2014/main" id="{E34854FF-9A1F-4684-B7E6-69DE62700689}"/>
               </a:ext>
             </a:extLst>
           </p:cNvPr>
@@ -2753,7 +3436,7 @@
           <p:cNvPr id="6" name="Content Placeholder 5">
             <a:extLst>
               <a:ext uri="{FF2B5EF4-FFF2-40B4-BE49-F238E27FC236}">
-                <a16:creationId xmlns:a16="http://schemas.microsoft.com/office/drawing/2014/main" id="{124C63B7-E373-44B5-8E78-F2E469CCB0C3}"/>
+                <a16:creationId xmlns:a16="http://schemas.microsoft.com/office/drawing/2014/main" id="{8ED7178C-08F6-4A78-B990-1B9B5CF4BE41}"/>
               </a:ext>
             </a:extLst>
           </p:cNvPr>
@@ -2815,7 +3498,7 @@
           <p:cNvPr id="7" name="Date Placeholder 6">
             <a:extLst>
               <a:ext uri="{FF2B5EF4-FFF2-40B4-BE49-F238E27FC236}">
-                <a16:creationId xmlns:a16="http://schemas.microsoft.com/office/drawing/2014/main" id="{48CB3A01-63BE-4BCD-AFB6-C79A37924BA9}"/>
+                <a16:creationId xmlns:a16="http://schemas.microsoft.com/office/drawing/2014/main" id="{1E438AF5-0F84-4307-9B98-3C7404BA9FC0}"/>
               </a:ext>
             </a:extLst>
           </p:cNvPr>
@@ -2833,7 +3516,7 @@
           <a:p>
             <a:fld id="{C1CC7F00-77D2-4F43-9191-B15704280A39}" type="datetimeFigureOut">
               <a:rPr lang="en-US" smtClean="0"/>
-              <a:t>6/21/2020</a:t>
+              <a:t>6/22/2020</a:t>
             </a:fld>
             <a:endParaRPr lang="en-US"/>
           </a:p>
@@ -2844,7 +3527,7 @@
           <p:cNvPr id="8" name="Footer Placeholder 7">
             <a:extLst>
               <a:ext uri="{FF2B5EF4-FFF2-40B4-BE49-F238E27FC236}">
-                <a16:creationId xmlns:a16="http://schemas.microsoft.com/office/drawing/2014/main" id="{42AF38A3-5C91-491F-8D04-8BAB9EB9C190}"/>
+                <a16:creationId xmlns:a16="http://schemas.microsoft.com/office/drawing/2014/main" id="{ED2DD19E-382C-406F-84B7-22457E233EA4}"/>
               </a:ext>
             </a:extLst>
           </p:cNvPr>
@@ -2869,7 +3552,7 @@
           <p:cNvPr id="9" name="Slide Number Placeholder 8">
             <a:extLst>
               <a:ext uri="{FF2B5EF4-FFF2-40B4-BE49-F238E27FC236}">
-                <a16:creationId xmlns:a16="http://schemas.microsoft.com/office/drawing/2014/main" id="{FD3CF855-6106-460B-A548-D64402AEE972}"/>
+                <a16:creationId xmlns:a16="http://schemas.microsoft.com/office/drawing/2014/main" id="{FCC2CF5E-4C0F-43A2-BB59-36CA85E0EC06}"/>
               </a:ext>
             </a:extLst>
           </p:cNvPr>
@@ -2896,7 +3579,7 @@
     </p:spTree>
     <p:extLst>
       <p:ext uri="{BB962C8B-B14F-4D97-AF65-F5344CB8AC3E}">
-        <p14:creationId xmlns:p14="http://schemas.microsoft.com/office/powerpoint/2010/main" val="3229250063"/>
+        <p14:creationId xmlns:p14="http://schemas.microsoft.com/office/powerpoint/2010/main" val="1169304453"/>
       </p:ext>
     </p:extLst>
   </p:cSld>
@@ -2928,7 +3611,7 @@
           <p:cNvPr id="2" name="Title 1">
             <a:extLst>
               <a:ext uri="{FF2B5EF4-FFF2-40B4-BE49-F238E27FC236}">
-                <a16:creationId xmlns:a16="http://schemas.microsoft.com/office/drawing/2014/main" id="{9F74B1AE-A37F-420C-9016-9B1E2F7C15E9}"/>
+                <a16:creationId xmlns:a16="http://schemas.microsoft.com/office/drawing/2014/main" id="{A74432B0-13B1-4690-B8D0-0029DBA74C89}"/>
               </a:ext>
             </a:extLst>
           </p:cNvPr>
@@ -2956,7 +3639,7 @@
           <p:cNvPr id="3" name="Date Placeholder 2">
             <a:extLst>
               <a:ext uri="{FF2B5EF4-FFF2-40B4-BE49-F238E27FC236}">
-                <a16:creationId xmlns:a16="http://schemas.microsoft.com/office/drawing/2014/main" id="{B0BF9E69-2660-4F70-B117-09CE29552865}"/>
+                <a16:creationId xmlns:a16="http://schemas.microsoft.com/office/drawing/2014/main" id="{60027265-67A1-4AA2-A926-D2D571F0707E}"/>
               </a:ext>
             </a:extLst>
           </p:cNvPr>
@@ -2974,7 +3657,7 @@
           <a:p>
             <a:fld id="{C1CC7F00-77D2-4F43-9191-B15704280A39}" type="datetimeFigureOut">
               <a:rPr lang="en-US" smtClean="0"/>
-              <a:t>6/21/2020</a:t>
+              <a:t>6/22/2020</a:t>
             </a:fld>
             <a:endParaRPr lang="en-US"/>
           </a:p>
@@ -2985,7 +3668,7 @@
           <p:cNvPr id="4" name="Footer Placeholder 3">
             <a:extLst>
               <a:ext uri="{FF2B5EF4-FFF2-40B4-BE49-F238E27FC236}">
-                <a16:creationId xmlns:a16="http://schemas.microsoft.com/office/drawing/2014/main" id="{4550C797-010C-401F-B1B4-00115C4ADF68}"/>
+                <a16:creationId xmlns:a16="http://schemas.microsoft.com/office/drawing/2014/main" id="{4ECCC024-BB4C-42FD-A194-E66A15EDBCA0}"/>
               </a:ext>
             </a:extLst>
           </p:cNvPr>
@@ -3010,7 +3693,7 @@
           <p:cNvPr id="5" name="Slide Number Placeholder 4">
             <a:extLst>
               <a:ext uri="{FF2B5EF4-FFF2-40B4-BE49-F238E27FC236}">
-                <a16:creationId xmlns:a16="http://schemas.microsoft.com/office/drawing/2014/main" id="{02DAA48D-54FA-4B2A-A1E1-38AF5719D99B}"/>
+                <a16:creationId xmlns:a16="http://schemas.microsoft.com/office/drawing/2014/main" id="{8E69F845-DD16-4966-8B37-DE6952E4FEDA}"/>
               </a:ext>
             </a:extLst>
           </p:cNvPr>
@@ -3037,7 +3720,7 @@
     </p:spTree>
     <p:extLst>
       <p:ext uri="{BB962C8B-B14F-4D97-AF65-F5344CB8AC3E}">
-        <p14:creationId xmlns:p14="http://schemas.microsoft.com/office/powerpoint/2010/main" val="1348250693"/>
+        <p14:creationId xmlns:p14="http://schemas.microsoft.com/office/powerpoint/2010/main" val="2869008117"/>
       </p:ext>
     </p:extLst>
   </p:cSld>
@@ -3069,7 +3752,7 @@
           <p:cNvPr id="2" name="Date Placeholder 1">
             <a:extLst>
               <a:ext uri="{FF2B5EF4-FFF2-40B4-BE49-F238E27FC236}">
-                <a16:creationId xmlns:a16="http://schemas.microsoft.com/office/drawing/2014/main" id="{4CF2FB08-AC92-4342-BF37-6C3741B271CB}"/>
+                <a16:creationId xmlns:a16="http://schemas.microsoft.com/office/drawing/2014/main" id="{FE025D58-5903-4A13-A262-4E0B21F5694F}"/>
               </a:ext>
             </a:extLst>
           </p:cNvPr>
@@ -3087,7 +3770,7 @@
           <a:p>
             <a:fld id="{C1CC7F00-77D2-4F43-9191-B15704280A39}" type="datetimeFigureOut">
               <a:rPr lang="en-US" smtClean="0"/>
-              <a:t>6/21/2020</a:t>
+              <a:t>6/22/2020</a:t>
             </a:fld>
             <a:endParaRPr lang="en-US"/>
           </a:p>
@@ -3098,7 +3781,7 @@
           <p:cNvPr id="3" name="Footer Placeholder 2">
             <a:extLst>
               <a:ext uri="{FF2B5EF4-FFF2-40B4-BE49-F238E27FC236}">
-                <a16:creationId xmlns:a16="http://schemas.microsoft.com/office/drawing/2014/main" id="{2D8917DD-7896-47ED-A589-DE4BFA732748}"/>
+                <a16:creationId xmlns:a16="http://schemas.microsoft.com/office/drawing/2014/main" id="{0DC2EF5C-5E20-4252-B5ED-5FBA2300A18E}"/>
               </a:ext>
             </a:extLst>
           </p:cNvPr>
@@ -3123,7 +3806,7 @@
           <p:cNvPr id="4" name="Slide Number Placeholder 3">
             <a:extLst>
               <a:ext uri="{FF2B5EF4-FFF2-40B4-BE49-F238E27FC236}">
-                <a16:creationId xmlns:a16="http://schemas.microsoft.com/office/drawing/2014/main" id="{8185D540-8334-46E2-AC3F-6BD73E993A81}"/>
+                <a16:creationId xmlns:a16="http://schemas.microsoft.com/office/drawing/2014/main" id="{FE2B4710-56BC-484F-A384-04A4BEF4E4D2}"/>
               </a:ext>
             </a:extLst>
           </p:cNvPr>
@@ -3150,13 +3833,18 @@
     </p:spTree>
     <p:extLst>
       <p:ext uri="{BB962C8B-B14F-4D97-AF65-F5344CB8AC3E}">
-        <p14:creationId xmlns:p14="http://schemas.microsoft.com/office/powerpoint/2010/main" val="1212950810"/>
+        <p14:creationId xmlns:p14="http://schemas.microsoft.com/office/powerpoint/2010/main" val="3767561606"/>
       </p:ext>
     </p:extLst>
   </p:cSld>
   <p:clrMapOvr>
     <a:masterClrMapping/>
   </p:clrMapOvr>
+  <p:extLst>
+    <p:ext uri="{DCECCB84-F9BA-43D5-87BE-67443E8EF086}">
+      <p15:sldGuideLst xmlns:p15="http://schemas.microsoft.com/office/powerpoint/2012/main"/>
+    </p:ext>
+  </p:extLst>
 </p:sldLayout>
 </file>
 
@@ -3182,7 +3870,7 @@
           <p:cNvPr id="2" name="Title 1">
             <a:extLst>
               <a:ext uri="{FF2B5EF4-FFF2-40B4-BE49-F238E27FC236}">
-                <a16:creationId xmlns:a16="http://schemas.microsoft.com/office/drawing/2014/main" id="{687D69D8-EF69-4D83-B0C9-26D6B32E1319}"/>
+                <a16:creationId xmlns:a16="http://schemas.microsoft.com/office/drawing/2014/main" id="{C922B3D5-EEAC-4F25-8F37-BFF7E41ED0DC}"/>
               </a:ext>
             </a:extLst>
           </p:cNvPr>
@@ -3219,7 +3907,7 @@
           <p:cNvPr id="3" name="Content Placeholder 2">
             <a:extLst>
               <a:ext uri="{FF2B5EF4-FFF2-40B4-BE49-F238E27FC236}">
-                <a16:creationId xmlns:a16="http://schemas.microsoft.com/office/drawing/2014/main" id="{AA50E03B-B6DB-4DE3-B87C-87467CDA59CC}"/>
+                <a16:creationId xmlns:a16="http://schemas.microsoft.com/office/drawing/2014/main" id="{C24B1539-AAEC-425C-91B4-C30DD3CCD74C}"/>
               </a:ext>
             </a:extLst>
           </p:cNvPr>
@@ -3309,7 +3997,7 @@
           <p:cNvPr id="4" name="Text Placeholder 3">
             <a:extLst>
               <a:ext uri="{FF2B5EF4-FFF2-40B4-BE49-F238E27FC236}">
-                <a16:creationId xmlns:a16="http://schemas.microsoft.com/office/drawing/2014/main" id="{38A3A543-456F-4AFE-ACD5-37AB065E5B5C}"/>
+                <a16:creationId xmlns:a16="http://schemas.microsoft.com/office/drawing/2014/main" id="{B691C594-4CBF-465F-9B73-625B45B66CE0}"/>
               </a:ext>
             </a:extLst>
           </p:cNvPr>
@@ -3380,7 +4068,7 @@
           <p:cNvPr id="5" name="Date Placeholder 4">
             <a:extLst>
               <a:ext uri="{FF2B5EF4-FFF2-40B4-BE49-F238E27FC236}">
-                <a16:creationId xmlns:a16="http://schemas.microsoft.com/office/drawing/2014/main" id="{B6A01AF6-348C-48C1-8678-EEF6F3572D1D}"/>
+                <a16:creationId xmlns:a16="http://schemas.microsoft.com/office/drawing/2014/main" id="{C18D72BF-C663-45BF-B7F8-E69F526A99A1}"/>
               </a:ext>
             </a:extLst>
           </p:cNvPr>
@@ -3398,7 +4086,7 @@
           <a:p>
             <a:fld id="{C1CC7F00-77D2-4F43-9191-B15704280A39}" type="datetimeFigureOut">
               <a:rPr lang="en-US" smtClean="0"/>
-              <a:t>6/21/2020</a:t>
+              <a:t>6/22/2020</a:t>
             </a:fld>
             <a:endParaRPr lang="en-US"/>
           </a:p>
@@ -3409,7 +4097,7 @@
           <p:cNvPr id="6" name="Footer Placeholder 5">
             <a:extLst>
               <a:ext uri="{FF2B5EF4-FFF2-40B4-BE49-F238E27FC236}">
-                <a16:creationId xmlns:a16="http://schemas.microsoft.com/office/drawing/2014/main" id="{308A8F81-68B3-4CB4-91EB-D85BECF6F440}"/>
+                <a16:creationId xmlns:a16="http://schemas.microsoft.com/office/drawing/2014/main" id="{F8955E3E-8CDA-477F-B483-DB1F0212F8F4}"/>
               </a:ext>
             </a:extLst>
           </p:cNvPr>
@@ -3434,7 +4122,7 @@
           <p:cNvPr id="7" name="Slide Number Placeholder 6">
             <a:extLst>
               <a:ext uri="{FF2B5EF4-FFF2-40B4-BE49-F238E27FC236}">
-                <a16:creationId xmlns:a16="http://schemas.microsoft.com/office/drawing/2014/main" id="{FE3F70A3-584F-482B-8354-D78E789E2AAA}"/>
+                <a16:creationId xmlns:a16="http://schemas.microsoft.com/office/drawing/2014/main" id="{E068DC0E-653B-4210-A162-1E2AF45487F2}"/>
               </a:ext>
             </a:extLst>
           </p:cNvPr>
@@ -3461,7 +4149,7 @@
     </p:spTree>
     <p:extLst>
       <p:ext uri="{BB962C8B-B14F-4D97-AF65-F5344CB8AC3E}">
-        <p14:creationId xmlns:p14="http://schemas.microsoft.com/office/powerpoint/2010/main" val="3316072081"/>
+        <p14:creationId xmlns:p14="http://schemas.microsoft.com/office/powerpoint/2010/main" val="910532370"/>
       </p:ext>
     </p:extLst>
   </p:cSld>
@@ -3493,7 +4181,7 @@
           <p:cNvPr id="2" name="Title 1">
             <a:extLst>
               <a:ext uri="{FF2B5EF4-FFF2-40B4-BE49-F238E27FC236}">
-                <a16:creationId xmlns:a16="http://schemas.microsoft.com/office/drawing/2014/main" id="{3BB01557-9ED2-4412-800F-A879CF5F0DC0}"/>
+                <a16:creationId xmlns:a16="http://schemas.microsoft.com/office/drawing/2014/main" id="{663FD6FC-2895-456E-9931-1EC67C37FE0F}"/>
               </a:ext>
             </a:extLst>
           </p:cNvPr>
@@ -3530,7 +4218,7 @@
           <p:cNvPr id="3" name="Picture Placeholder 2">
             <a:extLst>
               <a:ext uri="{FF2B5EF4-FFF2-40B4-BE49-F238E27FC236}">
-                <a16:creationId xmlns:a16="http://schemas.microsoft.com/office/drawing/2014/main" id="{2C681876-E61A-4EF9-8E24-A3D8C9FE4115}"/>
+                <a16:creationId xmlns:a16="http://schemas.microsoft.com/office/drawing/2014/main" id="{C58CBBF2-2817-47F6-911B-FD6321DBC25D}"/>
               </a:ext>
             </a:extLst>
           </p:cNvPr>
@@ -3597,7 +4285,7 @@
           <p:cNvPr id="4" name="Text Placeholder 3">
             <a:extLst>
               <a:ext uri="{FF2B5EF4-FFF2-40B4-BE49-F238E27FC236}">
-                <a16:creationId xmlns:a16="http://schemas.microsoft.com/office/drawing/2014/main" id="{F5E0F321-4FBF-4E5B-92E4-2681750A7591}"/>
+                <a16:creationId xmlns:a16="http://schemas.microsoft.com/office/drawing/2014/main" id="{01057634-6D6F-4771-B3F0-399453E22F2D}"/>
               </a:ext>
             </a:extLst>
           </p:cNvPr>
@@ -3668,7 +4356,7 @@
           <p:cNvPr id="5" name="Date Placeholder 4">
             <a:extLst>
               <a:ext uri="{FF2B5EF4-FFF2-40B4-BE49-F238E27FC236}">
-                <a16:creationId xmlns:a16="http://schemas.microsoft.com/office/drawing/2014/main" id="{3CD13CA3-4752-4D0C-B936-385F3048FB1D}"/>
+                <a16:creationId xmlns:a16="http://schemas.microsoft.com/office/drawing/2014/main" id="{1D4F5421-09F3-4A79-ABD1-16B361AD5CCC}"/>
               </a:ext>
             </a:extLst>
           </p:cNvPr>
@@ -3686,7 +4374,7 @@
           <a:p>
             <a:fld id="{C1CC7F00-77D2-4F43-9191-B15704280A39}" type="datetimeFigureOut">
               <a:rPr lang="en-US" smtClean="0"/>
-              <a:t>6/21/2020</a:t>
+              <a:t>6/22/2020</a:t>
             </a:fld>
             <a:endParaRPr lang="en-US"/>
           </a:p>
@@ -3697,7 +4385,7 @@
           <p:cNvPr id="6" name="Footer Placeholder 5">
             <a:extLst>
               <a:ext uri="{FF2B5EF4-FFF2-40B4-BE49-F238E27FC236}">
-                <a16:creationId xmlns:a16="http://schemas.microsoft.com/office/drawing/2014/main" id="{B95F5E55-2FFE-4CEE-9676-5B72903B245D}"/>
+                <a16:creationId xmlns:a16="http://schemas.microsoft.com/office/drawing/2014/main" id="{C843FEC3-F019-4153-92F6-9E791E6A319B}"/>
               </a:ext>
             </a:extLst>
           </p:cNvPr>
@@ -3722,7 +4410,7 @@
           <p:cNvPr id="7" name="Slide Number Placeholder 6">
             <a:extLst>
               <a:ext uri="{FF2B5EF4-FFF2-40B4-BE49-F238E27FC236}">
-                <a16:creationId xmlns:a16="http://schemas.microsoft.com/office/drawing/2014/main" id="{783C5EDB-C934-449C-AF25-7CC09D526E0D}"/>
+                <a16:creationId xmlns:a16="http://schemas.microsoft.com/office/drawing/2014/main" id="{7AB8F721-ACE7-43B9-836B-21F0098C7668}"/>
               </a:ext>
             </a:extLst>
           </p:cNvPr>
@@ -3749,7 +4437,7 @@
     </p:spTree>
     <p:extLst>
       <p:ext uri="{BB962C8B-B14F-4D97-AF65-F5344CB8AC3E}">
-        <p14:creationId xmlns:p14="http://schemas.microsoft.com/office/powerpoint/2010/main" val="3665923618"/>
+        <p14:creationId xmlns:p14="http://schemas.microsoft.com/office/powerpoint/2010/main" val="350324481"/>
       </p:ext>
     </p:extLst>
   </p:cSld>
@@ -3786,7 +4474,7 @@
           <p:cNvPr id="2" name="Title Placeholder 1">
             <a:extLst>
               <a:ext uri="{FF2B5EF4-FFF2-40B4-BE49-F238E27FC236}">
-                <a16:creationId xmlns:a16="http://schemas.microsoft.com/office/drawing/2014/main" id="{35DB2549-050D-49F0-B0EF-B0333444913D}"/>
+                <a16:creationId xmlns:a16="http://schemas.microsoft.com/office/drawing/2014/main" id="{721A7251-8F58-4DC2-B0E1-BE36EE494B8C}"/>
               </a:ext>
             </a:extLst>
           </p:cNvPr>
@@ -3824,7 +4512,7 @@
           <p:cNvPr id="3" name="Text Placeholder 2">
             <a:extLst>
               <a:ext uri="{FF2B5EF4-FFF2-40B4-BE49-F238E27FC236}">
-                <a16:creationId xmlns:a16="http://schemas.microsoft.com/office/drawing/2014/main" id="{A34D069A-98D4-42A7-9B03-3C4DCE1B143A}"/>
+                <a16:creationId xmlns:a16="http://schemas.microsoft.com/office/drawing/2014/main" id="{61F9A08D-A09D-44DA-B92F-F32B78A06B79}"/>
               </a:ext>
             </a:extLst>
           </p:cNvPr>
@@ -3891,7 +4579,7 @@
           <p:cNvPr id="4" name="Date Placeholder 3">
             <a:extLst>
               <a:ext uri="{FF2B5EF4-FFF2-40B4-BE49-F238E27FC236}">
-                <a16:creationId xmlns:a16="http://schemas.microsoft.com/office/drawing/2014/main" id="{3FA381D2-3021-44A6-B46B-596851A6546D}"/>
+                <a16:creationId xmlns:a16="http://schemas.microsoft.com/office/drawing/2014/main" id="{C7520A18-8D7E-44AF-BC8D-15BCDED3FBEB}"/>
               </a:ext>
             </a:extLst>
           </p:cNvPr>
@@ -3927,7 +4615,7 @@
           <a:p>
             <a:fld id="{C1CC7F00-77D2-4F43-9191-B15704280A39}" type="datetimeFigureOut">
               <a:rPr lang="en-US" smtClean="0"/>
-              <a:t>6/21/2020</a:t>
+              <a:t>6/22/2020</a:t>
             </a:fld>
             <a:endParaRPr lang="en-US"/>
           </a:p>
@@ -3938,7 +4626,7 @@
           <p:cNvPr id="5" name="Footer Placeholder 4">
             <a:extLst>
               <a:ext uri="{FF2B5EF4-FFF2-40B4-BE49-F238E27FC236}">
-                <a16:creationId xmlns:a16="http://schemas.microsoft.com/office/drawing/2014/main" id="{6B125FB4-BEE5-4A7A-A99B-9274337C3B53}"/>
+                <a16:creationId xmlns:a16="http://schemas.microsoft.com/office/drawing/2014/main" id="{14EE4372-BED9-43A8-A247-4854CFF6DD87}"/>
               </a:ext>
             </a:extLst>
           </p:cNvPr>
@@ -3981,7 +4669,7 @@
           <p:cNvPr id="6" name="Slide Number Placeholder 5">
             <a:extLst>
               <a:ext uri="{FF2B5EF4-FFF2-40B4-BE49-F238E27FC236}">
-                <a16:creationId xmlns:a16="http://schemas.microsoft.com/office/drawing/2014/main" id="{36648B74-1874-494C-AE78-8ECCBB056519}"/>
+                <a16:creationId xmlns:a16="http://schemas.microsoft.com/office/drawing/2014/main" id="{F1879996-192C-4E2B-8A04-3BC46B3884CC}"/>
               </a:ext>
             </a:extLst>
           </p:cNvPr>
@@ -4026,23 +4714,23 @@
     </p:spTree>
     <p:extLst>
       <p:ext uri="{BB962C8B-B14F-4D97-AF65-F5344CB8AC3E}">
-        <p14:creationId xmlns:p14="http://schemas.microsoft.com/office/powerpoint/2010/main" val="3394442832"/>
+        <p14:creationId xmlns:p14="http://schemas.microsoft.com/office/powerpoint/2010/main" val="1559169276"/>
       </p:ext>
     </p:extLst>
   </p:cSld>
   <p:clrMap bg1="lt1" tx1="dk1" bg2="lt2" tx2="dk2" accent1="accent1" accent2="accent2" accent3="accent3" accent4="accent4" accent5="accent5" accent6="accent6" hlink="hlink" folHlink="folHlink"/>
   <p:sldLayoutIdLst>
-    <p:sldLayoutId id="2147483649" r:id="rId1"/>
-    <p:sldLayoutId id="2147483650" r:id="rId2"/>
-    <p:sldLayoutId id="2147483651" r:id="rId3"/>
-    <p:sldLayoutId id="2147483652" r:id="rId4"/>
-    <p:sldLayoutId id="2147483653" r:id="rId5"/>
-    <p:sldLayoutId id="2147483654" r:id="rId6"/>
-    <p:sldLayoutId id="2147483655" r:id="rId7"/>
-    <p:sldLayoutId id="2147483656" r:id="rId8"/>
-    <p:sldLayoutId id="2147483657" r:id="rId9"/>
-    <p:sldLayoutId id="2147483658" r:id="rId10"/>
-    <p:sldLayoutId id="2147483659" r:id="rId11"/>
+    <p:sldLayoutId id="2147483824" r:id="rId1"/>
+    <p:sldLayoutId id="2147483825" r:id="rId2"/>
+    <p:sldLayoutId id="2147483826" r:id="rId3"/>
+    <p:sldLayoutId id="2147483827" r:id="rId4"/>
+    <p:sldLayoutId id="2147483828" r:id="rId5"/>
+    <p:sldLayoutId id="2147483829" r:id="rId6"/>
+    <p:sldLayoutId id="2147483830" r:id="rId7"/>
+    <p:sldLayoutId id="2147483831" r:id="rId8"/>
+    <p:sldLayoutId id="2147483832" r:id="rId9"/>
+    <p:sldLayoutId id="2147483833" r:id="rId10"/>
+    <p:sldLayoutId id="2147483834" r:id="rId11"/>
   </p:sldLayoutIdLst>
   <p:txStyles>
     <p:titleStyle>
@@ -4324,6 +5012,11 @@
       </a:lvl9pPr>
     </p:otherStyle>
   </p:txStyles>
+  <p:extLst>
+    <p:ext uri="{27BBF7A9-308A-43DC-89C8-2F10F3537804}">
+      <p15:sldGuideLst xmlns:p15="http://schemas.microsoft.com/office/powerpoint/2012/main"/>
+    </p:ext>
+  </p:extLst>
 </p:sldMaster>
 </file>
 
@@ -4362,13 +5055,16 @@
         </p:nvSpPr>
         <p:spPr/>
         <p:txBody>
-          <a:bodyPr/>
+          <a:bodyPr>
+            <a:normAutofit/>
+          </a:bodyPr>
           <a:lstStyle/>
           <a:p>
             <a:r>
-              <a:rPr lang="en-US" dirty="0"/>
+              <a:rPr lang="en-US"/>
               <a:t>Predictive Analysis of 20 Large Cap US Assets </a:t>
             </a:r>
+            <a:endParaRPr lang="en-US" dirty="0"/>
           </a:p>
         </p:txBody>
       </p:sp>
@@ -4394,7 +5090,7 @@
           <a:lstStyle/>
           <a:p>
             <a:r>
-              <a:rPr lang="en-US" dirty="0"/>
+              <a:rPr lang="en-US"/>
               <a:t>Proj1- Team#09 </a:t>
             </a:r>
           </a:p>
@@ -4456,9 +5152,12 @@
           </a:xfrm>
         </p:spPr>
         <p:txBody>
-          <a:bodyPr/>
+          <a:bodyPr>
+            <a:normAutofit/>
+          </a:bodyPr>
           <a:lstStyle/>
           <a:p>
+            <a:pPr algn="ctr"/>
             <a:r>
               <a:rPr lang="en-US" dirty="0">
                 <a:latin typeface="Times New Roman" panose="02020603050405020304" pitchFamily="18" charset="0"/>
@@ -4513,93 +5212,6 @@
           </a:p>
         </p:txBody>
       </p:sp>
-      <p:sp>
-        <p:nvSpPr>
-          <p:cNvPr id="6" name="TextBox 5">
-            <a:extLst>
-              <a:ext uri="{FF2B5EF4-FFF2-40B4-BE49-F238E27FC236}">
-                <a16:creationId xmlns:a16="http://schemas.microsoft.com/office/drawing/2014/main" id="{FD535C47-BC3B-C74F-88D5-E821F9B8F379}"/>
-              </a:ext>
-            </a:extLst>
-          </p:cNvPr>
-          <p:cNvSpPr txBox="1"/>
-          <p:nvPr/>
-        </p:nvSpPr>
-        <p:spPr>
-          <a:xfrm>
-            <a:off x="484095" y="2889455"/>
-            <a:ext cx="2892873" cy="2031325"/>
-          </a:xfrm>
-          <a:prstGeom prst="rect">
-            <a:avLst/>
-          </a:prstGeom>
-          <a:solidFill>
-            <a:srgbClr val="FFFF00"/>
-          </a:solidFill>
-        </p:spPr>
-        <p:txBody>
-          <a:bodyPr wrap="square" rtlCol="0">
-            <a:spAutoFit/>
-          </a:bodyPr>
-          <a:lstStyle/>
-          <a:p>
-            <a:r>
-              <a:rPr lang="en-US" dirty="0"/>
-              <a:t>Highlight the correlating assets with better marking </a:t>
-            </a:r>
-            <a:r>
-              <a:rPr lang="en-US" dirty="0">
-                <a:sym typeface="Wingdings" pitchFamily="2" charset="2"/>
-              </a:rPr>
-              <a:t>.</a:t>
-            </a:r>
-            <a:br>
-              <a:rPr lang="en-US" dirty="0">
-                <a:sym typeface="Wingdings" pitchFamily="2" charset="2"/>
-              </a:rPr>
-            </a:br>
-            <a:r>
-              <a:rPr lang="en-US" dirty="0">
-                <a:sym typeface="Wingdings" pitchFamily="2" charset="2"/>
-              </a:rPr>
-              <a:t>Re-arrange the assets to have assets from the same industries in pairs.</a:t>
-            </a:r>
-          </a:p>
-          <a:p>
-            <a:endParaRPr lang="en-US" dirty="0"/>
-          </a:p>
-        </p:txBody>
-      </p:sp>
-      <p:pic>
-        <p:nvPicPr>
-          <p:cNvPr id="9" name="Picture 8">
-            <a:extLst>
-              <a:ext uri="{FF2B5EF4-FFF2-40B4-BE49-F238E27FC236}">
-                <a16:creationId xmlns:a16="http://schemas.microsoft.com/office/drawing/2014/main" id="{12BCD5B3-0E5C-E24D-8AD3-9DD67A741BD0}"/>
-              </a:ext>
-            </a:extLst>
-          </p:cNvPr>
-          <p:cNvPicPr>
-            <a:picLocks noChangeAspect="1"/>
-          </p:cNvPicPr>
-          <p:nvPr/>
-        </p:nvPicPr>
-        <p:blipFill>
-          <a:blip r:embed="rId2"/>
-          <a:stretch>
-            <a:fillRect/>
-          </a:stretch>
-        </p:blipFill>
-        <p:spPr>
-          <a:xfrm>
-            <a:off x="484095" y="1427007"/>
-            <a:ext cx="2892873" cy="1495025"/>
-          </a:xfrm>
-          <a:prstGeom prst="rect">
-            <a:avLst/>
-          </a:prstGeom>
-        </p:spPr>
-      </p:pic>
       <p:pic>
         <p:nvPicPr>
           <p:cNvPr id="8" name="Picture 7">
@@ -5858,43 +6470,892 @@
           </a:p>
         </p:txBody>
       </p:sp>
-      <p:sp>
-        <p:nvSpPr>
-          <p:cNvPr id="46" name="TextBox 45">
+      <p:graphicFrame>
+        <p:nvGraphicFramePr>
+          <p:cNvPr id="4" name="Table 3">
             <a:extLst>
               <a:ext uri="{FF2B5EF4-FFF2-40B4-BE49-F238E27FC236}">
-                <a16:creationId xmlns:a16="http://schemas.microsoft.com/office/drawing/2014/main" id="{EE40F7ED-E242-43BF-9C72-175F26C15D8B}"/>
+                <a16:creationId xmlns:a16="http://schemas.microsoft.com/office/drawing/2014/main" id="{B83EC06D-AD73-4FAB-9EF9-32C015458536}"/>
               </a:ext>
             </a:extLst>
           </p:cNvPr>
-          <p:cNvSpPr txBox="1"/>
-          <p:nvPr/>
-        </p:nvSpPr>
-        <p:spPr>
-          <a:xfrm>
-            <a:off x="478136" y="4753979"/>
-            <a:ext cx="2907222" cy="1200329"/>
-          </a:xfrm>
-          <a:prstGeom prst="rect">
-            <a:avLst/>
-          </a:prstGeom>
-          <a:solidFill>
-            <a:srgbClr val="92D050"/>
-          </a:solidFill>
-        </p:spPr>
-        <p:txBody>
-          <a:bodyPr wrap="square" rtlCol="0">
-            <a:spAutoFit/>
-          </a:bodyPr>
-          <a:lstStyle/>
-          <a:p>
-            <a:r>
-              <a:rPr lang="en-US" dirty="0"/>
-              <a:t>Added highlights and went through to find higher correlation in the general matrix</a:t>
-            </a:r>
-          </a:p>
-        </p:txBody>
-      </p:sp>
+          <p:cNvGraphicFramePr>
+            <a:graphicFrameLocks noGrp="1"/>
+          </p:cNvGraphicFramePr>
+          <p:nvPr>
+            <p:extLst>
+              <p:ext uri="{D42A27DB-BD31-4B8C-83A1-F6EECF244321}">
+                <p14:modId xmlns:p14="http://schemas.microsoft.com/office/powerpoint/2010/main" val="1578791680"/>
+              </p:ext>
+            </p:extLst>
+          </p:nvPr>
+        </p:nvGraphicFramePr>
+        <p:xfrm>
+          <a:off x="131927" y="1424752"/>
+          <a:ext cx="3276117" cy="4526280"/>
+        </p:xfrm>
+        <a:graphic>
+          <a:graphicData uri="http://schemas.openxmlformats.org/drawingml/2006/table">
+            <a:tbl>
+              <a:tblPr firstRow="1" bandRow="1">
+                <a:tableStyleId>{5C22544A-7EE6-4342-B048-85BDC9FD1C3A}</a:tableStyleId>
+              </a:tblPr>
+              <a:tblGrid>
+                <a:gridCol w="1092039">
+                  <a:extLst>
+                    <a:ext uri="{9D8B030D-6E8A-4147-A177-3AD203B41FA5}">
+                      <a16:colId xmlns:a16="http://schemas.microsoft.com/office/drawing/2014/main" val="494876951"/>
+                    </a:ext>
+                  </a:extLst>
+                </a:gridCol>
+                <a:gridCol w="1092039">
+                  <a:extLst>
+                    <a:ext uri="{9D8B030D-6E8A-4147-A177-3AD203B41FA5}">
+                      <a16:colId xmlns:a16="http://schemas.microsoft.com/office/drawing/2014/main" val="1149348293"/>
+                    </a:ext>
+                  </a:extLst>
+                </a:gridCol>
+                <a:gridCol w="1092039">
+                  <a:extLst>
+                    <a:ext uri="{9D8B030D-6E8A-4147-A177-3AD203B41FA5}">
+                      <a16:colId xmlns:a16="http://schemas.microsoft.com/office/drawing/2014/main" val="3781393130"/>
+                    </a:ext>
+                  </a:extLst>
+                </a:gridCol>
+              </a:tblGrid>
+              <a:tr h="411819">
+                <a:tc>
+                  <a:txBody>
+                    <a:bodyPr/>
+                    <a:lstStyle/>
+                    <a:p>
+                      <a:r>
+                        <a:rPr lang="en-US" sz="1100" dirty="0"/>
+                        <a:t>Industry</a:t>
+                      </a:r>
+                    </a:p>
+                  </a:txBody>
+                  <a:tcPr/>
+                </a:tc>
+                <a:tc>
+                  <a:txBody>
+                    <a:bodyPr/>
+                    <a:lstStyle/>
+                    <a:p>
+                      <a:r>
+                        <a:rPr lang="en-US" sz="1100" dirty="0"/>
+                        <a:t>Asset 1 (Ticker Symbol)</a:t>
+                      </a:r>
+                    </a:p>
+                  </a:txBody>
+                  <a:tcPr/>
+                </a:tc>
+                <a:tc>
+                  <a:txBody>
+                    <a:bodyPr/>
+                    <a:lstStyle/>
+                    <a:p>
+                      <a:r>
+                        <a:rPr lang="en-US" sz="1100" dirty="0"/>
+                        <a:t>Asset 2 (Ticker Symbol)</a:t>
+                      </a:r>
+                    </a:p>
+                  </a:txBody>
+                  <a:tcPr/>
+                </a:tc>
+                <a:extLst>
+                  <a:ext uri="{0D108BD9-81ED-4DB2-BD59-A6C34878D82A}">
+                    <a16:rowId xmlns:a16="http://schemas.microsoft.com/office/drawing/2014/main" val="3731126865"/>
+                  </a:ext>
+                </a:extLst>
+              </a:tr>
+              <a:tr h="411819">
+                <a:tc>
+                  <a:txBody>
+                    <a:bodyPr/>
+                    <a:lstStyle/>
+                    <a:p>
+                      <a:pPr marL="0" marR="0" lvl="0" indent="0" algn="l" defTabSz="914400" rtl="0" eaLnBrk="1" fontAlgn="auto" latinLnBrk="0" hangingPunct="1">
+                        <a:lnSpc>
+                          <a:spcPct val="100000"/>
+                        </a:lnSpc>
+                        <a:spcBef>
+                          <a:spcPts val="0"/>
+                        </a:spcBef>
+                        <a:spcAft>
+                          <a:spcPts val="0"/>
+                        </a:spcAft>
+                        <a:buClrTx/>
+                        <a:buSzTx/>
+                        <a:buFontTx/>
+                        <a:buNone/>
+                        <a:tabLst/>
+                        <a:defRPr/>
+                      </a:pPr>
+                      <a:r>
+                        <a:rPr lang="en-US" sz="1100" dirty="0"/>
+                        <a:t>Banks</a:t>
+                      </a:r>
+                    </a:p>
+                  </a:txBody>
+                  <a:tcPr/>
+                </a:tc>
+                <a:tc>
+                  <a:txBody>
+                    <a:bodyPr/>
+                    <a:lstStyle/>
+                    <a:p>
+                      <a:r>
+                        <a:rPr lang="en-US" sz="1100" dirty="0"/>
+                        <a:t>Bank of America (BAC)</a:t>
+                      </a:r>
+                    </a:p>
+                  </a:txBody>
+                  <a:tcPr/>
+                </a:tc>
+                <a:tc>
+                  <a:txBody>
+                    <a:bodyPr/>
+                    <a:lstStyle/>
+                    <a:p>
+                      <a:pPr marL="0" marR="0" lvl="0" indent="0" algn="l" defTabSz="914400" rtl="0" eaLnBrk="1" fontAlgn="auto" latinLnBrk="0" hangingPunct="1">
+                        <a:lnSpc>
+                          <a:spcPct val="100000"/>
+                        </a:lnSpc>
+                        <a:spcBef>
+                          <a:spcPts val="0"/>
+                        </a:spcBef>
+                        <a:spcAft>
+                          <a:spcPts val="0"/>
+                        </a:spcAft>
+                        <a:buClrTx/>
+                        <a:buSzTx/>
+                        <a:buFontTx/>
+                        <a:buNone/>
+                        <a:tabLst/>
+                        <a:defRPr/>
+                      </a:pPr>
+                      <a:r>
+                        <a:rPr lang="en-US" sz="1100" dirty="0"/>
+                        <a:t>Wells Fargo (WFC)</a:t>
+                      </a:r>
+                    </a:p>
+                  </a:txBody>
+                  <a:tcPr/>
+                </a:tc>
+                <a:extLst>
+                  <a:ext uri="{0D108BD9-81ED-4DB2-BD59-A6C34878D82A}">
+                    <a16:rowId xmlns:a16="http://schemas.microsoft.com/office/drawing/2014/main" val="565189246"/>
+                  </a:ext>
+                </a:extLst>
+              </a:tr>
+              <a:tr h="411819">
+                <a:tc>
+                  <a:txBody>
+                    <a:bodyPr/>
+                    <a:lstStyle/>
+                    <a:p>
+                      <a:pPr marL="0" marR="0" lvl="0" indent="0" algn="l" defTabSz="914400" rtl="0" eaLnBrk="1" fontAlgn="auto" latinLnBrk="0" hangingPunct="1">
+                        <a:lnSpc>
+                          <a:spcPct val="100000"/>
+                        </a:lnSpc>
+                        <a:spcBef>
+                          <a:spcPts val="0"/>
+                        </a:spcBef>
+                        <a:spcAft>
+                          <a:spcPts val="0"/>
+                        </a:spcAft>
+                        <a:buClrTx/>
+                        <a:buSzTx/>
+                        <a:buFontTx/>
+                        <a:buNone/>
+                        <a:tabLst/>
+                        <a:defRPr/>
+                      </a:pPr>
+                      <a:r>
+                        <a:rPr lang="en-US" sz="1100" dirty="0"/>
+                        <a:t>Integrated Oil &amp; Gas</a:t>
+                      </a:r>
+                    </a:p>
+                  </a:txBody>
+                  <a:tcPr/>
+                </a:tc>
+                <a:tc>
+                  <a:txBody>
+                    <a:bodyPr/>
+                    <a:lstStyle/>
+                    <a:p>
+                      <a:pPr marL="0" marR="0" lvl="0" indent="0" algn="l" defTabSz="914400" rtl="0" eaLnBrk="1" fontAlgn="auto" latinLnBrk="0" hangingPunct="1">
+                        <a:lnSpc>
+                          <a:spcPct val="100000"/>
+                        </a:lnSpc>
+                        <a:spcBef>
+                          <a:spcPts val="0"/>
+                        </a:spcBef>
+                        <a:spcAft>
+                          <a:spcPts val="0"/>
+                        </a:spcAft>
+                        <a:buClrTx/>
+                        <a:buSzTx/>
+                        <a:buFontTx/>
+                        <a:buNone/>
+                        <a:tabLst/>
+                        <a:defRPr/>
+                      </a:pPr>
+                      <a:r>
+                        <a:rPr lang="en-US" sz="1100" dirty="0"/>
+                        <a:t>ExxonMobil (XOM)</a:t>
+                      </a:r>
+                    </a:p>
+                  </a:txBody>
+                  <a:tcPr/>
+                </a:tc>
+                <a:tc>
+                  <a:txBody>
+                    <a:bodyPr/>
+                    <a:lstStyle/>
+                    <a:p>
+                      <a:r>
+                        <a:rPr lang="en-US" sz="1100" dirty="0"/>
+                        <a:t>Chevron (CVX)</a:t>
+                      </a:r>
+                    </a:p>
+                  </a:txBody>
+                  <a:tcPr/>
+                </a:tc>
+                <a:extLst>
+                  <a:ext uri="{0D108BD9-81ED-4DB2-BD59-A6C34878D82A}">
+                    <a16:rowId xmlns:a16="http://schemas.microsoft.com/office/drawing/2014/main" val="2021123042"/>
+                  </a:ext>
+                </a:extLst>
+              </a:tr>
+              <a:tr h="411819">
+                <a:tc>
+                  <a:txBody>
+                    <a:bodyPr/>
+                    <a:lstStyle/>
+                    <a:p>
+                      <a:pPr marL="0" marR="0" lvl="0" indent="0" algn="l" defTabSz="914400" rtl="0" eaLnBrk="1" fontAlgn="auto" latinLnBrk="0" hangingPunct="1">
+                        <a:lnSpc>
+                          <a:spcPct val="100000"/>
+                        </a:lnSpc>
+                        <a:spcBef>
+                          <a:spcPts val="0"/>
+                        </a:spcBef>
+                        <a:spcAft>
+                          <a:spcPts val="0"/>
+                        </a:spcAft>
+                        <a:buClrTx/>
+                        <a:buSzTx/>
+                        <a:buFontTx/>
+                        <a:buNone/>
+                        <a:tabLst/>
+                        <a:defRPr/>
+                      </a:pPr>
+                      <a:r>
+                        <a:rPr lang="en-US" sz="1100" dirty="0"/>
+                        <a:t>Telecommunications </a:t>
+                      </a:r>
+                    </a:p>
+                  </a:txBody>
+                  <a:tcPr/>
+                </a:tc>
+                <a:tc>
+                  <a:txBody>
+                    <a:bodyPr/>
+                    <a:lstStyle/>
+                    <a:p>
+                      <a:pPr marL="0" marR="0" lvl="0" indent="0" algn="l" defTabSz="914400" rtl="0" eaLnBrk="1" fontAlgn="auto" latinLnBrk="0" hangingPunct="1">
+                        <a:lnSpc>
+                          <a:spcPct val="100000"/>
+                        </a:lnSpc>
+                        <a:spcBef>
+                          <a:spcPts val="0"/>
+                        </a:spcBef>
+                        <a:spcAft>
+                          <a:spcPts val="0"/>
+                        </a:spcAft>
+                        <a:buClrTx/>
+                        <a:buSzTx/>
+                        <a:buFontTx/>
+                        <a:buNone/>
+                        <a:tabLst/>
+                        <a:defRPr/>
+                      </a:pPr>
+                      <a:r>
+                        <a:rPr lang="en-US" sz="1100" dirty="0"/>
+                        <a:t>AT&amp;T (T)</a:t>
+                      </a:r>
+                    </a:p>
+                  </a:txBody>
+                  <a:tcPr/>
+                </a:tc>
+                <a:tc>
+                  <a:txBody>
+                    <a:bodyPr/>
+                    <a:lstStyle/>
+                    <a:p>
+                      <a:pPr marL="0" marR="0" lvl="0" indent="0" algn="l" defTabSz="914400" rtl="0" eaLnBrk="1" fontAlgn="auto" latinLnBrk="0" hangingPunct="1">
+                        <a:lnSpc>
+                          <a:spcPct val="100000"/>
+                        </a:lnSpc>
+                        <a:spcBef>
+                          <a:spcPts val="0"/>
+                        </a:spcBef>
+                        <a:spcAft>
+                          <a:spcPts val="0"/>
+                        </a:spcAft>
+                        <a:buClrTx/>
+                        <a:buSzTx/>
+                        <a:buFontTx/>
+                        <a:buNone/>
+                        <a:tabLst/>
+                        <a:defRPr/>
+                      </a:pPr>
+                      <a:r>
+                        <a:rPr lang="en-US" sz="1100" dirty="0"/>
+                        <a:t>T-Mobile (TMUS)</a:t>
+                      </a:r>
+                    </a:p>
+                  </a:txBody>
+                  <a:tcPr/>
+                </a:tc>
+                <a:extLst>
+                  <a:ext uri="{0D108BD9-81ED-4DB2-BD59-A6C34878D82A}">
+                    <a16:rowId xmlns:a16="http://schemas.microsoft.com/office/drawing/2014/main" val="88865026"/>
+                  </a:ext>
+                </a:extLst>
+              </a:tr>
+              <a:tr h="250033">
+                <a:tc>
+                  <a:txBody>
+                    <a:bodyPr/>
+                    <a:lstStyle/>
+                    <a:p>
+                      <a:pPr marL="0" marR="0" lvl="0" indent="0" algn="l" defTabSz="914400" rtl="0" eaLnBrk="1" fontAlgn="auto" latinLnBrk="0" hangingPunct="1">
+                        <a:lnSpc>
+                          <a:spcPct val="100000"/>
+                        </a:lnSpc>
+                        <a:spcBef>
+                          <a:spcPts val="0"/>
+                        </a:spcBef>
+                        <a:spcAft>
+                          <a:spcPts val="0"/>
+                        </a:spcAft>
+                        <a:buClrTx/>
+                        <a:buSzTx/>
+                        <a:buFontTx/>
+                        <a:buNone/>
+                        <a:tabLst/>
+                        <a:defRPr/>
+                      </a:pPr>
+                      <a:r>
+                        <a:rPr lang="en-US" sz="1100" dirty="0"/>
+                        <a:t>Entertainment</a:t>
+                      </a:r>
+                    </a:p>
+                  </a:txBody>
+                  <a:tcPr/>
+                </a:tc>
+                <a:tc>
+                  <a:txBody>
+                    <a:bodyPr/>
+                    <a:lstStyle/>
+                    <a:p>
+                      <a:r>
+                        <a:rPr lang="en-US" sz="1100" dirty="0"/>
+                        <a:t>Disney (DIS) </a:t>
+                      </a:r>
+                    </a:p>
+                  </a:txBody>
+                  <a:tcPr/>
+                </a:tc>
+                <a:tc>
+                  <a:txBody>
+                    <a:bodyPr/>
+                    <a:lstStyle/>
+                    <a:p>
+                      <a:pPr marL="0" marR="0" lvl="0" indent="0" algn="l" defTabSz="914400" rtl="0" eaLnBrk="1" fontAlgn="auto" latinLnBrk="0" hangingPunct="1">
+                        <a:lnSpc>
+                          <a:spcPct val="100000"/>
+                        </a:lnSpc>
+                        <a:spcBef>
+                          <a:spcPts val="0"/>
+                        </a:spcBef>
+                        <a:spcAft>
+                          <a:spcPts val="0"/>
+                        </a:spcAft>
+                        <a:buClrTx/>
+                        <a:buSzTx/>
+                        <a:buFontTx/>
+                        <a:buNone/>
+                        <a:tabLst/>
+                        <a:defRPr/>
+                      </a:pPr>
+                      <a:r>
+                        <a:rPr lang="en-US" sz="1100" dirty="0"/>
+                        <a:t>Netflix (NFLX)</a:t>
+                      </a:r>
+                    </a:p>
+                  </a:txBody>
+                  <a:tcPr/>
+                </a:tc>
+                <a:extLst>
+                  <a:ext uri="{0D108BD9-81ED-4DB2-BD59-A6C34878D82A}">
+                    <a16:rowId xmlns:a16="http://schemas.microsoft.com/office/drawing/2014/main" val="1374450707"/>
+                  </a:ext>
+                </a:extLst>
+              </a:tr>
+              <a:tr h="411819">
+                <a:tc>
+                  <a:txBody>
+                    <a:bodyPr/>
+                    <a:lstStyle/>
+                    <a:p>
+                      <a:pPr marL="0" marR="0" lvl="0" indent="0" algn="l" defTabSz="914400" rtl="0" eaLnBrk="1" fontAlgn="auto" latinLnBrk="0" hangingPunct="1">
+                        <a:lnSpc>
+                          <a:spcPct val="100000"/>
+                        </a:lnSpc>
+                        <a:spcBef>
+                          <a:spcPts val="0"/>
+                        </a:spcBef>
+                        <a:spcAft>
+                          <a:spcPts val="0"/>
+                        </a:spcAft>
+                        <a:buClrTx/>
+                        <a:buSzTx/>
+                        <a:buFontTx/>
+                        <a:buNone/>
+                        <a:tabLst/>
+                        <a:defRPr/>
+                      </a:pPr>
+                      <a:r>
+                        <a:rPr lang="en-US" sz="1100" dirty="0"/>
+                        <a:t>Restaurants</a:t>
+                      </a:r>
+                    </a:p>
+                  </a:txBody>
+                  <a:tcPr/>
+                </a:tc>
+                <a:tc>
+                  <a:txBody>
+                    <a:bodyPr/>
+                    <a:lstStyle/>
+                    <a:p>
+                      <a:r>
+                        <a:rPr lang="en-US" sz="1100" dirty="0"/>
+                        <a:t>McDonald (MCD) </a:t>
+                      </a:r>
+                    </a:p>
+                  </a:txBody>
+                  <a:tcPr/>
+                </a:tc>
+                <a:tc>
+                  <a:txBody>
+                    <a:bodyPr/>
+                    <a:lstStyle/>
+                    <a:p>
+                      <a:pPr marL="0" marR="0" lvl="0" indent="0" algn="l" defTabSz="914400" rtl="0" eaLnBrk="1" fontAlgn="auto" latinLnBrk="0" hangingPunct="1">
+                        <a:lnSpc>
+                          <a:spcPct val="100000"/>
+                        </a:lnSpc>
+                        <a:spcBef>
+                          <a:spcPts val="0"/>
+                        </a:spcBef>
+                        <a:spcAft>
+                          <a:spcPts val="0"/>
+                        </a:spcAft>
+                        <a:buClrTx/>
+                        <a:buSzTx/>
+                        <a:buFontTx/>
+                        <a:buNone/>
+                        <a:tabLst/>
+                        <a:defRPr/>
+                      </a:pPr>
+                      <a:r>
+                        <a:rPr lang="en-US" sz="1100" dirty="0"/>
+                        <a:t>Starbucks (SBUX)</a:t>
+                      </a:r>
+                    </a:p>
+                  </a:txBody>
+                  <a:tcPr/>
+                </a:tc>
+                <a:extLst>
+                  <a:ext uri="{0D108BD9-81ED-4DB2-BD59-A6C34878D82A}">
+                    <a16:rowId xmlns:a16="http://schemas.microsoft.com/office/drawing/2014/main" val="4089688246"/>
+                  </a:ext>
+                </a:extLst>
+              </a:tr>
+              <a:tr h="411819">
+                <a:tc>
+                  <a:txBody>
+                    <a:bodyPr/>
+                    <a:lstStyle/>
+                    <a:p>
+                      <a:pPr marL="0" marR="0" lvl="0" indent="0" algn="l" defTabSz="914400" rtl="0" eaLnBrk="1" fontAlgn="auto" latinLnBrk="0" hangingPunct="1">
+                        <a:lnSpc>
+                          <a:spcPct val="100000"/>
+                        </a:lnSpc>
+                        <a:spcBef>
+                          <a:spcPts val="0"/>
+                        </a:spcBef>
+                        <a:spcAft>
+                          <a:spcPts val="0"/>
+                        </a:spcAft>
+                        <a:buClrTx/>
+                        <a:buSzTx/>
+                        <a:buFontTx/>
+                        <a:buNone/>
+                        <a:tabLst/>
+                        <a:defRPr/>
+                      </a:pPr>
+                      <a:r>
+                        <a:rPr lang="en-US" sz="1100" dirty="0"/>
+                        <a:t>Household Products</a:t>
+                      </a:r>
+                    </a:p>
+                  </a:txBody>
+                  <a:tcPr/>
+                </a:tc>
+                <a:tc>
+                  <a:txBody>
+                    <a:bodyPr/>
+                    <a:lstStyle/>
+                    <a:p>
+                      <a:r>
+                        <a:rPr lang="en-US" sz="1100" dirty="0"/>
+                        <a:t>Procter &amp; Gamble (PG)</a:t>
+                      </a:r>
+                    </a:p>
+                  </a:txBody>
+                  <a:tcPr/>
+                </a:tc>
+                <a:tc>
+                  <a:txBody>
+                    <a:bodyPr/>
+                    <a:lstStyle/>
+                    <a:p>
+                      <a:pPr marL="0" marR="0" lvl="0" indent="0" algn="l" defTabSz="914400" rtl="0" eaLnBrk="1" fontAlgn="auto" latinLnBrk="0" hangingPunct="1">
+                        <a:lnSpc>
+                          <a:spcPct val="100000"/>
+                        </a:lnSpc>
+                        <a:spcBef>
+                          <a:spcPts val="0"/>
+                        </a:spcBef>
+                        <a:spcAft>
+                          <a:spcPts val="0"/>
+                        </a:spcAft>
+                        <a:buClrTx/>
+                        <a:buSzTx/>
+                        <a:buFontTx/>
+                        <a:buNone/>
+                        <a:tabLst/>
+                        <a:defRPr/>
+                      </a:pPr>
+                      <a:r>
+                        <a:rPr lang="en-US" sz="1100" dirty="0"/>
+                        <a:t>Colgate-Palmolive (PL)</a:t>
+                      </a:r>
+                    </a:p>
+                  </a:txBody>
+                  <a:tcPr/>
+                </a:tc>
+                <a:extLst>
+                  <a:ext uri="{0D108BD9-81ED-4DB2-BD59-A6C34878D82A}">
+                    <a16:rowId xmlns:a16="http://schemas.microsoft.com/office/drawing/2014/main" val="998036369"/>
+                  </a:ext>
+                </a:extLst>
+              </a:tr>
+              <a:tr h="411819">
+                <a:tc>
+                  <a:txBody>
+                    <a:bodyPr/>
+                    <a:lstStyle/>
+                    <a:p>
+                      <a:pPr marL="0" marR="0" lvl="0" indent="0" algn="l" defTabSz="914400" rtl="0" eaLnBrk="1" fontAlgn="auto" latinLnBrk="0" hangingPunct="1">
+                        <a:lnSpc>
+                          <a:spcPct val="100000"/>
+                        </a:lnSpc>
+                        <a:spcBef>
+                          <a:spcPts val="0"/>
+                        </a:spcBef>
+                        <a:spcAft>
+                          <a:spcPts val="0"/>
+                        </a:spcAft>
+                        <a:buClrTx/>
+                        <a:buSzTx/>
+                        <a:buFontTx/>
+                        <a:buNone/>
+                        <a:tabLst/>
+                        <a:defRPr/>
+                      </a:pPr>
+                      <a:r>
+                        <a:rPr lang="en-US" sz="1100" dirty="0"/>
+                        <a:t>Pharmaceuticals</a:t>
+                      </a:r>
+                    </a:p>
+                  </a:txBody>
+                  <a:tcPr/>
+                </a:tc>
+                <a:tc>
+                  <a:txBody>
+                    <a:bodyPr/>
+                    <a:lstStyle/>
+                    <a:p>
+                      <a:r>
+                        <a:rPr lang="en-US" sz="1100" dirty="0"/>
+                        <a:t>Johnson &amp; Johnson (JNJ) </a:t>
+                      </a:r>
+                    </a:p>
+                  </a:txBody>
+                  <a:tcPr/>
+                </a:tc>
+                <a:tc>
+                  <a:txBody>
+                    <a:bodyPr/>
+                    <a:lstStyle/>
+                    <a:p>
+                      <a:pPr marL="0" marR="0" lvl="0" indent="0" algn="l" defTabSz="914400" rtl="0" eaLnBrk="1" fontAlgn="auto" latinLnBrk="0" hangingPunct="1">
+                        <a:lnSpc>
+                          <a:spcPct val="100000"/>
+                        </a:lnSpc>
+                        <a:spcBef>
+                          <a:spcPts val="0"/>
+                        </a:spcBef>
+                        <a:spcAft>
+                          <a:spcPts val="0"/>
+                        </a:spcAft>
+                        <a:buClrTx/>
+                        <a:buSzTx/>
+                        <a:buFontTx/>
+                        <a:buNone/>
+                        <a:tabLst/>
+                        <a:defRPr/>
+                      </a:pPr>
+                      <a:r>
+                        <a:rPr lang="en-US" sz="1100" dirty="0"/>
+                        <a:t>Pfizer (PFE)</a:t>
+                      </a:r>
+                    </a:p>
+                  </a:txBody>
+                  <a:tcPr/>
+                </a:tc>
+                <a:extLst>
+                  <a:ext uri="{0D108BD9-81ED-4DB2-BD59-A6C34878D82A}">
+                    <a16:rowId xmlns:a16="http://schemas.microsoft.com/office/drawing/2014/main" val="3149391858"/>
+                  </a:ext>
+                </a:extLst>
+              </a:tr>
+              <a:tr h="411819">
+                <a:tc>
+                  <a:txBody>
+                    <a:bodyPr/>
+                    <a:lstStyle/>
+                    <a:p>
+                      <a:pPr marL="0" marR="0" lvl="0" indent="0" algn="l" defTabSz="914400" rtl="0" eaLnBrk="1" fontAlgn="auto" latinLnBrk="0" hangingPunct="1">
+                        <a:lnSpc>
+                          <a:spcPct val="100000"/>
+                        </a:lnSpc>
+                        <a:spcBef>
+                          <a:spcPts val="0"/>
+                        </a:spcBef>
+                        <a:spcAft>
+                          <a:spcPts val="0"/>
+                        </a:spcAft>
+                        <a:buClrTx/>
+                        <a:buSzTx/>
+                        <a:buFontTx/>
+                        <a:buNone/>
+                        <a:tabLst/>
+                        <a:defRPr/>
+                      </a:pPr>
+                      <a:r>
+                        <a:rPr lang="en-US" sz="1100" dirty="0"/>
+                        <a:t>Airlines</a:t>
+                      </a:r>
+                    </a:p>
+                  </a:txBody>
+                  <a:tcPr/>
+                </a:tc>
+                <a:tc>
+                  <a:txBody>
+                    <a:bodyPr/>
+                    <a:lstStyle/>
+                    <a:p>
+                      <a:r>
+                        <a:rPr lang="en-US" sz="1100" dirty="0"/>
+                        <a:t>American Airlines (AAL)</a:t>
+                      </a:r>
+                    </a:p>
+                  </a:txBody>
+                  <a:tcPr/>
+                </a:tc>
+                <a:tc>
+                  <a:txBody>
+                    <a:bodyPr/>
+                    <a:lstStyle/>
+                    <a:p>
+                      <a:r>
+                        <a:rPr lang="en-US" sz="1100" dirty="0"/>
+                        <a:t>Delta Airlines (DAL</a:t>
+                      </a:r>
+                    </a:p>
+                  </a:txBody>
+                  <a:tcPr/>
+                </a:tc>
+                <a:extLst>
+                  <a:ext uri="{0D108BD9-81ED-4DB2-BD59-A6C34878D82A}">
+                    <a16:rowId xmlns:a16="http://schemas.microsoft.com/office/drawing/2014/main" val="3519732357"/>
+                  </a:ext>
+                </a:extLst>
+              </a:tr>
+              <a:tr h="250033">
+                <a:tc>
+                  <a:txBody>
+                    <a:bodyPr/>
+                    <a:lstStyle/>
+                    <a:p>
+                      <a:pPr marL="0" marR="0" lvl="0" indent="0" algn="l" defTabSz="914400" rtl="0" eaLnBrk="1" fontAlgn="auto" latinLnBrk="0" hangingPunct="1">
+                        <a:lnSpc>
+                          <a:spcPct val="100000"/>
+                        </a:lnSpc>
+                        <a:spcBef>
+                          <a:spcPts val="0"/>
+                        </a:spcBef>
+                        <a:spcAft>
+                          <a:spcPts val="0"/>
+                        </a:spcAft>
+                        <a:buClrTx/>
+                        <a:buSzTx/>
+                        <a:buFontTx/>
+                        <a:buNone/>
+                        <a:tabLst/>
+                        <a:defRPr/>
+                      </a:pPr>
+                      <a:r>
+                        <a:rPr lang="en-US" sz="1100" dirty="0"/>
+                        <a:t>Soft Drinks</a:t>
+                      </a:r>
+                    </a:p>
+                  </a:txBody>
+                  <a:tcPr/>
+                </a:tc>
+                <a:tc>
+                  <a:txBody>
+                    <a:bodyPr/>
+                    <a:lstStyle/>
+                    <a:p>
+                      <a:r>
+                        <a:rPr lang="en-US" sz="1100" dirty="0"/>
+                        <a:t>Coca Cola (KO) </a:t>
+                      </a:r>
+                    </a:p>
+                  </a:txBody>
+                  <a:tcPr/>
+                </a:tc>
+                <a:tc>
+                  <a:txBody>
+                    <a:bodyPr/>
+                    <a:lstStyle/>
+                    <a:p>
+                      <a:pPr marL="0" marR="0" lvl="0" indent="0" algn="l" defTabSz="914400" rtl="0" eaLnBrk="1" fontAlgn="auto" latinLnBrk="0" hangingPunct="1">
+                        <a:lnSpc>
+                          <a:spcPct val="100000"/>
+                        </a:lnSpc>
+                        <a:spcBef>
+                          <a:spcPts val="0"/>
+                        </a:spcBef>
+                        <a:spcAft>
+                          <a:spcPts val="0"/>
+                        </a:spcAft>
+                        <a:buClrTx/>
+                        <a:buSzTx/>
+                        <a:buFontTx/>
+                        <a:buNone/>
+                        <a:tabLst/>
+                        <a:defRPr/>
+                      </a:pPr>
+                      <a:r>
+                        <a:rPr lang="en-US" sz="1100" dirty="0"/>
+                        <a:t>Pepsi (PEP)</a:t>
+                      </a:r>
+                    </a:p>
+                  </a:txBody>
+                  <a:tcPr/>
+                </a:tc>
+                <a:extLst>
+                  <a:ext uri="{0D108BD9-81ED-4DB2-BD59-A6C34878D82A}">
+                    <a16:rowId xmlns:a16="http://schemas.microsoft.com/office/drawing/2014/main" val="3893909711"/>
+                  </a:ext>
+                </a:extLst>
+              </a:tr>
+              <a:tr h="573605">
+                <a:tc>
+                  <a:txBody>
+                    <a:bodyPr/>
+                    <a:lstStyle/>
+                    <a:p>
+                      <a:pPr marL="0" marR="0" lvl="0" indent="0" algn="l" defTabSz="914400" rtl="0" eaLnBrk="1" fontAlgn="auto" latinLnBrk="0" hangingPunct="1">
+                        <a:lnSpc>
+                          <a:spcPct val="100000"/>
+                        </a:lnSpc>
+                        <a:spcBef>
+                          <a:spcPts val="0"/>
+                        </a:spcBef>
+                        <a:spcAft>
+                          <a:spcPts val="0"/>
+                        </a:spcAft>
+                        <a:buClrTx/>
+                        <a:buSzTx/>
+                        <a:buFontTx/>
+                        <a:buNone/>
+                        <a:tabLst/>
+                        <a:defRPr/>
+                      </a:pPr>
+                      <a:r>
+                        <a:rPr lang="en-US" sz="1100" dirty="0"/>
+                        <a:t>Hypermarkets and Super Centers</a:t>
+                      </a:r>
+                    </a:p>
+                  </a:txBody>
+                  <a:tcPr/>
+                </a:tc>
+                <a:tc>
+                  <a:txBody>
+                    <a:bodyPr/>
+                    <a:lstStyle/>
+                    <a:p>
+                      <a:r>
+                        <a:rPr lang="en-US" sz="1100" dirty="0"/>
+                        <a:t>Walmart (WMT) </a:t>
+                      </a:r>
+                    </a:p>
+                  </a:txBody>
+                  <a:tcPr/>
+                </a:tc>
+                <a:tc>
+                  <a:txBody>
+                    <a:bodyPr/>
+                    <a:lstStyle/>
+                    <a:p>
+                      <a:r>
+                        <a:rPr lang="en-US" sz="1100" dirty="0"/>
+                        <a:t>Costco (COST) </a:t>
+                      </a:r>
+                    </a:p>
+                  </a:txBody>
+                  <a:tcPr/>
+                </a:tc>
+                <a:extLst>
+                  <a:ext uri="{0D108BD9-81ED-4DB2-BD59-A6C34878D82A}">
+                    <a16:rowId xmlns:a16="http://schemas.microsoft.com/office/drawing/2014/main" val="1016440635"/>
+                  </a:ext>
+                </a:extLst>
+              </a:tr>
+            </a:tbl>
+          </a:graphicData>
+        </a:graphic>
+      </p:graphicFrame>
     </p:spTree>
     <p:extLst>
       <p:ext uri="{BB962C8B-B14F-4D97-AF65-F5344CB8AC3E}">
@@ -5943,8 +7404,8 @@
         </p:nvSpPr>
         <p:spPr>
           <a:xfrm>
-            <a:off x="838200" y="-116449"/>
-            <a:ext cx="10515600" cy="907560"/>
+            <a:off x="455688" y="0"/>
+            <a:ext cx="11073245" cy="907560"/>
           </a:xfrm>
         </p:spPr>
         <p:txBody>
@@ -5953,12 +7414,13 @@
           </a:bodyPr>
           <a:lstStyle/>
           <a:p>
+            <a:pPr algn="ctr"/>
             <a:r>
-              <a:rPr lang="en-US" sz="2000" dirty="0">
+              <a:rPr lang="en-US" sz="2200" dirty="0">
                 <a:latin typeface="Times New Roman" panose="02020603050405020304" pitchFamily="18" charset="0"/>
                 <a:cs typeface="Times New Roman" panose="02020603050405020304" pitchFamily="18" charset="0"/>
               </a:rPr>
-              <a:t>Predict the future Price of 2 assets with relative high and low STD – CVX and NFLX</a:t>
+              <a:t>Making price predictions based on regression model: CVX (Low STD) and NFLX (High STD)</a:t>
             </a:r>
           </a:p>
         </p:txBody>
@@ -5981,86 +7443,41 @@
         </p:nvSpPr>
         <p:spPr>
           <a:xfrm>
-            <a:off x="838200" y="4680729"/>
-            <a:ext cx="10740775" cy="1659973"/>
+            <a:off x="6424866" y="4812632"/>
+            <a:ext cx="5154112" cy="1975366"/>
           </a:xfrm>
         </p:spPr>
         <p:txBody>
           <a:bodyPr>
-            <a:normAutofit/>
+            <a:normAutofit lnSpcReduction="10000"/>
           </a:bodyPr>
           <a:lstStyle/>
           <a:p>
             <a:r>
-              <a:rPr lang="en-US" sz="2000" dirty="0">
-                <a:highlight>
-                  <a:srgbClr val="FFFF00"/>
-                </a:highlight>
-              </a:rPr>
-              <a:t>The actual closing price for CVX at the end of Jan 2020 is 104.37, while Feb is 90.93 </a:t>
+              <a:rPr lang="en-US" sz="2000" dirty="0"/>
+              <a:t>The STD of CVX price is 18.1. </a:t>
             </a:r>
           </a:p>
           <a:p>
             <a:r>
-              <a:rPr lang="en-US" sz="2000" dirty="0">
-                <a:highlight>
-                  <a:srgbClr val="FFFF00"/>
-                </a:highlight>
-              </a:rPr>
-              <a:t>The STD of CVX price is 18.1 the Jan forecasted price is within +/- CVX std, while Feb is outside the std. This can be attributed to the price war between Russia and Saudi Arabia that send crude price tumbling to the negative. </a:t>
+              <a:rPr lang="en-US" sz="2000" dirty="0"/>
+              <a:t>The Jan forecasted price is within +/- CVX STD, while Feb is outside the STD. </a:t>
             </a:r>
           </a:p>
-        </p:txBody>
-      </p:sp>
-      <p:sp>
-        <p:nvSpPr>
-          <p:cNvPr id="4" name="TextBox 3">
-            <a:extLst>
-              <a:ext uri="{FF2B5EF4-FFF2-40B4-BE49-F238E27FC236}">
-                <a16:creationId xmlns:a16="http://schemas.microsoft.com/office/drawing/2014/main" id="{ED322F9C-C4B6-304A-A79F-37EC6DE80E68}"/>
-              </a:ext>
-            </a:extLst>
-          </p:cNvPr>
-          <p:cNvSpPr txBox="1"/>
-          <p:nvPr/>
-        </p:nvSpPr>
-        <p:spPr>
-          <a:xfrm>
-            <a:off x="5369977" y="6017536"/>
-            <a:ext cx="6049413" cy="646331"/>
-          </a:xfrm>
-          <a:prstGeom prst="rect">
-            <a:avLst/>
-          </a:prstGeom>
-          <a:solidFill>
-            <a:srgbClr val="FFFF00"/>
-          </a:solidFill>
-        </p:spPr>
-        <p:txBody>
-          <a:bodyPr wrap="none" rtlCol="0">
-            <a:spAutoFit/>
-          </a:bodyPr>
-          <a:lstStyle/>
           <a:p>
             <a:r>
-              <a:rPr lang="en-US" dirty="0"/>
-              <a:t>Keep the CVX but replace with an updated plot.</a:t>
-            </a:r>
-          </a:p>
-          <a:p>
-            <a:r>
-              <a:rPr lang="en-US" dirty="0"/>
-              <a:t>Note: open to change, if more interesting companies observed.</a:t>
+              <a:rPr lang="en-US" sz="2000" dirty="0"/>
+              <a:t>This can be attributed to the price war between Russia and Saudi Arabia that sent crude oil prices tumbling into the negative. </a:t>
             </a:r>
           </a:p>
         </p:txBody>
       </p:sp>
       <p:pic>
         <p:nvPicPr>
-          <p:cNvPr id="10" name="Picture 9">
+          <p:cNvPr id="6" name="Picture 5" descr="A close up of a map&#10;&#10;Description automatically generated">
             <a:extLst>
               <a:ext uri="{FF2B5EF4-FFF2-40B4-BE49-F238E27FC236}">
-                <a16:creationId xmlns:a16="http://schemas.microsoft.com/office/drawing/2014/main" id="{C15A032C-218D-4C7A-A6E2-DC7BDB07A649}"/>
+                <a16:creationId xmlns:a16="http://schemas.microsoft.com/office/drawing/2014/main" id="{351A6121-83D3-4958-9FC0-F61E31A66FD5}"/>
               </a:ext>
             </a:extLst>
           </p:cNvPr>
@@ -6083,8 +7500,8 @@
         </p:blipFill>
         <p:spPr>
           <a:xfrm>
-            <a:off x="939567" y="487023"/>
-            <a:ext cx="7021585" cy="4177256"/>
+            <a:off x="1277926" y="633845"/>
+            <a:ext cx="9636151" cy="4178787"/>
           </a:xfrm>
           <a:prstGeom prst="rect">
             <a:avLst/>
@@ -6093,10 +7510,10 @@
       </p:pic>
       <p:sp>
         <p:nvSpPr>
-          <p:cNvPr id="11" name="TextBox 10">
+          <p:cNvPr id="7" name="TextBox 6">
             <a:extLst>
               <a:ext uri="{FF2B5EF4-FFF2-40B4-BE49-F238E27FC236}">
-                <a16:creationId xmlns:a16="http://schemas.microsoft.com/office/drawing/2014/main" id="{88245CC6-E68E-4C11-88F2-DD852286A96E}"/>
+                <a16:creationId xmlns:a16="http://schemas.microsoft.com/office/drawing/2014/main" id="{A4FEE946-2758-4B2D-8FD3-8AEA96CF98AC}"/>
               </a:ext>
             </a:extLst>
           </p:cNvPr>
@@ -6105,15 +7522,13 @@
         </p:nvSpPr>
         <p:spPr>
           <a:xfrm>
-            <a:off x="8263119" y="1577106"/>
-            <a:ext cx="2907222" cy="369332"/>
+            <a:off x="838199" y="4691523"/>
+            <a:ext cx="5154112" cy="923330"/>
           </a:xfrm>
           <a:prstGeom prst="rect">
             <a:avLst/>
           </a:prstGeom>
-          <a:solidFill>
-            <a:srgbClr val="92D050"/>
-          </a:solidFill>
+          <a:noFill/>
         </p:spPr>
         <p:txBody>
           <a:bodyPr wrap="square" rtlCol="0">
@@ -6121,10 +7536,127 @@
           </a:bodyPr>
           <a:lstStyle/>
           <a:p>
+            <a:pPr algn="ctr"/>
             <a:r>
               <a:rPr lang="en-US" dirty="0"/>
-              <a:t>Updated the Image</a:t>
+              <a:t>Forecasted closing price based on regression model:</a:t>
             </a:r>
+          </a:p>
+          <a:p>
+            <a:pPr marL="1657350" lvl="3" indent="-285750">
+              <a:buFont typeface="Arial" panose="020B0604020202020204" pitchFamily="34" charset="0"/>
+              <a:buChar char="•"/>
+            </a:pPr>
+            <a:r>
+              <a:rPr lang="en-US" dirty="0"/>
+              <a:t>Jan 2020: 114.30</a:t>
+            </a:r>
+          </a:p>
+          <a:p>
+            <a:pPr marL="1657350" lvl="3" indent="-285750">
+              <a:buFont typeface="Arial" panose="020B0604020202020204" pitchFamily="34" charset="0"/>
+              <a:buChar char="•"/>
+            </a:pPr>
+            <a:r>
+              <a:rPr lang="en-US" dirty="0"/>
+              <a:t>Feb 2020: 114.74</a:t>
+            </a:r>
+          </a:p>
+        </p:txBody>
+      </p:sp>
+      <p:sp>
+        <p:nvSpPr>
+          <p:cNvPr id="8" name="TextBox 7">
+            <a:extLst>
+              <a:ext uri="{FF2B5EF4-FFF2-40B4-BE49-F238E27FC236}">
+                <a16:creationId xmlns:a16="http://schemas.microsoft.com/office/drawing/2014/main" id="{4A655C45-771A-4927-A17E-ED9786F4A17F}"/>
+              </a:ext>
+            </a:extLst>
+          </p:cNvPr>
+          <p:cNvSpPr txBox="1"/>
+          <p:nvPr/>
+        </p:nvSpPr>
+        <p:spPr>
+          <a:xfrm>
+            <a:off x="838199" y="5720016"/>
+            <a:ext cx="4928937" cy="1200329"/>
+          </a:xfrm>
+          <a:prstGeom prst="rect">
+            <a:avLst/>
+          </a:prstGeom>
+          <a:noFill/>
+        </p:spPr>
+        <p:txBody>
+          <a:bodyPr wrap="square" rtlCol="0">
+            <a:spAutoFit/>
+          </a:bodyPr>
+          <a:lstStyle/>
+          <a:p>
+            <a:pPr lvl="0" algn="ctr"/>
+            <a:r>
+              <a:rPr lang="en-US" dirty="0">
+                <a:solidFill>
+                  <a:prstClr val="black"/>
+                </a:solidFill>
+              </a:rPr>
+              <a:t>The actual closing price for CVX: </a:t>
+            </a:r>
+          </a:p>
+          <a:p>
+            <a:pPr marL="1657350" lvl="3" indent="-285750">
+              <a:buFont typeface="Arial" panose="020B0604020202020204" pitchFamily="34" charset="0"/>
+              <a:buChar char="•"/>
+            </a:pPr>
+            <a:r>
+              <a:rPr lang="en-US" dirty="0">
+                <a:solidFill>
+                  <a:prstClr val="black"/>
+                </a:solidFill>
+              </a:rPr>
+              <a:t>Jan 2020: </a:t>
+            </a:r>
+            <a:r>
+              <a:rPr lang="en-US" dirty="0">
+                <a:solidFill>
+                  <a:srgbClr val="FC7404"/>
+                </a:solidFill>
+              </a:rPr>
+              <a:t>104.37</a:t>
+            </a:r>
+          </a:p>
+          <a:p>
+            <a:pPr marL="1657350" lvl="3" indent="-285750">
+              <a:buFont typeface="Arial" panose="020B0604020202020204" pitchFamily="34" charset="0"/>
+              <a:buChar char="•"/>
+            </a:pPr>
+            <a:r>
+              <a:rPr lang="en-US" dirty="0">
+                <a:solidFill>
+                  <a:prstClr val="black"/>
+                </a:solidFill>
+              </a:rPr>
+              <a:t>Feb 2020: </a:t>
+            </a:r>
+            <a:r>
+              <a:rPr lang="en-US" dirty="0">
+                <a:solidFill>
+                  <a:srgbClr val="FF0000"/>
+                </a:solidFill>
+              </a:rPr>
+              <a:t>90.93</a:t>
+            </a:r>
+            <a:r>
+              <a:rPr lang="en-US" dirty="0">
+                <a:solidFill>
+                  <a:prstClr val="black"/>
+                </a:solidFill>
+              </a:rPr>
+              <a:t> </a:t>
+            </a:r>
+            <a:endParaRPr lang="en-US" dirty="0"/>
+          </a:p>
+          <a:p>
+            <a:endParaRPr lang="en-US" dirty="0"/>
           </a:p>
         </p:txBody>
       </p:sp>
@@ -6163,7 +7695,7 @@
           <p:cNvPr id="2" name="Title 1">
             <a:extLst>
               <a:ext uri="{FF2B5EF4-FFF2-40B4-BE49-F238E27FC236}">
-                <a16:creationId xmlns:a16="http://schemas.microsoft.com/office/drawing/2014/main" id="{6F6F4A97-91BC-C041-973D-18C7349FC943}"/>
+                <a16:creationId xmlns:a16="http://schemas.microsoft.com/office/drawing/2014/main" id="{3403E013-A6ED-9C47-99A7-8731D6B609C0}"/>
               </a:ext>
             </a:extLst>
           </p:cNvPr>
@@ -6176,32 +7708,33 @@
         </p:nvSpPr>
         <p:spPr>
           <a:xfrm>
-            <a:off x="838200" y="365126"/>
-            <a:ext cx="10515600" cy="315912"/>
+            <a:off x="540547" y="-5469"/>
+            <a:ext cx="10903527" cy="907560"/>
           </a:xfrm>
         </p:spPr>
         <p:txBody>
           <a:bodyPr>
-            <a:normAutofit fontScale="90000"/>
+            <a:normAutofit/>
           </a:bodyPr>
           <a:lstStyle/>
           <a:p>
+            <a:pPr algn="ctr"/>
             <a:r>
-              <a:rPr lang="en-US" sz="2400" dirty="0">
+              <a:rPr lang="en-US" sz="2200" dirty="0">
                 <a:latin typeface="Times New Roman" panose="02020603050405020304" pitchFamily="18" charset="0"/>
                 <a:cs typeface="Times New Roman" panose="02020603050405020304" pitchFamily="18" charset="0"/>
               </a:rPr>
-              <a:t>Predict the future Price of 2 assets with relative high and low STD – CVX and NFLX</a:t>
+              <a:t>Making price predictions based on regression model: CVX (Low STD) and NFLX (High STD)</a:t>
             </a:r>
           </a:p>
         </p:txBody>
       </p:sp>
       <p:sp>
         <p:nvSpPr>
-          <p:cNvPr id="6" name="Content Placeholder 5">
+          <p:cNvPr id="3" name="Content Placeholder 2">
             <a:extLst>
               <a:ext uri="{FF2B5EF4-FFF2-40B4-BE49-F238E27FC236}">
-                <a16:creationId xmlns:a16="http://schemas.microsoft.com/office/drawing/2014/main" id="{65459BF0-1114-FA4C-9EB7-B4B4BE7D96E2}"/>
+                <a16:creationId xmlns:a16="http://schemas.microsoft.com/office/drawing/2014/main" id="{866BC438-487C-114A-874B-2E091C4E17A5}"/>
               </a:ext>
             </a:extLst>
           </p:cNvPr>
@@ -6214,8 +7747,8 @@
         </p:nvSpPr>
         <p:spPr>
           <a:xfrm>
-            <a:off x="578141" y="4865611"/>
-            <a:ext cx="10515600" cy="1685986"/>
+            <a:off x="6424866" y="4812632"/>
+            <a:ext cx="5154112" cy="1975366"/>
           </a:xfrm>
         </p:spPr>
         <p:txBody>
@@ -6225,78 +7758,34 @@
           <a:lstStyle/>
           <a:p>
             <a:r>
-              <a:rPr lang="en-US" sz="2000" dirty="0">
-                <a:highlight>
-                  <a:srgbClr val="FFFF00"/>
-                </a:highlight>
-              </a:rPr>
-              <a:t>The actual closing price for NFLX at the end of Jan 2020 is </a:t>
+              <a:rPr lang="en-US" sz="2000" dirty="0"/>
+              <a:t>The STD of NFLX price is 115.71. </a:t>
             </a:r>
+          </a:p>
+          <a:p>
             <a:r>
-              <a:rPr lang="en-US" sz="2000" strike="sngStrike" dirty="0">
-                <a:highlight>
-                  <a:srgbClr val="FFFF00"/>
-                </a:highlight>
-              </a:rPr>
-              <a:t>123.06</a:t>
+              <a:rPr lang="en-US" sz="2000" dirty="0"/>
+              <a:t>The Jan and Feb forecasted prices are within +/- NFLX STD.</a:t>
             </a:r>
+          </a:p>
+          <a:p>
             <a:r>
               <a:rPr lang="en-US" sz="2000" dirty="0">
                 <a:highlight>
                   <a:srgbClr val="FFFF00"/>
                 </a:highlight>
               </a:rPr>
-              <a:t>, while Feb is </a:t>
+              <a:t>This can be attributed by….</a:t>
             </a:r>
-            <a:r>
-              <a:rPr lang="en-US" sz="2000" strike="sngStrike" dirty="0">
-                <a:highlight>
-                  <a:srgbClr val="FFFF00"/>
-                </a:highlight>
-              </a:rPr>
-              <a:t>112.48</a:t>
-            </a:r>
-          </a:p>
-          <a:p>
-            <a:r>
-              <a:rPr lang="en-US" sz="2000" dirty="0">
-                <a:highlight>
-                  <a:srgbClr val="FFFF00"/>
-                </a:highlight>
-              </a:rPr>
-              <a:t> The STD of NFLX price is </a:t>
-            </a:r>
-            <a:r>
-              <a:rPr lang="en-US" sz="2000" strike="sngStrike" dirty="0">
-                <a:highlight>
-                  <a:srgbClr val="FFFF00"/>
-                </a:highlight>
-              </a:rPr>
-              <a:t>18.83…the Jan forecasted price is outside +/- PG std, while Feb is within the std. This can be attributed to the “Jan effect” when companies announce their annual returns. </a:t>
-            </a:r>
-          </a:p>
-          <a:p>
-            <a:endParaRPr lang="en-US" dirty="0">
-              <a:highlight>
-                <a:srgbClr val="FFFF00"/>
-              </a:highlight>
-            </a:endParaRPr>
-          </a:p>
-          <a:p>
-            <a:endParaRPr lang="en-US" dirty="0">
-              <a:highlight>
-                <a:srgbClr val="FFFF00"/>
-              </a:highlight>
-            </a:endParaRPr>
           </a:p>
         </p:txBody>
       </p:sp>
       <p:sp>
         <p:nvSpPr>
-          <p:cNvPr id="9" name="TextBox 8">
+          <p:cNvPr id="7" name="TextBox 6">
             <a:extLst>
               <a:ext uri="{FF2B5EF4-FFF2-40B4-BE49-F238E27FC236}">
-                <a16:creationId xmlns:a16="http://schemas.microsoft.com/office/drawing/2014/main" id="{32F31939-168A-DB46-B10B-76B423FE6253}"/>
+                <a16:creationId xmlns:a16="http://schemas.microsoft.com/office/drawing/2014/main" id="{A4FEE946-2758-4B2D-8FD3-8AEA96CF98AC}"/>
               </a:ext>
             </a:extLst>
           </p:cNvPr>
@@ -6305,41 +7794,141 @@
         </p:nvSpPr>
         <p:spPr>
           <a:xfrm>
-            <a:off x="900095" y="6046743"/>
-            <a:ext cx="6049413" cy="646331"/>
+            <a:off x="838199" y="4691523"/>
+            <a:ext cx="5154112" cy="923330"/>
           </a:xfrm>
           <a:prstGeom prst="rect">
             <a:avLst/>
           </a:prstGeom>
-          <a:solidFill>
-            <a:srgbClr val="FFFF00"/>
-          </a:solidFill>
+          <a:noFill/>
         </p:spPr>
         <p:txBody>
-          <a:bodyPr wrap="none" rtlCol="0">
+          <a:bodyPr wrap="square" rtlCol="0">
             <a:spAutoFit/>
           </a:bodyPr>
           <a:lstStyle/>
           <a:p>
+            <a:pPr algn="ctr"/>
             <a:r>
               <a:rPr lang="en-US" dirty="0"/>
-              <a:t>Keep the PG  but replace with an updated plot.</a:t>
+              <a:t>Forecasted closing price based on regression model:</a:t>
             </a:r>
           </a:p>
           <a:p>
+            <a:pPr marL="1657350" lvl="3" indent="-285750">
+              <a:buFont typeface="Arial" panose="020B0604020202020204" pitchFamily="34" charset="0"/>
+              <a:buChar char="•"/>
+            </a:pPr>
             <a:r>
               <a:rPr lang="en-US" dirty="0"/>
-              <a:t>Note: open to change, if more interesting companies observed.</a:t>
+              <a:t>Jan 2020: 298.02</a:t>
             </a:r>
+          </a:p>
+          <a:p>
+            <a:pPr marL="1657350" lvl="3" indent="-285750">
+              <a:buFont typeface="Arial" panose="020B0604020202020204" pitchFamily="34" charset="0"/>
+              <a:buChar char="•"/>
+            </a:pPr>
+            <a:r>
+              <a:rPr lang="en-US" dirty="0"/>
+              <a:t>Feb 2020: 300.97</a:t>
+            </a:r>
+          </a:p>
+        </p:txBody>
+      </p:sp>
+      <p:sp>
+        <p:nvSpPr>
+          <p:cNvPr id="8" name="TextBox 7">
+            <a:extLst>
+              <a:ext uri="{FF2B5EF4-FFF2-40B4-BE49-F238E27FC236}">
+                <a16:creationId xmlns:a16="http://schemas.microsoft.com/office/drawing/2014/main" id="{4A655C45-771A-4927-A17E-ED9786F4A17F}"/>
+              </a:ext>
+            </a:extLst>
+          </p:cNvPr>
+          <p:cNvSpPr txBox="1"/>
+          <p:nvPr/>
+        </p:nvSpPr>
+        <p:spPr>
+          <a:xfrm>
+            <a:off x="838199" y="5720016"/>
+            <a:ext cx="4928937" cy="1200329"/>
+          </a:xfrm>
+          <a:prstGeom prst="rect">
+            <a:avLst/>
+          </a:prstGeom>
+          <a:noFill/>
+        </p:spPr>
+        <p:txBody>
+          <a:bodyPr wrap="square" rtlCol="0">
+            <a:spAutoFit/>
+          </a:bodyPr>
+          <a:lstStyle/>
+          <a:p>
+            <a:pPr lvl="0" algn="ctr"/>
+            <a:r>
+              <a:rPr lang="en-US" dirty="0">
+                <a:solidFill>
+                  <a:prstClr val="black"/>
+                </a:solidFill>
+              </a:rPr>
+              <a:t>The actual closing price for NFLX: </a:t>
+            </a:r>
+          </a:p>
+          <a:p>
+            <a:pPr marL="1657350" lvl="3" indent="-285750">
+              <a:buFont typeface="Arial" panose="020B0604020202020204" pitchFamily="34" charset="0"/>
+              <a:buChar char="•"/>
+            </a:pPr>
+            <a:r>
+              <a:rPr lang="en-US" dirty="0">
+                <a:solidFill>
+                  <a:prstClr val="black"/>
+                </a:solidFill>
+              </a:rPr>
+              <a:t>Jan 2020:  </a:t>
+            </a:r>
+            <a:r>
+              <a:rPr lang="en-US" dirty="0">
+                <a:solidFill>
+                  <a:srgbClr val="00B050"/>
+                </a:solidFill>
+              </a:rPr>
+              <a:t>345.09</a:t>
+            </a:r>
+          </a:p>
+          <a:p>
+            <a:pPr marL="1657350" lvl="3" indent="-285750">
+              <a:buFont typeface="Arial" panose="020B0604020202020204" pitchFamily="34" charset="0"/>
+              <a:buChar char="•"/>
+            </a:pPr>
+            <a:r>
+              <a:rPr lang="en-US" dirty="0">
+                <a:solidFill>
+                  <a:prstClr val="black"/>
+                </a:solidFill>
+              </a:rPr>
+              <a:t>Feb 2020: </a:t>
+            </a:r>
+            <a:r>
+              <a:rPr lang="en-US" dirty="0">
+                <a:solidFill>
+                  <a:srgbClr val="00B050"/>
+                </a:solidFill>
+              </a:rPr>
+              <a:t>369.03</a:t>
+            </a:r>
+          </a:p>
+          <a:p>
+            <a:endParaRPr lang="en-US" dirty="0"/>
           </a:p>
         </p:txBody>
       </p:sp>
       <p:pic>
         <p:nvPicPr>
-          <p:cNvPr id="5" name="Picture 4">
+          <p:cNvPr id="10" name="Picture 9" descr="A close up of a map&#10;&#10;Description automatically generated">
             <a:extLst>
               <a:ext uri="{FF2B5EF4-FFF2-40B4-BE49-F238E27FC236}">
-                <a16:creationId xmlns:a16="http://schemas.microsoft.com/office/drawing/2014/main" id="{D7070D42-3DB5-4678-87AA-C7D6135EA827}"/>
+                <a16:creationId xmlns:a16="http://schemas.microsoft.com/office/drawing/2014/main" id="{F31C9E23-EF0D-48A2-AEF5-E732F43DD00A}"/>
               </a:ext>
             </a:extLst>
           </p:cNvPr>
@@ -6362,55 +7951,18 @@
         </p:blipFill>
         <p:spPr>
           <a:xfrm>
-            <a:off x="896923" y="639571"/>
-            <a:ext cx="7074218" cy="4167317"/>
+            <a:off x="1317411" y="631366"/>
+            <a:ext cx="9557180" cy="4181266"/>
           </a:xfrm>
           <a:prstGeom prst="rect">
             <a:avLst/>
           </a:prstGeom>
         </p:spPr>
       </p:pic>
-      <p:sp>
-        <p:nvSpPr>
-          <p:cNvPr id="10" name="TextBox 9">
-            <a:extLst>
-              <a:ext uri="{FF2B5EF4-FFF2-40B4-BE49-F238E27FC236}">
-                <a16:creationId xmlns:a16="http://schemas.microsoft.com/office/drawing/2014/main" id="{5EFE7C37-2CA8-4A03-8CE5-FDF744E2363F}"/>
-              </a:ext>
-            </a:extLst>
-          </p:cNvPr>
-          <p:cNvSpPr txBox="1"/>
-          <p:nvPr/>
-        </p:nvSpPr>
-        <p:spPr>
-          <a:xfrm>
-            <a:off x="7971141" y="830486"/>
-            <a:ext cx="2907222" cy="923330"/>
-          </a:xfrm>
-          <a:prstGeom prst="rect">
-            <a:avLst/>
-          </a:prstGeom>
-          <a:solidFill>
-            <a:srgbClr val="92D050"/>
-          </a:solidFill>
-        </p:spPr>
-        <p:txBody>
-          <a:bodyPr wrap="square" rtlCol="0">
-            <a:spAutoFit/>
-          </a:bodyPr>
-          <a:lstStyle/>
-          <a:p>
-            <a:r>
-              <a:rPr lang="en-US" dirty="0"/>
-              <a:t>Updated the Image. Not sure about the text below. Same with the slide above</a:t>
-            </a:r>
-          </a:p>
-        </p:txBody>
-      </p:sp>
     </p:spTree>
     <p:extLst>
       <p:ext uri="{BB962C8B-B14F-4D97-AF65-F5344CB8AC3E}">
-        <p14:creationId xmlns:p14="http://schemas.microsoft.com/office/powerpoint/2010/main" val="3800026386"/>
+        <p14:creationId xmlns:p14="http://schemas.microsoft.com/office/powerpoint/2010/main" val="3256371011"/>
       </p:ext>
     </p:extLst>
   </p:cSld>
@@ -6458,6 +8010,7 @@
           <a:bodyPr/>
           <a:lstStyle/>
           <a:p>
+            <a:pPr algn="ctr"/>
             <a:r>
               <a:rPr lang="en-US" dirty="0"/>
               <a:t>Integrity of Data of the 2 Assets </a:t>
@@ -6483,7 +8036,7 @@
         </p:nvSpPr>
         <p:spPr>
           <a:xfrm>
-            <a:off x="838200" y="5058137"/>
+            <a:off x="838200" y="5556901"/>
             <a:ext cx="10515600" cy="1118826"/>
           </a:xfrm>
         </p:spPr>
@@ -6495,54 +8048,11 @@
           <a:p>
             <a:r>
               <a:rPr lang="en-US" dirty="0"/>
-              <a:t>The box plot lend some credence to the Jan 2020 price of NFLX with all prices &gt;120 as outliers </a:t>
+              <a:t>The box plot lends some credence to the Jan 2020 price of NFLX with all prices &gt;120 as outliers </a:t>
             </a:r>
           </a:p>
           <a:p>
             <a:endParaRPr lang="en-US" dirty="0"/>
-          </a:p>
-        </p:txBody>
-      </p:sp>
-      <p:sp>
-        <p:nvSpPr>
-          <p:cNvPr id="5" name="TextBox 4">
-            <a:extLst>
-              <a:ext uri="{FF2B5EF4-FFF2-40B4-BE49-F238E27FC236}">
-                <a16:creationId xmlns:a16="http://schemas.microsoft.com/office/drawing/2014/main" id="{1B3A086A-D439-2847-95A0-90305C3968E5}"/>
-              </a:ext>
-            </a:extLst>
-          </p:cNvPr>
-          <p:cNvSpPr txBox="1"/>
-          <p:nvPr/>
-        </p:nvSpPr>
-        <p:spPr>
-          <a:xfrm>
-            <a:off x="5618961" y="5853797"/>
-            <a:ext cx="6049413" cy="646331"/>
-          </a:xfrm>
-          <a:prstGeom prst="rect">
-            <a:avLst/>
-          </a:prstGeom>
-          <a:solidFill>
-            <a:srgbClr val="FFFF00"/>
-          </a:solidFill>
-        </p:spPr>
-        <p:txBody>
-          <a:bodyPr wrap="none" rtlCol="0">
-            <a:spAutoFit/>
-          </a:bodyPr>
-          <a:lstStyle/>
-          <a:p>
-            <a:r>
-              <a:rPr lang="en-US" dirty="0"/>
-              <a:t>Keep the CVX but replace with an updated plot.</a:t>
-            </a:r>
-          </a:p>
-          <a:p>
-            <a:r>
-              <a:rPr lang="en-US" dirty="0"/>
-              <a:t>Note: open to change, if more interesting companies observed.</a:t>
-            </a:r>
           </a:p>
         </p:txBody>
       </p:sp>
@@ -6573,8 +8083,8 @@
         </p:blipFill>
         <p:spPr>
           <a:xfrm>
-            <a:off x="838200" y="1435261"/>
-            <a:ext cx="7941174" cy="3533690"/>
+            <a:off x="1464770" y="1368180"/>
+            <a:ext cx="9262459" cy="4121640"/>
           </a:xfrm>
           <a:prstGeom prst="rect">
             <a:avLst/>
@@ -6767,10 +8277,12 @@
           <a:bodyPr/>
           <a:lstStyle/>
           <a:p>
+            <a:pPr algn="ctr"/>
             <a:r>
-              <a:rPr lang="en-US" dirty="0"/>
+              <a:rPr lang="en-US"/>
               <a:t>Objective &amp; Scope</a:t>
             </a:r>
+            <a:endParaRPr lang="en-US" dirty="0"/>
           </a:p>
         </p:txBody>
       </p:sp>
@@ -6798,7 +8310,7 @@
         </p:spPr>
         <p:txBody>
           <a:bodyPr>
-            <a:normAutofit/>
+            <a:normAutofit lnSpcReduction="10000"/>
           </a:bodyPr>
           <a:lstStyle/>
           <a:p>
@@ -6806,26 +8318,26 @@
               <a:buNone/>
             </a:pPr>
             <a:r>
-              <a:rPr lang="en-US" sz="3000" dirty="0"/>
+              <a:rPr lang="en-US" sz="3000"/>
               <a:t>Objective: To analyze the performance of 20 large-cap US companies that are leaders in their respective industry sector over a period of 10 years (2010 to 2019) alongside the S&amp;P 500.  </a:t>
             </a:r>
-            <a:endParaRPr lang="en-US" sz="1900" dirty="0"/>
+            <a:endParaRPr lang="en-US" sz="1900"/>
           </a:p>
           <a:p>
             <a:pPr marL="0" indent="0">
               <a:buNone/>
             </a:pPr>
             <a:r>
-              <a:rPr lang="en-US" dirty="0"/>
+              <a:rPr lang="en-US"/>
               <a:t>Scope:</a:t>
             </a:r>
           </a:p>
           <a:p>
             <a:r>
-              <a:rPr lang="en-US" dirty="0"/>
+              <a:rPr lang="en-US"/>
               <a:t>Determine relative performance of assets’ returns over the 10 years period </a:t>
             </a:r>
-            <a:endParaRPr lang="en-US" dirty="0">
+            <a:endParaRPr lang="en-US">
               <a:solidFill>
                 <a:srgbClr val="FF0000"/>
               </a:solidFill>
@@ -6833,20 +8345,20 @@
           </a:p>
           <a:p>
             <a:r>
-              <a:rPr lang="en-US" dirty="0"/>
+              <a:rPr lang="en-US"/>
               <a:t>Determine relative volatility or riskiness of the assets </a:t>
             </a:r>
           </a:p>
           <a:p>
             <a:r>
-              <a:rPr lang="en-US" dirty="0"/>
+              <a:rPr lang="en-US"/>
               <a:t>Determine correlation among the assets and the S&amp;P 500</a:t>
             </a:r>
           </a:p>
           <a:p>
             <a:r>
-              <a:rPr lang="en-US" dirty="0"/>
-              <a:t>Forecast expected price/return of a low risk asset and a high risk asset </a:t>
+              <a:rPr lang="en-US"/>
+              <a:t>Forecast expected price/return of a low-risk asset and a high-risk asset </a:t>
             </a:r>
           </a:p>
           <a:p>
@@ -6910,6 +8422,7 @@
           <a:bodyPr/>
           <a:lstStyle/>
           <a:p>
+            <a:pPr algn="ctr"/>
             <a:r>
               <a:rPr lang="en-US" dirty="0"/>
               <a:t>Assets Included in the Analysis:</a:t>
@@ -7855,9 +9368,12 @@
         </p:nvSpPr>
         <p:spPr/>
         <p:txBody>
-          <a:bodyPr/>
+          <a:bodyPr>
+            <a:normAutofit/>
+          </a:bodyPr>
           <a:lstStyle/>
           <a:p>
+            <a:pPr algn="ctr"/>
             <a:r>
               <a:rPr lang="en-US" dirty="0"/>
               <a:t>An extract from our work in Jupyter notebook</a:t>
@@ -7981,9 +9497,12 @@
         </p:nvSpPr>
         <p:spPr/>
         <p:txBody>
-          <a:bodyPr/>
+          <a:bodyPr>
+            <a:normAutofit/>
+          </a:bodyPr>
           <a:lstStyle/>
           <a:p>
+            <a:pPr algn="ctr"/>
             <a:r>
               <a:rPr lang="en-US" dirty="0">
                 <a:latin typeface="Times New Roman" panose="02020603050405020304" pitchFamily="18" charset="0"/>
@@ -8049,133 +9568,11 @@
             <a:r>
               <a:rPr lang="en-US" sz="1600" dirty="0">
                 <a:solidFill>
-                  <a:srgbClr val="FA8A4C"/>
+                  <a:srgbClr val="FC7404"/>
                 </a:solidFill>
               </a:rPr>
               <a:t>Note: Netflix in January 2012 starts its expansion in Europe, launching in the UK and Ireland. By September it has expanded to Scandinavian countries</a:t>
             </a:r>
-          </a:p>
-        </p:txBody>
-      </p:sp>
-      <p:sp>
-        <p:nvSpPr>
-          <p:cNvPr id="6" name="TextBox 5">
-            <a:extLst>
-              <a:ext uri="{FF2B5EF4-FFF2-40B4-BE49-F238E27FC236}">
-                <a16:creationId xmlns:a16="http://schemas.microsoft.com/office/drawing/2014/main" id="{A0608884-2C61-104A-BC1E-F6CABEF1EB29}"/>
-              </a:ext>
-            </a:extLst>
-          </p:cNvPr>
-          <p:cNvSpPr txBox="1"/>
-          <p:nvPr/>
-        </p:nvSpPr>
-        <p:spPr>
-          <a:xfrm>
-            <a:off x="321578" y="97605"/>
-            <a:ext cx="6418277" cy="646331"/>
-          </a:xfrm>
-          <a:prstGeom prst="rect">
-            <a:avLst/>
-          </a:prstGeom>
-          <a:solidFill>
-            <a:srgbClr val="FFFF00"/>
-          </a:solidFill>
-        </p:spPr>
-        <p:txBody>
-          <a:bodyPr wrap="square" rtlCol="0">
-            <a:spAutoFit/>
-          </a:bodyPr>
-          <a:lstStyle/>
-          <a:p>
-            <a:r>
-              <a:rPr lang="en-US" sz="1200" dirty="0">
-                <a:ln w="0"/>
-                <a:effectLst>
-                  <a:outerShdw blurRad="38100" dist="19050" dir="2700000" algn="tl" rotWithShape="0">
-                    <a:schemeClr val="dk1">
-                      <a:alpha val="40000"/>
-                    </a:schemeClr>
-                  </a:outerShdw>
-                </a:effectLst>
-              </a:rPr>
-              <a:t>Cannot really use this view, as too much noise.</a:t>
-            </a:r>
-            <a:br>
-              <a:rPr lang="en-US" sz="1200" dirty="0">
-                <a:ln w="0"/>
-                <a:effectLst>
-                  <a:outerShdw blurRad="38100" dist="19050" dir="2700000" algn="tl" rotWithShape="0">
-                    <a:schemeClr val="dk1">
-                      <a:alpha val="40000"/>
-                    </a:schemeClr>
-                  </a:outerShdw>
-                </a:effectLst>
-              </a:rPr>
-            </a:br>
-            <a:r>
-              <a:rPr lang="en-US" sz="1200" dirty="0">
-                <a:ln w="0"/>
-                <a:effectLst>
-                  <a:outerShdw blurRad="38100" dist="19050" dir="2700000" algn="tl" rotWithShape="0">
-                    <a:schemeClr val="dk1">
-                      <a:alpha val="40000"/>
-                    </a:schemeClr>
-                  </a:outerShdw>
-                </a:effectLst>
-              </a:rPr>
-              <a:t>Note: might need to take out the SP500.</a:t>
-            </a:r>
-          </a:p>
-          <a:p>
-            <a:r>
-              <a:rPr lang="en-US" sz="1200" dirty="0">
-                <a:ln w="0"/>
-                <a:effectLst>
-                  <a:outerShdw blurRad="38100" dist="19050" dir="2700000" algn="tl" rotWithShape="0">
-                    <a:schemeClr val="dk1">
-                      <a:alpha val="40000"/>
-                    </a:schemeClr>
-                  </a:outerShdw>
-                </a:effectLst>
-              </a:rPr>
-              <a:t>Note: change the </a:t>
-            </a:r>
-            <a:r>
-              <a:rPr lang="en-US" sz="1200" dirty="0" err="1">
-                <a:ln w="0"/>
-                <a:effectLst>
-                  <a:outerShdw blurRad="38100" dist="19050" dir="2700000" algn="tl" rotWithShape="0">
-                    <a:schemeClr val="dk1">
-                      <a:alpha val="40000"/>
-                    </a:schemeClr>
-                  </a:outerShdw>
-                </a:effectLst>
-              </a:rPr>
-              <a:t>x_axis</a:t>
-            </a:r>
-            <a:r>
-              <a:rPr lang="en-US" sz="1200" dirty="0">
-                <a:ln w="0"/>
-                <a:effectLst>
-                  <a:outerShdw blurRad="38100" dist="19050" dir="2700000" algn="tl" rotWithShape="0">
-                    <a:schemeClr val="dk1">
-                      <a:alpha val="40000"/>
-                    </a:schemeClr>
-                  </a:outerShdw>
-                </a:effectLst>
-              </a:rPr>
-              <a:t> to convert to  mm-YYYY. (in 2012, Netflix …)</a:t>
-            </a:r>
-            <a:endParaRPr lang="en-US" dirty="0">
-              <a:ln w="0"/>
-              <a:effectLst>
-                <a:outerShdw blurRad="38100" dist="19050" dir="2700000" algn="tl" rotWithShape="0">
-                  <a:schemeClr val="dk1">
-                    <a:alpha val="40000"/>
-                  </a:schemeClr>
-                </a:outerShdw>
-              </a:effectLst>
-            </a:endParaRPr>
           </a:p>
         </p:txBody>
       </p:sp>
@@ -8206,51 +9603,14 @@
         </p:blipFill>
         <p:spPr>
           <a:xfrm>
-            <a:off x="1561707" y="1470581"/>
-            <a:ext cx="9068586" cy="4185501"/>
+            <a:off x="-223283" y="1470581"/>
+            <a:ext cx="11993526" cy="4185501"/>
           </a:xfrm>
           <a:prstGeom prst="rect">
             <a:avLst/>
           </a:prstGeom>
         </p:spPr>
       </p:pic>
-      <p:sp>
-        <p:nvSpPr>
-          <p:cNvPr id="7" name="TextBox 6">
-            <a:extLst>
-              <a:ext uri="{FF2B5EF4-FFF2-40B4-BE49-F238E27FC236}">
-                <a16:creationId xmlns:a16="http://schemas.microsoft.com/office/drawing/2014/main" id="{10D1AEA3-AB3C-43EB-A3BC-E5E46B7CE695}"/>
-              </a:ext>
-            </a:extLst>
-          </p:cNvPr>
-          <p:cNvSpPr txBox="1"/>
-          <p:nvPr/>
-        </p:nvSpPr>
-        <p:spPr>
-          <a:xfrm>
-            <a:off x="6006518" y="97605"/>
-            <a:ext cx="5922627" cy="646331"/>
-          </a:xfrm>
-          <a:prstGeom prst="rect">
-            <a:avLst/>
-          </a:prstGeom>
-          <a:solidFill>
-            <a:srgbClr val="92D050"/>
-          </a:solidFill>
-        </p:spPr>
-        <p:txBody>
-          <a:bodyPr wrap="square" rtlCol="0">
-            <a:spAutoFit/>
-          </a:bodyPr>
-          <a:lstStyle/>
-          <a:p>
-            <a:r>
-              <a:rPr lang="en-US" dirty="0"/>
-              <a:t>No change I believe we should keep This because it shows the large difference between Netflix and the Others</a:t>
-            </a:r>
-          </a:p>
-        </p:txBody>
-      </p:sp>
     </p:spTree>
     <p:extLst>
       <p:ext uri="{BB962C8B-B14F-4D97-AF65-F5344CB8AC3E}">
@@ -8304,9 +9664,12 @@
           </a:xfrm>
         </p:spPr>
         <p:txBody>
-          <a:bodyPr/>
+          <a:bodyPr>
+            <a:normAutofit/>
+          </a:bodyPr>
           <a:lstStyle/>
           <a:p>
+            <a:pPr algn="ctr"/>
             <a:r>
               <a:rPr lang="en-US" dirty="0"/>
               <a:t>Monthly Return of 2 Oil &amp; Gas Assets </a:t>
@@ -8332,8 +9695,8 @@
         </p:nvSpPr>
         <p:spPr>
           <a:xfrm>
-            <a:off x="838200" y="1055670"/>
-            <a:ext cx="10515600" cy="5121294"/>
+            <a:off x="838200" y="1055669"/>
+            <a:ext cx="10515600" cy="6062104"/>
           </a:xfrm>
         </p:spPr>
         <p:txBody>
@@ -8366,6 +9729,12 @@
             <a:endParaRPr lang="en-US" dirty="0"/>
           </a:p>
           <a:p>
+            <a:pPr marL="0" indent="0">
+              <a:buNone/>
+            </a:pPr>
+            <a:endParaRPr lang="en-US" dirty="0"/>
+          </a:p>
+          <a:p>
             <a:r>
               <a:rPr lang="en-US" dirty="0"/>
               <a:t>Note: can clearly see that both assets have similar positive and negative returns </a:t>
@@ -8376,49 +9745,6 @@
               <a:buNone/>
             </a:pPr>
             <a:endParaRPr lang="en-US" dirty="0"/>
-          </a:p>
-        </p:txBody>
-      </p:sp>
-      <p:sp>
-        <p:nvSpPr>
-          <p:cNvPr id="7" name="TextBox 6">
-            <a:extLst>
-              <a:ext uri="{FF2B5EF4-FFF2-40B4-BE49-F238E27FC236}">
-                <a16:creationId xmlns:a16="http://schemas.microsoft.com/office/drawing/2014/main" id="{F53F3945-53BD-6044-8201-ABFB29FB514B}"/>
-              </a:ext>
-            </a:extLst>
-          </p:cNvPr>
-          <p:cNvSpPr txBox="1"/>
-          <p:nvPr/>
-        </p:nvSpPr>
-        <p:spPr>
-          <a:xfrm>
-            <a:off x="838200" y="6039937"/>
-            <a:ext cx="9146086" cy="646331"/>
-          </a:xfrm>
-          <a:prstGeom prst="rect">
-            <a:avLst/>
-          </a:prstGeom>
-          <a:solidFill>
-            <a:srgbClr val="92D050"/>
-          </a:solidFill>
-        </p:spPr>
-        <p:txBody>
-          <a:bodyPr wrap="square" rtlCol="0">
-            <a:spAutoFit/>
-          </a:bodyPr>
-          <a:lstStyle/>
-          <a:p>
-            <a:r>
-              <a:rPr lang="en-US" dirty="0"/>
-              <a:t>The intention is to use a different representation to avoid noisy data as in the previous graph.</a:t>
-            </a:r>
-          </a:p>
-          <a:p>
-            <a:r>
-              <a:rPr lang="en-US" dirty="0"/>
-              <a:t>Import updated graphs.</a:t>
-            </a:r>
           </a:p>
         </p:txBody>
       </p:sp>
@@ -8449,8 +9775,8 @@
         </p:blipFill>
         <p:spPr>
           <a:xfrm>
-            <a:off x="12808" y="1915272"/>
-            <a:ext cx="6083192" cy="2500782"/>
+            <a:off x="602671" y="1792430"/>
+            <a:ext cx="5602939" cy="3273135"/>
           </a:xfrm>
           <a:prstGeom prst="rect">
             <a:avLst/>
@@ -8484,8 +9810,8 @@
         </p:blipFill>
         <p:spPr>
           <a:xfrm>
-            <a:off x="6470244" y="1386662"/>
-            <a:ext cx="4689183" cy="3558002"/>
+            <a:off x="6398455" y="1399846"/>
+            <a:ext cx="4762500" cy="4058305"/>
           </a:xfrm>
           <a:prstGeom prst="rect">
             <a:avLst/>
@@ -8540,9 +9866,12 @@
         </p:nvSpPr>
         <p:spPr/>
         <p:txBody>
-          <a:bodyPr/>
+          <a:bodyPr>
+            <a:normAutofit/>
+          </a:bodyPr>
           <a:lstStyle/>
           <a:p>
+            <a:pPr algn="ctr"/>
             <a:r>
               <a:rPr lang="en-US" dirty="0">
                 <a:latin typeface="Times New Roman" panose="02020603050405020304" pitchFamily="18" charset="0"/>
@@ -8555,10 +9884,10 @@
       </p:sp>
       <p:pic>
         <p:nvPicPr>
-          <p:cNvPr id="5" name="Content Placeholder 4">
+          <p:cNvPr id="8" name="Content Placeholder 7" descr="A close up of a map&#10;&#10;Description automatically generated">
             <a:extLst>
               <a:ext uri="{FF2B5EF4-FFF2-40B4-BE49-F238E27FC236}">
-                <a16:creationId xmlns:a16="http://schemas.microsoft.com/office/drawing/2014/main" id="{91E1C9AA-21D9-41E1-BEB0-8FA04E545195}"/>
+                <a16:creationId xmlns:a16="http://schemas.microsoft.com/office/drawing/2014/main" id="{B0763B55-A8C0-4A44-A076-9F321915D997}"/>
               </a:ext>
             </a:extLst>
           </p:cNvPr>
@@ -8570,7 +9899,7 @@
           </p:nvPr>
         </p:nvPicPr>
         <p:blipFill>
-          <a:blip r:embed="rId2">
+          <a:blip r:embed="rId3">
             <a:extLst>
               <a:ext uri="{28A0092B-C50C-407E-A947-70E740481C1C}">
                 <a14:useLocalDpi xmlns:a14="http://schemas.microsoft.com/office/drawing/2010/main" val="0"/>
@@ -8583,8 +9912,8 @@
         </p:blipFill>
         <p:spPr>
           <a:xfrm>
-            <a:off x="838200" y="2138425"/>
-            <a:ext cx="5797491" cy="2970120"/>
+            <a:off x="-488372" y="1392865"/>
+            <a:ext cx="7045036" cy="3856858"/>
           </a:xfrm>
         </p:spPr>
       </p:pic>
@@ -8603,7 +9932,7 @@
           <p:nvPr/>
         </p:nvPicPr>
         <p:blipFill>
-          <a:blip r:embed="rId3">
+          <a:blip r:embed="rId4">
             <a:extLst>
               <a:ext uri="{28A0092B-C50C-407E-A947-70E740481C1C}">
                 <a14:useLocalDpi xmlns:a14="http://schemas.microsoft.com/office/drawing/2010/main" val="0"/>
@@ -8616,8 +9945,8 @@
         </p:blipFill>
         <p:spPr>
           <a:xfrm>
-            <a:off x="6221835" y="2149308"/>
-            <a:ext cx="5973008" cy="2613191"/>
+            <a:off x="6328064" y="1392865"/>
+            <a:ext cx="6182590" cy="3715679"/>
           </a:xfrm>
           <a:prstGeom prst="rect">
             <a:avLst/>
@@ -8638,8 +9967,8 @@
         </p:nvSpPr>
         <p:spPr>
           <a:xfrm>
-            <a:off x="838200" y="5567166"/>
-            <a:ext cx="7965322" cy="738664"/>
+            <a:off x="1828800" y="5465135"/>
+            <a:ext cx="8138504" cy="1077218"/>
           </a:xfrm>
           <a:prstGeom prst="rect">
             <a:avLst/>
@@ -8647,7 +9976,7 @@
           <a:noFill/>
         </p:spPr>
         <p:txBody>
-          <a:bodyPr wrap="none" rtlCol="0">
+          <a:bodyPr wrap="square" rtlCol="0">
             <a:spAutoFit/>
           </a:bodyPr>
           <a:lstStyle/>
@@ -8657,7 +9986,7 @@
               <a:buChar char="•"/>
             </a:pPr>
             <a:r>
-              <a:rPr lang="en-US" sz="1400" dirty="0">
+              <a:rPr lang="en-US" sz="1600" dirty="0">
                 <a:latin typeface="Times New Roman" panose="02020603050405020304" pitchFamily="18" charset="0"/>
                 <a:cs typeface="Times New Roman" panose="02020603050405020304" pitchFamily="18" charset="0"/>
               </a:rPr>
@@ -8670,7 +9999,7 @@
               <a:buChar char="•"/>
             </a:pPr>
             <a:r>
-              <a:rPr lang="en-US" sz="1400" dirty="0">
+              <a:rPr lang="en-US" sz="1600" dirty="0">
                 <a:latin typeface="Times New Roman" panose="02020603050405020304" pitchFamily="18" charset="0"/>
                 <a:cs typeface="Times New Roman" panose="02020603050405020304" pitchFamily="18" charset="0"/>
               </a:rPr>
@@ -8683,51 +10012,11 @@
               <a:buChar char="•"/>
             </a:pPr>
             <a:r>
-              <a:rPr lang="en-US" sz="1400" dirty="0">
+              <a:rPr lang="en-US" sz="1600" dirty="0">
                 <a:latin typeface="Times New Roman" panose="02020603050405020304" pitchFamily="18" charset="0"/>
                 <a:cs typeface="Times New Roman" panose="02020603050405020304" pitchFamily="18" charset="0"/>
               </a:rPr>
               <a:t>Bar chart shows clearer difference in the Cumulative Returns of Netflix compared to all the other Assets</a:t>
-            </a:r>
-          </a:p>
-        </p:txBody>
-      </p:sp>
-      <p:sp>
-        <p:nvSpPr>
-          <p:cNvPr id="10" name="TextBox 9">
-            <a:extLst>
-              <a:ext uri="{FF2B5EF4-FFF2-40B4-BE49-F238E27FC236}">
-                <a16:creationId xmlns:a16="http://schemas.microsoft.com/office/drawing/2014/main" id="{4C461756-0463-42F6-8727-21D0801555CD}"/>
-              </a:ext>
-            </a:extLst>
-          </p:cNvPr>
-          <p:cNvSpPr txBox="1"/>
-          <p:nvPr/>
-        </p:nvSpPr>
-        <p:spPr>
-          <a:xfrm>
-            <a:off x="961955" y="6328306"/>
-            <a:ext cx="8246384" cy="461665"/>
-          </a:xfrm>
-          <a:prstGeom prst="rect">
-            <a:avLst/>
-          </a:prstGeom>
-          <a:solidFill>
-            <a:srgbClr val="92D050"/>
-          </a:solidFill>
-        </p:spPr>
-        <p:txBody>
-          <a:bodyPr wrap="square" rtlCol="0">
-            <a:spAutoFit/>
-          </a:bodyPr>
-          <a:lstStyle/>
-          <a:p>
-            <a:r>
-              <a:rPr lang="en-US" sz="1200" dirty="0">
-                <a:latin typeface="Times New Roman" panose="02020603050405020304" pitchFamily="18" charset="0"/>
-                <a:cs typeface="Times New Roman" panose="02020603050405020304" pitchFamily="18" charset="0"/>
-              </a:rPr>
-              <a:t>A slide for the cumulative returns. I put this cause it showed the greatest display with the most graph  images for comparison in the notebook and project in whole for all 20 assets.</a:t>
             </a:r>
           </a:p>
         </p:txBody>
@@ -8790,6 +10079,7 @@
           </a:bodyPr>
           <a:lstStyle/>
           <a:p>
+            <a:pPr algn="ctr"/>
             <a:r>
               <a:rPr lang="en-US" dirty="0"/>
               <a:t>Cumulative Return of all assets for the 10 years </a:t>
@@ -8815,8 +10105,8 @@
         </p:nvSpPr>
         <p:spPr>
           <a:xfrm>
-            <a:off x="1048229" y="1440065"/>
-            <a:ext cx="3253869" cy="4351338"/>
+            <a:off x="1048229" y="2198601"/>
+            <a:ext cx="4791961" cy="1230399"/>
           </a:xfrm>
         </p:spPr>
         <p:txBody>
@@ -8840,69 +10130,6 @@
             <a:r>
               <a:rPr lang="en-US" sz="1800" dirty="0"/>
               <a:t>The least performing asset return  ~150%</a:t>
-            </a:r>
-          </a:p>
-        </p:txBody>
-      </p:sp>
-      <p:sp>
-        <p:nvSpPr>
-          <p:cNvPr id="7" name="TextBox 6">
-            <a:extLst>
-              <a:ext uri="{FF2B5EF4-FFF2-40B4-BE49-F238E27FC236}">
-                <a16:creationId xmlns:a16="http://schemas.microsoft.com/office/drawing/2014/main" id="{B3D7109B-04B1-D545-B345-854881979386}"/>
-              </a:ext>
-            </a:extLst>
-          </p:cNvPr>
-          <p:cNvSpPr txBox="1"/>
-          <p:nvPr/>
-        </p:nvSpPr>
-        <p:spPr>
-          <a:xfrm>
-            <a:off x="981197" y="3435292"/>
-            <a:ext cx="2901369" cy="1200329"/>
-          </a:xfrm>
-          <a:prstGeom prst="rect">
-            <a:avLst/>
-          </a:prstGeom>
-          <a:solidFill>
-            <a:srgbClr val="FFFF00"/>
-          </a:solidFill>
-        </p:spPr>
-        <p:txBody>
-          <a:bodyPr wrap="square" rtlCol="0">
-            <a:spAutoFit/>
-          </a:bodyPr>
-          <a:lstStyle/>
-          <a:p>
-            <a:r>
-              <a:rPr lang="en-US" sz="1200" dirty="0"/>
-              <a:t>Add all assets.</a:t>
-            </a:r>
-          </a:p>
-          <a:p>
-            <a:endParaRPr lang="en-US" sz="1200" dirty="0"/>
-          </a:p>
-          <a:p>
-            <a:r>
-              <a:rPr lang="en-US" sz="1200" dirty="0"/>
-              <a:t>Import separate legend from previous graph.</a:t>
-            </a:r>
-          </a:p>
-          <a:p>
-            <a:endParaRPr lang="en-US" sz="1200" dirty="0"/>
-          </a:p>
-          <a:p>
-            <a:r>
-              <a:rPr lang="en-US" sz="1200" dirty="0"/>
-              <a:t>Note: </a:t>
-            </a:r>
-            <a:r>
-              <a:rPr lang="en-US" sz="1200" dirty="0" err="1"/>
-              <a:t>y_axis</a:t>
-            </a:r>
-            <a:r>
-              <a:rPr lang="en-US" sz="1200" dirty="0"/>
-              <a:t> renamed to Returns (no %)</a:t>
             </a:r>
           </a:p>
         </p:txBody>
@@ -13981,7 +15208,7 @@
           <p:nvPr>
             <p:extLst>
               <p:ext uri="{D42A27DB-BD31-4B8C-83A1-F6EECF244321}">
-                <p14:modId xmlns:p14="http://schemas.microsoft.com/office/powerpoint/2010/main" val="353478633"/>
+                <p14:modId xmlns:p14="http://schemas.microsoft.com/office/powerpoint/2010/main" val="38609009"/>
               </p:ext>
             </p:extLst>
           </p:nvPr>
@@ -19243,43 +20470,6 @@
           </a:graphicData>
         </a:graphic>
       </p:graphicFrame>
-      <p:sp>
-        <p:nvSpPr>
-          <p:cNvPr id="9" name="TextBox 8">
-            <a:extLst>
-              <a:ext uri="{FF2B5EF4-FFF2-40B4-BE49-F238E27FC236}">
-                <a16:creationId xmlns:a16="http://schemas.microsoft.com/office/drawing/2014/main" id="{E256C769-8F37-4E45-ACBC-2B1FE9AF4E20}"/>
-              </a:ext>
-            </a:extLst>
-          </p:cNvPr>
-          <p:cNvSpPr txBox="1"/>
-          <p:nvPr/>
-        </p:nvSpPr>
-        <p:spPr>
-          <a:xfrm>
-            <a:off x="3949598" y="3816225"/>
-            <a:ext cx="2064924" cy="830997"/>
-          </a:xfrm>
-          <a:prstGeom prst="rect">
-            <a:avLst/>
-          </a:prstGeom>
-          <a:solidFill>
-            <a:srgbClr val="92D050"/>
-          </a:solidFill>
-        </p:spPr>
-        <p:txBody>
-          <a:bodyPr wrap="square" rtlCol="0">
-            <a:spAutoFit/>
-          </a:bodyPr>
-          <a:lstStyle/>
-          <a:p>
-            <a:r>
-              <a:rPr lang="en-US" sz="1200" dirty="0"/>
-              <a:t>No change in this slide cause if we keep the slide I made, it adds a more depth explanation on the images</a:t>
-            </a:r>
-          </a:p>
-        </p:txBody>
-      </p:sp>
     </p:spTree>
     <p:extLst>
       <p:ext uri="{BB962C8B-B14F-4D97-AF65-F5344CB8AC3E}">
@@ -19333,9 +20523,12 @@
           </a:xfrm>
         </p:spPr>
         <p:txBody>
-          <a:bodyPr/>
+          <a:bodyPr>
+            <a:normAutofit/>
+          </a:bodyPr>
           <a:lstStyle/>
           <a:p>
+            <a:pPr algn="ctr"/>
             <a:r>
               <a:rPr lang="en-US" dirty="0"/>
               <a:t>Relative Standard Deviation or Volatility </a:t>
@@ -19361,13 +20554,13 @@
         </p:nvSpPr>
         <p:spPr>
           <a:xfrm>
-            <a:off x="359040" y="2265866"/>
-            <a:ext cx="10515600" cy="4227008"/>
+            <a:off x="838200" y="2265866"/>
+            <a:ext cx="10515600" cy="4301189"/>
           </a:xfrm>
         </p:spPr>
         <p:txBody>
           <a:bodyPr>
-            <a:normAutofit fontScale="92500" lnSpcReduction="10000"/>
+            <a:normAutofit fontScale="92500"/>
           </a:bodyPr>
           <a:lstStyle/>
           <a:p>
@@ -19456,106 +20649,14 @@
         </p:blipFill>
         <p:spPr>
           <a:xfrm>
-            <a:off x="838200" y="1212956"/>
-            <a:ext cx="9264383" cy="4053168"/>
+            <a:off x="838200" y="1128712"/>
+            <a:ext cx="10515599" cy="4600575"/>
           </a:xfrm>
           <a:prstGeom prst="rect">
             <a:avLst/>
           </a:prstGeom>
         </p:spPr>
       </p:pic>
-      <p:sp>
-        <p:nvSpPr>
-          <p:cNvPr id="8" name="TextBox 7">
-            <a:extLst>
-              <a:ext uri="{FF2B5EF4-FFF2-40B4-BE49-F238E27FC236}">
-                <a16:creationId xmlns:a16="http://schemas.microsoft.com/office/drawing/2014/main" id="{EE7736A8-BCE8-EA4F-A4FA-0829E5EBB2A2}"/>
-              </a:ext>
-            </a:extLst>
-          </p:cNvPr>
-          <p:cNvSpPr txBox="1"/>
-          <p:nvPr/>
-        </p:nvSpPr>
-        <p:spPr>
-          <a:xfrm>
-            <a:off x="9200271" y="1702838"/>
-            <a:ext cx="3055842" cy="2031325"/>
-          </a:xfrm>
-          <a:prstGeom prst="rect">
-            <a:avLst/>
-          </a:prstGeom>
-          <a:solidFill>
-            <a:srgbClr val="FFFF00"/>
-          </a:solidFill>
-        </p:spPr>
-        <p:txBody>
-          <a:bodyPr wrap="square" rtlCol="0">
-            <a:spAutoFit/>
-          </a:bodyPr>
-          <a:lstStyle/>
-          <a:p>
-            <a:r>
-              <a:rPr lang="en-US" dirty="0"/>
-              <a:t>Only leave one plot.</a:t>
-            </a:r>
-          </a:p>
-          <a:p>
-            <a:endParaRPr lang="en-US" dirty="0"/>
-          </a:p>
-          <a:p>
-            <a:r>
-              <a:rPr lang="en-US" dirty="0"/>
-              <a:t>Make the graph as big as possible.</a:t>
-            </a:r>
-          </a:p>
-          <a:p>
-            <a:endParaRPr lang="en-US" dirty="0"/>
-          </a:p>
-          <a:p>
-            <a:r>
-              <a:rPr lang="en-US" dirty="0"/>
-              <a:t>Collect all figures in a separate folder. </a:t>
-            </a:r>
-          </a:p>
-        </p:txBody>
-      </p:sp>
-      <p:sp>
-        <p:nvSpPr>
-          <p:cNvPr id="6" name="TextBox 5">
-            <a:extLst>
-              <a:ext uri="{FF2B5EF4-FFF2-40B4-BE49-F238E27FC236}">
-                <a16:creationId xmlns:a16="http://schemas.microsoft.com/office/drawing/2014/main" id="{A98B9F06-0FA1-4DDE-8C17-16F6280C0148}"/>
-              </a:ext>
-            </a:extLst>
-          </p:cNvPr>
-          <p:cNvSpPr txBox="1"/>
-          <p:nvPr/>
-        </p:nvSpPr>
-        <p:spPr>
-          <a:xfrm>
-            <a:off x="9200271" y="3786770"/>
-            <a:ext cx="1175141" cy="373845"/>
-          </a:xfrm>
-          <a:prstGeom prst="rect">
-            <a:avLst/>
-          </a:prstGeom>
-          <a:solidFill>
-            <a:srgbClr val="92D050"/>
-          </a:solidFill>
-        </p:spPr>
-        <p:txBody>
-          <a:bodyPr wrap="square" rtlCol="0">
-            <a:spAutoFit/>
-          </a:bodyPr>
-          <a:lstStyle/>
-          <a:p>
-            <a:r>
-              <a:rPr lang="en-US" dirty="0"/>
-              <a:t>No change</a:t>
-            </a:r>
-          </a:p>
-        </p:txBody>
-      </p:sp>
     </p:spTree>
     <p:extLst>
       <p:ext uri="{BB962C8B-B14F-4D97-AF65-F5344CB8AC3E}">

</xml_diff>

<commit_message>
added a new slide for multiple regression
</commit_message>
<xml_diff>
--- a/Final_Presentation.pptx
+++ b/Final_Presentation.pptx
@@ -5,7 +5,7 @@
     <p:sldMasterId id="2147483823" r:id="rId1"/>
   </p:sldMasterIdLst>
   <p:notesMasterIdLst>
-    <p:notesMasterId r:id="rId16"/>
+    <p:notesMasterId r:id="rId17"/>
   </p:notesMasterIdLst>
   <p:sldIdLst>
     <p:sldId id="256" r:id="rId2"/>
@@ -21,7 +21,8 @@
     <p:sldId id="266" r:id="rId12"/>
     <p:sldId id="272" r:id="rId13"/>
     <p:sldId id="269" r:id="rId14"/>
-    <p:sldId id="270" r:id="rId15"/>
+    <p:sldId id="273" r:id="rId15"/>
+    <p:sldId id="270" r:id="rId16"/>
   </p:sldIdLst>
   <p:sldSz cx="12192000" cy="6858000"/>
   <p:notesSz cx="6858000" cy="9144000"/>
@@ -210,7 +211,7 @@
           <a:p>
             <a:fld id="{967483A9-E084-4649-A19B-B92CB0DE91A3}" type="datetimeFigureOut">
               <a:rPr lang="en-US" smtClean="0"/>
-              <a:t>6/22/2020</a:t>
+              <a:t>6/22/20</a:t>
             </a:fld>
             <a:endParaRPr lang="en-US"/>
           </a:p>
@@ -521,154 +522,6 @@
           <a:bodyPr/>
           <a:lstStyle/>
           <a:p>
-            <a:r>
-              <a:rPr lang="en-US" dirty="0"/>
-              <a:t>The highest peaks are not from SP500 – it is actually from Netflix.</a:t>
-            </a:r>
-          </a:p>
-          <a:p>
-            <a:r>
-              <a:rPr lang="en-US" dirty="0"/>
-              <a:t>”Cut the wire / Cut the cord” – that’s when Netflix started going off the trend.</a:t>
-            </a:r>
-          </a:p>
-          <a:p>
-            <a:endParaRPr lang="en-US" dirty="0"/>
-          </a:p>
-          <a:p>
-            <a:r>
-              <a:rPr lang="en-US" dirty="0"/>
-              <a:t>Irina Notes:     </a:t>
-            </a:r>
-            <a:r>
-              <a:rPr lang="en-US" sz="1200" dirty="0">
-                <a:ln w="0"/>
-                <a:effectLst>
-                  <a:outerShdw blurRad="38100" dist="19050" dir="2700000" algn="tl" rotWithShape="0">
-                    <a:schemeClr val="dk1">
-                      <a:alpha val="40000"/>
-                    </a:schemeClr>
-                  </a:outerShdw>
-                </a:effectLst>
-              </a:rPr>
-              <a:t>Cannot really use this view, as too much noise.</a:t>
-            </a:r>
-            <a:br>
-              <a:rPr lang="en-US" sz="1200" dirty="0">
-                <a:ln w="0"/>
-                <a:effectLst>
-                  <a:outerShdw blurRad="38100" dist="19050" dir="2700000" algn="tl" rotWithShape="0">
-                    <a:schemeClr val="dk1">
-                      <a:alpha val="40000"/>
-                    </a:schemeClr>
-                  </a:outerShdw>
-                </a:effectLst>
-              </a:rPr>
-            </a:br>
-            <a:r>
-              <a:rPr lang="en-US" sz="1200" dirty="0">
-                <a:ln w="0"/>
-                <a:effectLst>
-                  <a:outerShdw blurRad="38100" dist="19050" dir="2700000" algn="tl" rotWithShape="0">
-                    <a:schemeClr val="dk1">
-                      <a:alpha val="40000"/>
-                    </a:schemeClr>
-                  </a:outerShdw>
-                </a:effectLst>
-              </a:rPr>
-              <a:t>	Note: might need to take out the SP500.</a:t>
-            </a:r>
-          </a:p>
-          <a:p>
-            <a:r>
-              <a:rPr lang="en-US" sz="1200" dirty="0">
-                <a:ln w="0"/>
-                <a:effectLst>
-                  <a:outerShdw blurRad="38100" dist="19050" dir="2700000" algn="tl" rotWithShape="0">
-                    <a:schemeClr val="dk1">
-                      <a:alpha val="40000"/>
-                    </a:schemeClr>
-                  </a:outerShdw>
-                </a:effectLst>
-              </a:rPr>
-              <a:t>	Note: change the </a:t>
-            </a:r>
-            <a:r>
-              <a:rPr lang="en-US" sz="1200" dirty="0" err="1">
-                <a:ln w="0"/>
-                <a:effectLst>
-                  <a:outerShdw blurRad="38100" dist="19050" dir="2700000" algn="tl" rotWithShape="0">
-                    <a:schemeClr val="dk1">
-                      <a:alpha val="40000"/>
-                    </a:schemeClr>
-                  </a:outerShdw>
-                </a:effectLst>
-              </a:rPr>
-              <a:t>x_axis</a:t>
-            </a:r>
-            <a:r>
-              <a:rPr lang="en-US" sz="1200" dirty="0">
-                <a:ln w="0"/>
-                <a:effectLst>
-                  <a:outerShdw blurRad="38100" dist="19050" dir="2700000" algn="tl" rotWithShape="0">
-                    <a:schemeClr val="dk1">
-                      <a:alpha val="40000"/>
-                    </a:schemeClr>
-                  </a:outerShdw>
-                </a:effectLst>
-              </a:rPr>
-              <a:t> to convert to  mm-YYYY. (in 2012, Netflix …)</a:t>
-            </a:r>
-          </a:p>
-          <a:p>
-            <a:pPr marL="0" marR="0" lvl="0" indent="0" algn="l" defTabSz="914400" rtl="0" eaLnBrk="1" fontAlgn="auto" latinLnBrk="0" hangingPunct="1">
-              <a:lnSpc>
-                <a:spcPct val="100000"/>
-              </a:lnSpc>
-              <a:spcBef>
-                <a:spcPts val="0"/>
-              </a:spcBef>
-              <a:spcAft>
-                <a:spcPts val="0"/>
-              </a:spcAft>
-              <a:buClrTx/>
-              <a:buSzTx/>
-              <a:buFontTx/>
-              <a:buNone/>
-              <a:tabLst/>
-              <a:defRPr/>
-            </a:pPr>
-            <a:r>
-              <a:rPr lang="en-US" sz="1200" dirty="0">
-                <a:ln w="0"/>
-                <a:effectLst>
-                  <a:outerShdw blurRad="38100" dist="19050" dir="2700000" algn="tl" rotWithShape="0">
-                    <a:schemeClr val="dk1">
-                      <a:alpha val="40000"/>
-                    </a:schemeClr>
-                  </a:outerShdw>
-                </a:effectLst>
-              </a:rPr>
-              <a:t>Lucas Notes:   </a:t>
-            </a:r>
-            <a:r>
-              <a:rPr lang="en-US" dirty="0"/>
-              <a:t>No change I believe we should keep This because it shows the large difference between Netflix and the Others</a:t>
-            </a:r>
-          </a:p>
-          <a:p>
-            <a:endParaRPr lang="en-US" dirty="0">
-              <a:ln w="0"/>
-              <a:effectLst>
-                <a:outerShdw blurRad="38100" dist="19050" dir="2700000" algn="tl" rotWithShape="0">
-                  <a:schemeClr val="dk1">
-                    <a:alpha val="40000"/>
-                  </a:schemeClr>
-                </a:outerShdw>
-              </a:effectLst>
-            </a:endParaRPr>
-          </a:p>
-          <a:p>
             <a:endParaRPr lang="en-US" dirty="0"/>
           </a:p>
         </p:txBody>
@@ -688,9 +541,9 @@
           <a:bodyPr/>
           <a:lstStyle/>
           <a:p>
-            <a:fld id="{5B0439F7-BA01-A541-95AE-C6E45E2F4003}" type="slidenum">
+            <a:fld id="{3C464D38-78EB-6A4F-BCA2-1B202E646C54}" type="slidenum">
               <a:rPr lang="en-US" smtClean="0"/>
-              <a:t>5</a:t>
+              <a:t>4</a:t>
             </a:fld>
             <a:endParaRPr lang="en-US"/>
           </a:p>
@@ -699,7 +552,133 @@
     </p:spTree>
     <p:extLst>
       <p:ext uri="{BB962C8B-B14F-4D97-AF65-F5344CB8AC3E}">
-        <p14:creationId xmlns:p14="http://schemas.microsoft.com/office/powerpoint/2010/main" val="2508813049"/>
+        <p14:creationId xmlns:p14="http://schemas.microsoft.com/office/powerpoint/2010/main" val="412128879"/>
+      </p:ext>
+    </p:extLst>
+  </p:cSld>
+  <p:clrMapOvr>
+    <a:masterClrMapping/>
+  </p:clrMapOvr>
+</p:notes>
+</file>
+
+<file path=ppt/notesSlides/notesSlide10.xml><?xml version="1.0" encoding="utf-8"?>
+<p:notes xmlns:a="http://schemas.openxmlformats.org/drawingml/2006/main" xmlns:r="http://schemas.openxmlformats.org/officeDocument/2006/relationships" xmlns:p="http://schemas.openxmlformats.org/presentationml/2006/main">
+  <p:cSld>
+    <p:spTree>
+      <p:nvGrpSpPr>
+        <p:cNvPr id="1" name=""/>
+        <p:cNvGrpSpPr/>
+        <p:nvPr/>
+      </p:nvGrpSpPr>
+      <p:grpSpPr>
+        <a:xfrm>
+          <a:off x="0" y="0"/>
+          <a:ext cx="0" cy="0"/>
+          <a:chOff x="0" y="0"/>
+          <a:chExt cx="0" cy="0"/>
+        </a:xfrm>
+      </p:grpSpPr>
+      <p:sp>
+        <p:nvSpPr>
+          <p:cNvPr id="2" name="Slide Image Placeholder 1"/>
+          <p:cNvSpPr>
+            <a:spLocks noGrp="1" noRot="1" noChangeAspect="1"/>
+          </p:cNvSpPr>
+          <p:nvPr>
+            <p:ph type="sldImg"/>
+          </p:nvPr>
+        </p:nvSpPr>
+        <p:spPr/>
+      </p:sp>
+      <p:sp>
+        <p:nvSpPr>
+          <p:cNvPr id="3" name="Notes Placeholder 2"/>
+          <p:cNvSpPr>
+            <a:spLocks noGrp="1"/>
+          </p:cNvSpPr>
+          <p:nvPr>
+            <p:ph type="body" idx="1"/>
+          </p:nvPr>
+        </p:nvSpPr>
+        <p:spPr/>
+        <p:txBody>
+          <a:bodyPr/>
+          <a:lstStyle/>
+          <a:p>
+            <a:r>
+              <a:rPr lang="en-US" dirty="0"/>
+              <a:t>50% of your data is in the box.</a:t>
+            </a:r>
+          </a:p>
+          <a:p>
+            <a:r>
+              <a:rPr lang="en-US" dirty="0"/>
+              <a:t>Orange line is the median.</a:t>
+            </a:r>
+          </a:p>
+          <a:p>
+            <a:r>
+              <a:rPr lang="en-US" dirty="0"/>
+              <a:t>The narrower the box the more data is closer to the median.</a:t>
+            </a:r>
+          </a:p>
+          <a:p>
+            <a:endParaRPr lang="en-US" dirty="0"/>
+          </a:p>
+          <a:p>
+            <a:r>
+              <a:rPr lang="en-US" dirty="0"/>
+              <a:t>Outliers</a:t>
+            </a:r>
+          </a:p>
+          <a:p>
+            <a:endParaRPr lang="en-US" dirty="0"/>
+          </a:p>
+          <a:p>
+            <a:r>
+              <a:rPr lang="en-US" dirty="0"/>
+              <a:t>Irina Notes:      Keep the CVX but replace with an updated plot.</a:t>
+            </a:r>
+          </a:p>
+          <a:p>
+            <a:r>
+              <a:rPr lang="en-US" dirty="0"/>
+              <a:t>	Note: open to change, if more interesting companies observed.</a:t>
+            </a:r>
+          </a:p>
+          <a:p>
+            <a:endParaRPr lang="en-US" dirty="0"/>
+          </a:p>
+        </p:txBody>
+      </p:sp>
+      <p:sp>
+        <p:nvSpPr>
+          <p:cNvPr id="4" name="Slide Number Placeholder 3"/>
+          <p:cNvSpPr>
+            <a:spLocks noGrp="1"/>
+          </p:cNvSpPr>
+          <p:nvPr>
+            <p:ph type="sldNum" sz="quarter" idx="5"/>
+          </p:nvPr>
+        </p:nvSpPr>
+        <p:spPr/>
+        <p:txBody>
+          <a:bodyPr/>
+          <a:lstStyle/>
+          <a:p>
+            <a:fld id="{5B0439F7-BA01-A541-95AE-C6E45E2F4003}" type="slidenum">
+              <a:rPr lang="en-US" smtClean="0"/>
+              <a:t>13</a:t>
+            </a:fld>
+            <a:endParaRPr lang="en-US"/>
+          </a:p>
+        </p:txBody>
+      </p:sp>
+    </p:spTree>
+    <p:extLst>
+      <p:ext uri="{BB962C8B-B14F-4D97-AF65-F5344CB8AC3E}">
+        <p14:creationId xmlns:p14="http://schemas.microsoft.com/office/powerpoint/2010/main" val="763483845"/>
       </p:ext>
     </p:extLst>
   </p:cSld>
@@ -754,27 +733,154 @@
           <a:lstStyle/>
           <a:p>
             <a:r>
-              <a:rPr lang="en-US" sz="2000" dirty="0"/>
-              <a:t>This is a continuation of the previous slide. Now, when we look closer at two companies within the same industry, we can observe this behavior from the presented histogram plot.</a:t>
+              <a:rPr lang="en-US" dirty="0"/>
+              <a:t>The highest peaks are not from SP500 – it is actually from Netflix.</a:t>
             </a:r>
           </a:p>
           <a:p>
-            <a:endParaRPr lang="en-US" sz="2000" dirty="0"/>
-          </a:p>
-          <a:p>
             <a:r>
-              <a:rPr lang="en-US" sz="2000" dirty="0"/>
-              <a:t>Lucas Notes:   The intention is to use a different representation to avoid noisy data as in the previous graph. </a:t>
+              <a:rPr lang="en-US" dirty="0"/>
+              <a:t>”Cut the wire / Cut the cord” – that’s when Netflix started going off the trend.</a:t>
             </a:r>
           </a:p>
           <a:p>
+            <a:endParaRPr lang="en-US" dirty="0"/>
+          </a:p>
+          <a:p>
             <a:r>
-              <a:rPr lang="en-US" sz="2000" dirty="0"/>
-              <a:t>	Import updated graphs.</a:t>
+              <a:rPr lang="en-US" dirty="0"/>
+              <a:t>Irina Notes:     </a:t>
             </a:r>
-          </a:p>
-          <a:p>
-            <a:endParaRPr lang="en-US" sz="2000" dirty="0"/>
+            <a:r>
+              <a:rPr lang="en-US" sz="1200" dirty="0">
+                <a:ln w="0"/>
+                <a:effectLst>
+                  <a:outerShdw blurRad="38100" dist="19050" dir="2700000" algn="tl" rotWithShape="0">
+                    <a:schemeClr val="dk1">
+                      <a:alpha val="40000"/>
+                    </a:schemeClr>
+                  </a:outerShdw>
+                </a:effectLst>
+              </a:rPr>
+              <a:t>Cannot really use this view, as too much noise.</a:t>
+            </a:r>
+            <a:br>
+              <a:rPr lang="en-US" sz="1200" dirty="0">
+                <a:ln w="0"/>
+                <a:effectLst>
+                  <a:outerShdw blurRad="38100" dist="19050" dir="2700000" algn="tl" rotWithShape="0">
+                    <a:schemeClr val="dk1">
+                      <a:alpha val="40000"/>
+                    </a:schemeClr>
+                  </a:outerShdw>
+                </a:effectLst>
+              </a:rPr>
+            </a:br>
+            <a:r>
+              <a:rPr lang="en-US" sz="1200" dirty="0">
+                <a:ln w="0"/>
+                <a:effectLst>
+                  <a:outerShdw blurRad="38100" dist="19050" dir="2700000" algn="tl" rotWithShape="0">
+                    <a:schemeClr val="dk1">
+                      <a:alpha val="40000"/>
+                    </a:schemeClr>
+                  </a:outerShdw>
+                </a:effectLst>
+              </a:rPr>
+              <a:t>	Note: might need to take out the SP500.</a:t>
+            </a:r>
+          </a:p>
+          <a:p>
+            <a:r>
+              <a:rPr lang="en-US" sz="1200" dirty="0">
+                <a:ln w="0"/>
+                <a:effectLst>
+                  <a:outerShdw blurRad="38100" dist="19050" dir="2700000" algn="tl" rotWithShape="0">
+                    <a:schemeClr val="dk1">
+                      <a:alpha val="40000"/>
+                    </a:schemeClr>
+                  </a:outerShdw>
+                </a:effectLst>
+              </a:rPr>
+              <a:t>	Note: change the </a:t>
+            </a:r>
+            <a:r>
+              <a:rPr lang="en-US" sz="1200" dirty="0" err="1">
+                <a:ln w="0"/>
+                <a:effectLst>
+                  <a:outerShdw blurRad="38100" dist="19050" dir="2700000" algn="tl" rotWithShape="0">
+                    <a:schemeClr val="dk1">
+                      <a:alpha val="40000"/>
+                    </a:schemeClr>
+                  </a:outerShdw>
+                </a:effectLst>
+              </a:rPr>
+              <a:t>x_axis</a:t>
+            </a:r>
+            <a:r>
+              <a:rPr lang="en-US" sz="1200" dirty="0">
+                <a:ln w="0"/>
+                <a:effectLst>
+                  <a:outerShdw blurRad="38100" dist="19050" dir="2700000" algn="tl" rotWithShape="0">
+                    <a:schemeClr val="dk1">
+                      <a:alpha val="40000"/>
+                    </a:schemeClr>
+                  </a:outerShdw>
+                </a:effectLst>
+              </a:rPr>
+              <a:t> to convert to  mm-YYYY. (in 2012, Netflix …)</a:t>
+            </a:r>
+          </a:p>
+          <a:p>
+            <a:pPr marL="0" marR="0" lvl="0" indent="0" algn="l" defTabSz="914400" rtl="0" eaLnBrk="1" fontAlgn="auto" latinLnBrk="0" hangingPunct="1">
+              <a:lnSpc>
+                <a:spcPct val="100000"/>
+              </a:lnSpc>
+              <a:spcBef>
+                <a:spcPts val="0"/>
+              </a:spcBef>
+              <a:spcAft>
+                <a:spcPts val="0"/>
+              </a:spcAft>
+              <a:buClrTx/>
+              <a:buSzTx/>
+              <a:buFontTx/>
+              <a:buNone/>
+              <a:tabLst/>
+              <a:defRPr/>
+            </a:pPr>
+            <a:r>
+              <a:rPr lang="en-US" sz="1200" dirty="0">
+                <a:ln w="0"/>
+                <a:effectLst>
+                  <a:outerShdw blurRad="38100" dist="19050" dir="2700000" algn="tl" rotWithShape="0">
+                    <a:schemeClr val="dk1">
+                      <a:alpha val="40000"/>
+                    </a:schemeClr>
+                  </a:outerShdw>
+                </a:effectLst>
+              </a:rPr>
+              <a:t>Lucas Notes:   </a:t>
+            </a:r>
+            <a:r>
+              <a:rPr lang="en-US" dirty="0"/>
+              <a:t>No change I believe we should keep This because it shows the large difference between Netflix and the Others</a:t>
+            </a:r>
+          </a:p>
+          <a:p>
+            <a:endParaRPr lang="en-US" dirty="0">
+              <a:ln w="0"/>
+              <a:effectLst>
+                <a:outerShdw blurRad="38100" dist="19050" dir="2700000" algn="tl" rotWithShape="0">
+                  <a:schemeClr val="dk1">
+                    <a:alpha val="40000"/>
+                  </a:schemeClr>
+                </a:outerShdw>
+              </a:effectLst>
+            </a:endParaRPr>
+          </a:p>
+          <a:p>
+            <a:endParaRPr lang="en-US" dirty="0"/>
           </a:p>
         </p:txBody>
       </p:sp>
@@ -795,7 +901,7 @@
           <a:p>
             <a:fld id="{5B0439F7-BA01-A541-95AE-C6E45E2F4003}" type="slidenum">
               <a:rPr lang="en-US" smtClean="0"/>
-              <a:t>6</a:t>
+              <a:t>5</a:t>
             </a:fld>
             <a:endParaRPr lang="en-US"/>
           </a:p>
@@ -804,7 +910,7 @@
     </p:spTree>
     <p:extLst>
       <p:ext uri="{BB962C8B-B14F-4D97-AF65-F5344CB8AC3E}">
-        <p14:creationId xmlns:p14="http://schemas.microsoft.com/office/powerpoint/2010/main" val="3479521378"/>
+        <p14:creationId xmlns:p14="http://schemas.microsoft.com/office/powerpoint/2010/main" val="2508813049"/>
       </p:ext>
     </p:extLst>
   </p:cSld>
@@ -858,43 +964,28 @@
           <a:bodyPr/>
           <a:lstStyle/>
           <a:p>
-            <a:endParaRPr lang="en-US" dirty="0"/>
-          </a:p>
-          <a:p>
-            <a:endParaRPr lang="en-US" dirty="0"/>
-          </a:p>
-          <a:p>
-            <a:pPr marL="0" marR="0" lvl="0" indent="0" algn="l" defTabSz="914400" rtl="0" eaLnBrk="1" fontAlgn="auto" latinLnBrk="0" hangingPunct="1">
-              <a:lnSpc>
-                <a:spcPct val="100000"/>
-              </a:lnSpc>
-              <a:spcBef>
-                <a:spcPts val="0"/>
-              </a:spcBef>
-              <a:spcAft>
-                <a:spcPts val="0"/>
-              </a:spcAft>
-              <a:buClrTx/>
-              <a:buSzTx/>
-              <a:buFontTx/>
-              <a:buNone/>
-              <a:tabLst/>
-              <a:defRPr/>
-            </a:pPr>
             <a:r>
-              <a:rPr lang="en-US" dirty="0"/>
-              <a:t>Lucas Notes: </a:t>
+              <a:rPr lang="en-US" sz="2000" dirty="0"/>
+              <a:t>This is a continuation of the previous slide. Now, when we look closer at two companies within the same industry, we can observe this behavior from the presented histogram plot.</a:t>
             </a:r>
+          </a:p>
+          <a:p>
+            <a:endParaRPr lang="en-US" sz="2000" dirty="0"/>
+          </a:p>
+          <a:p>
             <a:r>
-              <a:rPr lang="en-US" sz="1200" dirty="0">
-                <a:latin typeface="Times New Roman" panose="02020603050405020304" pitchFamily="18" charset="0"/>
-                <a:cs typeface="Times New Roman" panose="02020603050405020304" pitchFamily="18" charset="0"/>
-              </a:rPr>
-              <a:t>A slide for the cumulative returns. I put this cause it showed the greatest display with the most graph  images for comparison in the notebook and project in whole for all 20 assets.</a:t>
+              <a:rPr lang="en-US" sz="2000" dirty="0"/>
+              <a:t>Lucas Notes:   The intention is to use a different representation to avoid noisy data as in the previous graph. </a:t>
             </a:r>
           </a:p>
           <a:p>
-            <a:endParaRPr lang="en-US" dirty="0"/>
+            <a:r>
+              <a:rPr lang="en-US" sz="2000" dirty="0"/>
+              <a:t>	Import updated graphs.</a:t>
+            </a:r>
+          </a:p>
+          <a:p>
+            <a:endParaRPr lang="en-US" sz="2000" dirty="0"/>
           </a:p>
         </p:txBody>
       </p:sp>
@@ -913,9 +1004,9 @@
           <a:bodyPr/>
           <a:lstStyle/>
           <a:p>
-            <a:fld id="{3C464D38-78EB-6A4F-BCA2-1B202E646C54}" type="slidenum">
+            <a:fld id="{5B0439F7-BA01-A541-95AE-C6E45E2F4003}" type="slidenum">
               <a:rPr lang="en-US" smtClean="0"/>
-              <a:t>7</a:t>
+              <a:t>6</a:t>
             </a:fld>
             <a:endParaRPr lang="en-US"/>
           </a:p>
@@ -924,7 +1015,7 @@
     </p:spTree>
     <p:extLst>
       <p:ext uri="{BB962C8B-B14F-4D97-AF65-F5344CB8AC3E}">
-        <p14:creationId xmlns:p14="http://schemas.microsoft.com/office/powerpoint/2010/main" val="4110492165"/>
+        <p14:creationId xmlns:p14="http://schemas.microsoft.com/office/powerpoint/2010/main" val="3479521378"/>
       </p:ext>
     </p:extLst>
   </p:cSld>
@@ -978,59 +1069,10 @@
           <a:bodyPr/>
           <a:lstStyle/>
           <a:p>
-            <a:br>
-              <a:rPr lang="en-US" dirty="0"/>
-            </a:br>
-            <a:r>
-              <a:rPr lang="en-US" dirty="0"/>
-              <a:t>Note: focus on accumulative returns. Where investors make or lose money. </a:t>
-            </a:r>
-            <a:br>
-              <a:rPr lang="en-US" dirty="0"/>
-            </a:br>
-            <a:r>
-              <a:rPr lang="en-US" dirty="0"/>
-              <a:t>Long-term investors see 1.5 – 3.0 times the return over 10 years period.</a:t>
-            </a:r>
-          </a:p>
-          <a:p>
-            <a:r>
-              <a:rPr lang="en-US" dirty="0"/>
-              <a:t>Speculators capture gains on the volatility of short-term market movements. </a:t>
-            </a:r>
-          </a:p>
-          <a:p>
             <a:endParaRPr lang="en-US" dirty="0"/>
           </a:p>
           <a:p>
-            <a:r>
-              <a:rPr lang="en-US" dirty="0"/>
-              <a:t>Irina Notes:     </a:t>
-            </a:r>
-            <a:r>
-              <a:rPr lang="en-US" sz="1200" dirty="0"/>
-              <a:t>Add all assets.</a:t>
-            </a:r>
-          </a:p>
-          <a:p>
-            <a:r>
-              <a:rPr lang="en-US" sz="1200" dirty="0"/>
-              <a:t>	Import separate legend from previous graph.</a:t>
-            </a:r>
-          </a:p>
-          <a:p>
-            <a:r>
-              <a:rPr lang="en-US" sz="1200" dirty="0"/>
-              <a:t>	Note: </a:t>
-            </a:r>
-            <a:r>
-              <a:rPr lang="en-US" sz="1200" dirty="0" err="1"/>
-              <a:t>y_axis</a:t>
-            </a:r>
-            <a:r>
-              <a:rPr lang="en-US" sz="1200" dirty="0"/>
-              <a:t> renamed to Returns (no %)</a:t>
-            </a:r>
+            <a:endParaRPr lang="en-US" dirty="0"/>
           </a:p>
           <a:p>
             <a:pPr marL="0" marR="0" lvl="0" indent="0" algn="l" defTabSz="914400" rtl="0" eaLnBrk="1" fontAlgn="auto" latinLnBrk="0" hangingPunct="1">
@@ -1051,58 +1093,16 @@
               <a:defRPr/>
             </a:pPr>
             <a:r>
-              <a:rPr lang="en-US" sz="1200" dirty="0"/>
-              <a:t>Lucas Notes:    No change in this slide cause if we keep the slide I made, </a:t>
+              <a:rPr lang="en-US" dirty="0"/>
+              <a:t>Lucas Notes: </a:t>
             </a:r>
-          </a:p>
-          <a:p>
-            <a:pPr marL="0" marR="0" lvl="0" indent="0" algn="l" defTabSz="914400" rtl="0" eaLnBrk="1" fontAlgn="auto" latinLnBrk="0" hangingPunct="1">
-              <a:lnSpc>
-                <a:spcPct val="100000"/>
-              </a:lnSpc>
-              <a:spcBef>
-                <a:spcPts val="0"/>
-              </a:spcBef>
-              <a:spcAft>
-                <a:spcPts val="0"/>
-              </a:spcAft>
-              <a:buClrTx/>
-              <a:buSzTx/>
-              <a:buFontTx/>
-              <a:buNone/>
-              <a:tabLst/>
-              <a:defRPr/>
-            </a:pPr>
             <a:r>
-              <a:rPr lang="en-US" sz="1200" dirty="0"/>
-              <a:t>	it adds a more depth explanation on the images</a:t>
+              <a:rPr lang="en-US" sz="1200" dirty="0">
+                <a:latin typeface="Times New Roman" panose="02020603050405020304" pitchFamily="18" charset="0"/>
+                <a:cs typeface="Times New Roman" panose="02020603050405020304" pitchFamily="18" charset="0"/>
+              </a:rPr>
+              <a:t>A slide for the cumulative returns. I put this cause it showed the greatest display with the most graph  images for comparison in the notebook and project in whole for all 20 assets.</a:t>
             </a:r>
-          </a:p>
-          <a:p>
-            <a:pPr marL="0" marR="0" lvl="0" indent="0" algn="l" defTabSz="914400" rtl="0" eaLnBrk="1" fontAlgn="auto" latinLnBrk="0" hangingPunct="1">
-              <a:lnSpc>
-                <a:spcPct val="100000"/>
-              </a:lnSpc>
-              <a:spcBef>
-                <a:spcPts val="0"/>
-              </a:spcBef>
-              <a:spcAft>
-                <a:spcPts val="0"/>
-              </a:spcAft>
-              <a:buClrTx/>
-              <a:buSzTx/>
-              <a:buFontTx/>
-              <a:buNone/>
-              <a:tabLst/>
-              <a:defRPr/>
-            </a:pPr>
-            <a:r>
-              <a:rPr lang="en-US" sz="1200" dirty="0"/>
-              <a:t>Clay notes:    Do we need all the data at bottom?  Keep this or Lucas’s previous slide?</a:t>
-            </a:r>
-          </a:p>
-          <a:p>
-            <a:endParaRPr lang="en-US" sz="1200" dirty="0"/>
           </a:p>
           <a:p>
             <a:endParaRPr lang="en-US" dirty="0"/>
@@ -1124,9 +1124,9 @@
           <a:bodyPr/>
           <a:lstStyle/>
           <a:p>
-            <a:fld id="{5B0439F7-BA01-A541-95AE-C6E45E2F4003}" type="slidenum">
+            <a:fld id="{3C464D38-78EB-6A4F-BCA2-1B202E646C54}" type="slidenum">
               <a:rPr lang="en-US" smtClean="0"/>
-              <a:t>8</a:t>
+              <a:t>7</a:t>
             </a:fld>
             <a:endParaRPr lang="en-US"/>
           </a:p>
@@ -1135,7 +1135,7 @@
     </p:spTree>
     <p:extLst>
       <p:ext uri="{BB962C8B-B14F-4D97-AF65-F5344CB8AC3E}">
-        <p14:creationId xmlns:p14="http://schemas.microsoft.com/office/powerpoint/2010/main" val="2168716566"/>
+        <p14:creationId xmlns:p14="http://schemas.microsoft.com/office/powerpoint/2010/main" val="4110492165"/>
       </p:ext>
     </p:extLst>
   </p:cSld>
@@ -1189,37 +1189,134 @@
           <a:bodyPr/>
           <a:lstStyle/>
           <a:p>
+            <a:br>
+              <a:rPr lang="en-US" dirty="0"/>
+            </a:br>
             <a:r>
               <a:rPr lang="en-US" dirty="0"/>
-              <a:t>This chart </a:t>
+              <a:t>Note: focus on accumulative returns. Where investors make or lose money. </a:t>
             </a:r>
-          </a:p>
-          <a:p>
-            <a:endParaRPr lang="en-US" dirty="0"/>
-          </a:p>
-          <a:p>
+            <a:br>
+              <a:rPr lang="en-US" dirty="0"/>
+            </a:br>
             <a:r>
               <a:rPr lang="en-US" dirty="0"/>
-              <a:t>Irina Notes:     Only leave one plot.</a:t>
+              <a:t>Long-term investors see 1.5 – 3.0 times the return over 10 years period.</a:t>
             </a:r>
           </a:p>
           <a:p>
             <a:r>
               <a:rPr lang="en-US" dirty="0"/>
-              <a:t>	Make the graph as big as possible.</a:t>
+              <a:t>Speculators capture gains on the volatility of short-term market movements. </a:t>
             </a:r>
+          </a:p>
+          <a:p>
+            <a:endParaRPr lang="en-US" dirty="0"/>
           </a:p>
           <a:p>
             <a:r>
               <a:rPr lang="en-US" dirty="0"/>
-              <a:t>	Collect all figures in a separate folder. </a:t>
+              <a:t>Irina Notes:     </a:t>
             </a:r>
-          </a:p>
-          <a:p>
             <a:r>
-              <a:rPr lang="en-US" dirty="0"/>
-              <a:t>Lucas Notes:   No Change</a:t>
+              <a:rPr lang="en-US" sz="1200" dirty="0"/>
+              <a:t>Add all assets.</a:t>
             </a:r>
+          </a:p>
+          <a:p>
+            <a:r>
+              <a:rPr lang="en-US" sz="1200" dirty="0"/>
+              <a:t>	Import separate legend from previous graph.</a:t>
+            </a:r>
+          </a:p>
+          <a:p>
+            <a:r>
+              <a:rPr lang="en-US" sz="1200" dirty="0"/>
+              <a:t>	Note: </a:t>
+            </a:r>
+            <a:r>
+              <a:rPr lang="en-US" sz="1200" dirty="0" err="1"/>
+              <a:t>y_axis</a:t>
+            </a:r>
+            <a:r>
+              <a:rPr lang="en-US" sz="1200" dirty="0"/>
+              <a:t> renamed to Returns (no %)</a:t>
+            </a:r>
+          </a:p>
+          <a:p>
+            <a:pPr marL="0" marR="0" lvl="0" indent="0" algn="l" defTabSz="914400" rtl="0" eaLnBrk="1" fontAlgn="auto" latinLnBrk="0" hangingPunct="1">
+              <a:lnSpc>
+                <a:spcPct val="100000"/>
+              </a:lnSpc>
+              <a:spcBef>
+                <a:spcPts val="0"/>
+              </a:spcBef>
+              <a:spcAft>
+                <a:spcPts val="0"/>
+              </a:spcAft>
+              <a:buClrTx/>
+              <a:buSzTx/>
+              <a:buFontTx/>
+              <a:buNone/>
+              <a:tabLst/>
+              <a:defRPr/>
+            </a:pPr>
+            <a:r>
+              <a:rPr lang="en-US" sz="1200" dirty="0"/>
+              <a:t>Lucas Notes:    No change in this slide cause if we keep the slide I made, </a:t>
+            </a:r>
+          </a:p>
+          <a:p>
+            <a:pPr marL="0" marR="0" lvl="0" indent="0" algn="l" defTabSz="914400" rtl="0" eaLnBrk="1" fontAlgn="auto" latinLnBrk="0" hangingPunct="1">
+              <a:lnSpc>
+                <a:spcPct val="100000"/>
+              </a:lnSpc>
+              <a:spcBef>
+                <a:spcPts val="0"/>
+              </a:spcBef>
+              <a:spcAft>
+                <a:spcPts val="0"/>
+              </a:spcAft>
+              <a:buClrTx/>
+              <a:buSzTx/>
+              <a:buFontTx/>
+              <a:buNone/>
+              <a:tabLst/>
+              <a:defRPr/>
+            </a:pPr>
+            <a:r>
+              <a:rPr lang="en-US" sz="1200" dirty="0"/>
+              <a:t>	it adds a more depth explanation on the images</a:t>
+            </a:r>
+          </a:p>
+          <a:p>
+            <a:pPr marL="0" marR="0" lvl="0" indent="0" algn="l" defTabSz="914400" rtl="0" eaLnBrk="1" fontAlgn="auto" latinLnBrk="0" hangingPunct="1">
+              <a:lnSpc>
+                <a:spcPct val="100000"/>
+              </a:lnSpc>
+              <a:spcBef>
+                <a:spcPts val="0"/>
+              </a:spcBef>
+              <a:spcAft>
+                <a:spcPts val="0"/>
+              </a:spcAft>
+              <a:buClrTx/>
+              <a:buSzTx/>
+              <a:buFontTx/>
+              <a:buNone/>
+              <a:tabLst/>
+              <a:defRPr/>
+            </a:pPr>
+            <a:r>
+              <a:rPr lang="en-US" sz="1200" dirty="0"/>
+              <a:t>Clay notes:    Do we need all the data at bottom?  Keep this or Lucas’s previous slide?</a:t>
+            </a:r>
+          </a:p>
+          <a:p>
+            <a:endParaRPr lang="en-US" sz="1200" dirty="0"/>
+          </a:p>
+          <a:p>
+            <a:endParaRPr lang="en-US" dirty="0"/>
           </a:p>
         </p:txBody>
       </p:sp>
@@ -1240,7 +1337,7 @@
           <a:p>
             <a:fld id="{5B0439F7-BA01-A541-95AE-C6E45E2F4003}" type="slidenum">
               <a:rPr lang="en-US" smtClean="0"/>
-              <a:t>9</a:t>
+              <a:t>8</a:t>
             </a:fld>
             <a:endParaRPr lang="en-US"/>
           </a:p>
@@ -1249,7 +1346,7 @@
     </p:spTree>
     <p:extLst>
       <p:ext uri="{BB962C8B-B14F-4D97-AF65-F5344CB8AC3E}">
-        <p14:creationId xmlns:p14="http://schemas.microsoft.com/office/powerpoint/2010/main" val="4018700139"/>
+        <p14:creationId xmlns:p14="http://schemas.microsoft.com/office/powerpoint/2010/main" val="2168716566"/>
       </p:ext>
     </p:extLst>
   </p:cSld>
@@ -1303,78 +1400,36 @@
           <a:bodyPr/>
           <a:lstStyle/>
           <a:p>
-            <a:endParaRPr lang="en-US" dirty="0"/>
-          </a:p>
-          <a:p>
-            <a:endParaRPr lang="en-US" dirty="0"/>
-          </a:p>
-          <a:p>
-            <a:pPr marL="0" marR="0" lvl="0" indent="0" algn="l" defTabSz="914400" rtl="0" eaLnBrk="1" fontAlgn="auto" latinLnBrk="0" hangingPunct="1">
-              <a:lnSpc>
-                <a:spcPct val="100000"/>
-              </a:lnSpc>
-              <a:spcBef>
-                <a:spcPts val="0"/>
-              </a:spcBef>
-              <a:spcAft>
-                <a:spcPts val="0"/>
-              </a:spcAft>
-              <a:buClrTx/>
-              <a:buSzTx/>
-              <a:buFontTx/>
-              <a:buNone/>
-              <a:tabLst/>
-              <a:defRPr/>
-            </a:pPr>
             <a:r>
               <a:rPr lang="en-US" dirty="0"/>
-              <a:t>Irina Notes:     Highlight the correlating assets with better marking </a:t>
+              <a:t>This chart </a:t>
             </a:r>
-            <a:r>
-              <a:rPr lang="en-US" dirty="0">
-                <a:sym typeface="Wingdings" pitchFamily="2" charset="2"/>
-              </a:rPr>
-              <a:t>.</a:t>
-            </a:r>
-            <a:br>
-              <a:rPr lang="en-US" dirty="0">
-                <a:sym typeface="Wingdings" pitchFamily="2" charset="2"/>
-              </a:rPr>
-            </a:br>
-            <a:r>
-              <a:rPr lang="en-US" dirty="0">
-                <a:sym typeface="Wingdings" pitchFamily="2" charset="2"/>
-              </a:rPr>
-              <a:t>	Re-arrange the assets to have assets from the same industries in pairs.</a:t>
-            </a:r>
-          </a:p>
-          <a:p>
-            <a:pPr marL="0" marR="0" lvl="0" indent="0" algn="l" defTabSz="914400" rtl="0" eaLnBrk="1" fontAlgn="auto" latinLnBrk="0" hangingPunct="1">
-              <a:lnSpc>
-                <a:spcPct val="100000"/>
-              </a:lnSpc>
-              <a:spcBef>
-                <a:spcPts val="0"/>
-              </a:spcBef>
-              <a:spcAft>
-                <a:spcPts val="0"/>
-              </a:spcAft>
-              <a:buClrTx/>
-              <a:buSzTx/>
-              <a:buFontTx/>
-              <a:buNone/>
-              <a:tabLst/>
-              <a:defRPr/>
-            </a:pPr>
+          </a:p>
+          <a:p>
+            <a:endParaRPr lang="en-US" dirty="0"/>
+          </a:p>
+          <a:p>
             <a:r>
               <a:rPr lang="en-US" dirty="0"/>
-              <a:t>Lucas Notes:    Added highlights and went through to find higher correlation in the general matrix</a:t>
+              <a:t>Irina Notes:     Only leave one plot.</a:t>
             </a:r>
           </a:p>
           <a:p>
             <a:r>
               <a:rPr lang="en-US" dirty="0"/>
-              <a:t>Clay Notes:     Adjusted Key on left</a:t>
+              <a:t>	Make the graph as big as possible.</a:t>
+            </a:r>
+          </a:p>
+          <a:p>
+            <a:r>
+              <a:rPr lang="en-US" dirty="0"/>
+              <a:t>	Collect all figures in a separate folder. </a:t>
+            </a:r>
+          </a:p>
+          <a:p>
+            <a:r>
+              <a:rPr lang="en-US" dirty="0"/>
+              <a:t>Lucas Notes:   No Change</a:t>
             </a:r>
           </a:p>
         </p:txBody>
@@ -1394,9 +1449,9 @@
           <a:bodyPr/>
           <a:lstStyle/>
           <a:p>
-            <a:fld id="{3C464D38-78EB-6A4F-BCA2-1B202E646C54}" type="slidenum">
+            <a:fld id="{5B0439F7-BA01-A541-95AE-C6E45E2F4003}" type="slidenum">
               <a:rPr lang="en-US" smtClean="0"/>
-              <a:t>10</a:t>
+              <a:t>9</a:t>
             </a:fld>
             <a:endParaRPr lang="en-US"/>
           </a:p>
@@ -1405,7 +1460,7 @@
     </p:spTree>
     <p:extLst>
       <p:ext uri="{BB962C8B-B14F-4D97-AF65-F5344CB8AC3E}">
-        <p14:creationId xmlns:p14="http://schemas.microsoft.com/office/powerpoint/2010/main" val="2053148706"/>
+        <p14:creationId xmlns:p14="http://schemas.microsoft.com/office/powerpoint/2010/main" val="4018700139"/>
       </p:ext>
     </p:extLst>
   </p:cSld>
@@ -1459,25 +1514,10 @@
           <a:bodyPr/>
           <a:lstStyle/>
           <a:p>
-            <a:r>
-              <a:rPr lang="en-US" dirty="0"/>
-              <a:t>Open </a:t>
-            </a:r>
-          </a:p>
-          <a:p>
             <a:endParaRPr lang="en-US" dirty="0"/>
           </a:p>
           <a:p>
-            <a:r>
-              <a:rPr lang="en-US" dirty="0"/>
-              <a:t>Irina Notes:     Keep the CVX but replace with an updated plot.</a:t>
-            </a:r>
-          </a:p>
-          <a:p>
-            <a:r>
-              <a:rPr lang="en-US" dirty="0"/>
-              <a:t>	Note: open to change, if more interesting companies observed.</a:t>
-            </a:r>
+            <a:endParaRPr lang="en-US" dirty="0"/>
           </a:p>
           <a:p>
             <a:pPr marL="0" marR="0" lvl="0" indent="0" algn="l" defTabSz="914400" rtl="0" eaLnBrk="1" fontAlgn="auto" latinLnBrk="0" hangingPunct="1">
@@ -1499,14 +1539,54 @@
             </a:pPr>
             <a:r>
               <a:rPr lang="en-US" dirty="0"/>
-              <a:t>Lucas Notes:   Updated the Image</a:t>
+              <a:t>Irina Notes:     Highlight the correlating assets with better marking </a:t>
             </a:r>
-          </a:p>
-          <a:p>
-            <a:endParaRPr lang="en-US" dirty="0"/>
-          </a:p>
-          <a:p>
-            <a:endParaRPr lang="en-US" dirty="0"/>
+            <a:r>
+              <a:rPr lang="en-US" dirty="0">
+                <a:sym typeface="Wingdings" pitchFamily="2" charset="2"/>
+              </a:rPr>
+              <a:t>.</a:t>
+            </a:r>
+            <a:br>
+              <a:rPr lang="en-US" dirty="0">
+                <a:sym typeface="Wingdings" pitchFamily="2" charset="2"/>
+              </a:rPr>
+            </a:br>
+            <a:r>
+              <a:rPr lang="en-US" dirty="0">
+                <a:sym typeface="Wingdings" pitchFamily="2" charset="2"/>
+              </a:rPr>
+              <a:t>	Re-arrange the assets to have assets from the same industries in pairs.</a:t>
+            </a:r>
+          </a:p>
+          <a:p>
+            <a:pPr marL="0" marR="0" lvl="0" indent="0" algn="l" defTabSz="914400" rtl="0" eaLnBrk="1" fontAlgn="auto" latinLnBrk="0" hangingPunct="1">
+              <a:lnSpc>
+                <a:spcPct val="100000"/>
+              </a:lnSpc>
+              <a:spcBef>
+                <a:spcPts val="0"/>
+              </a:spcBef>
+              <a:spcAft>
+                <a:spcPts val="0"/>
+              </a:spcAft>
+              <a:buClrTx/>
+              <a:buSzTx/>
+              <a:buFontTx/>
+              <a:buNone/>
+              <a:tabLst/>
+              <a:defRPr/>
+            </a:pPr>
+            <a:r>
+              <a:rPr lang="en-US" dirty="0"/>
+              <a:t>Lucas Notes:    Added highlights and went through to find higher correlation in the general matrix</a:t>
+            </a:r>
+          </a:p>
+          <a:p>
+            <a:r>
+              <a:rPr lang="en-US" dirty="0"/>
+              <a:t>Clay Notes:     Adjusted Key on left</a:t>
+            </a:r>
           </a:p>
         </p:txBody>
       </p:sp>
@@ -1525,9 +1605,9 @@
           <a:bodyPr/>
           <a:lstStyle/>
           <a:p>
-            <a:fld id="{5B0439F7-BA01-A541-95AE-C6E45E2F4003}" type="slidenum">
+            <a:fld id="{3C464D38-78EB-6A4F-BCA2-1B202E646C54}" type="slidenum">
               <a:rPr lang="en-US" smtClean="0"/>
-              <a:t>11</a:t>
+              <a:t>10</a:t>
             </a:fld>
             <a:endParaRPr lang="en-US"/>
           </a:p>
@@ -1536,7 +1616,7 @@
     </p:spTree>
     <p:extLst>
       <p:ext uri="{BB962C8B-B14F-4D97-AF65-F5344CB8AC3E}">
-        <p14:creationId xmlns:p14="http://schemas.microsoft.com/office/powerpoint/2010/main" val="3024818523"/>
+        <p14:creationId xmlns:p14="http://schemas.microsoft.com/office/powerpoint/2010/main" val="2053148706"/>
       </p:ext>
     </p:extLst>
   </p:cSld>
@@ -1658,7 +1738,7 @@
           <a:p>
             <a:fld id="{5B0439F7-BA01-A541-95AE-C6E45E2F4003}" type="slidenum">
               <a:rPr lang="en-US" smtClean="0"/>
-              <a:t>12</a:t>
+              <a:t>11</a:t>
             </a:fld>
             <a:endParaRPr lang="en-US"/>
           </a:p>
@@ -1667,7 +1747,7 @@
     </p:spTree>
     <p:extLst>
       <p:ext uri="{BB962C8B-B14F-4D97-AF65-F5344CB8AC3E}">
-        <p14:creationId xmlns:p14="http://schemas.microsoft.com/office/powerpoint/2010/main" val="533763186"/>
+        <p14:creationId xmlns:p14="http://schemas.microsoft.com/office/powerpoint/2010/main" val="3024818523"/>
       </p:ext>
     </p:extLst>
   </p:cSld>
@@ -1723,37 +1803,16 @@
           <a:p>
             <a:r>
               <a:rPr lang="en-US" dirty="0"/>
-              <a:t>50% of your data is in the box.</a:t>
+              <a:t>Open </a:t>
             </a:r>
+          </a:p>
+          <a:p>
+            <a:endParaRPr lang="en-US" dirty="0"/>
           </a:p>
           <a:p>
             <a:r>
               <a:rPr lang="en-US" dirty="0"/>
-              <a:t>Orange line is the median.</a:t>
-            </a:r>
-          </a:p>
-          <a:p>
-            <a:r>
-              <a:rPr lang="en-US" dirty="0"/>
-              <a:t>The narrower the box the more data is closer to the median.</a:t>
-            </a:r>
-          </a:p>
-          <a:p>
-            <a:endParaRPr lang="en-US" dirty="0"/>
-          </a:p>
-          <a:p>
-            <a:r>
-              <a:rPr lang="en-US" dirty="0"/>
-              <a:t>Outliers</a:t>
-            </a:r>
-          </a:p>
-          <a:p>
-            <a:endParaRPr lang="en-US" dirty="0"/>
-          </a:p>
-          <a:p>
-            <a:r>
-              <a:rPr lang="en-US" dirty="0"/>
-              <a:t>Irina Notes:      Keep the CVX but replace with an updated plot.</a:t>
+              <a:t>Irina Notes:     Keep the CVX but replace with an updated plot.</a:t>
             </a:r>
           </a:p>
           <a:p>
@@ -1761,6 +1820,32 @@
               <a:rPr lang="en-US" dirty="0"/>
               <a:t>	Note: open to change, if more interesting companies observed.</a:t>
             </a:r>
+          </a:p>
+          <a:p>
+            <a:pPr marL="0" marR="0" lvl="0" indent="0" algn="l" defTabSz="914400" rtl="0" eaLnBrk="1" fontAlgn="auto" latinLnBrk="0" hangingPunct="1">
+              <a:lnSpc>
+                <a:spcPct val="100000"/>
+              </a:lnSpc>
+              <a:spcBef>
+                <a:spcPts val="0"/>
+              </a:spcBef>
+              <a:spcAft>
+                <a:spcPts val="0"/>
+              </a:spcAft>
+              <a:buClrTx/>
+              <a:buSzTx/>
+              <a:buFontTx/>
+              <a:buNone/>
+              <a:tabLst/>
+              <a:defRPr/>
+            </a:pPr>
+            <a:r>
+              <a:rPr lang="en-US" dirty="0"/>
+              <a:t>Lucas Notes:   Updated the Image</a:t>
+            </a:r>
+          </a:p>
+          <a:p>
+            <a:endParaRPr lang="en-US" dirty="0"/>
           </a:p>
           <a:p>
             <a:endParaRPr lang="en-US" dirty="0"/>
@@ -1784,7 +1869,7 @@
           <a:p>
             <a:fld id="{5B0439F7-BA01-A541-95AE-C6E45E2F4003}" type="slidenum">
               <a:rPr lang="en-US" smtClean="0"/>
-              <a:t>13</a:t>
+              <a:t>12</a:t>
             </a:fld>
             <a:endParaRPr lang="en-US"/>
           </a:p>
@@ -1793,7 +1878,7 @@
     </p:spTree>
     <p:extLst>
       <p:ext uri="{BB962C8B-B14F-4D97-AF65-F5344CB8AC3E}">
-        <p14:creationId xmlns:p14="http://schemas.microsoft.com/office/powerpoint/2010/main" val="763483845"/>
+        <p14:creationId xmlns:p14="http://schemas.microsoft.com/office/powerpoint/2010/main" val="533763186"/>
       </p:ext>
     </p:extLst>
   </p:cSld>
@@ -1950,7 +2035,7 @@
           <a:p>
             <a:fld id="{C1CC7F00-77D2-4F43-9191-B15704280A39}" type="datetimeFigureOut">
               <a:rPr lang="en-US" smtClean="0"/>
-              <a:t>6/22/2020</a:t>
+              <a:t>6/22/20</a:t>
             </a:fld>
             <a:endParaRPr lang="en-US"/>
           </a:p>
@@ -2153,7 +2238,7 @@
           <a:p>
             <a:fld id="{C1CC7F00-77D2-4F43-9191-B15704280A39}" type="datetimeFigureOut">
               <a:rPr lang="en-US" smtClean="0"/>
-              <a:t>6/22/2020</a:t>
+              <a:t>6/22/20</a:t>
             </a:fld>
             <a:endParaRPr lang="en-US"/>
           </a:p>
@@ -2361,7 +2446,7 @@
           <a:p>
             <a:fld id="{C1CC7F00-77D2-4F43-9191-B15704280A39}" type="datetimeFigureOut">
               <a:rPr lang="en-US" smtClean="0"/>
-              <a:t>6/22/2020</a:t>
+              <a:t>6/22/20</a:t>
             </a:fld>
             <a:endParaRPr lang="en-US"/>
           </a:p>
@@ -2559,7 +2644,7 @@
           <a:p>
             <a:fld id="{C1CC7F00-77D2-4F43-9191-B15704280A39}" type="datetimeFigureOut">
               <a:rPr lang="en-US" smtClean="0"/>
-              <a:t>6/22/2020</a:t>
+              <a:t>6/22/20</a:t>
             </a:fld>
             <a:endParaRPr lang="en-US"/>
           </a:p>
@@ -2834,7 +2919,7 @@
           <a:p>
             <a:fld id="{C1CC7F00-77D2-4F43-9191-B15704280A39}" type="datetimeFigureOut">
               <a:rPr lang="en-US" smtClean="0"/>
-              <a:t>6/22/2020</a:t>
+              <a:t>6/22/20</a:t>
             </a:fld>
             <a:endParaRPr lang="en-US"/>
           </a:p>
@@ -3104,7 +3189,7 @@
           <a:p>
             <a:fld id="{C1CC7F00-77D2-4F43-9191-B15704280A39}" type="datetimeFigureOut">
               <a:rPr lang="en-US" smtClean="0"/>
-              <a:t>6/22/2020</a:t>
+              <a:t>6/22/20</a:t>
             </a:fld>
             <a:endParaRPr lang="en-US"/>
           </a:p>
@@ -3516,7 +3601,7 @@
           <a:p>
             <a:fld id="{C1CC7F00-77D2-4F43-9191-B15704280A39}" type="datetimeFigureOut">
               <a:rPr lang="en-US" smtClean="0"/>
-              <a:t>6/22/2020</a:t>
+              <a:t>6/22/20</a:t>
             </a:fld>
             <a:endParaRPr lang="en-US"/>
           </a:p>
@@ -3657,7 +3742,7 @@
           <a:p>
             <a:fld id="{C1CC7F00-77D2-4F43-9191-B15704280A39}" type="datetimeFigureOut">
               <a:rPr lang="en-US" smtClean="0"/>
-              <a:t>6/22/2020</a:t>
+              <a:t>6/22/20</a:t>
             </a:fld>
             <a:endParaRPr lang="en-US"/>
           </a:p>
@@ -3770,7 +3855,7 @@
           <a:p>
             <a:fld id="{C1CC7F00-77D2-4F43-9191-B15704280A39}" type="datetimeFigureOut">
               <a:rPr lang="en-US" smtClean="0"/>
-              <a:t>6/22/2020</a:t>
+              <a:t>6/22/20</a:t>
             </a:fld>
             <a:endParaRPr lang="en-US"/>
           </a:p>
@@ -4086,7 +4171,7 @@
           <a:p>
             <a:fld id="{C1CC7F00-77D2-4F43-9191-B15704280A39}" type="datetimeFigureOut">
               <a:rPr lang="en-US" smtClean="0"/>
-              <a:t>6/22/2020</a:t>
+              <a:t>6/22/20</a:t>
             </a:fld>
             <a:endParaRPr lang="en-US"/>
           </a:p>
@@ -4374,7 +4459,7 @@
           <a:p>
             <a:fld id="{C1CC7F00-77D2-4F43-9191-B15704280A39}" type="datetimeFigureOut">
               <a:rPr lang="en-US" smtClean="0"/>
-              <a:t>6/22/2020</a:t>
+              <a:t>6/22/20</a:t>
             </a:fld>
             <a:endParaRPr lang="en-US"/>
           </a:p>
@@ -4615,7 +4700,7 @@
           <a:p>
             <a:fld id="{C1CC7F00-77D2-4F43-9191-B15704280A39}" type="datetimeFigureOut">
               <a:rPr lang="en-US" smtClean="0"/>
-              <a:t>6/22/2020</a:t>
+              <a:t>6/22/20</a:t>
             </a:fld>
             <a:endParaRPr lang="en-US"/>
           </a:p>
@@ -8126,6 +8211,202 @@
           <p:cNvPr id="2" name="Title 1">
             <a:extLst>
               <a:ext uri="{FF2B5EF4-FFF2-40B4-BE49-F238E27FC236}">
+                <a16:creationId xmlns:a16="http://schemas.microsoft.com/office/drawing/2014/main" id="{3719964E-B66F-9F4D-9520-C6D62A97ED13}"/>
+              </a:ext>
+            </a:extLst>
+          </p:cNvPr>
+          <p:cNvSpPr>
+            <a:spLocks noGrp="1"/>
+          </p:cNvSpPr>
+          <p:nvPr>
+            <p:ph type="title"/>
+          </p:nvPr>
+        </p:nvSpPr>
+        <p:spPr>
+          <a:xfrm>
+            <a:off x="838200" y="365126"/>
+            <a:ext cx="10515600" cy="786342"/>
+          </a:xfrm>
+        </p:spPr>
+        <p:txBody>
+          <a:bodyPr>
+            <a:normAutofit/>
+          </a:bodyPr>
+          <a:lstStyle/>
+          <a:p>
+            <a:r>
+              <a:rPr lang="en-US" sz="4000" dirty="0"/>
+              <a:t>Multiple Regression with SkLearn.Linear_Model</a:t>
+            </a:r>
+          </a:p>
+        </p:txBody>
+      </p:sp>
+      <p:sp>
+        <p:nvSpPr>
+          <p:cNvPr id="3" name="Content Placeholder 2">
+            <a:extLst>
+              <a:ext uri="{FF2B5EF4-FFF2-40B4-BE49-F238E27FC236}">
+                <a16:creationId xmlns:a16="http://schemas.microsoft.com/office/drawing/2014/main" id="{F7265012-292D-754A-9BEC-3E3BD69EFD5C}"/>
+              </a:ext>
+            </a:extLst>
+          </p:cNvPr>
+          <p:cNvSpPr>
+            <a:spLocks noGrp="1"/>
+          </p:cNvSpPr>
+          <p:nvPr>
+            <p:ph idx="1"/>
+          </p:nvPr>
+        </p:nvSpPr>
+        <p:spPr>
+          <a:xfrm>
+            <a:off x="838200" y="1151468"/>
+            <a:ext cx="10515600" cy="5025495"/>
+          </a:xfrm>
+        </p:spPr>
+        <p:txBody>
+          <a:bodyPr>
+            <a:normAutofit fontScale="92500" lnSpcReduction="20000"/>
+          </a:bodyPr>
+          <a:lstStyle/>
+          <a:p>
+            <a:r>
+              <a:rPr lang="en-US" dirty="0"/>
+              <a:t>Added “US Unemployment rate” for 2010 to 2019 as the second  dependent variable alongside “Time”</a:t>
+            </a:r>
+          </a:p>
+          <a:p>
+            <a:endParaRPr lang="en-US" dirty="0"/>
+          </a:p>
+          <a:p>
+            <a:r>
+              <a:rPr lang="en-US" dirty="0"/>
+              <a:t>Price = intercept + coefficient1*time + coefficient2*unemp_rate</a:t>
+            </a:r>
+          </a:p>
+          <a:p>
+            <a:pPr marL="0" indent="0">
+              <a:buNone/>
+            </a:pPr>
+            <a:endParaRPr lang="en-US" dirty="0"/>
+          </a:p>
+          <a:p>
+            <a:r>
+              <a:rPr lang="en-US" dirty="0"/>
+              <a:t>CVX Model:-9.567894331153013 [0.86705591 7.28598621]</a:t>
+            </a:r>
+          </a:p>
+          <a:p>
+            <a:pPr lvl="1">
+              <a:buFont typeface="Courier New" panose="02070309020205020404" pitchFamily="49" charset="0"/>
+              <a:buChar char="o"/>
+            </a:pPr>
+            <a:r>
+              <a:rPr lang="en-US" dirty="0"/>
+              <a:t>cvx_jan2020 = -9.568 + (0.867*121) + (7.286*0.036) = 95.60</a:t>
+            </a:r>
+          </a:p>
+          <a:p>
+            <a:pPr lvl="1">
+              <a:buFont typeface="Courier New" panose="02070309020205020404" pitchFamily="49" charset="0"/>
+              <a:buChar char="o"/>
+            </a:pPr>
+            <a:r>
+              <a:rPr lang="en-US" dirty="0"/>
+              <a:t>cvx_feb2020 = -9.568 + (0.867*122) + (7.286*0.035) = 96.46</a:t>
+            </a:r>
+          </a:p>
+          <a:p>
+            <a:pPr lvl="1">
+              <a:buFont typeface="Courier New" panose="02070309020205020404" pitchFamily="49" charset="0"/>
+              <a:buChar char="o"/>
+            </a:pPr>
+            <a:r>
+              <a:rPr lang="en-US" dirty="0"/>
+              <a:t>Both forecasted prices within CVX actual price and std of +/-18.1</a:t>
+            </a:r>
+          </a:p>
+          <a:p>
+            <a:pPr marL="457200" lvl="1" indent="0">
+              <a:buNone/>
+            </a:pPr>
+            <a:endParaRPr lang="en-US" dirty="0"/>
+          </a:p>
+          <a:p>
+            <a:r>
+              <a:rPr lang="en-US" dirty="0"/>
+              <a:t>NFLX Model: -945.0750550498519 [ 8.28553905 91.42047607]</a:t>
+            </a:r>
+          </a:p>
+          <a:p>
+            <a:pPr lvl="1">
+              <a:buFont typeface="Courier New" panose="02070309020205020404" pitchFamily="49" charset="0"/>
+              <a:buChar char="o"/>
+            </a:pPr>
+            <a:r>
+              <a:rPr lang="en-US" dirty="0"/>
+              <a:t>nflx_jan2020 = -945.075 + (8.286*121) + (91.42*0.036) = 60.82</a:t>
+            </a:r>
+          </a:p>
+          <a:p>
+            <a:pPr lvl="1">
+              <a:buFont typeface="Courier New" panose="02070309020205020404" pitchFamily="49" charset="0"/>
+              <a:buChar char="o"/>
+            </a:pPr>
+            <a:r>
+              <a:rPr lang="en-US" dirty="0"/>
+              <a:t>nflx_feb2020 = -945.075 + (8.286*122) + (91.42*0.035) = 69.02</a:t>
+            </a:r>
+          </a:p>
+          <a:p>
+            <a:pPr lvl="1">
+              <a:buFont typeface="Courier New" panose="02070309020205020404" pitchFamily="49" charset="0"/>
+              <a:buChar char="o"/>
+            </a:pPr>
+            <a:r>
+              <a:rPr lang="en-US" dirty="0"/>
+              <a:t>Both forecasted prices out of range with NFLX actual price and std of +/- 115.71</a:t>
+            </a:r>
+          </a:p>
+          <a:p>
+            <a:endParaRPr lang="en-US" dirty="0"/>
+          </a:p>
+        </p:txBody>
+      </p:sp>
+    </p:spTree>
+    <p:extLst>
+      <p:ext uri="{BB962C8B-B14F-4D97-AF65-F5344CB8AC3E}">
+        <p14:creationId xmlns:p14="http://schemas.microsoft.com/office/powerpoint/2010/main" val="257429843"/>
+      </p:ext>
+    </p:extLst>
+  </p:cSld>
+  <p:clrMapOvr>
+    <a:masterClrMapping/>
+  </p:clrMapOvr>
+</p:sld>
+</file>
+
+<file path=ppt/slides/slide15.xml><?xml version="1.0" encoding="utf-8"?>
+<p:sld xmlns:a="http://schemas.openxmlformats.org/drawingml/2006/main" xmlns:r="http://schemas.openxmlformats.org/officeDocument/2006/relationships" xmlns:p="http://schemas.openxmlformats.org/presentationml/2006/main">
+  <p:cSld>
+    <p:spTree>
+      <p:nvGrpSpPr>
+        <p:cNvPr id="1" name=""/>
+        <p:cNvGrpSpPr/>
+        <p:nvPr/>
+      </p:nvGrpSpPr>
+      <p:grpSpPr>
+        <a:xfrm>
+          <a:off x="0" y="0"/>
+          <a:ext cx="0" cy="0"/>
+          <a:chOff x="0" y="0"/>
+          <a:chExt cx="0" cy="0"/>
+        </a:xfrm>
+      </p:grpSpPr>
+      <p:sp>
+        <p:nvSpPr>
+          <p:cNvPr id="2" name="Title 1">
+            <a:extLst>
+              <a:ext uri="{FF2B5EF4-FFF2-40B4-BE49-F238E27FC236}">
                 <a16:creationId xmlns:a16="http://schemas.microsoft.com/office/drawing/2014/main" id="{F6E13D4C-2D85-A14B-9111-9F925E7C7539}"/>
               </a:ext>
             </a:extLst>
@@ -9398,7 +9679,7 @@
           </p:nvPr>
         </p:nvPicPr>
         <p:blipFill>
-          <a:blip r:embed="rId2"/>
+          <a:blip r:embed="rId3"/>
           <a:stretch>
             <a:fillRect/>
           </a:stretch>
@@ -9428,7 +9709,7 @@
           <p:nvPr/>
         </p:nvPicPr>
         <p:blipFill>
-          <a:blip r:embed="rId3">
+          <a:blip r:embed="rId4">
             <a:extLst>
               <a:ext uri="{28A0092B-C50C-407E-A947-70E740481C1C}">
                 <a14:useLocalDpi xmlns:a14="http://schemas.microsoft.com/office/drawing/2010/main" val="0"/>

</xml_diff>

<commit_message>
adjusted ppt & jupyter notebook
</commit_message>
<xml_diff>
--- a/Final_Presentation.pptx
+++ b/Final_Presentation.pptx
@@ -20,10 +20,10 @@
     <p:sldId id="265" r:id="rId11"/>
     <p:sldId id="266" r:id="rId12"/>
     <p:sldId id="272" r:id="rId13"/>
-    <p:sldId id="269" r:id="rId14"/>
-    <p:sldId id="273" r:id="rId15"/>
-    <p:sldId id="270" r:id="rId16"/>
-    <p:sldId id="276" r:id="rId17"/>
+    <p:sldId id="273" r:id="rId14"/>
+    <p:sldId id="270" r:id="rId15"/>
+    <p:sldId id="276" r:id="rId16"/>
+    <p:sldId id="269" r:id="rId17"/>
   </p:sldIdLst>
   <p:sldSz cx="12192000" cy="6858000"/>
   <p:notesSz cx="6858000" cy="9144000"/>
@@ -906,7 +906,7 @@
                 <a:ea typeface="Calibri" panose="020F0502020204030204" pitchFamily="34" charset="0"/>
                 <a:cs typeface="Times New Roman" panose="02020603050405020304" pitchFamily="18" charset="0"/>
               </a:rPr>
-              <a:t>How good is the data? To answer the question around the credibility of the assets data we created box plots of their monthly price to give us a quick visual understanding of the distribution and skewness/dispersion/variability. </a:t>
+              <a:t>We also considered the possibility of a more conservative predictor for price with multiple regression by introducing another dependent variable. We added the US unemployment rate for 10 years coinciding with the years included in our analysis</a:t>
             </a:r>
           </a:p>
           <a:p>
@@ -927,8 +927,41 @@
                 <a:ea typeface="Calibri" panose="020F0502020204030204" pitchFamily="34" charset="0"/>
                 <a:cs typeface="Times New Roman" panose="02020603050405020304" pitchFamily="18" charset="0"/>
               </a:rPr>
-              <a:t>CVX appears to have normal distribution. A shorter box indicates a less dispersed distribution which aligns with our earlier calculation of CVX’s STD.</a:t>
-            </a:r>
+              <a:t>For this purpose we imported the </a:t>
+            </a:r>
+            <a:r>
+              <a:rPr lang="en-US" sz="1800" dirty="0" err="1">
+                <a:effectLst/>
+                <a:latin typeface="Calibri" panose="020F0502020204030204" pitchFamily="34" charset="0"/>
+                <a:ea typeface="Calibri" panose="020F0502020204030204" pitchFamily="34" charset="0"/>
+                <a:cs typeface="Times New Roman" panose="02020603050405020304" pitchFamily="18" charset="0"/>
+              </a:rPr>
+              <a:t>LinearRegression</a:t>
+            </a:r>
+            <a:r>
+              <a:rPr lang="en-US" sz="1800" dirty="0">
+                <a:effectLst/>
+                <a:latin typeface="Calibri" panose="020F0502020204030204" pitchFamily="34" charset="0"/>
+                <a:ea typeface="Calibri" panose="020F0502020204030204" pitchFamily="34" charset="0"/>
+                <a:cs typeface="Times New Roman" panose="02020603050405020304" pitchFamily="18" charset="0"/>
+              </a:rPr>
+              <a:t> module from  </a:t>
+            </a:r>
+            <a:r>
+              <a:rPr lang="en-US" sz="1800" dirty="0" err="1">
+                <a:effectLst/>
+                <a:latin typeface="Calibri" panose="020F0502020204030204" pitchFamily="34" charset="0"/>
+                <a:ea typeface="Calibri" panose="020F0502020204030204" pitchFamily="34" charset="0"/>
+                <a:cs typeface="Times New Roman" panose="02020603050405020304" pitchFamily="18" charset="0"/>
+              </a:rPr>
+              <a:t>sklearn.linear_model</a:t>
+            </a:r>
+            <a:endParaRPr lang="en-US" sz="1800" dirty="0">
+              <a:effectLst/>
+              <a:latin typeface="Calibri" panose="020F0502020204030204" pitchFamily="34" charset="0"/>
+              <a:ea typeface="Calibri" panose="020F0502020204030204" pitchFamily="34" charset="0"/>
+              <a:cs typeface="Times New Roman" panose="02020603050405020304" pitchFamily="18" charset="0"/>
+            </a:endParaRPr>
           </a:p>
           <a:p>
             <a:pPr marL="342900" marR="0" lvl="0" indent="-342900">
@@ -948,8 +981,32 @@
                 <a:ea typeface="Calibri" panose="020F0502020204030204" pitchFamily="34" charset="0"/>
                 <a:cs typeface="Times New Roman" panose="02020603050405020304" pitchFamily="18" charset="0"/>
               </a:rPr>
-              <a:t>However, NFLX has a positive skew and the longer box show greater degree of spread.  This also aligns with our previous observations.</a:t>
-            </a:r>
+              <a:t>For CVX: The introduction of an additional variable resulted in a more conservative or better fitting prediction of CVX’s Jan and Feb prices within the STD. </a:t>
+            </a:r>
+          </a:p>
+          <a:p>
+            <a:pPr marL="342900" marR="0" lvl="0" indent="-342900">
+              <a:spcBef>
+                <a:spcPts val="0"/>
+              </a:spcBef>
+              <a:spcAft>
+                <a:spcPts val="0"/>
+              </a:spcAft>
+              <a:buFont typeface="Symbol" panose="05050102010706020507" pitchFamily="18" charset="2"/>
+              <a:buChar char=""/>
+            </a:pPr>
+            <a:r>
+              <a:rPr lang="en-US" sz="1800" dirty="0">
+                <a:effectLst/>
+                <a:latin typeface="Calibri" panose="020F0502020204030204" pitchFamily="34" charset="0"/>
+                <a:ea typeface="Calibri" panose="020F0502020204030204" pitchFamily="34" charset="0"/>
+                <a:cs typeface="Times New Roman" panose="02020603050405020304" pitchFamily="18" charset="0"/>
+              </a:rPr>
+              <a:t>For NFLX: The model didn’t provide a better prediction further alluding to its non-conformity with others in the pack.</a:t>
+            </a:r>
+          </a:p>
+          <a:p>
+            <a:endParaRPr lang="en-US" dirty="0"/>
           </a:p>
         </p:txBody>
       </p:sp>
@@ -968,7 +1025,7 @@
           <a:bodyPr/>
           <a:lstStyle/>
           <a:p>
-            <a:fld id="{5B0439F7-BA01-A541-95AE-C6E45E2F4003}" type="slidenum">
+            <a:fld id="{3C464D38-78EB-6A4F-BCA2-1B202E646C54}" type="slidenum">
               <a:rPr lang="en-US" smtClean="0"/>
               <a:t>13</a:t>
             </a:fld>
@@ -979,7 +1036,7 @@
     </p:spTree>
     <p:extLst>
       <p:ext uri="{BB962C8B-B14F-4D97-AF65-F5344CB8AC3E}">
-        <p14:creationId xmlns:p14="http://schemas.microsoft.com/office/powerpoint/2010/main" val="763483845"/>
+        <p14:creationId xmlns:p14="http://schemas.microsoft.com/office/powerpoint/2010/main" val="2735816175"/>
       </p:ext>
     </p:extLst>
   </p:cSld>
@@ -1043,14 +1100,62 @@
               <a:buFont typeface="Symbol" panose="05050102010706020507" pitchFamily="18" charset="2"/>
               <a:buChar char=""/>
             </a:pPr>
-            <a:r>
-              <a:rPr lang="en-US" sz="1800" dirty="0">
+            <a:endParaRPr lang="en-US" sz="1800" dirty="0">
+              <a:effectLst/>
+              <a:latin typeface="Calibri" panose="020F0502020204030204" pitchFamily="34" charset="0"/>
+              <a:ea typeface="Calibri" panose="020F0502020204030204" pitchFamily="34" charset="0"/>
+              <a:cs typeface="Times New Roman" panose="02020603050405020304" pitchFamily="18" charset="0"/>
+            </a:endParaRPr>
+          </a:p>
+          <a:p>
+            <a:pPr marL="0" marR="0" lvl="0" indent="0">
+              <a:spcBef>
+                <a:spcPts val="0"/>
+              </a:spcBef>
+              <a:spcAft>
+                <a:spcPts val="0"/>
+              </a:spcAft>
+              <a:buFont typeface="Symbol" panose="05050102010706020507" pitchFamily="18" charset="2"/>
+              <a:buNone/>
+            </a:pPr>
+            <a:r>
+              <a:rPr lang="en-US" sz="1800" u="sng" dirty="0">
                 <a:effectLst/>
                 <a:latin typeface="Calibri" panose="020F0502020204030204" pitchFamily="34" charset="0"/>
                 <a:ea typeface="Calibri" panose="020F0502020204030204" pitchFamily="34" charset="0"/>
                 <a:cs typeface="Times New Roman" panose="02020603050405020304" pitchFamily="18" charset="0"/>
               </a:rPr>
-              <a:t>We also consider the possibility of a more conservative predictor for price with multiple regression by introducing another dependent variable. We added the US unemployment rate for 10 years coinciding with the years included in our analysis</a:t>
+              <a:t>Old slide information is here:</a:t>
+            </a:r>
+          </a:p>
+          <a:p>
+            <a:r>
+              <a:rPr lang="en-US" sz="4000" dirty="0"/>
+              <a:t>Stock prices are Time Series</a:t>
+            </a:r>
+          </a:p>
+          <a:p>
+            <a:r>
+              <a:rPr lang="en-US" sz="4000" dirty="0"/>
+              <a:t>Day trading is speculative and risky</a:t>
+            </a:r>
+          </a:p>
+          <a:p>
+            <a:r>
+              <a:rPr lang="en-US" sz="4000" dirty="0"/>
+              <a:t>The sure way to make good returns on your investment is long term holding “buy and hold” </a:t>
+            </a:r>
+          </a:p>
+          <a:p>
+            <a:r>
+              <a:rPr lang="en-US" sz="4000" dirty="0"/>
+              <a:t>Make your portfolio selections with a mix of lowly correlated assets </a:t>
+            </a:r>
+          </a:p>
+          <a:p>
+            <a:r>
+              <a:rPr lang="en-US" sz="4000" dirty="0"/>
+              <a:t>Regression analysis may be able to tell the future trend of an asset price because prices are time series …however, there are other variables other than time that determines the future price of an asset.</a:t>
             </a:r>
           </a:p>
           <a:p>
@@ -1064,42 +1169,6 @@
               <a:buFont typeface="Symbol" panose="05050102010706020507" pitchFamily="18" charset="2"/>
               <a:buChar char=""/>
             </a:pPr>
-            <a:r>
-              <a:rPr lang="en-US" sz="1800" dirty="0">
-                <a:effectLst/>
-                <a:latin typeface="Calibri" panose="020F0502020204030204" pitchFamily="34" charset="0"/>
-                <a:ea typeface="Calibri" panose="020F0502020204030204" pitchFamily="34" charset="0"/>
-                <a:cs typeface="Times New Roman" panose="02020603050405020304" pitchFamily="18" charset="0"/>
-              </a:rPr>
-              <a:t>For this purpose we imported the </a:t>
-            </a:r>
-            <a:r>
-              <a:rPr lang="en-US" sz="1800" dirty="0" err="1">
-                <a:effectLst/>
-                <a:latin typeface="Calibri" panose="020F0502020204030204" pitchFamily="34" charset="0"/>
-                <a:ea typeface="Calibri" panose="020F0502020204030204" pitchFamily="34" charset="0"/>
-                <a:cs typeface="Times New Roman" panose="02020603050405020304" pitchFamily="18" charset="0"/>
-              </a:rPr>
-              <a:t>LinearRegression</a:t>
-            </a:r>
-            <a:r>
-              <a:rPr lang="en-US" sz="1800" dirty="0">
-                <a:effectLst/>
-                <a:latin typeface="Calibri" panose="020F0502020204030204" pitchFamily="34" charset="0"/>
-                <a:ea typeface="Calibri" panose="020F0502020204030204" pitchFamily="34" charset="0"/>
-                <a:cs typeface="Times New Roman" panose="02020603050405020304" pitchFamily="18" charset="0"/>
-              </a:rPr>
-              <a:t> module from  </a:t>
-            </a:r>
-            <a:r>
-              <a:rPr lang="en-US" sz="1800" dirty="0" err="1">
-                <a:effectLst/>
-                <a:latin typeface="Calibri" panose="020F0502020204030204" pitchFamily="34" charset="0"/>
-                <a:ea typeface="Calibri" panose="020F0502020204030204" pitchFamily="34" charset="0"/>
-                <a:cs typeface="Times New Roman" panose="02020603050405020304" pitchFamily="18" charset="0"/>
-              </a:rPr>
-              <a:t>sklearn.linear_model</a:t>
-            </a:r>
             <a:endParaRPr lang="en-US" sz="1800" dirty="0">
               <a:effectLst/>
               <a:latin typeface="Calibri" panose="020F0502020204030204" pitchFamily="34" charset="0"/>
@@ -1108,48 +1177,6 @@
             </a:endParaRPr>
           </a:p>
           <a:p>
-            <a:pPr marL="342900" marR="0" lvl="0" indent="-342900">
-              <a:spcBef>
-                <a:spcPts val="0"/>
-              </a:spcBef>
-              <a:spcAft>
-                <a:spcPts val="0"/>
-              </a:spcAft>
-              <a:buFont typeface="Symbol" panose="05050102010706020507" pitchFamily="18" charset="2"/>
-              <a:buChar char=""/>
-            </a:pPr>
-            <a:r>
-              <a:rPr lang="en-US" sz="1800" dirty="0">
-                <a:effectLst/>
-                <a:latin typeface="Calibri" panose="020F0502020204030204" pitchFamily="34" charset="0"/>
-                <a:ea typeface="Calibri" panose="020F0502020204030204" pitchFamily="34" charset="0"/>
-                <a:cs typeface="Times New Roman" panose="02020603050405020304" pitchFamily="18" charset="0"/>
-              </a:rPr>
-              <a:t>For CVX: The introduction of an additional variable resulted in a more conservative or better fitting prediction of CVX’s Jan and Feb prices within the STD. </a:t>
-            </a:r>
-          </a:p>
-          <a:p>
-            <a:pPr marL="342900" marR="0" lvl="0" indent="-342900">
-              <a:spcBef>
-                <a:spcPts val="0"/>
-              </a:spcBef>
-              <a:spcAft>
-                <a:spcPts val="0"/>
-              </a:spcAft>
-              <a:buFont typeface="Symbol" panose="05050102010706020507" pitchFamily="18" charset="2"/>
-              <a:buChar char=""/>
-            </a:pPr>
-            <a:r>
-              <a:rPr lang="en-US" sz="1800" dirty="0">
-                <a:effectLst/>
-                <a:latin typeface="Calibri" panose="020F0502020204030204" pitchFamily="34" charset="0"/>
-                <a:ea typeface="Calibri" panose="020F0502020204030204" pitchFamily="34" charset="0"/>
-                <a:cs typeface="Times New Roman" panose="02020603050405020304" pitchFamily="18" charset="0"/>
-              </a:rPr>
-              <a:t>For NFLX: The model didn’t provide a better prediction further alluding to its non-conformity with others in the pack.</a:t>
-            </a:r>
-          </a:p>
-          <a:p>
             <a:endParaRPr lang="en-US" dirty="0"/>
           </a:p>
         </p:txBody>
@@ -1180,7 +1207,7 @@
     </p:spTree>
     <p:extLst>
       <p:ext uri="{BB962C8B-B14F-4D97-AF65-F5344CB8AC3E}">
-        <p14:creationId xmlns:p14="http://schemas.microsoft.com/office/powerpoint/2010/main" val="2735816175"/>
+        <p14:creationId xmlns:p14="http://schemas.microsoft.com/office/powerpoint/2010/main" val="4258049016"/>
       </p:ext>
     </p:extLst>
   </p:cSld>
@@ -1244,62 +1271,14 @@
               <a:buFont typeface="Symbol" panose="05050102010706020507" pitchFamily="18" charset="2"/>
               <a:buChar char=""/>
             </a:pPr>
-            <a:endParaRPr lang="en-US" sz="1800" dirty="0">
-              <a:effectLst/>
-              <a:latin typeface="Calibri" panose="020F0502020204030204" pitchFamily="34" charset="0"/>
-              <a:ea typeface="Calibri" panose="020F0502020204030204" pitchFamily="34" charset="0"/>
-              <a:cs typeface="Times New Roman" panose="02020603050405020304" pitchFamily="18" charset="0"/>
-            </a:endParaRPr>
-          </a:p>
-          <a:p>
-            <a:pPr marL="0" marR="0" lvl="0" indent="0">
-              <a:spcBef>
-                <a:spcPts val="0"/>
-              </a:spcBef>
-              <a:spcAft>
-                <a:spcPts val="0"/>
-              </a:spcAft>
-              <a:buFont typeface="Symbol" panose="05050102010706020507" pitchFamily="18" charset="2"/>
-              <a:buNone/>
-            </a:pPr>
-            <a:r>
-              <a:rPr lang="en-US" sz="1800" u="sng" dirty="0">
+            <a:r>
+              <a:rPr lang="en-US" sz="1800" dirty="0">
                 <a:effectLst/>
                 <a:latin typeface="Calibri" panose="020F0502020204030204" pitchFamily="34" charset="0"/>
                 <a:ea typeface="Calibri" panose="020F0502020204030204" pitchFamily="34" charset="0"/>
                 <a:cs typeface="Times New Roman" panose="02020603050405020304" pitchFamily="18" charset="0"/>
               </a:rPr>
-              <a:t>Old slide information is here:</a:t>
-            </a:r>
-          </a:p>
-          <a:p>
-            <a:r>
-              <a:rPr lang="en-US" sz="4000" dirty="0"/>
-              <a:t>Stock prices are Time Series</a:t>
-            </a:r>
-          </a:p>
-          <a:p>
-            <a:r>
-              <a:rPr lang="en-US" sz="4000" dirty="0"/>
-              <a:t>Day trading is speculative and risky</a:t>
-            </a:r>
-          </a:p>
-          <a:p>
-            <a:r>
-              <a:rPr lang="en-US" sz="4000" dirty="0"/>
-              <a:t>The sure way to make good returns on your investment is long term holding “buy and hold” </a:t>
-            </a:r>
-          </a:p>
-          <a:p>
-            <a:r>
-              <a:rPr lang="en-US" sz="4000" dirty="0"/>
-              <a:t>Make your portfolio selections with a mix of lowly correlated assets </a:t>
-            </a:r>
-          </a:p>
-          <a:p>
-            <a:r>
-              <a:rPr lang="en-US" sz="4000" dirty="0"/>
-              <a:t>Regression analysis may be able to tell the future trend of an asset price because prices are time series …however, there are other variables other than time that determines the future price of an asset.</a:t>
+              <a:t>How good is the data? To answer the question around the credibility of the assets data we created box plots of their monthly price to give us a quick visual understanding of the distribution and skewness/dispersion/variability. </a:t>
             </a:r>
           </a:p>
           <a:p>
@@ -1313,15 +1292,54 @@
               <a:buFont typeface="Symbol" panose="05050102010706020507" pitchFamily="18" charset="2"/>
               <a:buChar char=""/>
             </a:pPr>
-            <a:endParaRPr lang="en-US" sz="1800" dirty="0">
-              <a:effectLst/>
-              <a:latin typeface="Calibri" panose="020F0502020204030204" pitchFamily="34" charset="0"/>
-              <a:ea typeface="Calibri" panose="020F0502020204030204" pitchFamily="34" charset="0"/>
-              <a:cs typeface="Times New Roman" panose="02020603050405020304" pitchFamily="18" charset="0"/>
-            </a:endParaRPr>
-          </a:p>
-          <a:p>
-            <a:endParaRPr lang="en-US" dirty="0"/>
+            <a:r>
+              <a:rPr lang="en-US" sz="1800" dirty="0">
+                <a:effectLst/>
+                <a:latin typeface="Calibri" panose="020F0502020204030204" pitchFamily="34" charset="0"/>
+                <a:ea typeface="Calibri" panose="020F0502020204030204" pitchFamily="34" charset="0"/>
+                <a:cs typeface="Times New Roman" panose="02020603050405020304" pitchFamily="18" charset="0"/>
+              </a:rPr>
+              <a:t>CVX appears to have normal distribution. A shorter box indicates a less dispersed distribution which aligns with our earlier calculation of CVX’s STD.</a:t>
+            </a:r>
+          </a:p>
+          <a:p>
+            <a:pPr marL="342900" marR="0" lvl="0" indent="-342900">
+              <a:spcBef>
+                <a:spcPts val="0"/>
+              </a:spcBef>
+              <a:spcAft>
+                <a:spcPts val="0"/>
+              </a:spcAft>
+              <a:buFont typeface="Symbol" panose="05050102010706020507" pitchFamily="18" charset="2"/>
+              <a:buChar char=""/>
+            </a:pPr>
+            <a:r>
+              <a:rPr lang="en-US" sz="1800" dirty="0">
+                <a:effectLst/>
+                <a:latin typeface="Calibri" panose="020F0502020204030204" pitchFamily="34" charset="0"/>
+                <a:ea typeface="Calibri" panose="020F0502020204030204" pitchFamily="34" charset="0"/>
+                <a:cs typeface="Times New Roman" panose="02020603050405020304" pitchFamily="18" charset="0"/>
+              </a:rPr>
+              <a:t>However</a:t>
+            </a:r>
+            <a:r>
+              <a:rPr lang="en-US" sz="1800" b="1" dirty="0">
+                <a:effectLst/>
+                <a:latin typeface="Calibri" panose="020F0502020204030204" pitchFamily="34" charset="0"/>
+                <a:ea typeface="Calibri" panose="020F0502020204030204" pitchFamily="34" charset="0"/>
+                <a:cs typeface="Times New Roman" panose="02020603050405020304" pitchFamily="18" charset="0"/>
+              </a:rPr>
+              <a:t>, NFLX has a positive skew and the longer box show greater degree of spread</a:t>
+            </a:r>
+            <a:r>
+              <a:rPr lang="en-US" sz="1800" dirty="0">
+                <a:effectLst/>
+                <a:latin typeface="Calibri" panose="020F0502020204030204" pitchFamily="34" charset="0"/>
+                <a:ea typeface="Calibri" panose="020F0502020204030204" pitchFamily="34" charset="0"/>
+                <a:cs typeface="Times New Roman" panose="02020603050405020304" pitchFamily="18" charset="0"/>
+              </a:rPr>
+              <a:t>.  This also aligns with our previous observations.</a:t>
+            </a:r>
           </a:p>
         </p:txBody>
       </p:sp>
@@ -1340,9 +1358,9 @@
           <a:bodyPr/>
           <a:lstStyle/>
           <a:p>
-            <a:fld id="{3C464D38-78EB-6A4F-BCA2-1B202E646C54}" type="slidenum">
+            <a:fld id="{5B0439F7-BA01-A541-95AE-C6E45E2F4003}" type="slidenum">
               <a:rPr lang="en-US" smtClean="0"/>
-              <a:t>15</a:t>
+              <a:t>16</a:t>
             </a:fld>
             <a:endParaRPr lang="en-US"/>
           </a:p>
@@ -1351,7 +1369,7 @@
     </p:spTree>
     <p:extLst>
       <p:ext uri="{BB962C8B-B14F-4D97-AF65-F5344CB8AC3E}">
-        <p14:creationId xmlns:p14="http://schemas.microsoft.com/office/powerpoint/2010/main" val="4258049016"/>
+        <p14:creationId xmlns:p14="http://schemas.microsoft.com/office/powerpoint/2010/main" val="763483845"/>
       </p:ext>
     </p:extLst>
   </p:cSld>
@@ -1405,7 +1423,14 @@
           <a:bodyPr/>
           <a:lstStyle/>
           <a:p>
-            <a:endParaRPr lang="en-US" dirty="0"/>
+            <a:pPr marL="171450" indent="-171450">
+              <a:buFont typeface="Arial" panose="020B0604020202020204" pitchFamily="34" charset="0"/>
+              <a:buChar char="•"/>
+            </a:pPr>
+            <a:r>
+              <a:rPr lang="en-US" dirty="0"/>
+              <a:t>Point out the fact that we imported 23 different CSV files into this analysis.  Each stock is a separate CSV file, the S&amp;P500, and the Texas &amp; US unemployment data.</a:t>
+            </a:r>
           </a:p>
         </p:txBody>
       </p:sp>
@@ -3068,7 +3093,32 @@
             <a:endParaRPr lang="en-US" dirty="0"/>
           </a:p>
           <a:p>
-            <a:endParaRPr lang="en-US" dirty="0"/>
+            <a:r>
+              <a:rPr lang="en-US" dirty="0"/>
+              <a:t>*** NEED TO DISCLAIM THAT LINEAR REGRESSION IS NOT A GOOD MODEL FOR TIME SERIES ***  </a:t>
+            </a:r>
+          </a:p>
+          <a:p>
+            <a:r>
+              <a:rPr lang="en-US" dirty="0"/>
+              <a:t>-The closing price today determines the closing price tomorrow, they are not independent variables, which you want in a Linear regression.</a:t>
+            </a:r>
+          </a:p>
+          <a:p>
+            <a:pPr algn="l"/>
+            <a:r>
+              <a:rPr lang="en-US" b="0" i="0" dirty="0">
+                <a:effectLst/>
+                <a:latin typeface="Arial" panose="020B0604020202020204" pitchFamily="34" charset="0"/>
+              </a:rPr>
+              <a:t>(A time series is a sequence of observations on a phenomenon taken at successive points in time.)</a:t>
+            </a:r>
+          </a:p>
+          <a:p>
+            <a:r>
+              <a:rPr lang="en-US" dirty="0"/>
+              <a:t>-We tried other variables to make a regression but ran out of time.</a:t>
+            </a:r>
           </a:p>
         </p:txBody>
       </p:sp>
@@ -7169,8 +7219,8 @@
         </p:blipFill>
         <p:spPr>
           <a:xfrm>
-            <a:off x="138429" y="201654"/>
-            <a:ext cx="8288407" cy="3627272"/>
+            <a:off x="51799" y="218129"/>
+            <a:ext cx="8233860" cy="3601202"/>
           </a:xfrm>
           <a:prstGeom prst="rect">
             <a:avLst/>
@@ -7230,7 +7280,7 @@
         </p:nvSpPr>
         <p:spPr>
           <a:xfrm rot="20195107">
-            <a:off x="743970" y="505759"/>
+            <a:off x="692635" y="479888"/>
             <a:ext cx="738231" cy="257077"/>
           </a:xfrm>
           <a:prstGeom prst="ellipse">
@@ -7750,7 +7800,7 @@
         </p:nvSpPr>
         <p:spPr>
           <a:xfrm rot="20195107">
-            <a:off x="3546025" y="1395610"/>
+            <a:off x="3519870" y="1361605"/>
             <a:ext cx="247806" cy="238094"/>
           </a:xfrm>
           <a:prstGeom prst="ellipse">
@@ -7802,7 +7852,7 @@
         </p:nvSpPr>
         <p:spPr>
           <a:xfrm rot="20195107">
-            <a:off x="3839145" y="1395610"/>
+            <a:off x="3827840" y="1360135"/>
             <a:ext cx="247806" cy="238094"/>
           </a:xfrm>
           <a:prstGeom prst="ellipse">
@@ -7854,7 +7904,7 @@
         </p:nvSpPr>
         <p:spPr>
           <a:xfrm rot="20195107">
-            <a:off x="4428217" y="1559500"/>
+            <a:off x="4426157" y="1525005"/>
             <a:ext cx="247806" cy="238094"/>
           </a:xfrm>
           <a:prstGeom prst="ellipse">
@@ -7906,7 +7956,7 @@
         </p:nvSpPr>
         <p:spPr>
           <a:xfrm rot="20195107">
-            <a:off x="5017289" y="1386995"/>
+            <a:off x="5029579" y="1362073"/>
             <a:ext cx="247806" cy="238094"/>
           </a:xfrm>
           <a:prstGeom prst="ellipse">
@@ -7958,7 +8008,7 @@
         </p:nvSpPr>
         <p:spPr>
           <a:xfrm rot="20195107">
-            <a:off x="5017288" y="2034343"/>
+            <a:off x="5026247" y="2011103"/>
             <a:ext cx="247806" cy="238094"/>
           </a:xfrm>
           <a:prstGeom prst="ellipse">
@@ -8010,7 +8060,7 @@
         </p:nvSpPr>
         <p:spPr>
           <a:xfrm rot="20195107">
-            <a:off x="5328540" y="1386993"/>
+            <a:off x="5328539" y="1364600"/>
             <a:ext cx="247806" cy="238094"/>
           </a:xfrm>
           <a:prstGeom prst="ellipse">
@@ -8062,7 +8112,7 @@
         </p:nvSpPr>
         <p:spPr>
           <a:xfrm rot="20195107">
-            <a:off x="5618291" y="1862276"/>
+            <a:off x="5631503" y="1852621"/>
             <a:ext cx="247806" cy="238094"/>
           </a:xfrm>
           <a:prstGeom prst="ellipse">
@@ -8114,7 +8164,7 @@
         </p:nvSpPr>
         <p:spPr>
           <a:xfrm rot="20195107">
-            <a:off x="6199257" y="1056630"/>
+            <a:off x="6235288" y="1043172"/>
             <a:ext cx="247806" cy="238094"/>
           </a:xfrm>
           <a:prstGeom prst="ellipse">
@@ -8166,59 +8216,7 @@
         </p:nvSpPr>
         <p:spPr>
           <a:xfrm rot="20195107">
-            <a:off x="6517066" y="1237129"/>
-            <a:ext cx="247806" cy="238094"/>
-          </a:xfrm>
-          <a:prstGeom prst="ellipse">
-            <a:avLst/>
-          </a:prstGeom>
-          <a:noFill/>
-          <a:ln w="28575">
-            <a:solidFill>
-              <a:srgbClr val="FFFF00"/>
-            </a:solidFill>
-          </a:ln>
-        </p:spPr>
-        <p:style>
-          <a:lnRef idx="2">
-            <a:schemeClr val="accent1">
-              <a:shade val="50000"/>
-            </a:schemeClr>
-          </a:lnRef>
-          <a:fillRef idx="1">
-            <a:schemeClr val="accent1"/>
-          </a:fillRef>
-          <a:effectRef idx="0">
-            <a:schemeClr val="accent1"/>
-          </a:effectRef>
-          <a:fontRef idx="minor">
-            <a:schemeClr val="lt1"/>
-          </a:fontRef>
-        </p:style>
-        <p:txBody>
-          <a:bodyPr rtlCol="0" anchor="ctr"/>
-          <a:lstStyle/>
-          <a:p>
-            <a:pPr algn="ctr"/>
-            <a:endParaRPr lang="en-US"/>
-          </a:p>
-        </p:txBody>
-      </p:sp>
-      <p:sp>
-        <p:nvSpPr>
-          <p:cNvPr id="71" name="Oval 70">
-            <a:extLst>
-              <a:ext uri="{FF2B5EF4-FFF2-40B4-BE49-F238E27FC236}">
-                <a16:creationId xmlns:a16="http://schemas.microsoft.com/office/drawing/2014/main" id="{B46F4F0A-D3D7-4527-9AA2-0D16CD39FE7C}"/>
-              </a:ext>
-            </a:extLst>
-          </p:cNvPr>
-          <p:cNvSpPr/>
-          <p:nvPr/>
-        </p:nvSpPr>
-        <p:spPr>
-          <a:xfrm rot="20195107">
-            <a:off x="2634107" y="1883712"/>
+            <a:off x="6551589" y="1214023"/>
             <a:ext cx="247806" cy="238094"/>
           </a:xfrm>
           <a:prstGeom prst="ellipse">
@@ -10349,361 +10347,6 @@
       </p:grpSpPr>
       <p:sp>
         <p:nvSpPr>
-          <p:cNvPr id="16" name="Rectangle 15">
-            <a:extLst>
-              <a:ext uri="{FF2B5EF4-FFF2-40B4-BE49-F238E27FC236}">
-                <a16:creationId xmlns:a16="http://schemas.microsoft.com/office/drawing/2014/main" id="{9AF5C66A-E8F2-4E13-98A3-FE96597C5A42}"/>
-              </a:ext>
-              <a:ext uri="{C183D7F6-B498-43B3-948B-1728B52AA6E4}">
-                <adec:decorative xmlns:adec="http://schemas.microsoft.com/office/drawing/2017/decorative" val="1"/>
-              </a:ext>
-            </a:extLst>
-          </p:cNvPr>
-          <p:cNvSpPr>
-            <a:spLocks noGrp="1" noRot="1" noChangeAspect="1" noMove="1" noResize="1" noEditPoints="1" noAdjustHandles="1" noChangeArrowheads="1" noChangeShapeType="1" noTextEdit="1"/>
-          </p:cNvSpPr>
-          <p:nvPr>
-            <p:extLst>
-              <p:ext uri="{386F3935-93C4-4BCD-93E2-E3B085C9AB24}">
-                <p16:designElem xmlns:p16="http://schemas.microsoft.com/office/powerpoint/2015/main" val="1"/>
-              </p:ext>
-            </p:extLst>
-          </p:nvPr>
-        </p:nvSpPr>
-        <p:spPr>
-          <a:xfrm>
-            <a:off x="355601" y="0"/>
-            <a:ext cx="11480494" cy="2753936"/>
-          </a:xfrm>
-          <a:prstGeom prst="rect">
-            <a:avLst/>
-          </a:prstGeom>
-          <a:gradFill>
-            <a:gsLst>
-              <a:gs pos="0">
-                <a:schemeClr val="accent1">
-                  <a:lumMod val="90000"/>
-                </a:schemeClr>
-              </a:gs>
-              <a:gs pos="25000">
-                <a:schemeClr val="accent1">
-                  <a:lumMod val="90000"/>
-                </a:schemeClr>
-              </a:gs>
-              <a:gs pos="94000">
-                <a:schemeClr val="bg2">
-                  <a:lumMod val="25000"/>
-                </a:schemeClr>
-              </a:gs>
-              <a:gs pos="100000">
-                <a:schemeClr val="bg2">
-                  <a:lumMod val="25000"/>
-                </a:schemeClr>
-              </a:gs>
-            </a:gsLst>
-            <a:lin ang="4200000" scaled="0"/>
-          </a:gradFill>
-          <a:ln>
-            <a:noFill/>
-          </a:ln>
-        </p:spPr>
-        <p:style>
-          <a:lnRef idx="2">
-            <a:schemeClr val="accent1">
-              <a:shade val="50000"/>
-            </a:schemeClr>
-          </a:lnRef>
-          <a:fillRef idx="1">
-            <a:schemeClr val="accent1"/>
-          </a:fillRef>
-          <a:effectRef idx="0">
-            <a:schemeClr val="accent1"/>
-          </a:effectRef>
-          <a:fontRef idx="minor">
-            <a:schemeClr val="lt1"/>
-          </a:fontRef>
-        </p:style>
-        <p:txBody>
-          <a:bodyPr rtlCol="0" anchor="ctr"/>
-          <a:lstStyle/>
-          <a:p>
-            <a:pPr marL="0" marR="0" lvl="0" indent="0" algn="ctr" defTabSz="914400" rtl="0" eaLnBrk="1" fontAlgn="auto" latinLnBrk="0" hangingPunct="1">
-              <a:lnSpc>
-                <a:spcPct val="100000"/>
-              </a:lnSpc>
-              <a:spcBef>
-                <a:spcPts val="0"/>
-              </a:spcBef>
-              <a:spcAft>
-                <a:spcPts val="0"/>
-              </a:spcAft>
-              <a:buClrTx/>
-              <a:buSzTx/>
-              <a:buFontTx/>
-              <a:buNone/>
-              <a:tabLst/>
-              <a:defRPr/>
-            </a:pPr>
-            <a:endParaRPr kumimoji="0" lang="en-US" sz="1800" b="0" i="0" u="none" strike="noStrike" kern="1200" cap="none" spc="0" normalizeH="0" baseline="0" noProof="0">
-              <a:ln>
-                <a:noFill/>
-              </a:ln>
-              <a:solidFill>
-                <a:prstClr val="white"/>
-              </a:solidFill>
-              <a:effectLst/>
-              <a:uLnTx/>
-              <a:uFillTx/>
-              <a:latin typeface="Calibri" panose="020F0502020204030204"/>
-              <a:ea typeface="+mn-ea"/>
-              <a:cs typeface="+mn-cs"/>
-            </a:endParaRPr>
-          </a:p>
-        </p:txBody>
-      </p:sp>
-      <p:pic>
-        <p:nvPicPr>
-          <p:cNvPr id="18" name="Picture 17">
-            <a:extLst>
-              <a:ext uri="{FF2B5EF4-FFF2-40B4-BE49-F238E27FC236}">
-                <a16:creationId xmlns:a16="http://schemas.microsoft.com/office/drawing/2014/main" id="{AC860275-E106-493A-8BF0-E0A91130EF6A}"/>
-              </a:ext>
-              <a:ext uri="{C183D7F6-B498-43B3-948B-1728B52AA6E4}">
-                <adec:decorative xmlns:adec="http://schemas.microsoft.com/office/drawing/2017/decorative" val="1"/>
-              </a:ext>
-            </a:extLst>
-          </p:cNvPr>
-          <p:cNvPicPr>
-            <a:picLocks noGrp="1" noRot="1" noChangeAspect="1" noMove="1" noResize="1" noEditPoints="1" noAdjustHandles="1" noChangeArrowheads="1" noChangeShapeType="1" noCrop="1"/>
-          </p:cNvPicPr>
-          <p:nvPr>
-            <p:extLst>
-              <p:ext uri="{386F3935-93C4-4BCD-93E2-E3B085C9AB24}">
-                <p16:designElem xmlns:p16="http://schemas.microsoft.com/office/powerpoint/2015/main" val="1"/>
-              </p:ext>
-            </p:extLst>
-          </p:nvPr>
-        </p:nvPicPr>
-        <p:blipFill>
-          <a:blip r:embed="rId3">
-            <a:extLst>
-              <a:ext uri="{28A0092B-C50C-407E-A947-70E740481C1C}">
-                <a14:useLocalDpi xmlns:a14="http://schemas.microsoft.com/office/drawing/2010/main" val="0"/>
-              </a:ext>
-            </a:extLst>
-          </a:blip>
-          <a:stretch>
-            <a:fillRect/>
-          </a:stretch>
-        </p:blipFill>
-        <p:spPr>
-          <a:xfrm>
-            <a:off x="0" y="0"/>
-            <a:ext cx="12192000" cy="6858000"/>
-          </a:xfrm>
-          <a:prstGeom prst="rect">
-            <a:avLst/>
-          </a:prstGeom>
-        </p:spPr>
-      </p:pic>
-      <p:sp>
-        <p:nvSpPr>
-          <p:cNvPr id="2" name="Title 1">
-            <a:extLst>
-              <a:ext uri="{FF2B5EF4-FFF2-40B4-BE49-F238E27FC236}">
-                <a16:creationId xmlns:a16="http://schemas.microsoft.com/office/drawing/2014/main" id="{3FD6EF63-5EA2-4B42-B846-53D4341777AB}"/>
-              </a:ext>
-            </a:extLst>
-          </p:cNvPr>
-          <p:cNvSpPr>
-            <a:spLocks noGrp="1"/>
-          </p:cNvSpPr>
-          <p:nvPr>
-            <p:ph type="title"/>
-          </p:nvPr>
-        </p:nvSpPr>
-        <p:spPr>
-          <a:xfrm>
-            <a:off x="1179576" y="822960"/>
-            <a:ext cx="9829800" cy="1325880"/>
-          </a:xfrm>
-        </p:spPr>
-        <p:txBody>
-          <a:bodyPr>
-            <a:normAutofit/>
-          </a:bodyPr>
-          <a:lstStyle/>
-          <a:p>
-            <a:pPr algn="ctr"/>
-            <a:r>
-              <a:rPr lang="en-US" sz="4000" dirty="0">
-                <a:solidFill>
-                  <a:srgbClr val="FFFFFF"/>
-                </a:solidFill>
-              </a:rPr>
-              <a:t>Data Integrity of the 2 Assets </a:t>
-            </a:r>
-          </a:p>
-        </p:txBody>
-      </p:sp>
-      <p:pic>
-        <p:nvPicPr>
-          <p:cNvPr id="4" name="Picture 3">
-            <a:extLst>
-              <a:ext uri="{FF2B5EF4-FFF2-40B4-BE49-F238E27FC236}">
-                <a16:creationId xmlns:a16="http://schemas.microsoft.com/office/drawing/2014/main" id="{D179DBDA-B792-0849-8AED-E88AAD05E678}"/>
-              </a:ext>
-            </a:extLst>
-          </p:cNvPr>
-          <p:cNvPicPr>
-            <a:picLocks noChangeAspect="1"/>
-          </p:cNvPicPr>
-          <p:nvPr/>
-        </p:nvPicPr>
-        <p:blipFill rotWithShape="1">
-          <a:blip r:embed="rId4">
-            <a:extLst>
-              <a:ext uri="{28A0092B-C50C-407E-A947-70E740481C1C}">
-                <a14:useLocalDpi xmlns:a14="http://schemas.microsoft.com/office/drawing/2010/main" val="0"/>
-              </a:ext>
-            </a:extLst>
-          </a:blip>
-          <a:srcRect l="6875" t="6546" r="8576" b="7459"/>
-          <a:stretch/>
-        </p:blipFill>
-        <p:spPr>
-          <a:xfrm>
-            <a:off x="797170" y="2753936"/>
-            <a:ext cx="6481124" cy="3795145"/>
-          </a:xfrm>
-          <a:prstGeom prst="rect">
-            <a:avLst/>
-          </a:prstGeom>
-        </p:spPr>
-      </p:pic>
-      <p:sp>
-        <p:nvSpPr>
-          <p:cNvPr id="6" name="Content Placeholder 5">
-            <a:extLst>
-              <a:ext uri="{FF2B5EF4-FFF2-40B4-BE49-F238E27FC236}">
-                <a16:creationId xmlns:a16="http://schemas.microsoft.com/office/drawing/2014/main" id="{6DEA3C7F-4EA8-5249-BB6B-09DE0AD89996}"/>
-              </a:ext>
-            </a:extLst>
-          </p:cNvPr>
-          <p:cNvSpPr>
-            <a:spLocks noGrp="1"/>
-          </p:cNvSpPr>
-          <p:nvPr>
-            <p:ph idx="1"/>
-          </p:nvPr>
-        </p:nvSpPr>
-        <p:spPr>
-          <a:xfrm>
-            <a:off x="7365248" y="3048000"/>
-            <a:ext cx="4029582" cy="3689517"/>
-          </a:xfrm>
-        </p:spPr>
-        <p:txBody>
-          <a:bodyPr anchor="ctr">
-            <a:normAutofit/>
-          </a:bodyPr>
-          <a:lstStyle/>
-          <a:p>
-            <a:r>
-              <a:rPr lang="en-US" sz="1900" dirty="0">
-                <a:solidFill>
-                  <a:srgbClr val="000000"/>
-                </a:solidFill>
-              </a:rPr>
-              <a:t>The box plot lends some credence to the Jan 2020 price of NFLX with all prices &gt;120 as outliers </a:t>
-            </a:r>
-          </a:p>
-          <a:p>
-            <a:r>
-              <a:rPr lang="en-US" sz="1900" dirty="0">
-                <a:solidFill>
-                  <a:srgbClr val="000000"/>
-                </a:solidFill>
-              </a:rPr>
-              <a:t>50% of your data is in the box.</a:t>
-            </a:r>
-          </a:p>
-          <a:p>
-            <a:r>
-              <a:rPr lang="en-US" sz="1900" dirty="0">
-                <a:solidFill>
-                  <a:srgbClr val="000000"/>
-                </a:solidFill>
-              </a:rPr>
-              <a:t>Orange line represents the median.</a:t>
-            </a:r>
-          </a:p>
-          <a:p>
-            <a:r>
-              <a:rPr lang="en-US" sz="1900" dirty="0">
-                <a:solidFill>
-                  <a:srgbClr val="000000"/>
-                </a:solidFill>
-              </a:rPr>
-              <a:t>The narrower the box the closer the majority of data is to the median.</a:t>
-            </a:r>
-          </a:p>
-          <a:p>
-            <a:endParaRPr lang="en-US" sz="1900" dirty="0">
-              <a:solidFill>
-                <a:srgbClr val="000000"/>
-              </a:solidFill>
-            </a:endParaRPr>
-          </a:p>
-          <a:p>
-            <a:endParaRPr lang="en-US" sz="1900" dirty="0">
-              <a:solidFill>
-                <a:srgbClr val="000000"/>
-              </a:solidFill>
-            </a:endParaRPr>
-          </a:p>
-        </p:txBody>
-      </p:sp>
-    </p:spTree>
-    <p:extLst>
-      <p:ext uri="{BB962C8B-B14F-4D97-AF65-F5344CB8AC3E}">
-        <p14:creationId xmlns:p14="http://schemas.microsoft.com/office/powerpoint/2010/main" val="2896706760"/>
-      </p:ext>
-    </p:extLst>
-  </p:cSld>
-  <p:clrMapOvr>
-    <a:masterClrMapping/>
-  </p:clrMapOvr>
-</p:sld>
-</file>
-
-<file path=ppt/slides/slide14.xml><?xml version="1.0" encoding="utf-8"?>
-<p:sld xmlns:a="http://schemas.openxmlformats.org/drawingml/2006/main" xmlns:r="http://schemas.openxmlformats.org/officeDocument/2006/relationships" xmlns:p="http://schemas.openxmlformats.org/presentationml/2006/main">
-  <p:cSld>
-    <p:bg>
-      <p:bgPr>
-        <a:solidFill>
-          <a:schemeClr val="bg1"/>
-        </a:solidFill>
-        <a:effectLst/>
-      </p:bgPr>
-    </p:bg>
-    <p:spTree>
-      <p:nvGrpSpPr>
-        <p:cNvPr id="1" name=""/>
-        <p:cNvGrpSpPr/>
-        <p:nvPr/>
-      </p:nvGrpSpPr>
-      <p:grpSpPr>
-        <a:xfrm>
-          <a:off x="0" y="0"/>
-          <a:ext cx="0" cy="0"/>
-          <a:chOff x="0" y="0"/>
-          <a:chExt cx="0" cy="0"/>
-        </a:xfrm>
-      </p:grpSpPr>
-      <p:sp>
-        <p:nvSpPr>
           <p:cNvPr id="8" name="Rectangle 7">
             <a:extLst>
               <a:ext uri="{FF2B5EF4-FFF2-40B4-BE49-F238E27FC236}">
@@ -11277,7 +10920,7 @@
 </p:sld>
 </file>
 
-<file path=ppt/slides/slide15.xml><?xml version="1.0" encoding="utf-8"?>
+<file path=ppt/slides/slide14.xml><?xml version="1.0" encoding="utf-8"?>
 <p:sld xmlns:a="http://schemas.openxmlformats.org/drawingml/2006/main" xmlns:r="http://schemas.openxmlformats.org/officeDocument/2006/relationships" xmlns:p="http://schemas.openxmlformats.org/presentationml/2006/main">
   <p:cSld>
     <p:bg>
@@ -11918,7 +11561,7 @@
 </p:sld>
 </file>
 
-<file path=ppt/slides/slide16.xml><?xml version="1.0" encoding="utf-8"?>
+<file path=ppt/slides/slide15.xml><?xml version="1.0" encoding="utf-8"?>
 <p:sld xmlns:a="http://schemas.openxmlformats.org/drawingml/2006/main" xmlns:r="http://schemas.openxmlformats.org/officeDocument/2006/relationships" xmlns:p="http://schemas.openxmlformats.org/presentationml/2006/main">
   <p:cSld>
     <p:bg>
@@ -12385,6 +12028,361 @@
 </p:sld>
 </file>
 
+<file path=ppt/slides/slide16.xml><?xml version="1.0" encoding="utf-8"?>
+<p:sld xmlns:a="http://schemas.openxmlformats.org/drawingml/2006/main" xmlns:r="http://schemas.openxmlformats.org/officeDocument/2006/relationships" xmlns:p="http://schemas.openxmlformats.org/presentationml/2006/main">
+  <p:cSld>
+    <p:bg>
+      <p:bgPr>
+        <a:solidFill>
+          <a:schemeClr val="bg1"/>
+        </a:solidFill>
+        <a:effectLst/>
+      </p:bgPr>
+    </p:bg>
+    <p:spTree>
+      <p:nvGrpSpPr>
+        <p:cNvPr id="1" name=""/>
+        <p:cNvGrpSpPr/>
+        <p:nvPr/>
+      </p:nvGrpSpPr>
+      <p:grpSpPr>
+        <a:xfrm>
+          <a:off x="0" y="0"/>
+          <a:ext cx="0" cy="0"/>
+          <a:chOff x="0" y="0"/>
+          <a:chExt cx="0" cy="0"/>
+        </a:xfrm>
+      </p:grpSpPr>
+      <p:sp>
+        <p:nvSpPr>
+          <p:cNvPr id="16" name="Rectangle 15">
+            <a:extLst>
+              <a:ext uri="{FF2B5EF4-FFF2-40B4-BE49-F238E27FC236}">
+                <a16:creationId xmlns:a16="http://schemas.microsoft.com/office/drawing/2014/main" id="{9AF5C66A-E8F2-4E13-98A3-FE96597C5A42}"/>
+              </a:ext>
+              <a:ext uri="{C183D7F6-B498-43B3-948B-1728B52AA6E4}">
+                <adec:decorative xmlns:adec="http://schemas.microsoft.com/office/drawing/2017/decorative" val="1"/>
+              </a:ext>
+            </a:extLst>
+          </p:cNvPr>
+          <p:cNvSpPr>
+            <a:spLocks noGrp="1" noRot="1" noChangeAspect="1" noMove="1" noResize="1" noEditPoints="1" noAdjustHandles="1" noChangeArrowheads="1" noChangeShapeType="1" noTextEdit="1"/>
+          </p:cNvSpPr>
+          <p:nvPr>
+            <p:extLst>
+              <p:ext uri="{386F3935-93C4-4BCD-93E2-E3B085C9AB24}">
+                <p16:designElem xmlns:p16="http://schemas.microsoft.com/office/powerpoint/2015/main" val="1"/>
+              </p:ext>
+            </p:extLst>
+          </p:nvPr>
+        </p:nvSpPr>
+        <p:spPr>
+          <a:xfrm>
+            <a:off x="355601" y="0"/>
+            <a:ext cx="11480494" cy="2753936"/>
+          </a:xfrm>
+          <a:prstGeom prst="rect">
+            <a:avLst/>
+          </a:prstGeom>
+          <a:gradFill>
+            <a:gsLst>
+              <a:gs pos="0">
+                <a:schemeClr val="accent1">
+                  <a:lumMod val="90000"/>
+                </a:schemeClr>
+              </a:gs>
+              <a:gs pos="25000">
+                <a:schemeClr val="accent1">
+                  <a:lumMod val="90000"/>
+                </a:schemeClr>
+              </a:gs>
+              <a:gs pos="94000">
+                <a:schemeClr val="bg2">
+                  <a:lumMod val="25000"/>
+                </a:schemeClr>
+              </a:gs>
+              <a:gs pos="100000">
+                <a:schemeClr val="bg2">
+                  <a:lumMod val="25000"/>
+                </a:schemeClr>
+              </a:gs>
+            </a:gsLst>
+            <a:lin ang="4200000" scaled="0"/>
+          </a:gradFill>
+          <a:ln>
+            <a:noFill/>
+          </a:ln>
+        </p:spPr>
+        <p:style>
+          <a:lnRef idx="2">
+            <a:schemeClr val="accent1">
+              <a:shade val="50000"/>
+            </a:schemeClr>
+          </a:lnRef>
+          <a:fillRef idx="1">
+            <a:schemeClr val="accent1"/>
+          </a:fillRef>
+          <a:effectRef idx="0">
+            <a:schemeClr val="accent1"/>
+          </a:effectRef>
+          <a:fontRef idx="minor">
+            <a:schemeClr val="lt1"/>
+          </a:fontRef>
+        </p:style>
+        <p:txBody>
+          <a:bodyPr rtlCol="0" anchor="ctr"/>
+          <a:lstStyle/>
+          <a:p>
+            <a:pPr marL="0" marR="0" lvl="0" indent="0" algn="ctr" defTabSz="914400" rtl="0" eaLnBrk="1" fontAlgn="auto" latinLnBrk="0" hangingPunct="1">
+              <a:lnSpc>
+                <a:spcPct val="100000"/>
+              </a:lnSpc>
+              <a:spcBef>
+                <a:spcPts val="0"/>
+              </a:spcBef>
+              <a:spcAft>
+                <a:spcPts val="0"/>
+              </a:spcAft>
+              <a:buClrTx/>
+              <a:buSzTx/>
+              <a:buFontTx/>
+              <a:buNone/>
+              <a:tabLst/>
+              <a:defRPr/>
+            </a:pPr>
+            <a:endParaRPr kumimoji="0" lang="en-US" sz="1800" b="0" i="0" u="none" strike="noStrike" kern="1200" cap="none" spc="0" normalizeH="0" baseline="0" noProof="0">
+              <a:ln>
+                <a:noFill/>
+              </a:ln>
+              <a:solidFill>
+                <a:prstClr val="white"/>
+              </a:solidFill>
+              <a:effectLst/>
+              <a:uLnTx/>
+              <a:uFillTx/>
+              <a:latin typeface="Calibri" panose="020F0502020204030204"/>
+              <a:ea typeface="+mn-ea"/>
+              <a:cs typeface="+mn-cs"/>
+            </a:endParaRPr>
+          </a:p>
+        </p:txBody>
+      </p:sp>
+      <p:pic>
+        <p:nvPicPr>
+          <p:cNvPr id="18" name="Picture 17">
+            <a:extLst>
+              <a:ext uri="{FF2B5EF4-FFF2-40B4-BE49-F238E27FC236}">
+                <a16:creationId xmlns:a16="http://schemas.microsoft.com/office/drawing/2014/main" id="{AC860275-E106-493A-8BF0-E0A91130EF6A}"/>
+              </a:ext>
+              <a:ext uri="{C183D7F6-B498-43B3-948B-1728B52AA6E4}">
+                <adec:decorative xmlns:adec="http://schemas.microsoft.com/office/drawing/2017/decorative" val="1"/>
+              </a:ext>
+            </a:extLst>
+          </p:cNvPr>
+          <p:cNvPicPr>
+            <a:picLocks noGrp="1" noRot="1" noChangeAspect="1" noMove="1" noResize="1" noEditPoints="1" noAdjustHandles="1" noChangeArrowheads="1" noChangeShapeType="1" noCrop="1"/>
+          </p:cNvPicPr>
+          <p:nvPr>
+            <p:extLst>
+              <p:ext uri="{386F3935-93C4-4BCD-93E2-E3B085C9AB24}">
+                <p16:designElem xmlns:p16="http://schemas.microsoft.com/office/powerpoint/2015/main" val="1"/>
+              </p:ext>
+            </p:extLst>
+          </p:nvPr>
+        </p:nvPicPr>
+        <p:blipFill>
+          <a:blip r:embed="rId3">
+            <a:extLst>
+              <a:ext uri="{28A0092B-C50C-407E-A947-70E740481C1C}">
+                <a14:useLocalDpi xmlns:a14="http://schemas.microsoft.com/office/drawing/2010/main" val="0"/>
+              </a:ext>
+            </a:extLst>
+          </a:blip>
+          <a:stretch>
+            <a:fillRect/>
+          </a:stretch>
+        </p:blipFill>
+        <p:spPr>
+          <a:xfrm>
+            <a:off x="0" y="0"/>
+            <a:ext cx="12192000" cy="6858000"/>
+          </a:xfrm>
+          <a:prstGeom prst="rect">
+            <a:avLst/>
+          </a:prstGeom>
+        </p:spPr>
+      </p:pic>
+      <p:sp>
+        <p:nvSpPr>
+          <p:cNvPr id="2" name="Title 1">
+            <a:extLst>
+              <a:ext uri="{FF2B5EF4-FFF2-40B4-BE49-F238E27FC236}">
+                <a16:creationId xmlns:a16="http://schemas.microsoft.com/office/drawing/2014/main" id="{3FD6EF63-5EA2-4B42-B846-53D4341777AB}"/>
+              </a:ext>
+            </a:extLst>
+          </p:cNvPr>
+          <p:cNvSpPr>
+            <a:spLocks noGrp="1"/>
+          </p:cNvSpPr>
+          <p:nvPr>
+            <p:ph type="title"/>
+          </p:nvPr>
+        </p:nvSpPr>
+        <p:spPr>
+          <a:xfrm>
+            <a:off x="1179576" y="822960"/>
+            <a:ext cx="9829800" cy="1325880"/>
+          </a:xfrm>
+        </p:spPr>
+        <p:txBody>
+          <a:bodyPr>
+            <a:normAutofit/>
+          </a:bodyPr>
+          <a:lstStyle/>
+          <a:p>
+            <a:pPr algn="ctr"/>
+            <a:r>
+              <a:rPr lang="en-US" sz="4000" dirty="0">
+                <a:solidFill>
+                  <a:srgbClr val="FFFFFF"/>
+                </a:solidFill>
+              </a:rPr>
+              <a:t>Data Integrity of the 2 Assets </a:t>
+            </a:r>
+          </a:p>
+        </p:txBody>
+      </p:sp>
+      <p:pic>
+        <p:nvPicPr>
+          <p:cNvPr id="4" name="Picture 3">
+            <a:extLst>
+              <a:ext uri="{FF2B5EF4-FFF2-40B4-BE49-F238E27FC236}">
+                <a16:creationId xmlns:a16="http://schemas.microsoft.com/office/drawing/2014/main" id="{D179DBDA-B792-0849-8AED-E88AAD05E678}"/>
+              </a:ext>
+            </a:extLst>
+          </p:cNvPr>
+          <p:cNvPicPr>
+            <a:picLocks noChangeAspect="1"/>
+          </p:cNvPicPr>
+          <p:nvPr/>
+        </p:nvPicPr>
+        <p:blipFill rotWithShape="1">
+          <a:blip r:embed="rId4">
+            <a:extLst>
+              <a:ext uri="{28A0092B-C50C-407E-A947-70E740481C1C}">
+                <a14:useLocalDpi xmlns:a14="http://schemas.microsoft.com/office/drawing/2010/main" val="0"/>
+              </a:ext>
+            </a:extLst>
+          </a:blip>
+          <a:srcRect l="6875" t="6546" r="8576" b="7459"/>
+          <a:stretch/>
+        </p:blipFill>
+        <p:spPr>
+          <a:xfrm>
+            <a:off x="797170" y="2753936"/>
+            <a:ext cx="6481124" cy="3795145"/>
+          </a:xfrm>
+          <a:prstGeom prst="rect">
+            <a:avLst/>
+          </a:prstGeom>
+        </p:spPr>
+      </p:pic>
+      <p:sp>
+        <p:nvSpPr>
+          <p:cNvPr id="6" name="Content Placeholder 5">
+            <a:extLst>
+              <a:ext uri="{FF2B5EF4-FFF2-40B4-BE49-F238E27FC236}">
+                <a16:creationId xmlns:a16="http://schemas.microsoft.com/office/drawing/2014/main" id="{6DEA3C7F-4EA8-5249-BB6B-09DE0AD89996}"/>
+              </a:ext>
+            </a:extLst>
+          </p:cNvPr>
+          <p:cNvSpPr>
+            <a:spLocks noGrp="1"/>
+          </p:cNvSpPr>
+          <p:nvPr>
+            <p:ph idx="1"/>
+          </p:nvPr>
+        </p:nvSpPr>
+        <p:spPr>
+          <a:xfrm>
+            <a:off x="7365248" y="3048000"/>
+            <a:ext cx="4029582" cy="3689517"/>
+          </a:xfrm>
+        </p:spPr>
+        <p:txBody>
+          <a:bodyPr anchor="ctr">
+            <a:normAutofit/>
+          </a:bodyPr>
+          <a:lstStyle/>
+          <a:p>
+            <a:r>
+              <a:rPr lang="en-US" sz="1900" dirty="0">
+                <a:solidFill>
+                  <a:srgbClr val="000000"/>
+                </a:solidFill>
+              </a:rPr>
+              <a:t>The box plot lends some credence to the Jan 2020 price of NFLX with all prices &gt;120 as outliers </a:t>
+            </a:r>
+          </a:p>
+          <a:p>
+            <a:r>
+              <a:rPr lang="en-US" sz="1900" dirty="0">
+                <a:solidFill>
+                  <a:srgbClr val="000000"/>
+                </a:solidFill>
+              </a:rPr>
+              <a:t>50% of your data is in the box.</a:t>
+            </a:r>
+          </a:p>
+          <a:p>
+            <a:r>
+              <a:rPr lang="en-US" sz="1900" dirty="0">
+                <a:solidFill>
+                  <a:srgbClr val="000000"/>
+                </a:solidFill>
+              </a:rPr>
+              <a:t>Orange line represents the median.</a:t>
+            </a:r>
+          </a:p>
+          <a:p>
+            <a:r>
+              <a:rPr lang="en-US" sz="1900" dirty="0">
+                <a:solidFill>
+                  <a:srgbClr val="000000"/>
+                </a:solidFill>
+              </a:rPr>
+              <a:t>The narrower the box the closer the majority of data is to the median.</a:t>
+            </a:r>
+          </a:p>
+          <a:p>
+            <a:endParaRPr lang="en-US" sz="1900" dirty="0">
+              <a:solidFill>
+                <a:srgbClr val="000000"/>
+              </a:solidFill>
+            </a:endParaRPr>
+          </a:p>
+          <a:p>
+            <a:endParaRPr lang="en-US" sz="1900" dirty="0">
+              <a:solidFill>
+                <a:srgbClr val="000000"/>
+              </a:solidFill>
+            </a:endParaRPr>
+          </a:p>
+        </p:txBody>
+      </p:sp>
+    </p:spTree>
+    <p:extLst>
+      <p:ext uri="{BB962C8B-B14F-4D97-AF65-F5344CB8AC3E}">
+        <p14:creationId xmlns:p14="http://schemas.microsoft.com/office/powerpoint/2010/main" val="2896706760"/>
+      </p:ext>
+    </p:extLst>
+  </p:cSld>
+  <p:clrMapOvr>
+    <a:masterClrMapping/>
+  </p:clrMapOvr>
+</p:sld>
+</file>
+
 <file path=ppt/slides/slide2.xml><?xml version="1.0" encoding="utf-8"?>
 <p:sld xmlns:a="http://schemas.openxmlformats.org/drawingml/2006/main" xmlns:r="http://schemas.openxmlformats.org/officeDocument/2006/relationships" xmlns:p="http://schemas.openxmlformats.org/presentationml/2006/main">
   <p:cSld>
@@ -12685,7 +12683,7 @@
                   <a:srgbClr val="000000"/>
                 </a:solidFill>
               </a:rPr>
-              <a:t>To analyze the performance of 20 large-cap US companies that are leaders in their respective industry sector over a period of 10 years (2010 to 2019) alongside the S&amp;P 500.  </a:t>
+              <a:t>To analyze the performance of 20 large-cap US companies that are leaders in their respective industry sectors over a period of 10 years (2010 to 2019) alongside the S&amp;P 500.  </a:t>
             </a:r>
           </a:p>
           <a:p>
@@ -13040,21 +13038,11 @@
               </a:rPr>
               <a:t>Assets Included in the Analysis:</a:t>
             </a:r>
-            <a:br>
-              <a:rPr lang="en-US" dirty="0">
-                <a:solidFill>
-                  <a:srgbClr val="FFFFFF"/>
-                </a:solidFill>
-              </a:rPr>
-            </a:br>
-            <a:r>
-              <a:rPr lang="en-US" b="1" dirty="0">
-                <a:solidFill>
-                  <a:srgbClr val="FFFFFF"/>
-                </a:solidFill>
-              </a:rPr>
-              <a:t>S&amp;P500 (^GSPC)</a:t>
-            </a:r>
+            <a:endParaRPr lang="en-US" b="1" dirty="0">
+              <a:solidFill>
+                <a:srgbClr val="FFFFFF"/>
+              </a:solidFill>
+            </a:endParaRPr>
           </a:p>
         </p:txBody>
       </p:sp>
@@ -13136,14 +13124,14 @@
           <p:nvPr>
             <p:extLst>
               <p:ext uri="{D42A27DB-BD31-4B8C-83A1-F6EECF244321}">
-                <p14:modId xmlns:p14="http://schemas.microsoft.com/office/powerpoint/2010/main" val="1260709105"/>
+                <p14:modId xmlns:p14="http://schemas.microsoft.com/office/powerpoint/2010/main" val="1003553637"/>
               </p:ext>
             </p:extLst>
           </p:nvPr>
         </p:nvGraphicFramePr>
         <p:xfrm>
           <a:off x="2311568" y="2390514"/>
-          <a:ext cx="7565605" cy="4010286"/>
+          <a:ext cx="7565605" cy="4353579"/>
         </p:xfrm>
         <a:graphic>
           <a:graphicData uri="http://schemas.openxmlformats.org/drawingml/2006/table">
@@ -13152,14 +13140,14 @@
                 <a:tableStyleId>{5C22544A-7EE6-4342-B048-85BDC9FD1C3A}</a:tableStyleId>
               </a:tblPr>
               <a:tblGrid>
-                <a:gridCol w="2514411">
+                <a:gridCol w="2518340">
                   <a:extLst>
                     <a:ext uri="{9D8B030D-6E8A-4147-A177-3AD203B41FA5}">
                       <a16:colId xmlns:a16="http://schemas.microsoft.com/office/drawing/2014/main" val="4158976773"/>
                     </a:ext>
                   </a:extLst>
                 </a:gridCol>
-                <a:gridCol w="2637447">
+                <a:gridCol w="2633518">
                   <a:extLst>
                     <a:ext uri="{9D8B030D-6E8A-4147-A177-3AD203B41FA5}">
                       <a16:colId xmlns:a16="http://schemas.microsoft.com/office/drawing/2014/main" val="2406677304"/>
@@ -13226,6 +13214,47 @@
                     <a:bodyPr/>
                     <a:lstStyle/>
                     <a:p>
+                      <a:endParaRPr lang="en-US" sz="1600" dirty="0"/>
+                    </a:p>
+                  </a:txBody>
+                  <a:tcPr marL="52741" marR="52741" marT="26370" marB="26370"/>
+                </a:tc>
+                <a:tc>
+                  <a:txBody>
+                    <a:bodyPr/>
+                    <a:lstStyle/>
+                    <a:p>
+                      <a:pPr algn="l"/>
+                      <a:r>
+                        <a:rPr lang="en-US" sz="1600" dirty="0"/>
+                        <a:t>S&amp;P500 (^GSPC)</a:t>
+                      </a:r>
+                    </a:p>
+                  </a:txBody>
+                  <a:tcPr marL="52741" marR="52741" marT="26370" marB="26370"/>
+                </a:tc>
+                <a:tc>
+                  <a:txBody>
+                    <a:bodyPr/>
+                    <a:lstStyle/>
+                    <a:p>
+                      <a:endParaRPr lang="en-US" sz="1600" dirty="0"/>
+                    </a:p>
+                  </a:txBody>
+                  <a:tcPr marL="52741" marR="52741" marT="26370" marB="26370"/>
+                </a:tc>
+                <a:extLst>
+                  <a:ext uri="{0D108BD9-81ED-4DB2-BD59-A6C34878D82A}">
+                    <a16:rowId xmlns:a16="http://schemas.microsoft.com/office/drawing/2014/main" val="4113138329"/>
+                  </a:ext>
+                </a:extLst>
+              </a:tr>
+              <a:tr h="343293">
+                <a:tc>
+                  <a:txBody>
+                    <a:bodyPr/>
+                    <a:lstStyle/>
+                    <a:p>
                       <a:pPr marL="0" marR="0" lvl="0" indent="0" algn="l" defTabSz="914400" rtl="0" eaLnBrk="1" fontAlgn="auto" latinLnBrk="0" hangingPunct="1">
                         <a:lnSpc>
                           <a:spcPct val="100000"/>
@@ -13244,7 +13273,7 @@
                         <a:defRPr/>
                       </a:pPr>
                       <a:r>
-                        <a:rPr lang="en-US" sz="1600"/>
+                        <a:rPr lang="en-US" sz="1600" dirty="0"/>
                         <a:t>Banks</a:t>
                       </a:r>
                     </a:p>
@@ -13964,7 +13993,7 @@
                         <a:defRPr/>
                       </a:pPr>
                       <a:r>
-                        <a:rPr lang="en-US" sz="1600"/>
+                        <a:rPr lang="en-US" sz="1600" dirty="0"/>
                         <a:t>Hypermarkets and Super Centers</a:t>
                       </a:r>
                     </a:p>
@@ -15538,6 +15567,60 @@
           </a:prstGeom>
         </p:spPr>
       </p:pic>
+      <p:sp>
+        <p:nvSpPr>
+          <p:cNvPr id="4" name="Rectangle 3">
+            <a:extLst>
+              <a:ext uri="{FF2B5EF4-FFF2-40B4-BE49-F238E27FC236}">
+                <a16:creationId xmlns:a16="http://schemas.microsoft.com/office/drawing/2014/main" id="{35565F3F-181D-4B4C-8E39-FB637D79ED05}"/>
+              </a:ext>
+            </a:extLst>
+          </p:cNvPr>
+          <p:cNvSpPr/>
+          <p:nvPr/>
+        </p:nvSpPr>
+        <p:spPr>
+          <a:xfrm>
+            <a:off x="7320763" y="3889959"/>
+            <a:ext cx="136552" cy="206490"/>
+          </a:xfrm>
+          <a:prstGeom prst="rect">
+            <a:avLst/>
+          </a:prstGeom>
+          <a:solidFill>
+            <a:schemeClr val="bg1"/>
+          </a:solidFill>
+          <a:ln>
+            <a:solidFill>
+              <a:schemeClr val="bg1"/>
+            </a:solidFill>
+          </a:ln>
+        </p:spPr>
+        <p:style>
+          <a:lnRef idx="2">
+            <a:schemeClr val="accent1">
+              <a:shade val="50000"/>
+            </a:schemeClr>
+          </a:lnRef>
+          <a:fillRef idx="1">
+            <a:schemeClr val="accent1"/>
+          </a:fillRef>
+          <a:effectRef idx="0">
+            <a:schemeClr val="accent1"/>
+          </a:effectRef>
+          <a:fontRef idx="minor">
+            <a:schemeClr val="lt1"/>
+          </a:fontRef>
+        </p:style>
+        <p:txBody>
+          <a:bodyPr rtlCol="0" anchor="ctr"/>
+          <a:lstStyle/>
+          <a:p>
+            <a:pPr algn="ctr"/>
+            <a:endParaRPr lang="en-US"/>
+          </a:p>
+        </p:txBody>
+      </p:sp>
     </p:spTree>
     <p:extLst>
       <p:ext uri="{BB962C8B-B14F-4D97-AF65-F5344CB8AC3E}">
@@ -15901,7 +15984,7 @@
       </p:sp>
       <p:pic>
         <p:nvPicPr>
-          <p:cNvPr id="18" name="Picture 17" descr="A close up of a logo&#10;&#10;Description automatically generated">
+          <p:cNvPr id="18" name="Picture 17">
             <a:extLst>
               <a:ext uri="{FF2B5EF4-FFF2-40B4-BE49-F238E27FC236}">
                 <a16:creationId xmlns:a16="http://schemas.microsoft.com/office/drawing/2014/main" id="{B26C6D78-A127-47D3-89BA-F016DFA31CA4}"/>
@@ -15921,14 +16004,13 @@
               </a:ext>
             </a:extLst>
           </a:blip>
-          <a:stretch>
-            <a:fillRect/>
-          </a:stretch>
+          <a:srcRect/>
+          <a:stretch/>
         </p:blipFill>
         <p:spPr>
           <a:xfrm>
-            <a:off x="5724939" y="3657939"/>
-            <a:ext cx="6467060" cy="2823024"/>
+            <a:off x="5737710" y="3657939"/>
+            <a:ext cx="6441518" cy="2823024"/>
           </a:xfrm>
           <a:prstGeom prst="rect">
             <a:avLst/>
@@ -16323,8 +16405,8 @@
         </p:blipFill>
         <p:spPr>
           <a:xfrm>
-            <a:off x="5672121" y="3670852"/>
-            <a:ext cx="6446324" cy="2823024"/>
+            <a:off x="5684083" y="3644760"/>
+            <a:ext cx="6519878" cy="2849382"/>
           </a:xfrm>
           <a:prstGeom prst="rect">
             <a:avLst/>

</xml_diff>

<commit_message>
Changed the x-axis back to default  0-120 months, and updated the PPT
</commit_message>
<xml_diff>
--- a/Final_Presentation.pptx
+++ b/Final_Presentation.pptx
@@ -14762,10 +14762,10 @@
       </p:sp>
       <p:pic>
         <p:nvPicPr>
-          <p:cNvPr id="12" name="Picture 11">
-            <a:extLst>
-              <a:ext uri="{FF2B5EF4-FFF2-40B4-BE49-F238E27FC236}">
-                <a16:creationId xmlns:a16="http://schemas.microsoft.com/office/drawing/2014/main" id="{70BDA700-1E2F-FB4F-8B85-C8FB56E78D12}"/>
+          <p:cNvPr id="7" name="Picture 6">
+            <a:extLst>
+              <a:ext uri="{FF2B5EF4-FFF2-40B4-BE49-F238E27FC236}">
+                <a16:creationId xmlns:a16="http://schemas.microsoft.com/office/drawing/2014/main" id="{2FEE5F0B-755C-4325-B09D-946EC24E9BE5}"/>
               </a:ext>
             </a:extLst>
           </p:cNvPr>
@@ -14782,49 +14782,20 @@
               </a:ext>
             </a:extLst>
           </a:blip>
-          <a:srcRect/>
-          <a:stretch/>
+          <a:stretch>
+            <a:fillRect/>
+          </a:stretch>
         </p:blipFill>
         <p:spPr>
           <a:xfrm>
-            <a:off x="1723154" y="2213811"/>
-            <a:ext cx="8745692" cy="4664978"/>
+            <a:off x="1507009" y="2159219"/>
+            <a:ext cx="9174724" cy="5006031"/>
           </a:xfrm>
           <a:prstGeom prst="rect">
             <a:avLst/>
           </a:prstGeom>
         </p:spPr>
       </p:pic>
-      <p:sp>
-        <p:nvSpPr>
-          <p:cNvPr id="5" name="Content Placeholder 4">
-            <a:extLst>
-              <a:ext uri="{FF2B5EF4-FFF2-40B4-BE49-F238E27FC236}">
-                <a16:creationId xmlns:a16="http://schemas.microsoft.com/office/drawing/2014/main" id="{A3FFED2B-91A2-414A-9901-06E602DC4BD2}"/>
-              </a:ext>
-            </a:extLst>
-          </p:cNvPr>
-          <p:cNvSpPr>
-            <a:spLocks noGrp="1"/>
-          </p:cNvSpPr>
-          <p:nvPr>
-            <p:ph idx="1"/>
-          </p:nvPr>
-        </p:nvSpPr>
-        <p:spPr>
-          <a:xfrm>
-            <a:off x="466998" y="6983226"/>
-            <a:ext cx="10917072" cy="1236701"/>
-          </a:xfrm>
-        </p:spPr>
-        <p:txBody>
-          <a:bodyPr/>
-          <a:lstStyle/>
-          <a:p>
-            <a:endParaRPr lang="en-US" dirty="0"/>
-          </a:p>
-        </p:txBody>
-      </p:sp>
     </p:spTree>
     <p:extLst>
       <p:ext uri="{BB962C8B-B14F-4D97-AF65-F5344CB8AC3E}">
@@ -15470,10 +15441,10 @@
       </p:sp>
       <p:pic>
         <p:nvPicPr>
-          <p:cNvPr id="10" name="Picture 9" descr="A screenshot of a cell phone&#10;&#10;Description automatically generated">
-            <a:extLst>
-              <a:ext uri="{FF2B5EF4-FFF2-40B4-BE49-F238E27FC236}">
-                <a16:creationId xmlns:a16="http://schemas.microsoft.com/office/drawing/2014/main" id="{188E4981-A12E-364E-B3B0-2D62E271A016}"/>
+          <p:cNvPr id="5" name="Picture 4">
+            <a:extLst>
+              <a:ext uri="{FF2B5EF4-FFF2-40B4-BE49-F238E27FC236}">
+                <a16:creationId xmlns:a16="http://schemas.microsoft.com/office/drawing/2014/main" id="{86672DD6-C9B4-44AF-8736-A625BB87D44B}"/>
               </a:ext>
             </a:extLst>
           </p:cNvPr>
@@ -15482,7 +15453,7 @@
           </p:cNvPicPr>
           <p:nvPr/>
         </p:nvPicPr>
-        <p:blipFill rotWithShape="1">
+        <p:blipFill>
           <a:blip r:embed="rId3">
             <a:extLst>
               <a:ext uri="{28A0092B-C50C-407E-A947-70E740481C1C}">
@@ -15490,13 +15461,14 @@
               </a:ext>
             </a:extLst>
           </a:blip>
-          <a:srcRect l="3443" r="9672"/>
-          <a:stretch/>
+          <a:stretch>
+            <a:fillRect/>
+          </a:stretch>
         </p:blipFill>
         <p:spPr>
           <a:xfrm>
-            <a:off x="-140633" y="3249467"/>
-            <a:ext cx="7480538" cy="2862724"/>
+            <a:off x="-10254" y="3389428"/>
+            <a:ext cx="7350159" cy="2450053"/>
           </a:xfrm>
           <a:prstGeom prst="rect">
             <a:avLst/>
@@ -15505,10 +15477,10 @@
       </p:pic>
       <p:pic>
         <p:nvPicPr>
-          <p:cNvPr id="12" name="Picture 11" descr="A screenshot of a cell phone&#10;&#10;Description automatically generated">
-            <a:extLst>
-              <a:ext uri="{FF2B5EF4-FFF2-40B4-BE49-F238E27FC236}">
-                <a16:creationId xmlns:a16="http://schemas.microsoft.com/office/drawing/2014/main" id="{C312CEEA-65EE-6748-8F71-FF19332BF257}"/>
+          <p:cNvPr id="7" name="Picture 6">
+            <a:extLst>
+              <a:ext uri="{FF2B5EF4-FFF2-40B4-BE49-F238E27FC236}">
+                <a16:creationId xmlns:a16="http://schemas.microsoft.com/office/drawing/2014/main" id="{7A49C4C1-299F-4092-83F7-51C8E6CE09B3}"/>
               </a:ext>
             </a:extLst>
           </p:cNvPr>
@@ -15517,7 +15489,7 @@
           </p:cNvPicPr>
           <p:nvPr/>
         </p:nvPicPr>
-        <p:blipFill rotWithShape="1">
+        <p:blipFill>
           <a:blip r:embed="rId4">
             <a:extLst>
               <a:ext uri="{28A0092B-C50C-407E-A947-70E740481C1C}">
@@ -15525,13 +15497,14 @@
               </a:ext>
             </a:extLst>
           </a:blip>
-          <a:srcRect l="6433" r="5704"/>
-          <a:stretch/>
+          <a:stretch>
+            <a:fillRect/>
+          </a:stretch>
         </p:blipFill>
         <p:spPr>
           <a:xfrm>
-            <a:off x="7339905" y="2354089"/>
-            <a:ext cx="4797641" cy="3873154"/>
+            <a:off x="6743515" y="2707105"/>
+            <a:ext cx="5438288" cy="3625525"/>
           </a:xfrm>
           <a:prstGeom prst="rect">
             <a:avLst/>
@@ -15776,40 +15749,6 @@
           </a:p>
         </p:txBody>
       </p:sp>
-      <p:pic>
-        <p:nvPicPr>
-          <p:cNvPr id="4" name="Content Placeholder 3">
-            <a:extLst>
-              <a:ext uri="{FF2B5EF4-FFF2-40B4-BE49-F238E27FC236}">
-                <a16:creationId xmlns:a16="http://schemas.microsoft.com/office/drawing/2014/main" id="{0B8F259E-172C-4599-9FB4-C44CFF2205C0}"/>
-              </a:ext>
-            </a:extLst>
-          </p:cNvPr>
-          <p:cNvPicPr>
-            <a:picLocks noGrp="1" noChangeAspect="1"/>
-          </p:cNvPicPr>
-          <p:nvPr>
-            <p:ph idx="1"/>
-          </p:nvPr>
-        </p:nvPicPr>
-        <p:blipFill>
-          <a:blip r:embed="rId4">
-            <a:extLst>
-              <a:ext uri="{28A0092B-C50C-407E-A947-70E740481C1C}">
-                <a14:useLocalDpi xmlns:a14="http://schemas.microsoft.com/office/drawing/2010/main" val="0"/>
-              </a:ext>
-            </a:extLst>
-          </a:blip>
-          <a:srcRect/>
-          <a:stretch/>
-        </p:blipFill>
-        <p:spPr>
-          <a:xfrm>
-            <a:off x="5724939" y="153351"/>
-            <a:ext cx="6603536" cy="3549306"/>
-          </a:xfrm>
-        </p:spPr>
-      </p:pic>
       <p:sp>
         <p:nvSpPr>
           <p:cNvPr id="19" name="Rectangle 18">
@@ -15914,7 +15853,7 @@
           <p:nvPr/>
         </p:nvPicPr>
         <p:blipFill>
-          <a:blip r:embed="rId5">
+          <a:blip r:embed="rId4">
             <a:extLst>
               <a:ext uri="{28A0092B-C50C-407E-A947-70E740481C1C}">
                 <a14:useLocalDpi xmlns:a14="http://schemas.microsoft.com/office/drawing/2010/main" val="0"/>
@@ -15929,6 +15868,42 @@
           <a:xfrm>
             <a:off x="5724939" y="3657939"/>
             <a:ext cx="6467060" cy="2823024"/>
+          </a:xfrm>
+          <a:prstGeom prst="rect">
+            <a:avLst/>
+          </a:prstGeom>
+        </p:spPr>
+      </p:pic>
+      <p:pic>
+        <p:nvPicPr>
+          <p:cNvPr id="5" name="Picture 4">
+            <a:extLst>
+              <a:ext uri="{FF2B5EF4-FFF2-40B4-BE49-F238E27FC236}">
+                <a16:creationId xmlns:a16="http://schemas.microsoft.com/office/drawing/2014/main" id="{B44A7C3B-30C0-4C3B-9245-FC059B06DF7B}"/>
+              </a:ext>
+            </a:extLst>
+          </p:cNvPr>
+          <p:cNvPicPr>
+            <a:picLocks noChangeAspect="1"/>
+          </p:cNvPicPr>
+          <p:nvPr/>
+        </p:nvPicPr>
+        <p:blipFill>
+          <a:blip r:embed="rId5">
+            <a:extLst>
+              <a:ext uri="{28A0092B-C50C-407E-A947-70E740481C1C}">
+                <a14:useLocalDpi xmlns:a14="http://schemas.microsoft.com/office/drawing/2010/main" val="0"/>
+              </a:ext>
+            </a:extLst>
+          </a:blip>
+          <a:stretch>
+            <a:fillRect/>
+          </a:stretch>
+        </p:blipFill>
+        <p:spPr>
+          <a:xfrm>
+            <a:off x="5573894" y="57921"/>
+            <a:ext cx="6467060" cy="3482263"/>
           </a:xfrm>
           <a:prstGeom prst="rect">
             <a:avLst/>

</xml_diff>

<commit_message>
restored my original changes from last night... Fixed AAL, correlation matrix 1 decimal, etc.
</commit_message>
<xml_diff>
--- a/Final_Presentation.pptx
+++ b/Final_Presentation.pptx
@@ -212,7 +212,7 @@
           <a:p>
             <a:fld id="{967483A9-E084-4649-A19B-B92CB0DE91A3}" type="datetimeFigureOut">
               <a:rPr lang="en-US" smtClean="0"/>
-              <a:t>6/23/2020</a:t>
+              <a:t>6/24/2020</a:t>
             </a:fld>
             <a:endParaRPr lang="en-US"/>
           </a:p>
@@ -3255,7 +3255,7 @@
           <a:p>
             <a:fld id="{C1CC7F00-77D2-4F43-9191-B15704280A39}" type="datetimeFigureOut">
               <a:rPr lang="en-US" smtClean="0"/>
-              <a:t>6/23/2020</a:t>
+              <a:t>6/24/2020</a:t>
             </a:fld>
             <a:endParaRPr lang="en-US"/>
           </a:p>
@@ -3458,7 +3458,7 @@
           <a:p>
             <a:fld id="{C1CC7F00-77D2-4F43-9191-B15704280A39}" type="datetimeFigureOut">
               <a:rPr lang="en-US" smtClean="0"/>
-              <a:t>6/23/2020</a:t>
+              <a:t>6/24/2020</a:t>
             </a:fld>
             <a:endParaRPr lang="en-US"/>
           </a:p>
@@ -3666,7 +3666,7 @@
           <a:p>
             <a:fld id="{C1CC7F00-77D2-4F43-9191-B15704280A39}" type="datetimeFigureOut">
               <a:rPr lang="en-US" smtClean="0"/>
-              <a:t>6/23/2020</a:t>
+              <a:t>6/24/2020</a:t>
             </a:fld>
             <a:endParaRPr lang="en-US"/>
           </a:p>
@@ -3864,7 +3864,7 @@
           <a:p>
             <a:fld id="{C1CC7F00-77D2-4F43-9191-B15704280A39}" type="datetimeFigureOut">
               <a:rPr lang="en-US" smtClean="0"/>
-              <a:t>6/23/2020</a:t>
+              <a:t>6/24/2020</a:t>
             </a:fld>
             <a:endParaRPr lang="en-US"/>
           </a:p>
@@ -4139,7 +4139,7 @@
           <a:p>
             <a:fld id="{C1CC7F00-77D2-4F43-9191-B15704280A39}" type="datetimeFigureOut">
               <a:rPr lang="en-US" smtClean="0"/>
-              <a:t>6/23/2020</a:t>
+              <a:t>6/24/2020</a:t>
             </a:fld>
             <a:endParaRPr lang="en-US"/>
           </a:p>
@@ -4409,7 +4409,7 @@
           <a:p>
             <a:fld id="{C1CC7F00-77D2-4F43-9191-B15704280A39}" type="datetimeFigureOut">
               <a:rPr lang="en-US" smtClean="0"/>
-              <a:t>6/23/2020</a:t>
+              <a:t>6/24/2020</a:t>
             </a:fld>
             <a:endParaRPr lang="en-US"/>
           </a:p>
@@ -4821,7 +4821,7 @@
           <a:p>
             <a:fld id="{C1CC7F00-77D2-4F43-9191-B15704280A39}" type="datetimeFigureOut">
               <a:rPr lang="en-US" smtClean="0"/>
-              <a:t>6/23/2020</a:t>
+              <a:t>6/24/2020</a:t>
             </a:fld>
             <a:endParaRPr lang="en-US"/>
           </a:p>
@@ -4962,7 +4962,7 @@
           <a:p>
             <a:fld id="{C1CC7F00-77D2-4F43-9191-B15704280A39}" type="datetimeFigureOut">
               <a:rPr lang="en-US" smtClean="0"/>
-              <a:t>6/23/2020</a:t>
+              <a:t>6/24/2020</a:t>
             </a:fld>
             <a:endParaRPr lang="en-US"/>
           </a:p>
@@ -5075,7 +5075,7 @@
           <a:p>
             <a:fld id="{C1CC7F00-77D2-4F43-9191-B15704280A39}" type="datetimeFigureOut">
               <a:rPr lang="en-US" smtClean="0"/>
-              <a:t>6/23/2020</a:t>
+              <a:t>6/24/2020</a:t>
             </a:fld>
             <a:endParaRPr lang="en-US"/>
           </a:p>
@@ -5391,7 +5391,7 @@
           <a:p>
             <a:fld id="{C1CC7F00-77D2-4F43-9191-B15704280A39}" type="datetimeFigureOut">
               <a:rPr lang="en-US" smtClean="0"/>
-              <a:t>6/23/2020</a:t>
+              <a:t>6/24/2020</a:t>
             </a:fld>
             <a:endParaRPr lang="en-US"/>
           </a:p>
@@ -5679,7 +5679,7 @@
           <a:p>
             <a:fld id="{C1CC7F00-77D2-4F43-9191-B15704280A39}" type="datetimeFigureOut">
               <a:rPr lang="en-US" smtClean="0"/>
-              <a:t>6/23/2020</a:t>
+              <a:t>6/24/2020</a:t>
             </a:fld>
             <a:endParaRPr lang="en-US"/>
           </a:p>
@@ -5920,7 +5920,7 @@
           <a:p>
             <a:fld id="{C1CC7F00-77D2-4F43-9191-B15704280A39}" type="datetimeFigureOut">
               <a:rPr lang="en-US" smtClean="0"/>
-              <a:t>6/23/2020</a:t>
+              <a:t>6/24/2020</a:t>
             </a:fld>
             <a:endParaRPr lang="en-US"/>
           </a:p>
@@ -7169,8 +7169,8 @@
         </p:blipFill>
         <p:spPr>
           <a:xfrm>
-            <a:off x="138429" y="201654"/>
-            <a:ext cx="8288407" cy="3627272"/>
+            <a:off x="38219" y="264388"/>
+            <a:ext cx="8182637" cy="3578799"/>
           </a:xfrm>
           <a:prstGeom prst="rect">
             <a:avLst/>
@@ -7750,7 +7750,7 @@
         </p:nvSpPr>
         <p:spPr>
           <a:xfrm rot="20195107">
-            <a:off x="3546025" y="1395610"/>
+            <a:off x="3506294" y="1382379"/>
             <a:ext cx="247806" cy="238094"/>
           </a:xfrm>
           <a:prstGeom prst="ellipse">
@@ -7802,7 +7802,7 @@
         </p:nvSpPr>
         <p:spPr>
           <a:xfrm rot="20195107">
-            <a:off x="3839145" y="1395610"/>
+            <a:off x="3827036" y="1395609"/>
             <a:ext cx="247806" cy="238094"/>
           </a:xfrm>
           <a:prstGeom prst="ellipse">
@@ -7854,7 +7854,7 @@
         </p:nvSpPr>
         <p:spPr>
           <a:xfrm rot="20195107">
-            <a:off x="4428217" y="1559500"/>
+            <a:off x="4414770" y="1545475"/>
             <a:ext cx="247806" cy="238094"/>
           </a:xfrm>
           <a:prstGeom prst="ellipse">
@@ -8167,58 +8167,6 @@
         <p:spPr>
           <a:xfrm rot="20195107">
             <a:off x="6517066" y="1237129"/>
-            <a:ext cx="247806" cy="238094"/>
-          </a:xfrm>
-          <a:prstGeom prst="ellipse">
-            <a:avLst/>
-          </a:prstGeom>
-          <a:noFill/>
-          <a:ln w="28575">
-            <a:solidFill>
-              <a:srgbClr val="FFFF00"/>
-            </a:solidFill>
-          </a:ln>
-        </p:spPr>
-        <p:style>
-          <a:lnRef idx="2">
-            <a:schemeClr val="accent1">
-              <a:shade val="50000"/>
-            </a:schemeClr>
-          </a:lnRef>
-          <a:fillRef idx="1">
-            <a:schemeClr val="accent1"/>
-          </a:fillRef>
-          <a:effectRef idx="0">
-            <a:schemeClr val="accent1"/>
-          </a:effectRef>
-          <a:fontRef idx="minor">
-            <a:schemeClr val="lt1"/>
-          </a:fontRef>
-        </p:style>
-        <p:txBody>
-          <a:bodyPr rtlCol="0" anchor="ctr"/>
-          <a:lstStyle/>
-          <a:p>
-            <a:pPr algn="ctr"/>
-            <a:endParaRPr lang="en-US"/>
-          </a:p>
-        </p:txBody>
-      </p:sp>
-      <p:sp>
-        <p:nvSpPr>
-          <p:cNvPr id="71" name="Oval 70">
-            <a:extLst>
-              <a:ext uri="{FF2B5EF4-FFF2-40B4-BE49-F238E27FC236}">
-                <a16:creationId xmlns:a16="http://schemas.microsoft.com/office/drawing/2014/main" id="{B46F4F0A-D3D7-4527-9AA2-0D16CD39FE7C}"/>
-              </a:ext>
-            </a:extLst>
-          </p:cNvPr>
-          <p:cNvSpPr/>
-          <p:nvPr/>
-        </p:nvSpPr>
-        <p:spPr>
-          <a:xfrm rot="20195107">
-            <a:off x="2634107" y="1883712"/>
             <a:ext cx="247806" cy="238094"/>
           </a:xfrm>
           <a:prstGeom prst="ellipse">
@@ -13038,23 +12986,13 @@
                   <a:srgbClr val="FFFFFF"/>
                 </a:solidFill>
               </a:rPr>
-              <a:t>Assets Included in the Analysis:</a:t>
-            </a:r>
-            <a:br>
-              <a:rPr lang="en-US" dirty="0">
-                <a:solidFill>
-                  <a:srgbClr val="FFFFFF"/>
-                </a:solidFill>
-              </a:rPr>
-            </a:br>
-            <a:r>
-              <a:rPr lang="en-US" b="1" dirty="0">
-                <a:solidFill>
-                  <a:srgbClr val="FFFFFF"/>
-                </a:solidFill>
-              </a:rPr>
-              <a:t>S&amp;P500 (^GSPC)</a:t>
-            </a:r>
+              <a:t>Assets Included in the Analysis</a:t>
+            </a:r>
+            <a:endParaRPr lang="en-US" b="1" dirty="0">
+              <a:solidFill>
+                <a:srgbClr val="FFFFFF"/>
+              </a:solidFill>
+            </a:endParaRPr>
           </a:p>
         </p:txBody>
       </p:sp>
@@ -13136,14 +13074,14 @@
           <p:nvPr>
             <p:extLst>
               <p:ext uri="{D42A27DB-BD31-4B8C-83A1-F6EECF244321}">
-                <p14:modId xmlns:p14="http://schemas.microsoft.com/office/powerpoint/2010/main" val="1260709105"/>
+                <p14:modId xmlns:p14="http://schemas.microsoft.com/office/powerpoint/2010/main" val="98682439"/>
               </p:ext>
             </p:extLst>
           </p:nvPr>
         </p:nvGraphicFramePr>
         <p:xfrm>
           <a:off x="2311568" y="2390514"/>
-          <a:ext cx="7565605" cy="4010286"/>
+          <a:ext cx="7565605" cy="4353579"/>
         </p:xfrm>
         <a:graphic>
           <a:graphicData uri="http://schemas.openxmlformats.org/drawingml/2006/table">
@@ -13243,6 +13181,84 @@
                         <a:tabLst/>
                         <a:defRPr/>
                       </a:pPr>
+                      <a:endParaRPr lang="en-US" sz="1600"/>
+                    </a:p>
+                  </a:txBody>
+                  <a:tcPr marL="52741" marR="52741" marT="26370" marB="26370"/>
+                </a:tc>
+                <a:tc>
+                  <a:txBody>
+                    <a:bodyPr/>
+                    <a:lstStyle/>
+                    <a:p>
+                      <a:r>
+                        <a:rPr lang="en-US" sz="1600" b="0" dirty="0">
+                          <a:solidFill>
+                            <a:schemeClr val="tx1"/>
+                          </a:solidFill>
+                        </a:rPr>
+                        <a:t>S&amp;P500 (^GSPC)</a:t>
+                      </a:r>
+                    </a:p>
+                  </a:txBody>
+                  <a:tcPr marL="52741" marR="52741" marT="26370" marB="26370"/>
+                </a:tc>
+                <a:tc>
+                  <a:txBody>
+                    <a:bodyPr/>
+                    <a:lstStyle/>
+                    <a:p>
+                      <a:pPr marL="0" marR="0" lvl="0" indent="0" algn="l" defTabSz="914400" rtl="0" eaLnBrk="1" fontAlgn="auto" latinLnBrk="0" hangingPunct="1">
+                        <a:lnSpc>
+                          <a:spcPct val="100000"/>
+                        </a:lnSpc>
+                        <a:spcBef>
+                          <a:spcPts val="0"/>
+                        </a:spcBef>
+                        <a:spcAft>
+                          <a:spcPts val="0"/>
+                        </a:spcAft>
+                        <a:buClrTx/>
+                        <a:buSzTx/>
+                        <a:buFontTx/>
+                        <a:buNone/>
+                        <a:tabLst/>
+                        <a:defRPr/>
+                      </a:pPr>
+                      <a:endParaRPr lang="en-US" sz="1600" dirty="0"/>
+                    </a:p>
+                  </a:txBody>
+                  <a:tcPr marL="52741" marR="52741" marT="26370" marB="26370"/>
+                </a:tc>
+                <a:extLst>
+                  <a:ext uri="{0D108BD9-81ED-4DB2-BD59-A6C34878D82A}">
+                    <a16:rowId xmlns:a16="http://schemas.microsoft.com/office/drawing/2014/main" val="554036702"/>
+                  </a:ext>
+                </a:extLst>
+              </a:tr>
+              <a:tr h="343293">
+                <a:tc>
+                  <a:txBody>
+                    <a:bodyPr/>
+                    <a:lstStyle/>
+                    <a:p>
+                      <a:pPr marL="0" marR="0" lvl="0" indent="0" algn="l" defTabSz="914400" rtl="0" eaLnBrk="1" fontAlgn="auto" latinLnBrk="0" hangingPunct="1">
+                        <a:lnSpc>
+                          <a:spcPct val="100000"/>
+                        </a:lnSpc>
+                        <a:spcBef>
+                          <a:spcPts val="0"/>
+                        </a:spcBef>
+                        <a:spcAft>
+                          <a:spcPts val="0"/>
+                        </a:spcAft>
+                        <a:buClrTx/>
+                        <a:buSzTx/>
+                        <a:buFontTx/>
+                        <a:buNone/>
+                        <a:tabLst/>
+                        <a:defRPr/>
+                      </a:pPr>
                       <a:r>
                         <a:rPr lang="en-US" sz="1600"/>
                         <a:t>Banks</a:t>
@@ -13257,7 +13273,7 @@
                     <a:lstStyle/>
                     <a:p>
                       <a:r>
-                        <a:rPr lang="en-US" sz="1600"/>
+                        <a:rPr lang="en-US" sz="1600" dirty="0"/>
                         <a:t>Bank of America (BAC)</a:t>
                       </a:r>
                     </a:p>
@@ -13847,8 +13863,8 @@
                     <a:lstStyle/>
                     <a:p>
                       <a:r>
-                        <a:rPr lang="en-US" sz="1600"/>
-                        <a:t>Delta Airlines (DAL</a:t>
+                        <a:rPr lang="en-US" sz="1600" dirty="0"/>
+                        <a:t>Delta Airlines (DAL)</a:t>
                       </a:r>
                     </a:p>
                   </a:txBody>
@@ -15840,7 +15856,7 @@
       </p:sp>
       <p:pic>
         <p:nvPicPr>
-          <p:cNvPr id="18" name="Picture 17" descr="A close up of a logo&#10;&#10;Description automatically generated">
+          <p:cNvPr id="18" name="Picture 17">
             <a:extLst>
               <a:ext uri="{FF2B5EF4-FFF2-40B4-BE49-F238E27FC236}">
                 <a16:creationId xmlns:a16="http://schemas.microsoft.com/office/drawing/2014/main" id="{B26C6D78-A127-47D3-89BA-F016DFA31CA4}"/>
@@ -15860,14 +15876,13 @@
               </a:ext>
             </a:extLst>
           </a:blip>
-          <a:stretch>
-            <a:fillRect/>
-          </a:stretch>
+          <a:srcRect/>
+          <a:stretch/>
         </p:blipFill>
         <p:spPr>
           <a:xfrm>
-            <a:off x="5724939" y="3657939"/>
-            <a:ext cx="6467060" cy="2823024"/>
+            <a:off x="5577334" y="3761382"/>
+            <a:ext cx="6699256" cy="2928977"/>
           </a:xfrm>
           <a:prstGeom prst="rect">
             <a:avLst/>
@@ -15896,14 +15911,13 @@
               </a:ext>
             </a:extLst>
           </a:blip>
-          <a:stretch>
-            <a:fillRect/>
-          </a:stretch>
+          <a:srcRect/>
+          <a:stretch/>
         </p:blipFill>
         <p:spPr>
           <a:xfrm>
-            <a:off x="5573894" y="57921"/>
-            <a:ext cx="6467060" cy="3482263"/>
+            <a:off x="5617091" y="285088"/>
+            <a:ext cx="6463617" cy="3476295"/>
           </a:xfrm>
           <a:prstGeom prst="rect">
             <a:avLst/>
@@ -16177,7 +16191,7 @@
         </p:blipFill>
         <p:spPr>
           <a:xfrm>
-            <a:off x="5704775" y="121546"/>
+            <a:off x="5693164" y="176966"/>
             <a:ext cx="6590485" cy="3549306"/>
           </a:xfrm>
         </p:spPr>
@@ -16298,8 +16312,8 @@
         </p:blipFill>
         <p:spPr>
           <a:xfrm>
-            <a:off x="5672121" y="3670852"/>
-            <a:ext cx="6446324" cy="2823024"/>
+            <a:off x="5679911" y="3784628"/>
+            <a:ext cx="6603737" cy="2890692"/>
           </a:xfrm>
           <a:prstGeom prst="rect">
             <a:avLst/>
@@ -16594,7 +16608,7 @@
       </p:sp>
       <p:pic>
         <p:nvPicPr>
-          <p:cNvPr id="5" name="Picture 4" descr="A screenshot of a cell phone&#10;&#10;Description automatically generated">
+          <p:cNvPr id="5" name="Picture 4">
             <a:extLst>
               <a:ext uri="{FF2B5EF4-FFF2-40B4-BE49-F238E27FC236}">
                 <a16:creationId xmlns:a16="http://schemas.microsoft.com/office/drawing/2014/main" id="{B384423D-1DFA-F047-971E-65627C51B3A0}"/>
@@ -16614,14 +16628,13 @@
               </a:ext>
             </a:extLst>
           </a:blip>
-          <a:stretch>
-            <a:fillRect/>
-          </a:stretch>
+          <a:srcRect/>
+          <a:stretch/>
         </p:blipFill>
         <p:spPr>
           <a:xfrm>
-            <a:off x="35438" y="2625253"/>
-            <a:ext cx="9526441" cy="4167816"/>
+            <a:off x="70875" y="2538954"/>
+            <a:ext cx="9526441" cy="4164466"/>
           </a:xfrm>
           <a:prstGeom prst="rect">
             <a:avLst/>

</xml_diff>

<commit_message>
make minor changes to the closing slides
</commit_message>
<xml_diff>
--- a/Final_Presentation.pptx
+++ b/Final_Presentation.pptx
@@ -5,7 +5,7 @@
     <p:sldMasterId id="2147483823" r:id="rId1"/>
   </p:sldMasterIdLst>
   <p:notesMasterIdLst>
-    <p:notesMasterId r:id="rId18"/>
+    <p:notesMasterId r:id="rId19"/>
   </p:notesMasterIdLst>
   <p:sldIdLst>
     <p:sldId id="256" r:id="rId2"/>
@@ -20,10 +20,11 @@
     <p:sldId id="265" r:id="rId11"/>
     <p:sldId id="266" r:id="rId12"/>
     <p:sldId id="272" r:id="rId13"/>
-    <p:sldId id="269" r:id="rId14"/>
-    <p:sldId id="273" r:id="rId15"/>
-    <p:sldId id="270" r:id="rId16"/>
-    <p:sldId id="276" r:id="rId17"/>
+    <p:sldId id="273" r:id="rId14"/>
+    <p:sldId id="270" r:id="rId15"/>
+    <p:sldId id="276" r:id="rId16"/>
+    <p:sldId id="277" r:id="rId17"/>
+    <p:sldId id="269" r:id="rId18"/>
   </p:sldIdLst>
   <p:sldSz cx="12192000" cy="6858000"/>
   <p:notesSz cx="6858000" cy="9144000"/>
@@ -212,7 +213,7 @@
           <a:p>
             <a:fld id="{967483A9-E084-4649-A19B-B92CB0DE91A3}" type="datetimeFigureOut">
               <a:rPr lang="en-US" smtClean="0"/>
-              <a:t>6/24/2020</a:t>
+              <a:t>6/24/20</a:t>
             </a:fld>
             <a:endParaRPr lang="en-US"/>
           </a:p>
@@ -906,7 +907,7 @@
                 <a:ea typeface="Calibri" panose="020F0502020204030204" pitchFamily="34" charset="0"/>
                 <a:cs typeface="Times New Roman" panose="02020603050405020304" pitchFamily="18" charset="0"/>
               </a:rPr>
-              <a:t>How good is the data? To answer the question around the credibility of the assets data we created box plots of their monthly price to give us a quick visual understanding of the distribution and skewness/dispersion/variability. </a:t>
+              <a:t>We also consider the possibility of a more conservative predictor for price with multiple regression by introducing another dependent variable. We added the US unemployment rate for 10 years coinciding with the years included in our analysis</a:t>
             </a:r>
           </a:p>
           <a:p>
@@ -927,8 +928,41 @@
                 <a:ea typeface="Calibri" panose="020F0502020204030204" pitchFamily="34" charset="0"/>
                 <a:cs typeface="Times New Roman" panose="02020603050405020304" pitchFamily="18" charset="0"/>
               </a:rPr>
-              <a:t>CVX appears to have normal distribution. A shorter box indicates a less dispersed distribution which aligns with our earlier calculation of CVX’s STD.</a:t>
-            </a:r>
+              <a:t>For this purpose we imported the </a:t>
+            </a:r>
+            <a:r>
+              <a:rPr lang="en-US" sz="1800" dirty="0" err="1">
+                <a:effectLst/>
+                <a:latin typeface="Calibri" panose="020F0502020204030204" pitchFamily="34" charset="0"/>
+                <a:ea typeface="Calibri" panose="020F0502020204030204" pitchFamily="34" charset="0"/>
+                <a:cs typeface="Times New Roman" panose="02020603050405020304" pitchFamily="18" charset="0"/>
+              </a:rPr>
+              <a:t>LinearRegression</a:t>
+            </a:r>
+            <a:r>
+              <a:rPr lang="en-US" sz="1800" dirty="0">
+                <a:effectLst/>
+                <a:latin typeface="Calibri" panose="020F0502020204030204" pitchFamily="34" charset="0"/>
+                <a:ea typeface="Calibri" panose="020F0502020204030204" pitchFamily="34" charset="0"/>
+                <a:cs typeface="Times New Roman" panose="02020603050405020304" pitchFamily="18" charset="0"/>
+              </a:rPr>
+              <a:t> module from  </a:t>
+            </a:r>
+            <a:r>
+              <a:rPr lang="en-US" sz="1800" dirty="0" err="1">
+                <a:effectLst/>
+                <a:latin typeface="Calibri" panose="020F0502020204030204" pitchFamily="34" charset="0"/>
+                <a:ea typeface="Calibri" panose="020F0502020204030204" pitchFamily="34" charset="0"/>
+                <a:cs typeface="Times New Roman" panose="02020603050405020304" pitchFamily="18" charset="0"/>
+              </a:rPr>
+              <a:t>sklearn.linear_model</a:t>
+            </a:r>
+            <a:endParaRPr lang="en-US" sz="1800" dirty="0">
+              <a:effectLst/>
+              <a:latin typeface="Calibri" panose="020F0502020204030204" pitchFamily="34" charset="0"/>
+              <a:ea typeface="Calibri" panose="020F0502020204030204" pitchFamily="34" charset="0"/>
+              <a:cs typeface="Times New Roman" panose="02020603050405020304" pitchFamily="18" charset="0"/>
+            </a:endParaRPr>
           </a:p>
           <a:p>
             <a:pPr marL="342900" marR="0" lvl="0" indent="-342900">
@@ -948,8 +982,32 @@
                 <a:ea typeface="Calibri" panose="020F0502020204030204" pitchFamily="34" charset="0"/>
                 <a:cs typeface="Times New Roman" panose="02020603050405020304" pitchFamily="18" charset="0"/>
               </a:rPr>
-              <a:t>However, NFLX has a positive skew and the longer box show greater degree of spread.  This also aligns with our previous observations.</a:t>
-            </a:r>
+              <a:t>For CVX: The introduction of an additional variable resulted in a more conservative or better fitting prediction of CVX’s Jan and Feb prices within the STD. </a:t>
+            </a:r>
+          </a:p>
+          <a:p>
+            <a:pPr marL="342900" marR="0" lvl="0" indent="-342900">
+              <a:spcBef>
+                <a:spcPts val="0"/>
+              </a:spcBef>
+              <a:spcAft>
+                <a:spcPts val="0"/>
+              </a:spcAft>
+              <a:buFont typeface="Symbol" panose="05050102010706020507" pitchFamily="18" charset="2"/>
+              <a:buChar char=""/>
+            </a:pPr>
+            <a:r>
+              <a:rPr lang="en-US" sz="1800" dirty="0">
+                <a:effectLst/>
+                <a:latin typeface="Calibri" panose="020F0502020204030204" pitchFamily="34" charset="0"/>
+                <a:ea typeface="Calibri" panose="020F0502020204030204" pitchFamily="34" charset="0"/>
+                <a:cs typeface="Times New Roman" panose="02020603050405020304" pitchFamily="18" charset="0"/>
+              </a:rPr>
+              <a:t>For NFLX: The model didn’t provide a better prediction further alluding to its non-conformity with others in the pack.</a:t>
+            </a:r>
+          </a:p>
+          <a:p>
+            <a:endParaRPr lang="en-US" dirty="0"/>
           </a:p>
         </p:txBody>
       </p:sp>
@@ -968,7 +1026,7 @@
           <a:bodyPr/>
           <a:lstStyle/>
           <a:p>
-            <a:fld id="{5B0439F7-BA01-A541-95AE-C6E45E2F4003}" type="slidenum">
+            <a:fld id="{3C464D38-78EB-6A4F-BCA2-1B202E646C54}" type="slidenum">
               <a:rPr lang="en-US" smtClean="0"/>
               <a:t>13</a:t>
             </a:fld>
@@ -979,7 +1037,7 @@
     </p:spTree>
     <p:extLst>
       <p:ext uri="{BB962C8B-B14F-4D97-AF65-F5344CB8AC3E}">
-        <p14:creationId xmlns:p14="http://schemas.microsoft.com/office/powerpoint/2010/main" val="763483845"/>
+        <p14:creationId xmlns:p14="http://schemas.microsoft.com/office/powerpoint/2010/main" val="2735816175"/>
       </p:ext>
     </p:extLst>
   </p:cSld>
@@ -1043,14 +1101,62 @@
               <a:buFont typeface="Symbol" panose="05050102010706020507" pitchFamily="18" charset="2"/>
               <a:buChar char=""/>
             </a:pPr>
-            <a:r>
-              <a:rPr lang="en-US" sz="1800" dirty="0">
+            <a:endParaRPr lang="en-US" sz="1800" dirty="0">
+              <a:effectLst/>
+              <a:latin typeface="Calibri" panose="020F0502020204030204" pitchFamily="34" charset="0"/>
+              <a:ea typeface="Calibri" panose="020F0502020204030204" pitchFamily="34" charset="0"/>
+              <a:cs typeface="Times New Roman" panose="02020603050405020304" pitchFamily="18" charset="0"/>
+            </a:endParaRPr>
+          </a:p>
+          <a:p>
+            <a:pPr marL="0" marR="0" lvl="0" indent="0">
+              <a:spcBef>
+                <a:spcPts val="0"/>
+              </a:spcBef>
+              <a:spcAft>
+                <a:spcPts val="0"/>
+              </a:spcAft>
+              <a:buFont typeface="Symbol" panose="05050102010706020507" pitchFamily="18" charset="2"/>
+              <a:buNone/>
+            </a:pPr>
+            <a:r>
+              <a:rPr lang="en-US" sz="1800" u="sng" dirty="0">
                 <a:effectLst/>
                 <a:latin typeface="Calibri" panose="020F0502020204030204" pitchFamily="34" charset="0"/>
                 <a:ea typeface="Calibri" panose="020F0502020204030204" pitchFamily="34" charset="0"/>
                 <a:cs typeface="Times New Roman" panose="02020603050405020304" pitchFamily="18" charset="0"/>
               </a:rPr>
-              <a:t>We also consider the possibility of a more conservative predictor for price with multiple regression by introducing another dependent variable. We added the US unemployment rate for 10 years coinciding with the years included in our analysis</a:t>
+              <a:t>Old slide information is here:</a:t>
+            </a:r>
+          </a:p>
+          <a:p>
+            <a:r>
+              <a:rPr lang="en-US" sz="4000" dirty="0"/>
+              <a:t>Stock prices are Time Series</a:t>
+            </a:r>
+          </a:p>
+          <a:p>
+            <a:r>
+              <a:rPr lang="en-US" sz="4000" dirty="0"/>
+              <a:t>Day trading is speculative and risky</a:t>
+            </a:r>
+          </a:p>
+          <a:p>
+            <a:r>
+              <a:rPr lang="en-US" sz="4000" dirty="0"/>
+              <a:t>The sure way to make good returns on your investment is long term holding “buy and hold” </a:t>
+            </a:r>
+          </a:p>
+          <a:p>
+            <a:r>
+              <a:rPr lang="en-US" sz="4000" dirty="0"/>
+              <a:t>Make your portfolio selections with a mix of lowly correlated assets </a:t>
+            </a:r>
+          </a:p>
+          <a:p>
+            <a:r>
+              <a:rPr lang="en-US" sz="4000" dirty="0"/>
+              <a:t>Regression analysis may be able to tell the future trend of an asset price because prices are time series …however, there are other variables other than time that determines the future price of an asset.</a:t>
             </a:r>
           </a:p>
           <a:p>
@@ -1064,42 +1170,6 @@
               <a:buFont typeface="Symbol" panose="05050102010706020507" pitchFamily="18" charset="2"/>
               <a:buChar char=""/>
             </a:pPr>
-            <a:r>
-              <a:rPr lang="en-US" sz="1800" dirty="0">
-                <a:effectLst/>
-                <a:latin typeface="Calibri" panose="020F0502020204030204" pitchFamily="34" charset="0"/>
-                <a:ea typeface="Calibri" panose="020F0502020204030204" pitchFamily="34" charset="0"/>
-                <a:cs typeface="Times New Roman" panose="02020603050405020304" pitchFamily="18" charset="0"/>
-              </a:rPr>
-              <a:t>For this purpose we imported the </a:t>
-            </a:r>
-            <a:r>
-              <a:rPr lang="en-US" sz="1800" dirty="0" err="1">
-                <a:effectLst/>
-                <a:latin typeface="Calibri" panose="020F0502020204030204" pitchFamily="34" charset="0"/>
-                <a:ea typeface="Calibri" panose="020F0502020204030204" pitchFamily="34" charset="0"/>
-                <a:cs typeface="Times New Roman" panose="02020603050405020304" pitchFamily="18" charset="0"/>
-              </a:rPr>
-              <a:t>LinearRegression</a:t>
-            </a:r>
-            <a:r>
-              <a:rPr lang="en-US" sz="1800" dirty="0">
-                <a:effectLst/>
-                <a:latin typeface="Calibri" panose="020F0502020204030204" pitchFamily="34" charset="0"/>
-                <a:ea typeface="Calibri" panose="020F0502020204030204" pitchFamily="34" charset="0"/>
-                <a:cs typeface="Times New Roman" panose="02020603050405020304" pitchFamily="18" charset="0"/>
-              </a:rPr>
-              <a:t> module from  </a:t>
-            </a:r>
-            <a:r>
-              <a:rPr lang="en-US" sz="1800" dirty="0" err="1">
-                <a:effectLst/>
-                <a:latin typeface="Calibri" panose="020F0502020204030204" pitchFamily="34" charset="0"/>
-                <a:ea typeface="Calibri" panose="020F0502020204030204" pitchFamily="34" charset="0"/>
-                <a:cs typeface="Times New Roman" panose="02020603050405020304" pitchFamily="18" charset="0"/>
-              </a:rPr>
-              <a:t>sklearn.linear_model</a:t>
-            </a:r>
             <a:endParaRPr lang="en-US" sz="1800" dirty="0">
               <a:effectLst/>
               <a:latin typeface="Calibri" panose="020F0502020204030204" pitchFamily="34" charset="0"/>
@@ -1108,48 +1178,6 @@
             </a:endParaRPr>
           </a:p>
           <a:p>
-            <a:pPr marL="342900" marR="0" lvl="0" indent="-342900">
-              <a:spcBef>
-                <a:spcPts val="0"/>
-              </a:spcBef>
-              <a:spcAft>
-                <a:spcPts val="0"/>
-              </a:spcAft>
-              <a:buFont typeface="Symbol" panose="05050102010706020507" pitchFamily="18" charset="2"/>
-              <a:buChar char=""/>
-            </a:pPr>
-            <a:r>
-              <a:rPr lang="en-US" sz="1800" dirty="0">
-                <a:effectLst/>
-                <a:latin typeface="Calibri" panose="020F0502020204030204" pitchFamily="34" charset="0"/>
-                <a:ea typeface="Calibri" panose="020F0502020204030204" pitchFamily="34" charset="0"/>
-                <a:cs typeface="Times New Roman" panose="02020603050405020304" pitchFamily="18" charset="0"/>
-              </a:rPr>
-              <a:t>For CVX: The introduction of an additional variable resulted in a more conservative or better fitting prediction of CVX’s Jan and Feb prices within the STD. </a:t>
-            </a:r>
-          </a:p>
-          <a:p>
-            <a:pPr marL="342900" marR="0" lvl="0" indent="-342900">
-              <a:spcBef>
-                <a:spcPts val="0"/>
-              </a:spcBef>
-              <a:spcAft>
-                <a:spcPts val="0"/>
-              </a:spcAft>
-              <a:buFont typeface="Symbol" panose="05050102010706020507" pitchFamily="18" charset="2"/>
-              <a:buChar char=""/>
-            </a:pPr>
-            <a:r>
-              <a:rPr lang="en-US" sz="1800" dirty="0">
-                <a:effectLst/>
-                <a:latin typeface="Calibri" panose="020F0502020204030204" pitchFamily="34" charset="0"/>
-                <a:ea typeface="Calibri" panose="020F0502020204030204" pitchFamily="34" charset="0"/>
-                <a:cs typeface="Times New Roman" panose="02020603050405020304" pitchFamily="18" charset="0"/>
-              </a:rPr>
-              <a:t>For NFLX: The model didn’t provide a better prediction further alluding to its non-conformity with others in the pack.</a:t>
-            </a:r>
-          </a:p>
-          <a:p>
             <a:endParaRPr lang="en-US" dirty="0"/>
           </a:p>
         </p:txBody>
@@ -1180,7 +1208,7 @@
     </p:spTree>
     <p:extLst>
       <p:ext uri="{BB962C8B-B14F-4D97-AF65-F5344CB8AC3E}">
-        <p14:creationId xmlns:p14="http://schemas.microsoft.com/office/powerpoint/2010/main" val="2735816175"/>
+        <p14:creationId xmlns:p14="http://schemas.microsoft.com/office/powerpoint/2010/main" val="4258049016"/>
       </p:ext>
     </p:extLst>
   </p:cSld>
@@ -1244,62 +1272,14 @@
               <a:buFont typeface="Symbol" panose="05050102010706020507" pitchFamily="18" charset="2"/>
               <a:buChar char=""/>
             </a:pPr>
-            <a:endParaRPr lang="en-US" sz="1800" dirty="0">
-              <a:effectLst/>
-              <a:latin typeface="Calibri" panose="020F0502020204030204" pitchFamily="34" charset="0"/>
-              <a:ea typeface="Calibri" panose="020F0502020204030204" pitchFamily="34" charset="0"/>
-              <a:cs typeface="Times New Roman" panose="02020603050405020304" pitchFamily="18" charset="0"/>
-            </a:endParaRPr>
-          </a:p>
-          <a:p>
-            <a:pPr marL="0" marR="0" lvl="0" indent="0">
-              <a:spcBef>
-                <a:spcPts val="0"/>
-              </a:spcBef>
-              <a:spcAft>
-                <a:spcPts val="0"/>
-              </a:spcAft>
-              <a:buFont typeface="Symbol" panose="05050102010706020507" pitchFamily="18" charset="2"/>
-              <a:buNone/>
-            </a:pPr>
-            <a:r>
-              <a:rPr lang="en-US" sz="1800" u="sng" dirty="0">
+            <a:r>
+              <a:rPr lang="en-US" sz="1800" dirty="0">
                 <a:effectLst/>
                 <a:latin typeface="Calibri" panose="020F0502020204030204" pitchFamily="34" charset="0"/>
                 <a:ea typeface="Calibri" panose="020F0502020204030204" pitchFamily="34" charset="0"/>
                 <a:cs typeface="Times New Roman" panose="02020603050405020304" pitchFamily="18" charset="0"/>
               </a:rPr>
-              <a:t>Old slide information is here:</a:t>
-            </a:r>
-          </a:p>
-          <a:p>
-            <a:r>
-              <a:rPr lang="en-US" sz="4000" dirty="0"/>
-              <a:t>Stock prices are Time Series</a:t>
-            </a:r>
-          </a:p>
-          <a:p>
-            <a:r>
-              <a:rPr lang="en-US" sz="4000" dirty="0"/>
-              <a:t>Day trading is speculative and risky</a:t>
-            </a:r>
-          </a:p>
-          <a:p>
-            <a:r>
-              <a:rPr lang="en-US" sz="4000" dirty="0"/>
-              <a:t>The sure way to make good returns on your investment is long term holding “buy and hold” </a:t>
-            </a:r>
-          </a:p>
-          <a:p>
-            <a:r>
-              <a:rPr lang="en-US" sz="4000" dirty="0"/>
-              <a:t>Make your portfolio selections with a mix of lowly correlated assets </a:t>
-            </a:r>
-          </a:p>
-          <a:p>
-            <a:r>
-              <a:rPr lang="en-US" sz="4000" dirty="0"/>
-              <a:t>Regression analysis may be able to tell the future trend of an asset price because prices are time series …however, there are other variables other than time that determines the future price of an asset.</a:t>
+              <a:t>How good is the data? To answer the question around the credibility of the assets data we created box plots of their monthly price to give us a quick visual understanding of the distribution and skewness/dispersion/variability. </a:t>
             </a:r>
           </a:p>
           <a:p>
@@ -1313,15 +1293,36 @@
               <a:buFont typeface="Symbol" panose="05050102010706020507" pitchFamily="18" charset="2"/>
               <a:buChar char=""/>
             </a:pPr>
-            <a:endParaRPr lang="en-US" sz="1800" dirty="0">
-              <a:effectLst/>
-              <a:latin typeface="Calibri" panose="020F0502020204030204" pitchFamily="34" charset="0"/>
-              <a:ea typeface="Calibri" panose="020F0502020204030204" pitchFamily="34" charset="0"/>
-              <a:cs typeface="Times New Roman" panose="02020603050405020304" pitchFamily="18" charset="0"/>
-            </a:endParaRPr>
-          </a:p>
-          <a:p>
-            <a:endParaRPr lang="en-US" dirty="0"/>
+            <a:r>
+              <a:rPr lang="en-US" sz="1800" dirty="0">
+                <a:effectLst/>
+                <a:latin typeface="Calibri" panose="020F0502020204030204" pitchFamily="34" charset="0"/>
+                <a:ea typeface="Calibri" panose="020F0502020204030204" pitchFamily="34" charset="0"/>
+                <a:cs typeface="Times New Roman" panose="02020603050405020304" pitchFamily="18" charset="0"/>
+              </a:rPr>
+              <a:t>CVX appears to have normal distribution. A shorter box indicates a less dispersed distribution which aligns with our earlier calculation of CVX’s STD.</a:t>
+            </a:r>
+          </a:p>
+          <a:p>
+            <a:pPr marL="342900" marR="0" lvl="0" indent="-342900">
+              <a:spcBef>
+                <a:spcPts val="0"/>
+              </a:spcBef>
+              <a:spcAft>
+                <a:spcPts val="0"/>
+              </a:spcAft>
+              <a:buFont typeface="Symbol" panose="05050102010706020507" pitchFamily="18" charset="2"/>
+              <a:buChar char=""/>
+            </a:pPr>
+            <a:r>
+              <a:rPr lang="en-US" sz="1800" dirty="0">
+                <a:effectLst/>
+                <a:latin typeface="Calibri" panose="020F0502020204030204" pitchFamily="34" charset="0"/>
+                <a:ea typeface="Calibri" panose="020F0502020204030204" pitchFamily="34" charset="0"/>
+                <a:cs typeface="Times New Roman" panose="02020603050405020304" pitchFamily="18" charset="0"/>
+              </a:rPr>
+              <a:t>However, NFLX has a positive skew and the longer box show greater degree of spread.  This also aligns with our previous observations.</a:t>
+            </a:r>
           </a:p>
         </p:txBody>
       </p:sp>
@@ -1340,9 +1341,9 @@
           <a:bodyPr/>
           <a:lstStyle/>
           <a:p>
-            <a:fld id="{3C464D38-78EB-6A4F-BCA2-1B202E646C54}" type="slidenum">
+            <a:fld id="{5B0439F7-BA01-A541-95AE-C6E45E2F4003}" type="slidenum">
               <a:rPr lang="en-US" smtClean="0"/>
-              <a:t>15</a:t>
+              <a:t>17</a:t>
             </a:fld>
             <a:endParaRPr lang="en-US"/>
           </a:p>
@@ -1351,7 +1352,7 @@
     </p:spTree>
     <p:extLst>
       <p:ext uri="{BB962C8B-B14F-4D97-AF65-F5344CB8AC3E}">
-        <p14:creationId xmlns:p14="http://schemas.microsoft.com/office/powerpoint/2010/main" val="4258049016"/>
+        <p14:creationId xmlns:p14="http://schemas.microsoft.com/office/powerpoint/2010/main" val="763483845"/>
       </p:ext>
     </p:extLst>
   </p:cSld>
@@ -3255,7 +3256,7 @@
           <a:p>
             <a:fld id="{C1CC7F00-77D2-4F43-9191-B15704280A39}" type="datetimeFigureOut">
               <a:rPr lang="en-US" smtClean="0"/>
-              <a:t>6/24/2020</a:t>
+              <a:t>6/24/20</a:t>
             </a:fld>
             <a:endParaRPr lang="en-US"/>
           </a:p>
@@ -3458,7 +3459,7 @@
           <a:p>
             <a:fld id="{C1CC7F00-77D2-4F43-9191-B15704280A39}" type="datetimeFigureOut">
               <a:rPr lang="en-US" smtClean="0"/>
-              <a:t>6/24/2020</a:t>
+              <a:t>6/24/20</a:t>
             </a:fld>
             <a:endParaRPr lang="en-US"/>
           </a:p>
@@ -3666,7 +3667,7 @@
           <a:p>
             <a:fld id="{C1CC7F00-77D2-4F43-9191-B15704280A39}" type="datetimeFigureOut">
               <a:rPr lang="en-US" smtClean="0"/>
-              <a:t>6/24/2020</a:t>
+              <a:t>6/24/20</a:t>
             </a:fld>
             <a:endParaRPr lang="en-US"/>
           </a:p>
@@ -3864,7 +3865,7 @@
           <a:p>
             <a:fld id="{C1CC7F00-77D2-4F43-9191-B15704280A39}" type="datetimeFigureOut">
               <a:rPr lang="en-US" smtClean="0"/>
-              <a:t>6/24/2020</a:t>
+              <a:t>6/24/20</a:t>
             </a:fld>
             <a:endParaRPr lang="en-US"/>
           </a:p>
@@ -4139,7 +4140,7 @@
           <a:p>
             <a:fld id="{C1CC7F00-77D2-4F43-9191-B15704280A39}" type="datetimeFigureOut">
               <a:rPr lang="en-US" smtClean="0"/>
-              <a:t>6/24/2020</a:t>
+              <a:t>6/24/20</a:t>
             </a:fld>
             <a:endParaRPr lang="en-US"/>
           </a:p>
@@ -4409,7 +4410,7 @@
           <a:p>
             <a:fld id="{C1CC7F00-77D2-4F43-9191-B15704280A39}" type="datetimeFigureOut">
               <a:rPr lang="en-US" smtClean="0"/>
-              <a:t>6/24/2020</a:t>
+              <a:t>6/24/20</a:t>
             </a:fld>
             <a:endParaRPr lang="en-US"/>
           </a:p>
@@ -4821,7 +4822,7 @@
           <a:p>
             <a:fld id="{C1CC7F00-77D2-4F43-9191-B15704280A39}" type="datetimeFigureOut">
               <a:rPr lang="en-US" smtClean="0"/>
-              <a:t>6/24/2020</a:t>
+              <a:t>6/24/20</a:t>
             </a:fld>
             <a:endParaRPr lang="en-US"/>
           </a:p>
@@ -4962,7 +4963,7 @@
           <a:p>
             <a:fld id="{C1CC7F00-77D2-4F43-9191-B15704280A39}" type="datetimeFigureOut">
               <a:rPr lang="en-US" smtClean="0"/>
-              <a:t>6/24/2020</a:t>
+              <a:t>6/24/20</a:t>
             </a:fld>
             <a:endParaRPr lang="en-US"/>
           </a:p>
@@ -5075,7 +5076,7 @@
           <a:p>
             <a:fld id="{C1CC7F00-77D2-4F43-9191-B15704280A39}" type="datetimeFigureOut">
               <a:rPr lang="en-US" smtClean="0"/>
-              <a:t>6/24/2020</a:t>
+              <a:t>6/24/20</a:t>
             </a:fld>
             <a:endParaRPr lang="en-US"/>
           </a:p>
@@ -5391,7 +5392,7 @@
           <a:p>
             <a:fld id="{C1CC7F00-77D2-4F43-9191-B15704280A39}" type="datetimeFigureOut">
               <a:rPr lang="en-US" smtClean="0"/>
-              <a:t>6/24/2020</a:t>
+              <a:t>6/24/20</a:t>
             </a:fld>
             <a:endParaRPr lang="en-US"/>
           </a:p>
@@ -5679,7 +5680,7 @@
           <a:p>
             <a:fld id="{C1CC7F00-77D2-4F43-9191-B15704280A39}" type="datetimeFigureOut">
               <a:rPr lang="en-US" smtClean="0"/>
-              <a:t>6/24/2020</a:t>
+              <a:t>6/24/20</a:t>
             </a:fld>
             <a:endParaRPr lang="en-US"/>
           </a:p>
@@ -5920,7 +5921,7 @@
           <a:p>
             <a:fld id="{C1CC7F00-77D2-4F43-9191-B15704280A39}" type="datetimeFigureOut">
               <a:rPr lang="en-US" smtClean="0"/>
-              <a:t>6/24/2020</a:t>
+              <a:t>6/24/20</a:t>
             </a:fld>
             <a:endParaRPr lang="en-US"/>
           </a:p>
@@ -10077,16 +10078,6 @@
               <a:t>The Jan and Feb forecasted prices are within +/- NFLX STD.</a:t>
             </a:r>
           </a:p>
-          <a:p>
-            <a:r>
-              <a:rPr lang="en-US" sz="1900" dirty="0">
-                <a:solidFill>
-                  <a:srgbClr val="000000"/>
-                </a:solidFill>
-              </a:rPr>
-              <a:t>This can be attributed by three things…</a:t>
-            </a:r>
-          </a:p>
         </p:txBody>
       </p:sp>
       <p:sp>
@@ -10271,361 +10262,6 @@
 </file>
 
 <file path=ppt/slides/slide13.xml><?xml version="1.0" encoding="utf-8"?>
-<p:sld xmlns:a="http://schemas.openxmlformats.org/drawingml/2006/main" xmlns:r="http://schemas.openxmlformats.org/officeDocument/2006/relationships" xmlns:p="http://schemas.openxmlformats.org/presentationml/2006/main">
-  <p:cSld>
-    <p:bg>
-      <p:bgPr>
-        <a:solidFill>
-          <a:schemeClr val="bg1"/>
-        </a:solidFill>
-        <a:effectLst/>
-      </p:bgPr>
-    </p:bg>
-    <p:spTree>
-      <p:nvGrpSpPr>
-        <p:cNvPr id="1" name=""/>
-        <p:cNvGrpSpPr/>
-        <p:nvPr/>
-      </p:nvGrpSpPr>
-      <p:grpSpPr>
-        <a:xfrm>
-          <a:off x="0" y="0"/>
-          <a:ext cx="0" cy="0"/>
-          <a:chOff x="0" y="0"/>
-          <a:chExt cx="0" cy="0"/>
-        </a:xfrm>
-      </p:grpSpPr>
-      <p:sp>
-        <p:nvSpPr>
-          <p:cNvPr id="16" name="Rectangle 15">
-            <a:extLst>
-              <a:ext uri="{FF2B5EF4-FFF2-40B4-BE49-F238E27FC236}">
-                <a16:creationId xmlns:a16="http://schemas.microsoft.com/office/drawing/2014/main" id="{9AF5C66A-E8F2-4E13-98A3-FE96597C5A42}"/>
-              </a:ext>
-              <a:ext uri="{C183D7F6-B498-43B3-948B-1728B52AA6E4}">
-                <adec:decorative xmlns:adec="http://schemas.microsoft.com/office/drawing/2017/decorative" val="1"/>
-              </a:ext>
-            </a:extLst>
-          </p:cNvPr>
-          <p:cNvSpPr>
-            <a:spLocks noGrp="1" noRot="1" noChangeAspect="1" noMove="1" noResize="1" noEditPoints="1" noAdjustHandles="1" noChangeArrowheads="1" noChangeShapeType="1" noTextEdit="1"/>
-          </p:cNvSpPr>
-          <p:nvPr>
-            <p:extLst>
-              <p:ext uri="{386F3935-93C4-4BCD-93E2-E3B085C9AB24}">
-                <p16:designElem xmlns:p16="http://schemas.microsoft.com/office/powerpoint/2015/main" val="1"/>
-              </p:ext>
-            </p:extLst>
-          </p:nvPr>
-        </p:nvSpPr>
-        <p:spPr>
-          <a:xfrm>
-            <a:off x="355601" y="0"/>
-            <a:ext cx="11480494" cy="2753936"/>
-          </a:xfrm>
-          <a:prstGeom prst="rect">
-            <a:avLst/>
-          </a:prstGeom>
-          <a:gradFill>
-            <a:gsLst>
-              <a:gs pos="0">
-                <a:schemeClr val="accent1">
-                  <a:lumMod val="90000"/>
-                </a:schemeClr>
-              </a:gs>
-              <a:gs pos="25000">
-                <a:schemeClr val="accent1">
-                  <a:lumMod val="90000"/>
-                </a:schemeClr>
-              </a:gs>
-              <a:gs pos="94000">
-                <a:schemeClr val="bg2">
-                  <a:lumMod val="25000"/>
-                </a:schemeClr>
-              </a:gs>
-              <a:gs pos="100000">
-                <a:schemeClr val="bg2">
-                  <a:lumMod val="25000"/>
-                </a:schemeClr>
-              </a:gs>
-            </a:gsLst>
-            <a:lin ang="4200000" scaled="0"/>
-          </a:gradFill>
-          <a:ln>
-            <a:noFill/>
-          </a:ln>
-        </p:spPr>
-        <p:style>
-          <a:lnRef idx="2">
-            <a:schemeClr val="accent1">
-              <a:shade val="50000"/>
-            </a:schemeClr>
-          </a:lnRef>
-          <a:fillRef idx="1">
-            <a:schemeClr val="accent1"/>
-          </a:fillRef>
-          <a:effectRef idx="0">
-            <a:schemeClr val="accent1"/>
-          </a:effectRef>
-          <a:fontRef idx="minor">
-            <a:schemeClr val="lt1"/>
-          </a:fontRef>
-        </p:style>
-        <p:txBody>
-          <a:bodyPr rtlCol="0" anchor="ctr"/>
-          <a:lstStyle/>
-          <a:p>
-            <a:pPr marL="0" marR="0" lvl="0" indent="0" algn="ctr" defTabSz="914400" rtl="0" eaLnBrk="1" fontAlgn="auto" latinLnBrk="0" hangingPunct="1">
-              <a:lnSpc>
-                <a:spcPct val="100000"/>
-              </a:lnSpc>
-              <a:spcBef>
-                <a:spcPts val="0"/>
-              </a:spcBef>
-              <a:spcAft>
-                <a:spcPts val="0"/>
-              </a:spcAft>
-              <a:buClrTx/>
-              <a:buSzTx/>
-              <a:buFontTx/>
-              <a:buNone/>
-              <a:tabLst/>
-              <a:defRPr/>
-            </a:pPr>
-            <a:endParaRPr kumimoji="0" lang="en-US" sz="1800" b="0" i="0" u="none" strike="noStrike" kern="1200" cap="none" spc="0" normalizeH="0" baseline="0" noProof="0">
-              <a:ln>
-                <a:noFill/>
-              </a:ln>
-              <a:solidFill>
-                <a:prstClr val="white"/>
-              </a:solidFill>
-              <a:effectLst/>
-              <a:uLnTx/>
-              <a:uFillTx/>
-              <a:latin typeface="Calibri" panose="020F0502020204030204"/>
-              <a:ea typeface="+mn-ea"/>
-              <a:cs typeface="+mn-cs"/>
-            </a:endParaRPr>
-          </a:p>
-        </p:txBody>
-      </p:sp>
-      <p:pic>
-        <p:nvPicPr>
-          <p:cNvPr id="18" name="Picture 17">
-            <a:extLst>
-              <a:ext uri="{FF2B5EF4-FFF2-40B4-BE49-F238E27FC236}">
-                <a16:creationId xmlns:a16="http://schemas.microsoft.com/office/drawing/2014/main" id="{AC860275-E106-493A-8BF0-E0A91130EF6A}"/>
-              </a:ext>
-              <a:ext uri="{C183D7F6-B498-43B3-948B-1728B52AA6E4}">
-                <adec:decorative xmlns:adec="http://schemas.microsoft.com/office/drawing/2017/decorative" val="1"/>
-              </a:ext>
-            </a:extLst>
-          </p:cNvPr>
-          <p:cNvPicPr>
-            <a:picLocks noGrp="1" noRot="1" noChangeAspect="1" noMove="1" noResize="1" noEditPoints="1" noAdjustHandles="1" noChangeArrowheads="1" noChangeShapeType="1" noCrop="1"/>
-          </p:cNvPicPr>
-          <p:nvPr>
-            <p:extLst>
-              <p:ext uri="{386F3935-93C4-4BCD-93E2-E3B085C9AB24}">
-                <p16:designElem xmlns:p16="http://schemas.microsoft.com/office/powerpoint/2015/main" val="1"/>
-              </p:ext>
-            </p:extLst>
-          </p:nvPr>
-        </p:nvPicPr>
-        <p:blipFill>
-          <a:blip r:embed="rId3">
-            <a:extLst>
-              <a:ext uri="{28A0092B-C50C-407E-A947-70E740481C1C}">
-                <a14:useLocalDpi xmlns:a14="http://schemas.microsoft.com/office/drawing/2010/main" val="0"/>
-              </a:ext>
-            </a:extLst>
-          </a:blip>
-          <a:stretch>
-            <a:fillRect/>
-          </a:stretch>
-        </p:blipFill>
-        <p:spPr>
-          <a:xfrm>
-            <a:off x="0" y="0"/>
-            <a:ext cx="12192000" cy="6858000"/>
-          </a:xfrm>
-          <a:prstGeom prst="rect">
-            <a:avLst/>
-          </a:prstGeom>
-        </p:spPr>
-      </p:pic>
-      <p:sp>
-        <p:nvSpPr>
-          <p:cNvPr id="2" name="Title 1">
-            <a:extLst>
-              <a:ext uri="{FF2B5EF4-FFF2-40B4-BE49-F238E27FC236}">
-                <a16:creationId xmlns:a16="http://schemas.microsoft.com/office/drawing/2014/main" id="{3FD6EF63-5EA2-4B42-B846-53D4341777AB}"/>
-              </a:ext>
-            </a:extLst>
-          </p:cNvPr>
-          <p:cNvSpPr>
-            <a:spLocks noGrp="1"/>
-          </p:cNvSpPr>
-          <p:nvPr>
-            <p:ph type="title"/>
-          </p:nvPr>
-        </p:nvSpPr>
-        <p:spPr>
-          <a:xfrm>
-            <a:off x="1179576" y="822960"/>
-            <a:ext cx="9829800" cy="1325880"/>
-          </a:xfrm>
-        </p:spPr>
-        <p:txBody>
-          <a:bodyPr>
-            <a:normAutofit/>
-          </a:bodyPr>
-          <a:lstStyle/>
-          <a:p>
-            <a:pPr algn="ctr"/>
-            <a:r>
-              <a:rPr lang="en-US" sz="4000" dirty="0">
-                <a:solidFill>
-                  <a:srgbClr val="FFFFFF"/>
-                </a:solidFill>
-              </a:rPr>
-              <a:t>Data Integrity of the 2 Assets </a:t>
-            </a:r>
-          </a:p>
-        </p:txBody>
-      </p:sp>
-      <p:pic>
-        <p:nvPicPr>
-          <p:cNvPr id="4" name="Picture 3">
-            <a:extLst>
-              <a:ext uri="{FF2B5EF4-FFF2-40B4-BE49-F238E27FC236}">
-                <a16:creationId xmlns:a16="http://schemas.microsoft.com/office/drawing/2014/main" id="{D179DBDA-B792-0849-8AED-E88AAD05E678}"/>
-              </a:ext>
-            </a:extLst>
-          </p:cNvPr>
-          <p:cNvPicPr>
-            <a:picLocks noChangeAspect="1"/>
-          </p:cNvPicPr>
-          <p:nvPr/>
-        </p:nvPicPr>
-        <p:blipFill rotWithShape="1">
-          <a:blip r:embed="rId4">
-            <a:extLst>
-              <a:ext uri="{28A0092B-C50C-407E-A947-70E740481C1C}">
-                <a14:useLocalDpi xmlns:a14="http://schemas.microsoft.com/office/drawing/2010/main" val="0"/>
-              </a:ext>
-            </a:extLst>
-          </a:blip>
-          <a:srcRect l="6875" t="6546" r="8576" b="7459"/>
-          <a:stretch/>
-        </p:blipFill>
-        <p:spPr>
-          <a:xfrm>
-            <a:off x="797170" y="2753936"/>
-            <a:ext cx="6481124" cy="3795145"/>
-          </a:xfrm>
-          <a:prstGeom prst="rect">
-            <a:avLst/>
-          </a:prstGeom>
-        </p:spPr>
-      </p:pic>
-      <p:sp>
-        <p:nvSpPr>
-          <p:cNvPr id="6" name="Content Placeholder 5">
-            <a:extLst>
-              <a:ext uri="{FF2B5EF4-FFF2-40B4-BE49-F238E27FC236}">
-                <a16:creationId xmlns:a16="http://schemas.microsoft.com/office/drawing/2014/main" id="{6DEA3C7F-4EA8-5249-BB6B-09DE0AD89996}"/>
-              </a:ext>
-            </a:extLst>
-          </p:cNvPr>
-          <p:cNvSpPr>
-            <a:spLocks noGrp="1"/>
-          </p:cNvSpPr>
-          <p:nvPr>
-            <p:ph idx="1"/>
-          </p:nvPr>
-        </p:nvSpPr>
-        <p:spPr>
-          <a:xfrm>
-            <a:off x="7365248" y="3048000"/>
-            <a:ext cx="4029582" cy="3689517"/>
-          </a:xfrm>
-        </p:spPr>
-        <p:txBody>
-          <a:bodyPr anchor="ctr">
-            <a:normAutofit/>
-          </a:bodyPr>
-          <a:lstStyle/>
-          <a:p>
-            <a:r>
-              <a:rPr lang="en-US" sz="1900" dirty="0">
-                <a:solidFill>
-                  <a:srgbClr val="000000"/>
-                </a:solidFill>
-              </a:rPr>
-              <a:t>The box plot lends some credence to the Jan 2020 price of NFLX with all prices &gt;120 as outliers </a:t>
-            </a:r>
-          </a:p>
-          <a:p>
-            <a:r>
-              <a:rPr lang="en-US" sz="1900" dirty="0">
-                <a:solidFill>
-                  <a:srgbClr val="000000"/>
-                </a:solidFill>
-              </a:rPr>
-              <a:t>50% of your data is in the box.</a:t>
-            </a:r>
-          </a:p>
-          <a:p>
-            <a:r>
-              <a:rPr lang="en-US" sz="1900" dirty="0">
-                <a:solidFill>
-                  <a:srgbClr val="000000"/>
-                </a:solidFill>
-              </a:rPr>
-              <a:t>Orange line represents the median.</a:t>
-            </a:r>
-          </a:p>
-          <a:p>
-            <a:r>
-              <a:rPr lang="en-US" sz="1900" dirty="0">
-                <a:solidFill>
-                  <a:srgbClr val="000000"/>
-                </a:solidFill>
-              </a:rPr>
-              <a:t>The narrower the box the closer the majority of data is to the median.</a:t>
-            </a:r>
-          </a:p>
-          <a:p>
-            <a:endParaRPr lang="en-US" sz="1900" dirty="0">
-              <a:solidFill>
-                <a:srgbClr val="000000"/>
-              </a:solidFill>
-            </a:endParaRPr>
-          </a:p>
-          <a:p>
-            <a:endParaRPr lang="en-US" sz="1900" dirty="0">
-              <a:solidFill>
-                <a:srgbClr val="000000"/>
-              </a:solidFill>
-            </a:endParaRPr>
-          </a:p>
-        </p:txBody>
-      </p:sp>
-    </p:spTree>
-    <p:extLst>
-      <p:ext uri="{BB962C8B-B14F-4D97-AF65-F5344CB8AC3E}">
-        <p14:creationId xmlns:p14="http://schemas.microsoft.com/office/powerpoint/2010/main" val="2896706760"/>
-      </p:ext>
-    </p:extLst>
-  </p:cSld>
-  <p:clrMapOvr>
-    <a:masterClrMapping/>
-  </p:clrMapOvr>
-</p:sld>
-</file>
-
-<file path=ppt/slides/slide14.xml><?xml version="1.0" encoding="utf-8"?>
 <p:sld xmlns:a="http://schemas.openxmlformats.org/drawingml/2006/main" xmlns:r="http://schemas.openxmlformats.org/officeDocument/2006/relationships" xmlns:p="http://schemas.openxmlformats.org/presentationml/2006/main">
   <p:cSld>
     <p:bg>
@@ -11225,7 +10861,7 @@
 </p:sld>
 </file>
 
-<file path=ppt/slides/slide15.xml><?xml version="1.0" encoding="utf-8"?>
+<file path=ppt/slides/slide14.xml><?xml version="1.0" encoding="utf-8"?>
 <p:sld xmlns:a="http://schemas.openxmlformats.org/drawingml/2006/main" xmlns:r="http://schemas.openxmlformats.org/officeDocument/2006/relationships" xmlns:p="http://schemas.openxmlformats.org/presentationml/2006/main">
   <p:cSld>
     <p:bg>
@@ -11866,7 +11502,7 @@
 </p:sld>
 </file>
 
-<file path=ppt/slides/slide16.xml><?xml version="1.0" encoding="utf-8"?>
+<file path=ppt/slides/slide15.xml><?xml version="1.0" encoding="utf-8"?>
 <p:sld xmlns:a="http://schemas.openxmlformats.org/drawingml/2006/main" xmlns:r="http://schemas.openxmlformats.org/officeDocument/2006/relationships" xmlns:p="http://schemas.openxmlformats.org/presentationml/2006/main">
   <p:cSld>
     <p:bg>
@@ -12324,6 +11960,447 @@
     <p:extLst>
       <p:ext uri="{BB962C8B-B14F-4D97-AF65-F5344CB8AC3E}">
         <p14:creationId xmlns:p14="http://schemas.microsoft.com/office/powerpoint/2010/main" val="4126127436"/>
+      </p:ext>
+    </p:extLst>
+  </p:cSld>
+  <p:clrMapOvr>
+    <a:masterClrMapping/>
+  </p:clrMapOvr>
+</p:sld>
+</file>
+
+<file path=ppt/slides/slide16.xml><?xml version="1.0" encoding="utf-8"?>
+<p:sld xmlns:a="http://schemas.openxmlformats.org/drawingml/2006/main" xmlns:r="http://schemas.openxmlformats.org/officeDocument/2006/relationships" xmlns:p="http://schemas.openxmlformats.org/presentationml/2006/main">
+  <p:cSld>
+    <p:spTree>
+      <p:nvGrpSpPr>
+        <p:cNvPr id="1" name=""/>
+        <p:cNvGrpSpPr/>
+        <p:nvPr/>
+      </p:nvGrpSpPr>
+      <p:grpSpPr>
+        <a:xfrm>
+          <a:off x="0" y="0"/>
+          <a:ext cx="0" cy="0"/>
+          <a:chOff x="0" y="0"/>
+          <a:chExt cx="0" cy="0"/>
+        </a:xfrm>
+      </p:grpSpPr>
+      <p:sp>
+        <p:nvSpPr>
+          <p:cNvPr id="3" name="Content Placeholder 2">
+            <a:extLst>
+              <a:ext uri="{FF2B5EF4-FFF2-40B4-BE49-F238E27FC236}">
+                <a16:creationId xmlns:a16="http://schemas.microsoft.com/office/drawing/2014/main" id="{89CCDBBA-34C4-6B4C-B74D-E9A7CF78A81A}"/>
+              </a:ext>
+            </a:extLst>
+          </p:cNvPr>
+          <p:cNvSpPr>
+            <a:spLocks noGrp="1"/>
+          </p:cNvSpPr>
+          <p:nvPr>
+            <p:ph idx="1"/>
+          </p:nvPr>
+        </p:nvSpPr>
+        <p:spPr>
+          <a:xfrm>
+            <a:off x="838200" y="332509"/>
+            <a:ext cx="10515600" cy="5844454"/>
+          </a:xfrm>
+        </p:spPr>
+        <p:txBody>
+          <a:bodyPr>
+            <a:normAutofit/>
+          </a:bodyPr>
+          <a:lstStyle/>
+          <a:p>
+            <a:pPr marL="0" indent="0" algn="ctr">
+              <a:buNone/>
+            </a:pPr>
+            <a:endParaRPr lang="en-US" sz="5400" dirty="0"/>
+          </a:p>
+          <a:p>
+            <a:pPr marL="0" indent="0" algn="ctr">
+              <a:buNone/>
+            </a:pPr>
+            <a:endParaRPr lang="en-US" sz="5400" dirty="0"/>
+          </a:p>
+          <a:p>
+            <a:pPr marL="0" indent="0" algn="ctr">
+              <a:buNone/>
+            </a:pPr>
+            <a:endParaRPr lang="en-US" sz="5400" dirty="0"/>
+          </a:p>
+          <a:p>
+            <a:pPr marL="0" indent="0" algn="ctr">
+              <a:buNone/>
+            </a:pPr>
+            <a:r>
+              <a:rPr lang="en-US" sz="5400" dirty="0"/>
+              <a:t>Backup Slides </a:t>
+            </a:r>
+          </a:p>
+        </p:txBody>
+      </p:sp>
+    </p:spTree>
+    <p:extLst>
+      <p:ext uri="{BB962C8B-B14F-4D97-AF65-F5344CB8AC3E}">
+        <p14:creationId xmlns:p14="http://schemas.microsoft.com/office/powerpoint/2010/main" val="1408939107"/>
+      </p:ext>
+    </p:extLst>
+  </p:cSld>
+  <p:clrMapOvr>
+    <a:masterClrMapping/>
+  </p:clrMapOvr>
+</p:sld>
+</file>
+
+<file path=ppt/slides/slide17.xml><?xml version="1.0" encoding="utf-8"?>
+<p:sld xmlns:a="http://schemas.openxmlformats.org/drawingml/2006/main" xmlns:r="http://schemas.openxmlformats.org/officeDocument/2006/relationships" xmlns:p="http://schemas.openxmlformats.org/presentationml/2006/main">
+  <p:cSld>
+    <p:bg>
+      <p:bgPr>
+        <a:solidFill>
+          <a:schemeClr val="bg1"/>
+        </a:solidFill>
+        <a:effectLst/>
+      </p:bgPr>
+    </p:bg>
+    <p:spTree>
+      <p:nvGrpSpPr>
+        <p:cNvPr id="1" name=""/>
+        <p:cNvGrpSpPr/>
+        <p:nvPr/>
+      </p:nvGrpSpPr>
+      <p:grpSpPr>
+        <a:xfrm>
+          <a:off x="0" y="0"/>
+          <a:ext cx="0" cy="0"/>
+          <a:chOff x="0" y="0"/>
+          <a:chExt cx="0" cy="0"/>
+        </a:xfrm>
+      </p:grpSpPr>
+      <p:sp>
+        <p:nvSpPr>
+          <p:cNvPr id="16" name="Rectangle 15">
+            <a:extLst>
+              <a:ext uri="{FF2B5EF4-FFF2-40B4-BE49-F238E27FC236}">
+                <a16:creationId xmlns:a16="http://schemas.microsoft.com/office/drawing/2014/main" id="{9AF5C66A-E8F2-4E13-98A3-FE96597C5A42}"/>
+              </a:ext>
+              <a:ext uri="{C183D7F6-B498-43B3-948B-1728B52AA6E4}">
+                <adec:decorative xmlns:adec="http://schemas.microsoft.com/office/drawing/2017/decorative" val="1"/>
+              </a:ext>
+            </a:extLst>
+          </p:cNvPr>
+          <p:cNvSpPr>
+            <a:spLocks noGrp="1" noRot="1" noChangeAspect="1" noMove="1" noResize="1" noEditPoints="1" noAdjustHandles="1" noChangeArrowheads="1" noChangeShapeType="1" noTextEdit="1"/>
+          </p:cNvSpPr>
+          <p:nvPr>
+            <p:extLst>
+              <p:ext uri="{386F3935-93C4-4BCD-93E2-E3B085C9AB24}">
+                <p16:designElem xmlns:p16="http://schemas.microsoft.com/office/powerpoint/2015/main" val="1"/>
+              </p:ext>
+            </p:extLst>
+          </p:nvPr>
+        </p:nvSpPr>
+        <p:spPr>
+          <a:xfrm>
+            <a:off x="355601" y="0"/>
+            <a:ext cx="11480494" cy="2753936"/>
+          </a:xfrm>
+          <a:prstGeom prst="rect">
+            <a:avLst/>
+          </a:prstGeom>
+          <a:gradFill>
+            <a:gsLst>
+              <a:gs pos="0">
+                <a:schemeClr val="accent1">
+                  <a:lumMod val="90000"/>
+                </a:schemeClr>
+              </a:gs>
+              <a:gs pos="25000">
+                <a:schemeClr val="accent1">
+                  <a:lumMod val="90000"/>
+                </a:schemeClr>
+              </a:gs>
+              <a:gs pos="94000">
+                <a:schemeClr val="bg2">
+                  <a:lumMod val="25000"/>
+                </a:schemeClr>
+              </a:gs>
+              <a:gs pos="100000">
+                <a:schemeClr val="bg2">
+                  <a:lumMod val="25000"/>
+                </a:schemeClr>
+              </a:gs>
+            </a:gsLst>
+            <a:lin ang="4200000" scaled="0"/>
+          </a:gradFill>
+          <a:ln>
+            <a:noFill/>
+          </a:ln>
+        </p:spPr>
+        <p:style>
+          <a:lnRef idx="2">
+            <a:schemeClr val="accent1">
+              <a:shade val="50000"/>
+            </a:schemeClr>
+          </a:lnRef>
+          <a:fillRef idx="1">
+            <a:schemeClr val="accent1"/>
+          </a:fillRef>
+          <a:effectRef idx="0">
+            <a:schemeClr val="accent1"/>
+          </a:effectRef>
+          <a:fontRef idx="minor">
+            <a:schemeClr val="lt1"/>
+          </a:fontRef>
+        </p:style>
+        <p:txBody>
+          <a:bodyPr rtlCol="0" anchor="ctr"/>
+          <a:lstStyle/>
+          <a:p>
+            <a:pPr marL="0" marR="0" lvl="0" indent="0" algn="ctr" defTabSz="914400" rtl="0" eaLnBrk="1" fontAlgn="auto" latinLnBrk="0" hangingPunct="1">
+              <a:lnSpc>
+                <a:spcPct val="100000"/>
+              </a:lnSpc>
+              <a:spcBef>
+                <a:spcPts val="0"/>
+              </a:spcBef>
+              <a:spcAft>
+                <a:spcPts val="0"/>
+              </a:spcAft>
+              <a:buClrTx/>
+              <a:buSzTx/>
+              <a:buFontTx/>
+              <a:buNone/>
+              <a:tabLst/>
+              <a:defRPr/>
+            </a:pPr>
+            <a:endParaRPr kumimoji="0" lang="en-US" sz="1800" b="0" i="0" u="none" strike="noStrike" kern="1200" cap="none" spc="0" normalizeH="0" baseline="0" noProof="0">
+              <a:ln>
+                <a:noFill/>
+              </a:ln>
+              <a:solidFill>
+                <a:prstClr val="white"/>
+              </a:solidFill>
+              <a:effectLst/>
+              <a:uLnTx/>
+              <a:uFillTx/>
+              <a:latin typeface="Calibri" panose="020F0502020204030204"/>
+              <a:ea typeface="+mn-ea"/>
+              <a:cs typeface="+mn-cs"/>
+            </a:endParaRPr>
+          </a:p>
+        </p:txBody>
+      </p:sp>
+      <p:pic>
+        <p:nvPicPr>
+          <p:cNvPr id="18" name="Picture 17">
+            <a:extLst>
+              <a:ext uri="{FF2B5EF4-FFF2-40B4-BE49-F238E27FC236}">
+                <a16:creationId xmlns:a16="http://schemas.microsoft.com/office/drawing/2014/main" id="{AC860275-E106-493A-8BF0-E0A91130EF6A}"/>
+              </a:ext>
+              <a:ext uri="{C183D7F6-B498-43B3-948B-1728B52AA6E4}">
+                <adec:decorative xmlns:adec="http://schemas.microsoft.com/office/drawing/2017/decorative" val="1"/>
+              </a:ext>
+            </a:extLst>
+          </p:cNvPr>
+          <p:cNvPicPr>
+            <a:picLocks noGrp="1" noRot="1" noChangeAspect="1" noMove="1" noResize="1" noEditPoints="1" noAdjustHandles="1" noChangeArrowheads="1" noChangeShapeType="1" noCrop="1"/>
+          </p:cNvPicPr>
+          <p:nvPr>
+            <p:extLst>
+              <p:ext uri="{386F3935-93C4-4BCD-93E2-E3B085C9AB24}">
+                <p16:designElem xmlns:p16="http://schemas.microsoft.com/office/powerpoint/2015/main" val="1"/>
+              </p:ext>
+            </p:extLst>
+          </p:nvPr>
+        </p:nvPicPr>
+        <p:blipFill>
+          <a:blip r:embed="rId3">
+            <a:extLst>
+              <a:ext uri="{28A0092B-C50C-407E-A947-70E740481C1C}">
+                <a14:useLocalDpi xmlns:a14="http://schemas.microsoft.com/office/drawing/2010/main" val="0"/>
+              </a:ext>
+            </a:extLst>
+          </a:blip>
+          <a:stretch>
+            <a:fillRect/>
+          </a:stretch>
+        </p:blipFill>
+        <p:spPr>
+          <a:xfrm>
+            <a:off x="0" y="0"/>
+            <a:ext cx="12192000" cy="6858000"/>
+          </a:xfrm>
+          <a:prstGeom prst="rect">
+            <a:avLst/>
+          </a:prstGeom>
+        </p:spPr>
+      </p:pic>
+      <p:sp>
+        <p:nvSpPr>
+          <p:cNvPr id="2" name="Title 1">
+            <a:extLst>
+              <a:ext uri="{FF2B5EF4-FFF2-40B4-BE49-F238E27FC236}">
+                <a16:creationId xmlns:a16="http://schemas.microsoft.com/office/drawing/2014/main" id="{3FD6EF63-5EA2-4B42-B846-53D4341777AB}"/>
+              </a:ext>
+            </a:extLst>
+          </p:cNvPr>
+          <p:cNvSpPr>
+            <a:spLocks noGrp="1"/>
+          </p:cNvSpPr>
+          <p:nvPr>
+            <p:ph type="title"/>
+          </p:nvPr>
+        </p:nvSpPr>
+        <p:spPr>
+          <a:xfrm>
+            <a:off x="1179576" y="822960"/>
+            <a:ext cx="9829800" cy="1325880"/>
+          </a:xfrm>
+        </p:spPr>
+        <p:txBody>
+          <a:bodyPr>
+            <a:normAutofit/>
+          </a:bodyPr>
+          <a:lstStyle/>
+          <a:p>
+            <a:pPr algn="ctr"/>
+            <a:r>
+              <a:rPr lang="en-US" sz="4000" dirty="0">
+                <a:solidFill>
+                  <a:srgbClr val="FFFFFF"/>
+                </a:solidFill>
+              </a:rPr>
+              <a:t>Data Integrity of the 2 Assets </a:t>
+            </a:r>
+          </a:p>
+        </p:txBody>
+      </p:sp>
+      <p:pic>
+        <p:nvPicPr>
+          <p:cNvPr id="4" name="Picture 3">
+            <a:extLst>
+              <a:ext uri="{FF2B5EF4-FFF2-40B4-BE49-F238E27FC236}">
+                <a16:creationId xmlns:a16="http://schemas.microsoft.com/office/drawing/2014/main" id="{D179DBDA-B792-0849-8AED-E88AAD05E678}"/>
+              </a:ext>
+            </a:extLst>
+          </p:cNvPr>
+          <p:cNvPicPr>
+            <a:picLocks noChangeAspect="1"/>
+          </p:cNvPicPr>
+          <p:nvPr/>
+        </p:nvPicPr>
+        <p:blipFill rotWithShape="1">
+          <a:blip r:embed="rId4">
+            <a:extLst>
+              <a:ext uri="{28A0092B-C50C-407E-A947-70E740481C1C}">
+                <a14:useLocalDpi xmlns:a14="http://schemas.microsoft.com/office/drawing/2010/main" val="0"/>
+              </a:ext>
+            </a:extLst>
+          </a:blip>
+          <a:srcRect l="6875" t="6546" r="8576" b="7459"/>
+          <a:stretch/>
+        </p:blipFill>
+        <p:spPr>
+          <a:xfrm>
+            <a:off x="797170" y="2753936"/>
+            <a:ext cx="6481124" cy="3795145"/>
+          </a:xfrm>
+          <a:prstGeom prst="rect">
+            <a:avLst/>
+          </a:prstGeom>
+        </p:spPr>
+      </p:pic>
+      <p:sp>
+        <p:nvSpPr>
+          <p:cNvPr id="6" name="Content Placeholder 5">
+            <a:extLst>
+              <a:ext uri="{FF2B5EF4-FFF2-40B4-BE49-F238E27FC236}">
+                <a16:creationId xmlns:a16="http://schemas.microsoft.com/office/drawing/2014/main" id="{6DEA3C7F-4EA8-5249-BB6B-09DE0AD89996}"/>
+              </a:ext>
+            </a:extLst>
+          </p:cNvPr>
+          <p:cNvSpPr>
+            <a:spLocks noGrp="1"/>
+          </p:cNvSpPr>
+          <p:nvPr>
+            <p:ph idx="1"/>
+          </p:nvPr>
+        </p:nvSpPr>
+        <p:spPr>
+          <a:xfrm>
+            <a:off x="7365248" y="3048000"/>
+            <a:ext cx="4029582" cy="3689517"/>
+          </a:xfrm>
+        </p:spPr>
+        <p:txBody>
+          <a:bodyPr anchor="ctr">
+            <a:normAutofit/>
+          </a:bodyPr>
+          <a:lstStyle/>
+          <a:p>
+            <a:r>
+              <a:rPr lang="en-US" sz="1900" dirty="0">
+                <a:solidFill>
+                  <a:srgbClr val="000000"/>
+                </a:solidFill>
+              </a:rPr>
+              <a:t>The box plot lends some credence to the Jan 2020 price of NFLX with all prices &gt;120 as outliers </a:t>
+            </a:r>
+          </a:p>
+          <a:p>
+            <a:r>
+              <a:rPr lang="en-US" sz="1900" dirty="0">
+                <a:solidFill>
+                  <a:srgbClr val="000000"/>
+                </a:solidFill>
+              </a:rPr>
+              <a:t>50% of your data is in the box.</a:t>
+            </a:r>
+          </a:p>
+          <a:p>
+            <a:r>
+              <a:rPr lang="en-US" sz="1900" dirty="0">
+                <a:solidFill>
+                  <a:srgbClr val="000000"/>
+                </a:solidFill>
+              </a:rPr>
+              <a:t>Orange line represents the median.</a:t>
+            </a:r>
+          </a:p>
+          <a:p>
+            <a:r>
+              <a:rPr lang="en-US" sz="1900" dirty="0">
+                <a:solidFill>
+                  <a:srgbClr val="000000"/>
+                </a:solidFill>
+              </a:rPr>
+              <a:t>The narrower the box the closer the majority of data is to the median.</a:t>
+            </a:r>
+          </a:p>
+          <a:p>
+            <a:endParaRPr lang="en-US" sz="1900" dirty="0">
+              <a:solidFill>
+                <a:srgbClr val="000000"/>
+              </a:solidFill>
+            </a:endParaRPr>
+          </a:p>
+          <a:p>
+            <a:endParaRPr lang="en-US" sz="1900" dirty="0">
+              <a:solidFill>
+                <a:srgbClr val="000000"/>
+              </a:solidFill>
+            </a:endParaRPr>
+          </a:p>
+        </p:txBody>
+      </p:sp>
+    </p:spTree>
+    <p:extLst>
+      <p:ext uri="{BB962C8B-B14F-4D97-AF65-F5344CB8AC3E}">
+        <p14:creationId xmlns:p14="http://schemas.microsoft.com/office/powerpoint/2010/main" val="2896706760"/>
       </p:ext>
     </p:extLst>
   </p:cSld>

</xml_diff>

<commit_message>
Made changes to Clay's slides & notes
</commit_message>
<xml_diff>
--- a/Final_Presentation.pptx
+++ b/Final_Presentation.pptx
@@ -213,7 +213,7 @@
           <a:p>
             <a:fld id="{967483A9-E084-4649-A19B-B92CB0DE91A3}" type="datetimeFigureOut">
               <a:rPr lang="en-US" smtClean="0"/>
-              <a:t>6/24/20</a:t>
+              <a:t>6/25/2020</a:t>
             </a:fld>
             <a:endParaRPr lang="en-US"/>
           </a:p>
@@ -2502,15 +2502,22 @@
           <a:bodyPr/>
           <a:lstStyle/>
           <a:p>
-            <a:pPr marL="342900" marR="0" lvl="0" indent="-342900">
+            <a:pPr marL="342900" marR="0" lvl="0" indent="-342900" algn="l" defTabSz="914400" rtl="0" eaLnBrk="1" fontAlgn="auto" latinLnBrk="0" hangingPunct="1">
+              <a:lnSpc>
+                <a:spcPct val="100000"/>
+              </a:lnSpc>
               <a:spcBef>
                 <a:spcPts val="0"/>
               </a:spcBef>
               <a:spcAft>
                 <a:spcPts val="0"/>
               </a:spcAft>
+              <a:buClrTx/>
+              <a:buSzTx/>
               <a:buFont typeface="Symbol" panose="05050102010706020507" pitchFamily="18" charset="2"/>
               <a:buChar char=""/>
+              <a:tabLst/>
+              <a:defRPr/>
             </a:pPr>
             <a:r>
               <a:rPr lang="en-US" sz="1200" dirty="0">
@@ -2519,19 +2526,51 @@
                 <a:ea typeface="Calibri" panose="020F0502020204030204" pitchFamily="34" charset="0"/>
                 <a:cs typeface="Times New Roman" panose="02020603050405020304" pitchFamily="18" charset="0"/>
               </a:rPr>
-              <a:t>There is always some risk in every undertaking and even greater when you put your money in a company you have no clue about its operations</a:t>
-            </a:r>
-          </a:p>
-          <a:p>
-            <a:pPr marL="342900" marR="0" lvl="0" indent="-342900">
+              <a:t>Here we used panda’s standard deviation function to calculate the STD of our stock’s monthly returns over 10 years. </a:t>
+            </a:r>
+          </a:p>
+          <a:p>
+            <a:pPr marL="342900" marR="0" lvl="0" indent="-342900" algn="l" defTabSz="914400" rtl="0" eaLnBrk="1" fontAlgn="auto" latinLnBrk="0" hangingPunct="1">
+              <a:lnSpc>
+                <a:spcPct val="100000"/>
+              </a:lnSpc>
               <a:spcBef>
                 <a:spcPts val="0"/>
               </a:spcBef>
               <a:spcAft>
                 <a:spcPts val="0"/>
               </a:spcAft>
+              <a:buClrTx/>
+              <a:buSzTx/>
               <a:buFont typeface="Symbol" panose="05050102010706020507" pitchFamily="18" charset="2"/>
               <a:buChar char=""/>
+              <a:tabLst/>
+              <a:defRPr/>
+            </a:pPr>
+            <a:endParaRPr lang="en-US" sz="1200" dirty="0">
+              <a:effectLst/>
+              <a:latin typeface="Calibri" panose="020F0502020204030204" pitchFamily="34" charset="0"/>
+              <a:ea typeface="Calibri" panose="020F0502020204030204" pitchFamily="34" charset="0"/>
+              <a:cs typeface="Times New Roman" panose="02020603050405020304" pitchFamily="18" charset="0"/>
+            </a:endParaRPr>
+          </a:p>
+          <a:p>
+            <a:pPr marL="342900" marR="0" lvl="0" indent="-342900" algn="l" defTabSz="914400" rtl="0" eaLnBrk="1" fontAlgn="auto" latinLnBrk="0" hangingPunct="1">
+              <a:lnSpc>
+                <a:spcPct val="100000"/>
+              </a:lnSpc>
+              <a:spcBef>
+                <a:spcPts val="0"/>
+              </a:spcBef>
+              <a:spcAft>
+                <a:spcPts val="0"/>
+              </a:spcAft>
+              <a:buClrTx/>
+              <a:buSzTx/>
+              <a:buFont typeface="Symbol" panose="05050102010706020507" pitchFamily="18" charset="2"/>
+              <a:buChar char=""/>
+              <a:tabLst/>
+              <a:defRPr/>
             </a:pPr>
             <a:r>
               <a:rPr lang="en-US" sz="1200" dirty="0">
@@ -2540,19 +2579,51 @@
                 <a:ea typeface="Calibri" panose="020F0502020204030204" pitchFamily="34" charset="0"/>
                 <a:cs typeface="Times New Roman" panose="02020603050405020304" pitchFamily="18" charset="0"/>
               </a:rPr>
-              <a:t>Here we used pandas standard deviation function/method to calculate the std of the stocks monthly returns. This is a measure of the volatility of the return. </a:t>
-            </a:r>
-          </a:p>
-          <a:p>
-            <a:pPr marL="342900" marR="0" lvl="0" indent="-342900">
+              <a:t>Essentially, this is a measure of the volatility of the return.  A more volatile stock will have a higher risk/reward.</a:t>
+            </a:r>
+          </a:p>
+          <a:p>
+            <a:pPr marL="342900" marR="0" lvl="0" indent="-342900" algn="l" defTabSz="914400" rtl="0" eaLnBrk="1" fontAlgn="auto" latinLnBrk="0" hangingPunct="1">
+              <a:lnSpc>
+                <a:spcPct val="100000"/>
+              </a:lnSpc>
               <a:spcBef>
                 <a:spcPts val="0"/>
               </a:spcBef>
               <a:spcAft>
                 <a:spcPts val="0"/>
               </a:spcAft>
+              <a:buClrTx/>
+              <a:buSzTx/>
               <a:buFont typeface="Symbol" panose="05050102010706020507" pitchFamily="18" charset="2"/>
               <a:buChar char=""/>
+              <a:tabLst/>
+              <a:defRPr/>
+            </a:pPr>
+            <a:endParaRPr lang="en-US" sz="1200" dirty="0">
+              <a:effectLst/>
+              <a:latin typeface="Calibri" panose="020F0502020204030204" pitchFamily="34" charset="0"/>
+              <a:ea typeface="Calibri" panose="020F0502020204030204" pitchFamily="34" charset="0"/>
+              <a:cs typeface="Times New Roman" panose="02020603050405020304" pitchFamily="18" charset="0"/>
+            </a:endParaRPr>
+          </a:p>
+          <a:p>
+            <a:pPr marL="342900" marR="0" lvl="0" indent="-342900" algn="l" defTabSz="914400" rtl="0" eaLnBrk="1" fontAlgn="auto" latinLnBrk="0" hangingPunct="1">
+              <a:lnSpc>
+                <a:spcPct val="100000"/>
+              </a:lnSpc>
+              <a:spcBef>
+                <a:spcPts val="0"/>
+              </a:spcBef>
+              <a:spcAft>
+                <a:spcPts val="0"/>
+              </a:spcAft>
+              <a:buClrTx/>
+              <a:buSzTx/>
+              <a:buFont typeface="Symbol" panose="05050102010706020507" pitchFamily="18" charset="2"/>
+              <a:buChar char=""/>
+              <a:tabLst/>
+              <a:defRPr/>
             </a:pPr>
             <a:r>
               <a:rPr lang="en-US" sz="1200" dirty="0">
@@ -2561,19 +2632,51 @@
                 <a:ea typeface="Calibri" panose="020F0502020204030204" pitchFamily="34" charset="0"/>
                 <a:cs typeface="Times New Roman" panose="02020603050405020304" pitchFamily="18" charset="0"/>
               </a:rPr>
-              <a:t>Remember in this context, STD is the dispersion of each stocks return relative to its mean value (variance). A higher STD indicates more datapoints are further away from the mean within the data set and a large return range.</a:t>
-            </a:r>
-          </a:p>
-          <a:p>
-            <a:pPr marL="342900" marR="0" lvl="0" indent="-342900">
+              <a:t>Young, aggressive investors may be more inclined to invest in more volatile stocks because they have time to recoup their potential losses.</a:t>
+            </a:r>
+          </a:p>
+          <a:p>
+            <a:pPr marL="342900" marR="0" lvl="0" indent="-342900" algn="l" defTabSz="914400" rtl="0" eaLnBrk="1" fontAlgn="auto" latinLnBrk="0" hangingPunct="1">
+              <a:lnSpc>
+                <a:spcPct val="100000"/>
+              </a:lnSpc>
               <a:spcBef>
                 <a:spcPts val="0"/>
               </a:spcBef>
               <a:spcAft>
                 <a:spcPts val="0"/>
               </a:spcAft>
+              <a:buClrTx/>
+              <a:buSzTx/>
               <a:buFont typeface="Symbol" panose="05050102010706020507" pitchFamily="18" charset="2"/>
               <a:buChar char=""/>
+              <a:tabLst/>
+              <a:defRPr/>
+            </a:pPr>
+            <a:endParaRPr lang="en-US" sz="1200" dirty="0">
+              <a:effectLst/>
+              <a:latin typeface="Calibri" panose="020F0502020204030204" pitchFamily="34" charset="0"/>
+              <a:ea typeface="Calibri" panose="020F0502020204030204" pitchFamily="34" charset="0"/>
+              <a:cs typeface="Times New Roman" panose="02020603050405020304" pitchFamily="18" charset="0"/>
+            </a:endParaRPr>
+          </a:p>
+          <a:p>
+            <a:pPr marL="342900" marR="0" lvl="0" indent="-342900" algn="l" defTabSz="914400" rtl="0" eaLnBrk="1" fontAlgn="auto" latinLnBrk="0" hangingPunct="1">
+              <a:lnSpc>
+                <a:spcPct val="100000"/>
+              </a:lnSpc>
+              <a:spcBef>
+                <a:spcPts val="0"/>
+              </a:spcBef>
+              <a:spcAft>
+                <a:spcPts val="0"/>
+              </a:spcAft>
+              <a:buClrTx/>
+              <a:buSzTx/>
+              <a:buFont typeface="Symbol" panose="05050102010706020507" pitchFamily="18" charset="2"/>
+              <a:buChar char=""/>
+              <a:tabLst/>
+              <a:defRPr/>
             </a:pPr>
             <a:r>
               <a:rPr lang="en-US" sz="1200" dirty="0">
@@ -2582,8 +2685,33 @@
                 <a:ea typeface="Calibri" panose="020F0502020204030204" pitchFamily="34" charset="0"/>
                 <a:cs typeface="Times New Roman" panose="02020603050405020304" pitchFamily="18" charset="0"/>
               </a:rPr>
-              <a:t>All stocks except for few are within 3.5 to 5.5% and of course the standout is NFLX. The range as seen here are typical of the large-cap S&amp;P 500 stocks</a:t>
-            </a:r>
+              <a:t>Speculators and day traders also love risky assets, while long term investors favor more stable assets.</a:t>
+            </a:r>
+          </a:p>
+          <a:p>
+            <a:pPr marL="342900" marR="0" lvl="0" indent="-342900" algn="l" defTabSz="914400" rtl="0" eaLnBrk="1" fontAlgn="auto" latinLnBrk="0" hangingPunct="1">
+              <a:lnSpc>
+                <a:spcPct val="100000"/>
+              </a:lnSpc>
+              <a:spcBef>
+                <a:spcPts val="0"/>
+              </a:spcBef>
+              <a:spcAft>
+                <a:spcPts val="0"/>
+              </a:spcAft>
+              <a:buClrTx/>
+              <a:buSzTx/>
+              <a:buFont typeface="Symbol" panose="05050102010706020507" pitchFamily="18" charset="2"/>
+              <a:buChar char=""/>
+              <a:tabLst/>
+              <a:defRPr/>
+            </a:pPr>
+            <a:endParaRPr lang="en-US" sz="1200" dirty="0">
+              <a:effectLst/>
+              <a:latin typeface="Calibri" panose="020F0502020204030204" pitchFamily="34" charset="0"/>
+              <a:ea typeface="Calibri" panose="020F0502020204030204" pitchFamily="34" charset="0"/>
+              <a:cs typeface="Times New Roman" panose="02020603050405020304" pitchFamily="18" charset="0"/>
+            </a:endParaRPr>
           </a:p>
           <a:p>
             <a:pPr marL="342900" marR="0" lvl="0" indent="-342900">
@@ -2603,7 +2731,7 @@
                 <a:ea typeface="Calibri" panose="020F0502020204030204" pitchFamily="34" charset="0"/>
                 <a:cs typeface="Times New Roman" panose="02020603050405020304" pitchFamily="18" charset="0"/>
               </a:rPr>
-              <a:t>Note that a low STD isn’t necessarily the holy grail of investments. Young and aggressive investors typically go for above average std assets </a:t>
+              <a:t>It should be noted that there is always some risk in every undertaking, and even greater risk when you put your money into a company in which operations you are less knowledgeable of.</a:t>
             </a:r>
           </a:p>
           <a:p>
@@ -2616,6 +2744,98 @@
               </a:spcAft>
               <a:buFont typeface="Symbol" panose="05050102010706020507" pitchFamily="18" charset="2"/>
               <a:buChar char=""/>
+            </a:pPr>
+            <a:endParaRPr lang="en-US" sz="1200" dirty="0">
+              <a:effectLst/>
+              <a:latin typeface="Calibri" panose="020F0502020204030204" pitchFamily="34" charset="0"/>
+              <a:ea typeface="Calibri" panose="020F0502020204030204" pitchFamily="34" charset="0"/>
+              <a:cs typeface="Times New Roman" panose="02020603050405020304" pitchFamily="18" charset="0"/>
+            </a:endParaRPr>
+          </a:p>
+          <a:p>
+            <a:pPr marL="342900" marR="0" lvl="0" indent="-342900" algn="l" defTabSz="914400" rtl="0" eaLnBrk="1" fontAlgn="auto" latinLnBrk="0" hangingPunct="1">
+              <a:lnSpc>
+                <a:spcPct val="100000"/>
+              </a:lnSpc>
+              <a:spcBef>
+                <a:spcPts val="0"/>
+              </a:spcBef>
+              <a:spcAft>
+                <a:spcPts val="0"/>
+              </a:spcAft>
+              <a:buClrTx/>
+              <a:buSzTx/>
+              <a:buFont typeface="Symbol" panose="05050102010706020507" pitchFamily="18" charset="2"/>
+              <a:buChar char=""/>
+              <a:tabLst/>
+              <a:defRPr/>
+            </a:pPr>
+            <a:r>
+              <a:rPr lang="en-US" sz="1200" i="0" dirty="0">
+                <a:solidFill>
+                  <a:srgbClr val="000000"/>
+                </a:solidFill>
+              </a:rPr>
+              <a:t>The STD of returns of most stocks we have analyzed fall between </a:t>
+            </a:r>
+            <a:r>
+              <a:rPr lang="en-US" sz="1200" i="1" dirty="0">
+                <a:solidFill>
+                  <a:srgbClr val="000000"/>
+                </a:solidFill>
+              </a:rPr>
+              <a:t>3.5% to 5.5%, </a:t>
+            </a:r>
+            <a:r>
+              <a:rPr lang="en-US" sz="1200" i="0" dirty="0">
+                <a:solidFill>
+                  <a:srgbClr val="000000"/>
+                </a:solidFill>
+              </a:rPr>
+              <a:t>a range that is very typical of large-cap S&amp;P 500 stocks. </a:t>
+            </a:r>
+          </a:p>
+          <a:p>
+            <a:pPr marL="342900" marR="0" lvl="0" indent="-342900" algn="l" defTabSz="914400" rtl="0" eaLnBrk="1" fontAlgn="auto" latinLnBrk="0" hangingPunct="1">
+              <a:lnSpc>
+                <a:spcPct val="100000"/>
+              </a:lnSpc>
+              <a:spcBef>
+                <a:spcPts val="0"/>
+              </a:spcBef>
+              <a:spcAft>
+                <a:spcPts val="0"/>
+              </a:spcAft>
+              <a:buClrTx/>
+              <a:buSzTx/>
+              <a:buFont typeface="Symbol" panose="05050102010706020507" pitchFamily="18" charset="2"/>
+              <a:buChar char=""/>
+              <a:tabLst/>
+              <a:defRPr/>
+            </a:pPr>
+            <a:endParaRPr lang="en-US" sz="1200" i="0" dirty="0">
+              <a:solidFill>
+                <a:srgbClr val="000000"/>
+              </a:solidFill>
+            </a:endParaRPr>
+          </a:p>
+          <a:p>
+            <a:pPr marL="342900" marR="0" lvl="0" indent="-342900" algn="l" defTabSz="914400" rtl="0" eaLnBrk="1" fontAlgn="auto" latinLnBrk="0" hangingPunct="1">
+              <a:lnSpc>
+                <a:spcPct val="100000"/>
+              </a:lnSpc>
+              <a:spcBef>
+                <a:spcPts val="0"/>
+              </a:spcBef>
+              <a:spcAft>
+                <a:spcPts val="0"/>
+              </a:spcAft>
+              <a:buClrTx/>
+              <a:buSzTx/>
+              <a:buFont typeface="Symbol" panose="05050102010706020507" pitchFamily="18" charset="2"/>
+              <a:buChar char=""/>
+              <a:tabLst/>
+              <a:defRPr/>
             </a:pPr>
             <a:r>
               <a:rPr lang="en-US" sz="1200" dirty="0">
@@ -2624,7 +2844,135 @@
                 <a:ea typeface="Calibri" panose="020F0502020204030204" pitchFamily="34" charset="0"/>
                 <a:cs typeface="Times New Roman" panose="02020603050405020304" pitchFamily="18" charset="0"/>
               </a:rPr>
-              <a:t>Also note that std are very susceptible to outliers.</a:t>
+              <a:t>Netflix stands out with a STD of returns of ~17% over the last 10 years and has been one of the most successful growth stories of the past decade.</a:t>
+            </a:r>
+          </a:p>
+          <a:p>
+            <a:pPr marL="0" marR="0" lvl="0" indent="0" algn="l" defTabSz="914400" rtl="0" eaLnBrk="1" fontAlgn="auto" latinLnBrk="0" hangingPunct="1">
+              <a:lnSpc>
+                <a:spcPct val="100000"/>
+              </a:lnSpc>
+              <a:spcBef>
+                <a:spcPts val="0"/>
+              </a:spcBef>
+              <a:spcAft>
+                <a:spcPts val="0"/>
+              </a:spcAft>
+              <a:buClrTx/>
+              <a:buSzTx/>
+              <a:buFont typeface="Symbol" panose="05050102010706020507" pitchFamily="18" charset="2"/>
+              <a:buNone/>
+              <a:tabLst/>
+              <a:defRPr/>
+            </a:pPr>
+            <a:endParaRPr lang="en-US" sz="1200" dirty="0">
+              <a:effectLst/>
+              <a:latin typeface="Calibri" panose="020F0502020204030204" pitchFamily="34" charset="0"/>
+              <a:ea typeface="Calibri" panose="020F0502020204030204" pitchFamily="34" charset="0"/>
+              <a:cs typeface="Times New Roman" panose="02020603050405020304" pitchFamily="18" charset="0"/>
+            </a:endParaRPr>
+          </a:p>
+          <a:p>
+            <a:pPr marL="0" marR="0" lvl="0" indent="0" algn="l" defTabSz="914400" rtl="0" eaLnBrk="1" fontAlgn="auto" latinLnBrk="0" hangingPunct="1">
+              <a:lnSpc>
+                <a:spcPct val="100000"/>
+              </a:lnSpc>
+              <a:spcBef>
+                <a:spcPts val="0"/>
+              </a:spcBef>
+              <a:spcAft>
+                <a:spcPts val="0"/>
+              </a:spcAft>
+              <a:buClrTx/>
+              <a:buSzTx/>
+              <a:buFont typeface="Symbol" panose="05050102010706020507" pitchFamily="18" charset="2"/>
+              <a:buNone/>
+              <a:tabLst/>
+              <a:defRPr/>
+            </a:pPr>
+            <a:endParaRPr lang="en-US" sz="1200" dirty="0">
+              <a:effectLst/>
+              <a:latin typeface="Calibri" panose="020F0502020204030204" pitchFamily="34" charset="0"/>
+              <a:ea typeface="Calibri" panose="020F0502020204030204" pitchFamily="34" charset="0"/>
+              <a:cs typeface="Times New Roman" panose="02020603050405020304" pitchFamily="18" charset="0"/>
+            </a:endParaRPr>
+          </a:p>
+          <a:p>
+            <a:pPr marL="0" marR="0" lvl="0" indent="0" algn="l" defTabSz="914400" rtl="0" eaLnBrk="1" fontAlgn="auto" latinLnBrk="0" hangingPunct="1">
+              <a:lnSpc>
+                <a:spcPct val="100000"/>
+              </a:lnSpc>
+              <a:spcBef>
+                <a:spcPts val="0"/>
+              </a:spcBef>
+              <a:spcAft>
+                <a:spcPts val="0"/>
+              </a:spcAft>
+              <a:buClrTx/>
+              <a:buSzTx/>
+              <a:buFont typeface="Symbol" panose="05050102010706020507" pitchFamily="18" charset="2"/>
+              <a:buNone/>
+              <a:tabLst/>
+              <a:defRPr/>
+            </a:pPr>
+            <a:r>
+              <a:rPr lang="en-US" sz="1200" dirty="0">
+                <a:effectLst/>
+                <a:latin typeface="Calibri" panose="020F0502020204030204" pitchFamily="34" charset="0"/>
+                <a:ea typeface="Calibri" panose="020F0502020204030204" pitchFamily="34" charset="0"/>
+                <a:cs typeface="Times New Roman" panose="02020603050405020304" pitchFamily="18" charset="0"/>
+              </a:rPr>
+              <a:t>-Note that a low STD isn’t necessarily the holy grail of investments. Young and aggressive investors typically go for above average std assets </a:t>
+            </a:r>
+          </a:p>
+          <a:p>
+            <a:pPr marL="0" marR="0" lvl="0" indent="0">
+              <a:spcBef>
+                <a:spcPts val="0"/>
+              </a:spcBef>
+              <a:spcAft>
+                <a:spcPts val="0"/>
+              </a:spcAft>
+              <a:buFont typeface="Symbol" panose="05050102010706020507" pitchFamily="18" charset="2"/>
+              <a:buNone/>
+            </a:pPr>
+            <a:r>
+              <a:rPr lang="en-US" sz="1200" dirty="0">
+                <a:effectLst/>
+                <a:latin typeface="Calibri" panose="020F0502020204030204" pitchFamily="34" charset="0"/>
+                <a:ea typeface="Calibri" panose="020F0502020204030204" pitchFamily="34" charset="0"/>
+                <a:cs typeface="Times New Roman" panose="02020603050405020304" pitchFamily="18" charset="0"/>
+              </a:rPr>
+              <a:t>-Also note that std are very susceptible to outliers.</a:t>
+            </a:r>
+            <a:endParaRPr lang="en-US" dirty="0"/>
+          </a:p>
+          <a:p>
+            <a:pPr marL="0" marR="0" lvl="0" indent="0" algn="l" defTabSz="914400" rtl="0" eaLnBrk="1" fontAlgn="auto" latinLnBrk="0" hangingPunct="1">
+              <a:lnSpc>
+                <a:spcPct val="100000"/>
+              </a:lnSpc>
+              <a:spcBef>
+                <a:spcPts val="0"/>
+              </a:spcBef>
+              <a:spcAft>
+                <a:spcPts val="0"/>
+              </a:spcAft>
+              <a:buClrTx/>
+              <a:buSzTx/>
+              <a:buFontTx/>
+              <a:buNone/>
+              <a:tabLst/>
+              <a:defRPr/>
+            </a:pPr>
+            <a:r>
+              <a:rPr lang="en-US" sz="1200" dirty="0">
+                <a:effectLst/>
+                <a:latin typeface="Calibri" panose="020F0502020204030204" pitchFamily="34" charset="0"/>
+                <a:ea typeface="Calibri" panose="020F0502020204030204" pitchFamily="34" charset="0"/>
+                <a:cs typeface="Times New Roman" panose="02020603050405020304" pitchFamily="18" charset="0"/>
+              </a:rPr>
+              <a:t>-Remember in this context, STD is the dispersion of each stocks return relative to its mean value (variance). A higher STD indicates more datapoints are further away from the mean within the data set and a large return range.</a:t>
             </a:r>
           </a:p>
           <a:p>
@@ -2729,8 +3077,26 @@
                 <a:ea typeface="Calibri" panose="020F0502020204030204" pitchFamily="34" charset="0"/>
                 <a:cs typeface="Times New Roman" panose="02020603050405020304" pitchFamily="18" charset="0"/>
               </a:rPr>
-              <a:t>Here we created a correlation matrix of the stock returns with pandas CORR function</a:t>
-            </a:r>
+              <a:t>Here we created a correlation matrix of all assets returns using pandas CORR function</a:t>
+            </a:r>
+          </a:p>
+          <a:p>
+            <a:pPr marL="342900" marR="0" lvl="0" indent="-342900">
+              <a:spcBef>
+                <a:spcPts val="0"/>
+              </a:spcBef>
+              <a:spcAft>
+                <a:spcPts val="0"/>
+              </a:spcAft>
+              <a:buFont typeface="Symbol" panose="05050102010706020507" pitchFamily="18" charset="2"/>
+              <a:buChar char=""/>
+            </a:pPr>
+            <a:endParaRPr lang="en-US" sz="1800" dirty="0">
+              <a:effectLst/>
+              <a:latin typeface="Calibri" panose="020F0502020204030204" pitchFamily="34" charset="0"/>
+              <a:ea typeface="Calibri" panose="020F0502020204030204" pitchFamily="34" charset="0"/>
+              <a:cs typeface="Times New Roman" panose="02020603050405020304" pitchFamily="18" charset="0"/>
+            </a:endParaRPr>
           </a:p>
           <a:p>
             <a:pPr marL="342900" marR="0" lvl="0" indent="-342900">
@@ -2750,8 +3116,26 @@
                 <a:ea typeface="Calibri" panose="020F0502020204030204" pitchFamily="34" charset="0"/>
                 <a:cs typeface="Times New Roman" panose="02020603050405020304" pitchFamily="18" charset="0"/>
               </a:rPr>
-              <a:t>The objective of this aspect of our analysis is to understand the degree of linear relationships between pairs of stocks and to use analytics tools to shed more light on the concept of a diversified portfolio. (Do not put all your eggs in one basket)</a:t>
-            </a:r>
+              <a:t>The objective of this is to study the degree of linear relationships between pairs of stocks and to use analytical tools to create a more diverse portfolio. </a:t>
+            </a:r>
+          </a:p>
+          <a:p>
+            <a:pPr marL="342900" marR="0" lvl="0" indent="-342900">
+              <a:spcBef>
+                <a:spcPts val="0"/>
+              </a:spcBef>
+              <a:spcAft>
+                <a:spcPts val="0"/>
+              </a:spcAft>
+              <a:buFont typeface="Symbol" panose="05050102010706020507" pitchFamily="18" charset="2"/>
+              <a:buChar char=""/>
+            </a:pPr>
+            <a:endParaRPr lang="en-US" sz="1800" dirty="0">
+              <a:effectLst/>
+              <a:latin typeface="Calibri" panose="020F0502020204030204" pitchFamily="34" charset="0"/>
+              <a:ea typeface="Calibri" panose="020F0502020204030204" pitchFamily="34" charset="0"/>
+              <a:cs typeface="Times New Roman" panose="02020603050405020304" pitchFamily="18" charset="0"/>
+            </a:endParaRPr>
           </a:p>
           <a:p>
             <a:pPr marL="342900" marR="0" lvl="0" indent="-342900">
@@ -2771,8 +3155,26 @@
                 <a:ea typeface="Calibri" panose="020F0502020204030204" pitchFamily="34" charset="0"/>
                 <a:cs typeface="Times New Roman" panose="02020603050405020304" pitchFamily="18" charset="0"/>
               </a:rPr>
-              <a:t>The range is -1 to +1. </a:t>
-            </a:r>
+              <a:t>As an investor, you don’t want to put all of your eggs in one basket and risk taking a major hit.</a:t>
+            </a:r>
+          </a:p>
+          <a:p>
+            <a:pPr marL="342900" marR="0" lvl="0" indent="-342900">
+              <a:spcBef>
+                <a:spcPts val="0"/>
+              </a:spcBef>
+              <a:spcAft>
+                <a:spcPts val="0"/>
+              </a:spcAft>
+              <a:buFont typeface="Symbol" panose="05050102010706020507" pitchFamily="18" charset="2"/>
+              <a:buChar char=""/>
+            </a:pPr>
+            <a:endParaRPr lang="en-US" sz="1800" dirty="0">
+              <a:effectLst/>
+              <a:latin typeface="Calibri" panose="020F0502020204030204" pitchFamily="34" charset="0"/>
+              <a:ea typeface="Calibri" panose="020F0502020204030204" pitchFamily="34" charset="0"/>
+              <a:cs typeface="Times New Roman" panose="02020603050405020304" pitchFamily="18" charset="0"/>
+            </a:endParaRPr>
           </a:p>
           <a:p>
             <a:pPr marL="342900" marR="0" lvl="0" indent="-342900">
@@ -2792,20 +3194,17 @@
                 <a:ea typeface="Calibri" panose="020F0502020204030204" pitchFamily="34" charset="0"/>
                 <a:cs typeface="Times New Roman" panose="02020603050405020304" pitchFamily="18" charset="0"/>
               </a:rPr>
-              <a:t>Correlation rule of thumb:</a:t>
-            </a:r>
-          </a:p>
-          <a:p>
-            <a:pPr marL="342900" marR="0" lvl="0" indent="-342900">
-              <a:spcBef>
-                <a:spcPts val="0"/>
-              </a:spcBef>
-              <a:spcAft>
-                <a:spcPts val="0"/>
-              </a:spcAft>
-              <a:buFont typeface="Courier New" panose="02070309020205020404" pitchFamily="49" charset="0"/>
-              <a:buChar char="o"/>
-            </a:pPr>
+              <a:t>Take a look at assets within same industry such as Chevron/Exxon ; American/Delta; </a:t>
+            </a:r>
+            <a:r>
+              <a:rPr lang="en-US" sz="1800" dirty="0" err="1">
+                <a:effectLst/>
+                <a:latin typeface="Calibri" panose="020F0502020204030204" pitchFamily="34" charset="0"/>
+                <a:ea typeface="Calibri" panose="020F0502020204030204" pitchFamily="34" charset="0"/>
+                <a:cs typeface="Times New Roman" panose="02020603050405020304" pitchFamily="18" charset="0"/>
+              </a:rPr>
+              <a:t>BofA</a:t>
+            </a:r>
             <a:r>
               <a:rPr lang="en-US" sz="1800" dirty="0">
                 <a:effectLst/>
@@ -2813,7 +3212,7 @@
                 <a:ea typeface="Calibri" panose="020F0502020204030204" pitchFamily="34" charset="0"/>
                 <a:cs typeface="Times New Roman" panose="02020603050405020304" pitchFamily="18" charset="0"/>
               </a:rPr>
-              <a:t>-1 or 1 (perfect correlation)</a:t>
+              <a:t>/WFC; and note that they have strong correlation of returns.</a:t>
             </a:r>
           </a:p>
           <a:p>
@@ -2824,8 +3223,26 @@
               <a:spcAft>
                 <a:spcPts val="0"/>
               </a:spcAft>
-              <a:buFont typeface="Courier New" panose="02070309020205020404" pitchFamily="49" charset="0"/>
-              <a:buChar char="o"/>
+              <a:buFont typeface="Symbol" panose="05050102010706020507" pitchFamily="18" charset="2"/>
+              <a:buChar char=""/>
+            </a:pPr>
+            <a:endParaRPr lang="en-US" sz="1800" dirty="0">
+              <a:effectLst/>
+              <a:latin typeface="Calibri" panose="020F0502020204030204" pitchFamily="34" charset="0"/>
+              <a:ea typeface="Calibri" panose="020F0502020204030204" pitchFamily="34" charset="0"/>
+              <a:cs typeface="Times New Roman" panose="02020603050405020304" pitchFamily="18" charset="0"/>
+            </a:endParaRPr>
+          </a:p>
+          <a:p>
+            <a:pPr marL="342900" marR="0" lvl="0" indent="-342900">
+              <a:spcBef>
+                <a:spcPts val="0"/>
+              </a:spcBef>
+              <a:spcAft>
+                <a:spcPts val="0"/>
+              </a:spcAft>
+              <a:buFont typeface="Symbol" panose="05050102010706020507" pitchFamily="18" charset="2"/>
+              <a:buChar char=""/>
             </a:pPr>
             <a:r>
               <a:rPr lang="en-US" sz="1800" dirty="0">
@@ -2834,7 +3251,7 @@
                 <a:ea typeface="Calibri" panose="020F0502020204030204" pitchFamily="34" charset="0"/>
                 <a:cs typeface="Times New Roman" panose="02020603050405020304" pitchFamily="18" charset="0"/>
               </a:rPr>
-              <a:t>&gt;=  +/- 0.7 (strong correlation)</a:t>
+              <a:t>However, some assets have a stronger relationship with companies outside of their industry than they do within. A few examples of this is Walmart having a higher correlation with Pepsi that it does Costco, and Disney has a higher correlation with Wells Fargo than it does Netflix.</a:t>
             </a:r>
           </a:p>
           <a:p>
@@ -2845,8 +3262,26 @@
               <a:spcAft>
                 <a:spcPts val="0"/>
               </a:spcAft>
-              <a:buFont typeface="Courier New" panose="02070309020205020404" pitchFamily="49" charset="0"/>
-              <a:buChar char="o"/>
+              <a:buFont typeface="Symbol" panose="05050102010706020507" pitchFamily="18" charset="2"/>
+              <a:buChar char=""/>
+            </a:pPr>
+            <a:endParaRPr lang="en-US" sz="1800" dirty="0">
+              <a:effectLst/>
+              <a:latin typeface="Calibri" panose="020F0502020204030204" pitchFamily="34" charset="0"/>
+              <a:ea typeface="Calibri" panose="020F0502020204030204" pitchFamily="34" charset="0"/>
+              <a:cs typeface="Times New Roman" panose="02020603050405020304" pitchFamily="18" charset="0"/>
+            </a:endParaRPr>
+          </a:p>
+          <a:p>
+            <a:pPr marL="342900" marR="0" lvl="0" indent="-342900">
+              <a:spcBef>
+                <a:spcPts val="0"/>
+              </a:spcBef>
+              <a:spcAft>
+                <a:spcPts val="0"/>
+              </a:spcAft>
+              <a:buFont typeface="Symbol" panose="05050102010706020507" pitchFamily="18" charset="2"/>
+              <a:buChar char=""/>
             </a:pPr>
             <a:r>
               <a:rPr lang="en-US" sz="1800" dirty="0">
@@ -2855,19 +3290,55 @@
                 <a:ea typeface="Calibri" panose="020F0502020204030204" pitchFamily="34" charset="0"/>
                 <a:cs typeface="Times New Roman" panose="02020603050405020304" pitchFamily="18" charset="0"/>
               </a:rPr>
-              <a:t>&gt;=  +/- 0.5 (moderate)</a:t>
-            </a:r>
-          </a:p>
-          <a:p>
-            <a:pPr marL="342900" marR="0" lvl="0" indent="-342900">
+              <a:t>Information is always powerful to an investor, and the key take away here is to have a mix of lowly correlated assets in your portfolio. </a:t>
+            </a:r>
+          </a:p>
+          <a:p>
+            <a:pPr marL="0" marR="0" lvl="0" indent="0">
               <a:spcBef>
                 <a:spcPts val="0"/>
               </a:spcBef>
               <a:spcAft>
                 <a:spcPts val="0"/>
               </a:spcAft>
-              <a:buFont typeface="Courier New" panose="02070309020205020404" pitchFamily="49" charset="0"/>
-              <a:buChar char="o"/>
+              <a:buFont typeface="Symbol" panose="05050102010706020507" pitchFamily="18" charset="2"/>
+              <a:buNone/>
+            </a:pPr>
+            <a:endParaRPr lang="en-US" sz="1800" dirty="0">
+              <a:effectLst/>
+              <a:latin typeface="Calibri" panose="020F0502020204030204" pitchFamily="34" charset="0"/>
+              <a:ea typeface="Calibri" panose="020F0502020204030204" pitchFamily="34" charset="0"/>
+              <a:cs typeface="Times New Roman" panose="02020603050405020304" pitchFamily="18" charset="0"/>
+            </a:endParaRPr>
+          </a:p>
+          <a:p>
+            <a:pPr marL="0" marR="0" lvl="0" indent="0">
+              <a:spcBef>
+                <a:spcPts val="0"/>
+              </a:spcBef>
+              <a:spcAft>
+                <a:spcPts val="0"/>
+              </a:spcAft>
+              <a:buFont typeface="Symbol" panose="05050102010706020507" pitchFamily="18" charset="2"/>
+              <a:buNone/>
+            </a:pPr>
+            <a:endParaRPr lang="en-US" sz="1800" dirty="0">
+              <a:effectLst/>
+              <a:latin typeface="Calibri" panose="020F0502020204030204" pitchFamily="34" charset="0"/>
+              <a:ea typeface="Calibri" panose="020F0502020204030204" pitchFamily="34" charset="0"/>
+              <a:cs typeface="Times New Roman" panose="02020603050405020304" pitchFamily="18" charset="0"/>
+            </a:endParaRPr>
+          </a:p>
+          <a:p>
+            <a:pPr marL="0" marR="0" lvl="0" indent="0">
+              <a:spcBef>
+                <a:spcPts val="0"/>
+              </a:spcBef>
+              <a:spcAft>
+                <a:spcPts val="0"/>
+              </a:spcAft>
+              <a:buFont typeface="Symbol" panose="05050102010706020507" pitchFamily="18" charset="2"/>
+              <a:buNone/>
             </a:pPr>
             <a:r>
               <a:rPr lang="en-US" sz="1800" dirty="0">
@@ -2876,112 +3347,7 @@
                 <a:ea typeface="Calibri" panose="020F0502020204030204" pitchFamily="34" charset="0"/>
                 <a:cs typeface="Times New Roman" panose="02020603050405020304" pitchFamily="18" charset="0"/>
               </a:rPr>
-              <a:t>&lt;=  +/- 0.3 (weak)</a:t>
-            </a:r>
-          </a:p>
-          <a:p>
-            <a:pPr marL="342900" marR="0" lvl="0" indent="-342900">
-              <a:spcBef>
-                <a:spcPts val="0"/>
-              </a:spcBef>
-              <a:spcAft>
-                <a:spcPts val="0"/>
-              </a:spcAft>
-              <a:buFont typeface="Courier New" panose="02070309020205020404" pitchFamily="49" charset="0"/>
-              <a:buChar char="o"/>
-            </a:pPr>
-            <a:r>
-              <a:rPr lang="en-US" sz="1800" dirty="0">
-                <a:effectLst/>
-                <a:latin typeface="Calibri" panose="020F0502020204030204" pitchFamily="34" charset="0"/>
-                <a:ea typeface="Calibri" panose="020F0502020204030204" pitchFamily="34" charset="0"/>
-                <a:cs typeface="Times New Roman" panose="02020603050405020304" pitchFamily="18" charset="0"/>
-              </a:rPr>
-              <a:t>0 (no linear relation sip)</a:t>
-            </a:r>
-          </a:p>
-          <a:p>
-            <a:pPr marL="342900" marR="0" lvl="0" indent="-342900">
-              <a:spcBef>
-                <a:spcPts val="0"/>
-              </a:spcBef>
-              <a:spcAft>
-                <a:spcPts val="0"/>
-              </a:spcAft>
-              <a:buFont typeface="Symbol" panose="05050102010706020507" pitchFamily="18" charset="2"/>
-              <a:buChar char=""/>
-            </a:pPr>
-            <a:r>
-              <a:rPr lang="en-US" sz="1800" dirty="0">
-                <a:effectLst/>
-                <a:latin typeface="Calibri" panose="020F0502020204030204" pitchFamily="34" charset="0"/>
-                <a:ea typeface="Calibri" panose="020F0502020204030204" pitchFamily="34" charset="0"/>
-                <a:cs typeface="Times New Roman" panose="02020603050405020304" pitchFamily="18" charset="0"/>
-              </a:rPr>
-              <a:t>Take a look at assets within same industry BAC/WFC; AAL/DAL; CVX/XOM and note that they have strong correlation </a:t>
-            </a:r>
-          </a:p>
-          <a:p>
-            <a:pPr marL="342900" marR="0" lvl="0" indent="-342900">
-              <a:spcBef>
-                <a:spcPts val="0"/>
-              </a:spcBef>
-              <a:spcAft>
-                <a:spcPts val="0"/>
-              </a:spcAft>
-              <a:buFont typeface="Symbol" panose="05050102010706020507" pitchFamily="18" charset="2"/>
-              <a:buChar char=""/>
-            </a:pPr>
-            <a:r>
-              <a:rPr lang="en-US" sz="1800" dirty="0">
-                <a:effectLst/>
-                <a:latin typeface="Calibri" panose="020F0502020204030204" pitchFamily="34" charset="0"/>
-                <a:ea typeface="Calibri" panose="020F0502020204030204" pitchFamily="34" charset="0"/>
-                <a:cs typeface="Times New Roman" panose="02020603050405020304" pitchFamily="18" charset="0"/>
-              </a:rPr>
-              <a:t>Also take a look at individual assets correlation with S&amp;P 500….very hard to find assets within the S&amp;P500 index with &lt;0.3 correlation with the market. </a:t>
-            </a:r>
-          </a:p>
-          <a:p>
-            <a:pPr marL="342900" marR="0" lvl="0" indent="-342900">
-              <a:spcBef>
-                <a:spcPts val="0"/>
-              </a:spcBef>
-              <a:spcAft>
-                <a:spcPts val="0"/>
-              </a:spcAft>
-              <a:buFont typeface="Symbol" panose="05050102010706020507" pitchFamily="18" charset="2"/>
-              <a:buChar char=""/>
-            </a:pPr>
-            <a:r>
-              <a:rPr lang="en-US" sz="1800" dirty="0">
-                <a:effectLst/>
-                <a:latin typeface="Calibri" panose="020F0502020204030204" pitchFamily="34" charset="0"/>
-                <a:ea typeface="Calibri" panose="020F0502020204030204" pitchFamily="34" charset="0"/>
-                <a:cs typeface="Times New Roman" panose="02020603050405020304" pitchFamily="18" charset="0"/>
-              </a:rPr>
-              <a:t>Key take away here is to have a mix of lowly correlated assets in your portfolio. </a:t>
-            </a:r>
-          </a:p>
-          <a:p>
-            <a:pPr marL="342900" marR="0" lvl="0" indent="-342900">
-              <a:spcBef>
-                <a:spcPts val="0"/>
-              </a:spcBef>
-              <a:spcAft>
-                <a:spcPts val="0"/>
-              </a:spcAft>
-              <a:buFont typeface="Symbol" panose="05050102010706020507" pitchFamily="18" charset="2"/>
-              <a:buChar char=""/>
-            </a:pPr>
-            <a:r>
-              <a:rPr lang="en-US" sz="1800" dirty="0">
-                <a:effectLst/>
-                <a:latin typeface="Calibri" panose="020F0502020204030204" pitchFamily="34" charset="0"/>
-                <a:ea typeface="Calibri" panose="020F0502020204030204" pitchFamily="34" charset="0"/>
-                <a:cs typeface="Times New Roman" panose="02020603050405020304" pitchFamily="18" charset="0"/>
-              </a:rPr>
-              <a:t> Next we will focus on 2 assets and make an attempt to predict their future stock price with regression model ….the assets are CVX with the strongest correlation with the market and NFLX with the lowest correlation with the market …also NFLX returns have the highest volatility while CVX have a much lower volatility relative to NFLX</a:t>
+              <a:t>Next we will focus on 2 assets and make an attempt to predict their future stock price with regression model ….the assets are CVX with the strongest correlation with the market and NFLX with the lowest correlation with the market …also NFLX returns have the highest volatility while CVX have a much lower volatility relative to NFLX</a:t>
             </a:r>
           </a:p>
         </p:txBody>
@@ -3256,7 +3622,7 @@
           <a:p>
             <a:fld id="{C1CC7F00-77D2-4F43-9191-B15704280A39}" type="datetimeFigureOut">
               <a:rPr lang="en-US" smtClean="0"/>
-              <a:t>6/24/20</a:t>
+              <a:t>6/25/2020</a:t>
             </a:fld>
             <a:endParaRPr lang="en-US"/>
           </a:p>
@@ -3459,7 +3825,7 @@
           <a:p>
             <a:fld id="{C1CC7F00-77D2-4F43-9191-B15704280A39}" type="datetimeFigureOut">
               <a:rPr lang="en-US" smtClean="0"/>
-              <a:t>6/24/20</a:t>
+              <a:t>6/25/2020</a:t>
             </a:fld>
             <a:endParaRPr lang="en-US"/>
           </a:p>
@@ -3667,7 +4033,7 @@
           <a:p>
             <a:fld id="{C1CC7F00-77D2-4F43-9191-B15704280A39}" type="datetimeFigureOut">
               <a:rPr lang="en-US" smtClean="0"/>
-              <a:t>6/24/20</a:t>
+              <a:t>6/25/2020</a:t>
             </a:fld>
             <a:endParaRPr lang="en-US"/>
           </a:p>
@@ -3865,7 +4231,7 @@
           <a:p>
             <a:fld id="{C1CC7F00-77D2-4F43-9191-B15704280A39}" type="datetimeFigureOut">
               <a:rPr lang="en-US" smtClean="0"/>
-              <a:t>6/24/20</a:t>
+              <a:t>6/25/2020</a:t>
             </a:fld>
             <a:endParaRPr lang="en-US"/>
           </a:p>
@@ -4140,7 +4506,7 @@
           <a:p>
             <a:fld id="{C1CC7F00-77D2-4F43-9191-B15704280A39}" type="datetimeFigureOut">
               <a:rPr lang="en-US" smtClean="0"/>
-              <a:t>6/24/20</a:t>
+              <a:t>6/25/2020</a:t>
             </a:fld>
             <a:endParaRPr lang="en-US"/>
           </a:p>
@@ -4410,7 +4776,7 @@
           <a:p>
             <a:fld id="{C1CC7F00-77D2-4F43-9191-B15704280A39}" type="datetimeFigureOut">
               <a:rPr lang="en-US" smtClean="0"/>
-              <a:t>6/24/20</a:t>
+              <a:t>6/25/2020</a:t>
             </a:fld>
             <a:endParaRPr lang="en-US"/>
           </a:p>
@@ -4822,7 +5188,7 @@
           <a:p>
             <a:fld id="{C1CC7F00-77D2-4F43-9191-B15704280A39}" type="datetimeFigureOut">
               <a:rPr lang="en-US" smtClean="0"/>
-              <a:t>6/24/20</a:t>
+              <a:t>6/25/2020</a:t>
             </a:fld>
             <a:endParaRPr lang="en-US"/>
           </a:p>
@@ -4963,7 +5329,7 @@
           <a:p>
             <a:fld id="{C1CC7F00-77D2-4F43-9191-B15704280A39}" type="datetimeFigureOut">
               <a:rPr lang="en-US" smtClean="0"/>
-              <a:t>6/24/20</a:t>
+              <a:t>6/25/2020</a:t>
             </a:fld>
             <a:endParaRPr lang="en-US"/>
           </a:p>
@@ -5076,7 +5442,7 @@
           <a:p>
             <a:fld id="{C1CC7F00-77D2-4F43-9191-B15704280A39}" type="datetimeFigureOut">
               <a:rPr lang="en-US" smtClean="0"/>
-              <a:t>6/24/20</a:t>
+              <a:t>6/25/2020</a:t>
             </a:fld>
             <a:endParaRPr lang="en-US"/>
           </a:p>
@@ -5392,7 +5758,7 @@
           <a:p>
             <a:fld id="{C1CC7F00-77D2-4F43-9191-B15704280A39}" type="datetimeFigureOut">
               <a:rPr lang="en-US" smtClean="0"/>
-              <a:t>6/24/20</a:t>
+              <a:t>6/25/2020</a:t>
             </a:fld>
             <a:endParaRPr lang="en-US"/>
           </a:p>
@@ -5680,7 +6046,7 @@
           <a:p>
             <a:fld id="{C1CC7F00-77D2-4F43-9191-B15704280A39}" type="datetimeFigureOut">
               <a:rPr lang="en-US" smtClean="0"/>
-              <a:t>6/24/20</a:t>
+              <a:t>6/25/2020</a:t>
             </a:fld>
             <a:endParaRPr lang="en-US"/>
           </a:p>
@@ -5921,7 +6287,7 @@
           <a:p>
             <a:fld id="{C1CC7F00-77D2-4F43-9191-B15704280A39}" type="datetimeFigureOut">
               <a:rPr lang="en-US" smtClean="0"/>
-              <a:t>6/24/20</a:t>
+              <a:t>6/25/2020</a:t>
             </a:fld>
             <a:endParaRPr lang="en-US"/>
           </a:p>
@@ -7180,45 +7546,6 @@
       </p:pic>
       <p:sp>
         <p:nvSpPr>
-          <p:cNvPr id="3" name="Content Placeholder 2">
-            <a:extLst>
-              <a:ext uri="{FF2B5EF4-FFF2-40B4-BE49-F238E27FC236}">
-                <a16:creationId xmlns:a16="http://schemas.microsoft.com/office/drawing/2014/main" id="{971D751F-79D8-1E49-B651-29F593965A38}"/>
-              </a:ext>
-            </a:extLst>
-          </p:cNvPr>
-          <p:cNvSpPr>
-            <a:spLocks noGrp="1"/>
-          </p:cNvSpPr>
-          <p:nvPr>
-            <p:ph idx="1"/>
-          </p:nvPr>
-        </p:nvSpPr>
-        <p:spPr>
-          <a:xfrm>
-            <a:off x="477905" y="3828926"/>
-            <a:ext cx="3669985" cy="741971"/>
-          </a:xfrm>
-        </p:spPr>
-        <p:txBody>
-          <a:bodyPr anchor="ctr">
-            <a:normAutofit/>
-          </a:bodyPr>
-          <a:lstStyle/>
-          <a:p>
-            <a:r>
-              <a:rPr lang="en-US" sz="1900" dirty="0">
-                <a:solidFill>
-                  <a:srgbClr val="000000"/>
-                </a:solidFill>
-              </a:rPr>
-              <a:t>A measure of linear relationship between 2 assets.</a:t>
-            </a:r>
-          </a:p>
-        </p:txBody>
-      </p:sp>
-      <p:sp>
-        <p:nvSpPr>
           <p:cNvPr id="46" name="Oval 45">
             <a:extLst>
               <a:ext uri="{FF2B5EF4-FFF2-40B4-BE49-F238E27FC236}">
@@ -8220,7 +8547,7 @@
         <p:spPr>
           <a:xfrm>
             <a:off x="7873340" y="2682269"/>
-            <a:ext cx="4092783" cy="1028411"/>
+            <a:ext cx="4092783" cy="1889224"/>
           </a:xfrm>
           <a:prstGeom prst="rect">
             <a:avLst/>
@@ -8318,7 +8645,7 @@
         <p:spPr>
           <a:xfrm>
             <a:off x="8687097" y="3273408"/>
-            <a:ext cx="3241593" cy="461665"/>
+            <a:ext cx="3324949" cy="276999"/>
           </a:xfrm>
           <a:prstGeom prst="rect">
             <a:avLst/>
@@ -8331,16 +8658,17 @@
           </a:bodyPr>
           <a:lstStyle/>
           <a:p>
+            <a:pPr marL="171450" indent="-171450">
+              <a:buFontTx/>
+              <a:buChar char="-"/>
+            </a:pPr>
             <a:r>
               <a:rPr lang="en-US" sz="1200" dirty="0">
                 <a:latin typeface="Times New Roman" panose="02020603050405020304" pitchFamily="18" charset="0"/>
                 <a:cs typeface="Times New Roman" panose="02020603050405020304" pitchFamily="18" charset="0"/>
               </a:rPr>
-              <a:t>- Correlation between assets in the same category</a:t>
-            </a:r>
-          </a:p>
-          <a:p>
-            <a:endParaRPr lang="en-US" sz="1200" dirty="0"/>
+              <a:t>Correlation between assets in the same category</a:t>
+            </a:r>
           </a:p>
         </p:txBody>
       </p:sp>
@@ -8444,16 +8772,16 @@
           <a:lstStyle/>
           <a:p>
             <a:pPr algn="ctr"/>
-            <a:endParaRPr lang="en-US"/>
-          </a:p>
-        </p:txBody>
-      </p:sp>
-      <p:sp>
-        <p:nvSpPr>
-          <p:cNvPr id="12" name="TextBox 11">
-            <a:extLst>
-              <a:ext uri="{FF2B5EF4-FFF2-40B4-BE49-F238E27FC236}">
-                <a16:creationId xmlns:a16="http://schemas.microsoft.com/office/drawing/2014/main" id="{E4C8ABBB-D831-4A36-9D65-77BC7F5175AB}"/>
+            <a:endParaRPr lang="en-US" dirty="0"/>
+          </a:p>
+        </p:txBody>
+      </p:sp>
+      <p:sp>
+        <p:nvSpPr>
+          <p:cNvPr id="16" name="TextBox 15">
+            <a:extLst>
+              <a:ext uri="{FF2B5EF4-FFF2-40B4-BE49-F238E27FC236}">
+                <a16:creationId xmlns:a16="http://schemas.microsoft.com/office/drawing/2014/main" id="{D83929BE-C6BF-43ED-8AC5-0A3CB7686E0B}"/>
               </a:ext>
             </a:extLst>
           </p:cNvPr>
@@ -8462,53 +8790,7 @@
         </p:nvSpPr>
         <p:spPr>
           <a:xfrm>
-            <a:off x="3964042" y="3845153"/>
-            <a:ext cx="3602202" cy="923330"/>
-          </a:xfrm>
-          <a:prstGeom prst="rect">
-            <a:avLst/>
-          </a:prstGeom>
-          <a:noFill/>
-        </p:spPr>
-        <p:txBody>
-          <a:bodyPr wrap="square" rtlCol="0">
-            <a:spAutoFit/>
-          </a:bodyPr>
-          <a:lstStyle/>
-          <a:p>
-            <a:pPr marL="285750" indent="-285750">
-              <a:buFont typeface="Arial" panose="020B0604020202020204" pitchFamily="34" charset="0"/>
-              <a:buChar char="•"/>
-            </a:pPr>
-            <a:r>
-              <a:rPr lang="en-US" sz="1800" dirty="0">
-                <a:solidFill>
-                  <a:srgbClr val="000000"/>
-                </a:solidFill>
-              </a:rPr>
-              <a:t>What is the impact of a change on one asset on the other asset?</a:t>
-            </a:r>
-          </a:p>
-          <a:p>
-            <a:endParaRPr lang="en-US" dirty="0"/>
-          </a:p>
-        </p:txBody>
-      </p:sp>
-      <p:sp>
-        <p:nvSpPr>
-          <p:cNvPr id="16" name="TextBox 15">
-            <a:extLst>
-              <a:ext uri="{FF2B5EF4-FFF2-40B4-BE49-F238E27FC236}">
-                <a16:creationId xmlns:a16="http://schemas.microsoft.com/office/drawing/2014/main" id="{D83929BE-C6BF-43ED-8AC5-0A3CB7686E0B}"/>
-              </a:ext>
-            </a:extLst>
-          </p:cNvPr>
-          <p:cNvSpPr txBox="1"/>
-          <p:nvPr/>
-        </p:nvSpPr>
-        <p:spPr>
-          <a:xfrm>
-            <a:off x="7415237" y="3835557"/>
+            <a:off x="1966522" y="3947936"/>
             <a:ext cx="3968833" cy="923330"/>
           </a:xfrm>
           <a:prstGeom prst="rect">
@@ -8555,7 +8837,7 @@
           <p:nvPr>
             <p:extLst>
               <p:ext uri="{D42A27DB-BD31-4B8C-83A1-F6EECF244321}">
-                <p14:modId xmlns:p14="http://schemas.microsoft.com/office/powerpoint/2010/main" val="3946580493"/>
+                <p14:modId xmlns:p14="http://schemas.microsoft.com/office/powerpoint/2010/main" val="3614232083"/>
               </p:ext>
             </p:extLst>
           </p:nvPr>
@@ -8913,7 +9195,7 @@
                       </a:pPr>
                       <a:r>
                         <a:rPr lang="en-US" sz="1000" dirty="0"/>
-                        <a:t>Colgate-Palmolive (PL)</a:t>
+                        <a:t>Colgate-Palmolive (CL)</a:t>
                       </a:r>
                     </a:p>
                   </a:txBody>
@@ -9095,6 +9377,121 @@
           </a:graphicData>
         </a:graphic>
       </p:graphicFrame>
+      <p:sp>
+        <p:nvSpPr>
+          <p:cNvPr id="15" name="TextBox 14">
+            <a:extLst>
+              <a:ext uri="{FF2B5EF4-FFF2-40B4-BE49-F238E27FC236}">
+                <a16:creationId xmlns:a16="http://schemas.microsoft.com/office/drawing/2014/main" id="{5A779F21-EE10-49B5-A5FF-A6C47DFF2943}"/>
+              </a:ext>
+            </a:extLst>
+          </p:cNvPr>
+          <p:cNvSpPr txBox="1"/>
+          <p:nvPr/>
+        </p:nvSpPr>
+        <p:spPr>
+          <a:xfrm>
+            <a:off x="8637544" y="3579620"/>
+            <a:ext cx="2352567" cy="1292662"/>
+          </a:xfrm>
+          <a:prstGeom prst="rect">
+            <a:avLst/>
+          </a:prstGeom>
+          <a:noFill/>
+        </p:spPr>
+        <p:txBody>
+          <a:bodyPr wrap="none" rtlCol="0">
+            <a:spAutoFit/>
+          </a:bodyPr>
+          <a:lstStyle/>
+          <a:p>
+            <a:pPr marL="285750" indent="-285750">
+              <a:buFont typeface="Arial" panose="020B0604020202020204" pitchFamily="34" charset="0"/>
+              <a:buChar char="•"/>
+            </a:pPr>
+            <a:r>
+              <a:rPr lang="en-US" sz="1200" dirty="0">
+                <a:effectLst/>
+                <a:latin typeface="Calibri" panose="020F0502020204030204" pitchFamily="34" charset="0"/>
+                <a:ea typeface="Calibri" panose="020F0502020204030204" pitchFamily="34" charset="0"/>
+                <a:cs typeface="Times New Roman" panose="02020603050405020304" pitchFamily="18" charset="0"/>
+              </a:rPr>
+              <a:t>-1 or 1 (perfect correlation)</a:t>
+            </a:r>
+            <a:endParaRPr lang="en-US" sz="1200" dirty="0">
+              <a:solidFill>
+                <a:srgbClr val="000000"/>
+              </a:solidFill>
+              <a:latin typeface="Calibri" panose="020F0502020204030204" pitchFamily="34" charset="0"/>
+              <a:ea typeface="Calibri" panose="020F0502020204030204" pitchFamily="34" charset="0"/>
+              <a:cs typeface="Times New Roman" panose="02020603050405020304" pitchFamily="18" charset="0"/>
+            </a:endParaRPr>
+          </a:p>
+          <a:p>
+            <a:pPr marL="285750" indent="-285750">
+              <a:buFont typeface="Arial" panose="020B0604020202020204" pitchFamily="34" charset="0"/>
+              <a:buChar char="•"/>
+            </a:pPr>
+            <a:r>
+              <a:rPr lang="en-US" sz="1200" dirty="0">
+                <a:effectLst/>
+                <a:latin typeface="Calibri" panose="020F0502020204030204" pitchFamily="34" charset="0"/>
+                <a:ea typeface="Calibri" panose="020F0502020204030204" pitchFamily="34" charset="0"/>
+                <a:cs typeface="Times New Roman" panose="02020603050405020304" pitchFamily="18" charset="0"/>
+              </a:rPr>
+              <a:t>&gt;=  +/- 0.7 (strong correlation)</a:t>
+            </a:r>
+          </a:p>
+          <a:p>
+            <a:pPr marL="285750" indent="-285750">
+              <a:buFont typeface="Arial" panose="020B0604020202020204" pitchFamily="34" charset="0"/>
+              <a:buChar char="•"/>
+            </a:pPr>
+            <a:r>
+              <a:rPr lang="en-US" sz="1200" dirty="0">
+                <a:effectLst/>
+                <a:latin typeface="Calibri" panose="020F0502020204030204" pitchFamily="34" charset="0"/>
+                <a:ea typeface="Calibri" panose="020F0502020204030204" pitchFamily="34" charset="0"/>
+                <a:cs typeface="Times New Roman" panose="02020603050405020304" pitchFamily="18" charset="0"/>
+              </a:rPr>
+              <a:t>&gt;=  +/- 0.5 (moderate)</a:t>
+            </a:r>
+          </a:p>
+          <a:p>
+            <a:pPr marL="285750" indent="-285750">
+              <a:buFont typeface="Arial" panose="020B0604020202020204" pitchFamily="34" charset="0"/>
+              <a:buChar char="•"/>
+            </a:pPr>
+            <a:r>
+              <a:rPr lang="en-US" sz="1200" dirty="0">
+                <a:effectLst/>
+                <a:latin typeface="Calibri" panose="020F0502020204030204" pitchFamily="34" charset="0"/>
+                <a:ea typeface="Calibri" panose="020F0502020204030204" pitchFamily="34" charset="0"/>
+                <a:cs typeface="Times New Roman" panose="02020603050405020304" pitchFamily="18" charset="0"/>
+              </a:rPr>
+              <a:t>&lt;=  +/- 0.3 (weak)</a:t>
+            </a:r>
+          </a:p>
+          <a:p>
+            <a:pPr marL="285750" indent="-285750">
+              <a:buFont typeface="Arial" panose="020B0604020202020204" pitchFamily="34" charset="0"/>
+              <a:buChar char="•"/>
+            </a:pPr>
+            <a:r>
+              <a:rPr lang="en-US" sz="1200" dirty="0">
+                <a:effectLst/>
+                <a:latin typeface="Calibri" panose="020F0502020204030204" pitchFamily="34" charset="0"/>
+                <a:ea typeface="Calibri" panose="020F0502020204030204" pitchFamily="34" charset="0"/>
+                <a:cs typeface="Times New Roman" panose="02020603050405020304" pitchFamily="18" charset="0"/>
+              </a:rPr>
+              <a:t>0 (no linear relationship)</a:t>
+            </a:r>
+          </a:p>
+          <a:p>
+            <a:endParaRPr lang="en-US" dirty="0"/>
+          </a:p>
+        </p:txBody>
+      </p:sp>
     </p:spTree>
     <p:extLst>
       <p:ext uri="{BB962C8B-B14F-4D97-AF65-F5344CB8AC3E}">
@@ -16652,8 +17049,8 @@
         </p:nvSpPr>
         <p:spPr>
           <a:xfrm>
-            <a:off x="9597316" y="3269788"/>
-            <a:ext cx="2238779" cy="2702798"/>
+            <a:off x="9526441" y="2971800"/>
+            <a:ext cx="2594684" cy="3148584"/>
           </a:xfrm>
         </p:spPr>
         <p:txBody>
@@ -16668,18 +17065,18 @@
                   <a:srgbClr val="000000"/>
                 </a:solidFill>
               </a:rPr>
-              <a:t>Speculators and day traders love risky assets while long term favor more stable assets</a:t>
-            </a:r>
-          </a:p>
-          <a:p>
-            <a:pPr marL="0" indent="0">
-              <a:buNone/>
-            </a:pPr>
-            <a:endParaRPr lang="en-US" sz="1900" dirty="0">
-              <a:solidFill>
-                <a:srgbClr val="000000"/>
-              </a:solidFill>
-            </a:endParaRPr>
+              <a:t>Speculators and day traders love risky assets while long term investors favor more stable assets</a:t>
+            </a:r>
+          </a:p>
+          <a:p>
+            <a:r>
+              <a:rPr lang="en-US" sz="1900" i="1" dirty="0">
+                <a:solidFill>
+                  <a:srgbClr val="000000"/>
+                </a:solidFill>
+              </a:rPr>
+              <a:t>The STD of most stocks we have analyzed fall between 3.5% to 5.5%</a:t>
+            </a:r>
           </a:p>
         </p:txBody>
       </p:sp>

</xml_diff>